<commit_message>
Inclusão de slide referência para revisão Java 8
</commit_message>
<xml_diff>
--- a/CAP385-00-Presentations/02-JUnit 5/02-JUnit 5.pptx
+++ b/CAP385-00-Presentations/02-JUnit 5/02-JUnit 5.pptx
@@ -5,23 +5,24 @@
     <p:sldMasterId id="2147483648" r:id="rId1"/>
   </p:sldMasterIdLst>
   <p:notesMasterIdLst>
-    <p:notesMasterId r:id="rId16"/>
+    <p:notesMasterId r:id="rId17"/>
   </p:notesMasterIdLst>
   <p:sldIdLst>
     <p:sldId id="257" r:id="rId2"/>
     <p:sldId id="271" r:id="rId3"/>
     <p:sldId id="265" r:id="rId4"/>
     <p:sldId id="272" r:id="rId5"/>
-    <p:sldId id="281" r:id="rId6"/>
-    <p:sldId id="280" r:id="rId7"/>
-    <p:sldId id="282" r:id="rId8"/>
-    <p:sldId id="273" r:id="rId9"/>
-    <p:sldId id="274" r:id="rId10"/>
-    <p:sldId id="275" r:id="rId11"/>
-    <p:sldId id="276" r:id="rId12"/>
-    <p:sldId id="277" r:id="rId13"/>
-    <p:sldId id="278" r:id="rId14"/>
-    <p:sldId id="279" r:id="rId15"/>
+    <p:sldId id="283" r:id="rId6"/>
+    <p:sldId id="281" r:id="rId7"/>
+    <p:sldId id="280" r:id="rId8"/>
+    <p:sldId id="282" r:id="rId9"/>
+    <p:sldId id="273" r:id="rId10"/>
+    <p:sldId id="274" r:id="rId11"/>
+    <p:sldId id="275" r:id="rId12"/>
+    <p:sldId id="276" r:id="rId13"/>
+    <p:sldId id="277" r:id="rId14"/>
+    <p:sldId id="278" r:id="rId15"/>
+    <p:sldId id="279" r:id="rId16"/>
   </p:sldIdLst>
   <p:sldSz cx="9144000" cy="6858000" type="screen4x3"/>
   <p:notesSz cx="6858000" cy="9144000"/>
@@ -4221,6 +4222,264 @@
           </a:p>
         </p:txBody>
       </p:sp>
+      <p:pic>
+        <p:nvPicPr>
+          <p:cNvPr id="4099" name="Picture 3"/>
+          <p:cNvPicPr>
+            <a:picLocks noChangeAspect="1" noChangeArrowheads="1"/>
+          </p:cNvPicPr>
+          <p:nvPr/>
+        </p:nvPicPr>
+        <p:blipFill>
+          <a:blip r:embed="rId2" cstate="print">
+            <a:extLst>
+              <a:ext uri="{28A0092B-C50C-407E-A947-70E740481C1C}">
+                <a14:useLocalDpi xmlns:a14="http://schemas.microsoft.com/office/drawing/2010/main" xmlns="" val="0"/>
+              </a:ext>
+            </a:extLst>
+          </a:blip>
+          <a:srcRect/>
+          <a:stretch>
+            <a:fillRect/>
+          </a:stretch>
+        </p:blipFill>
+        <p:spPr bwMode="auto">
+          <a:xfrm>
+            <a:off x="457200" y="1268760"/>
+            <a:ext cx="8229600" cy="5238750"/>
+          </a:xfrm>
+          <a:prstGeom prst="rect">
+            <a:avLst/>
+          </a:prstGeom>
+          <a:noFill/>
+          <a:ln>
+            <a:noFill/>
+          </a:ln>
+          <a:effectLst/>
+          <a:extLst>
+            <a:ext uri="{909E8E84-426E-40DD-AFC4-6F175D3DCCD1}">
+              <a14:hiddenFill xmlns:a14="http://schemas.microsoft.com/office/drawing/2010/main" xmlns="">
+                <a:solidFill>
+                  <a:schemeClr val="accent1"/>
+                </a:solidFill>
+              </a14:hiddenFill>
+            </a:ext>
+            <a:ext uri="{91240B29-F687-4F45-9708-019B960494DF}">
+              <a14:hiddenLine xmlns:a14="http://schemas.microsoft.com/office/drawing/2010/main" xmlns="" w="9525">
+                <a:solidFill>
+                  <a:schemeClr val="tx1"/>
+                </a:solidFill>
+                <a:miter lim="800000"/>
+                <a:headEnd/>
+                <a:tailEnd/>
+              </a14:hiddenLine>
+            </a:ext>
+            <a:ext uri="{AF507438-7753-43E0-B8FC-AC1667EBCBE1}">
+              <a14:hiddenEffects xmlns:a14="http://schemas.microsoft.com/office/drawing/2010/main" xmlns="">
+                <a:effectLst>
+                  <a:outerShdw dist="35921" dir="2700000" algn="ctr" rotWithShape="0">
+                    <a:schemeClr val="bg2"/>
+                  </a:outerShdw>
+                </a:effectLst>
+              </a14:hiddenEffects>
+            </a:ext>
+          </a:extLst>
+        </p:spPr>
+      </p:pic>
+      <p:sp>
+        <p:nvSpPr>
+          <p:cNvPr id="13" name="Title 3"/>
+          <p:cNvSpPr>
+            <a:spLocks noGrp="1"/>
+          </p:cNvSpPr>
+          <p:nvPr>
+            <p:ph type="title"/>
+          </p:nvPr>
+        </p:nvSpPr>
+        <p:spPr/>
+        <p:txBody>
+          <a:bodyPr>
+            <a:normAutofit/>
+          </a:bodyPr>
+          <a:lstStyle/>
+          <a:p>
+            <a:r>
+              <a:rPr lang="pt-BR" dirty="0" smtClean="0">
+                <a:solidFill>
+                  <a:srgbClr val="0070C0"/>
+                </a:solidFill>
+                <a:effectLst>
+                  <a:outerShdw blurRad="38100" dist="38100" dir="2700000" algn="tl">
+                    <a:srgbClr val="000000">
+                      <a:alpha val="43137"/>
+                    </a:srgbClr>
+                  </a:outerShdw>
+                </a:effectLst>
+              </a:rPr>
+              <a:t>Exemplo - Função</a:t>
+            </a:r>
+            <a:endParaRPr lang="pt-BR" dirty="0">
+              <a:solidFill>
+                <a:srgbClr val="0070C0"/>
+              </a:solidFill>
+              <a:effectLst>
+                <a:outerShdw blurRad="38100" dist="38100" dir="2700000" algn="tl">
+                  <a:srgbClr val="000000">
+                    <a:alpha val="43137"/>
+                  </a:srgbClr>
+                </a:outerShdw>
+              </a:effectLst>
+            </a:endParaRPr>
+          </a:p>
+        </p:txBody>
+      </p:sp>
+    </p:spTree>
+    <p:extLst>
+      <p:ext uri="{BB962C8B-B14F-4D97-AF65-F5344CB8AC3E}">
+        <p14:creationId xmlns:p14="http://schemas.microsoft.com/office/powerpoint/2010/main" xmlns="" val="3659421261"/>
+      </p:ext>
+    </p:extLst>
+  </p:cSld>
+  <p:clrMapOvr>
+    <a:masterClrMapping/>
+  </p:clrMapOvr>
+  <mc:AlternateContent xmlns:mc="http://schemas.openxmlformats.org/markup-compatibility/2006">
+    <mc:Choice xmlns:p14="http://schemas.microsoft.com/office/powerpoint/2010/main" xmlns="" Requires="p14">
+      <p:transition p14:dur="0"/>
+    </mc:Choice>
+    <mc:Fallback>
+      <p:transition/>
+    </mc:Fallback>
+  </mc:AlternateContent>
+  <p:timing>
+    <p:tnLst>
+      <p:par>
+        <p:cTn id="1" dur="indefinite" restart="never" nodeType="tmRoot"/>
+      </p:par>
+    </p:tnLst>
+  </p:timing>
+</p:sld>
+</file>
+
+<file path=ppt/slides/slide11.xml><?xml version="1.0" encoding="utf-8"?>
+<p:sld xmlns:a="http://schemas.openxmlformats.org/drawingml/2006/main" xmlns:r="http://schemas.openxmlformats.org/officeDocument/2006/relationships" xmlns:p="http://schemas.openxmlformats.org/presentationml/2006/main">
+  <p:cSld>
+    <p:spTree>
+      <p:nvGrpSpPr>
+        <p:cNvPr id="1" name=""/>
+        <p:cNvGrpSpPr/>
+        <p:nvPr/>
+      </p:nvGrpSpPr>
+      <p:grpSpPr>
+        <a:xfrm>
+          <a:off x="0" y="0"/>
+          <a:ext cx="0" cy="0"/>
+          <a:chOff x="0" y="0"/>
+          <a:chExt cx="0" cy="0"/>
+        </a:xfrm>
+      </p:grpSpPr>
+      <p:sp>
+        <p:nvSpPr>
+          <p:cNvPr id="3" name="Slide Number Placeholder 2"/>
+          <p:cNvSpPr>
+            <a:spLocks noGrp="1"/>
+          </p:cNvSpPr>
+          <p:nvPr>
+            <p:ph type="sldNum" sz="quarter" idx="11"/>
+          </p:nvPr>
+        </p:nvSpPr>
+        <p:spPr/>
+        <p:txBody>
+          <a:bodyPr/>
+          <a:lstStyle/>
+          <a:p>
+            <a:fld id="{338BD863-DCDC-5F43-A029-265BB7DA4A17}" type="slidenum">
+              <a:rPr lang="en-US" smtClean="0"/>
+              <a:pPr/>
+              <a:t>11</a:t>
+            </a:fld>
+            <a:endParaRPr lang="en-US" dirty="0"/>
+          </a:p>
+        </p:txBody>
+      </p:sp>
+      <p:sp>
+        <p:nvSpPr>
+          <p:cNvPr id="5" name="AutoShape 2" descr="G:\HD-Games\GitRepos\DesignPatterns\CAP392-02-PloP\artigos\03 - Pattern Language\entrega final\family-guy-simpsons2.webp"/>
+          <p:cNvSpPr>
+            <a:spLocks noChangeAspect="1" noChangeArrowheads="1"/>
+          </p:cNvSpPr>
+          <p:nvPr/>
+        </p:nvSpPr>
+        <p:spPr bwMode="auto">
+          <a:xfrm>
+            <a:off x="155575" y="-144463"/>
+            <a:ext cx="304800" cy="304801"/>
+          </a:xfrm>
+          <a:prstGeom prst="rect">
+            <a:avLst/>
+          </a:prstGeom>
+          <a:noFill/>
+          <a:extLst>
+            <a:ext uri="{909E8E84-426E-40DD-AFC4-6F175D3DCCD1}">
+              <a14:hiddenFill xmlns:a14="http://schemas.microsoft.com/office/drawing/2010/main" xmlns="">
+                <a:solidFill>
+                  <a:srgbClr val="FFFFFF"/>
+                </a:solidFill>
+              </a14:hiddenFill>
+            </a:ext>
+          </a:extLst>
+        </p:spPr>
+        <p:txBody>
+          <a:bodyPr vert="horz" wrap="square" lIns="91440" tIns="45720" rIns="91440" bIns="45720" numCol="1" anchor="t" anchorCtr="0" compatLnSpc="1">
+            <a:prstTxWarp prst="textNoShape">
+              <a:avLst/>
+            </a:prstTxWarp>
+          </a:bodyPr>
+          <a:lstStyle/>
+          <a:p>
+            <a:endParaRPr lang="pt-BR"/>
+          </a:p>
+        </p:txBody>
+      </p:sp>
+      <p:sp>
+        <p:nvSpPr>
+          <p:cNvPr id="7" name="AutoShape 4" descr="G:\HD-Games\GitRepos\DesignPatterns\CAP392-02-PloP\artigos\03 - Pattern Language\entrega final\family-guy-simpsons2.webp"/>
+          <p:cNvSpPr>
+            <a:spLocks noChangeAspect="1" noChangeArrowheads="1"/>
+          </p:cNvSpPr>
+          <p:nvPr/>
+        </p:nvSpPr>
+        <p:spPr bwMode="auto">
+          <a:xfrm>
+            <a:off x="307975" y="7937"/>
+            <a:ext cx="304800" cy="304801"/>
+          </a:xfrm>
+          <a:prstGeom prst="rect">
+            <a:avLst/>
+          </a:prstGeom>
+          <a:noFill/>
+          <a:extLst>
+            <a:ext uri="{909E8E84-426E-40DD-AFC4-6F175D3DCCD1}">
+              <a14:hiddenFill xmlns:a14="http://schemas.microsoft.com/office/drawing/2010/main" xmlns="">
+                <a:solidFill>
+                  <a:srgbClr val="FFFFFF"/>
+                </a:solidFill>
+              </a14:hiddenFill>
+            </a:ext>
+          </a:extLst>
+        </p:spPr>
+        <p:txBody>
+          <a:bodyPr vert="horz" wrap="square" lIns="91440" tIns="45720" rIns="91440" bIns="45720" numCol="1" anchor="t" anchorCtr="0" compatLnSpc="1">
+            <a:prstTxWarp prst="textNoShape">
+              <a:avLst/>
+            </a:prstTxWarp>
+          </a:bodyPr>
+          <a:lstStyle/>
+          <a:p>
+            <a:endParaRPr lang="pt-BR"/>
+          </a:p>
+        </p:txBody>
+      </p:sp>
       <p:sp>
         <p:nvSpPr>
           <p:cNvPr id="13" name="Title 3"/>
@@ -4500,7 +4759,7 @@
 </p:sld>
 </file>
 
-<file path=ppt/slides/slide11.xml><?xml version="1.0" encoding="utf-8"?>
+<file path=ppt/slides/slide12.xml><?xml version="1.0" encoding="utf-8"?>
 <p:sld xmlns:a="http://schemas.openxmlformats.org/drawingml/2006/main" xmlns:r="http://schemas.openxmlformats.org/officeDocument/2006/relationships" xmlns:p="http://schemas.openxmlformats.org/presentationml/2006/main">
   <p:cSld>
     <p:spTree>
@@ -4535,7 +4794,7 @@
             <a:fld id="{338BD863-DCDC-5F43-A029-265BB7DA4A17}" type="slidenum">
               <a:rPr lang="en-US" smtClean="0"/>
               <a:pPr/>
-              <a:t>11</a:t>
+              <a:t>12</a:t>
             </a:fld>
             <a:endParaRPr lang="en-US" dirty="0"/>
           </a:p>
@@ -4758,7 +5017,7 @@
 </p:sld>
 </file>
 
-<file path=ppt/slides/slide12.xml><?xml version="1.0" encoding="utf-8"?>
+<file path=ppt/slides/slide13.xml><?xml version="1.0" encoding="utf-8"?>
 <p:sld xmlns:a="http://schemas.openxmlformats.org/drawingml/2006/main" xmlns:r="http://schemas.openxmlformats.org/officeDocument/2006/relationships" xmlns:p="http://schemas.openxmlformats.org/presentationml/2006/main">
   <p:cSld>
     <p:spTree>
@@ -4793,7 +5052,7 @@
             <a:fld id="{338BD863-DCDC-5F43-A029-265BB7DA4A17}" type="slidenum">
               <a:rPr lang="en-US" smtClean="0"/>
               <a:pPr/>
-              <a:t>12</a:t>
+              <a:t>13</a:t>
             </a:fld>
             <a:endParaRPr lang="en-US" dirty="0"/>
           </a:p>
@@ -5141,7 +5400,7 @@
 </p:sld>
 </file>
 
-<file path=ppt/slides/slide13.xml><?xml version="1.0" encoding="utf-8"?>
+<file path=ppt/slides/slide14.xml><?xml version="1.0" encoding="utf-8"?>
 <p:sld xmlns:a="http://schemas.openxmlformats.org/drawingml/2006/main" xmlns:r="http://schemas.openxmlformats.org/officeDocument/2006/relationships" xmlns:p="http://schemas.openxmlformats.org/presentationml/2006/main">
   <p:cSld>
     <p:spTree>
@@ -5176,7 +5435,7 @@
             <a:fld id="{338BD863-DCDC-5F43-A029-265BB7DA4A17}" type="slidenum">
               <a:rPr lang="en-US" smtClean="0"/>
               <a:pPr/>
-              <a:t>13</a:t>
+              <a:t>14</a:t>
             </a:fld>
             <a:endParaRPr lang="en-US" dirty="0"/>
           </a:p>
@@ -5399,7 +5658,7 @@
 </p:sld>
 </file>
 
-<file path=ppt/slides/slide14.xml><?xml version="1.0" encoding="utf-8"?>
+<file path=ppt/slides/slide15.xml><?xml version="1.0" encoding="utf-8"?>
 <p:sld xmlns:a="http://schemas.openxmlformats.org/drawingml/2006/main" xmlns:r="http://schemas.openxmlformats.org/officeDocument/2006/relationships" xmlns:p="http://schemas.openxmlformats.org/presentationml/2006/main">
   <p:cSld>
     <p:spTree>
@@ -5434,7 +5693,7 @@
             <a:fld id="{338BD863-DCDC-5F43-A029-265BB7DA4A17}" type="slidenum">
               <a:rPr lang="en-US" smtClean="0"/>
               <a:pPr/>
-              <a:t>14</a:t>
+              <a:t>15</a:t>
             </a:fld>
             <a:endParaRPr lang="en-US" dirty="0"/>
           </a:p>
@@ -6755,55 +7014,118 @@
               <a:rPr lang="pt-BR" sz="2800" dirty="0" smtClean="0">
                 <a:hlinkClick r:id="rId2"/>
               </a:rPr>
-              <a:t>http://</a:t>
-            </a:r>
+              <a:t>http://blog.caelum.com.br/o-minimo-que-voce-deve-saber-de-java-8/</a:t>
+            </a:r>
+          </a:p>
+          <a:p>
             <a:r>
               <a:rPr lang="pt-BR" sz="2800" dirty="0" smtClean="0">
                 <a:hlinkClick r:id="rId2"/>
               </a:rPr>
-              <a:t>radar.oreilly.com/2014/12/unit-testing-java-8-lambda-expressions-and-streams.html</a:t>
+              <a:t>http</a:t>
+            </a:r>
+            <a:r>
+              <a:rPr lang="pt-BR" sz="2800" dirty="0" smtClean="0">
+                <a:hlinkClick r:id="rId2"/>
+              </a:rPr>
+              <a:t>://</a:t>
+            </a:r>
+            <a:r>
+              <a:rPr lang="pt-BR" sz="2800" dirty="0" smtClean="0">
+                <a:hlinkClick r:id="rId2"/>
+              </a:rPr>
+              <a:t>pt.stackoverflow.com/questions/269/quais-as-vantagens-das-express%C3%B5es-</a:t>
+            </a:r>
+            <a:r>
+              <a:rPr lang="pt-BR" sz="2800" dirty="0" err="1" smtClean="0">
+                <a:hlinkClick r:id="rId2"/>
+              </a:rPr>
+              <a:t>lambda-presentes-no-java</a:t>
+            </a:r>
+            <a:r>
+              <a:rPr lang="pt-BR" sz="2800" dirty="0" smtClean="0">
+                <a:hlinkClick r:id="rId2"/>
+              </a:rPr>
+              <a:t>-8</a:t>
             </a:r>
             <a:endParaRPr lang="pt-BR" sz="2800" dirty="0" smtClean="0"/>
           </a:p>
           <a:p>
             <a:r>
-              <a:rPr lang="en-US" sz="2800" b="1" dirty="0" smtClean="0"/>
-              <a:t>Unit </a:t>
-            </a:r>
-            <a:r>
-              <a:rPr lang="en-US" sz="2800" b="1" dirty="0" smtClean="0"/>
-              <a:t>Testing Java 8 Lambda Expressions and Streams</a:t>
-            </a:r>
-          </a:p>
-          <a:p>
-            <a:r>
-              <a:rPr lang="en-US" sz="2800" b="1" dirty="0" smtClean="0"/>
-              <a:t>Two approaches to testing </a:t>
-            </a:r>
-            <a:r>
-              <a:rPr lang="en-US" sz="2800" b="1" dirty="0" err="1" smtClean="0"/>
-              <a:t>lambdafied</a:t>
-            </a:r>
-            <a:r>
-              <a:rPr lang="en-US" sz="2800" b="1" dirty="0" smtClean="0"/>
-              <a:t> code.</a:t>
-            </a:r>
-          </a:p>
-          <a:p>
-            <a:pPr lvl="1"/>
-            <a:r>
-              <a:rPr lang="en-US" sz="2400" dirty="0" smtClean="0"/>
-              <a:t>Lambda expressions pose a slightly different challenge when unit testing code. Because they don’t have a name, it’s impossible to directly call them in your test code. You could choose to copy the body of the lambda expression into your test and then test that copy, but this approach has the unfortunate side effect of not actually testing the behavior of your implementation. If you change the implementation code, your test will still pass even though the implementation is performing a different task</a:t>
-            </a:r>
-            <a:r>
-              <a:rPr lang="en-US" sz="2400" dirty="0" smtClean="0"/>
-              <a:t>.</a:t>
-            </a:r>
-          </a:p>
-          <a:p>
-            <a:pPr lvl="1">
-              <a:buNone/>
-            </a:pPr>
+              <a:rPr lang="pt-BR" sz="2400" dirty="0" smtClean="0">
+                <a:hlinkClick r:id="rId3"/>
+              </a:rPr>
+              <a:t>http://</a:t>
+            </a:r>
+            <a:r>
+              <a:rPr lang="pt-BR" sz="2400" dirty="0" smtClean="0">
+                <a:hlinkClick r:id="rId3"/>
+              </a:rPr>
+              <a:t>www.devmedia.com.br/como-usar-funcoes-lambda-em-java/32826</a:t>
+            </a:r>
+            <a:endParaRPr lang="pt-BR" sz="2400" dirty="0" smtClean="0"/>
+          </a:p>
+          <a:p>
+            <a:r>
+              <a:rPr lang="pt-BR" sz="2400" dirty="0" smtClean="0">
+                <a:hlinkClick r:id="rId4"/>
+              </a:rPr>
+              <a:t>http://</a:t>
+            </a:r>
+            <a:r>
+              <a:rPr lang="pt-BR" sz="2400" dirty="0" smtClean="0">
+                <a:hlinkClick r:id="rId4"/>
+              </a:rPr>
+              <a:t>www.devmedia.com.br/novidades-do-java-8-do-lambda-ao-metaspace/29056</a:t>
+            </a:r>
+            <a:endParaRPr lang="pt-BR" sz="2400" dirty="0" smtClean="0"/>
+          </a:p>
+          <a:p>
+            <a:r>
+              <a:rPr lang="pt-BR" sz="2400" dirty="0" smtClean="0">
+                <a:hlinkClick r:id="rId5"/>
+              </a:rPr>
+              <a:t>http://www.teclogica.com.br/blog/java-8-o-que-e-lambda</a:t>
+            </a:r>
+            <a:r>
+              <a:rPr lang="pt-BR" sz="2400" dirty="0" smtClean="0">
+                <a:hlinkClick r:id="rId5"/>
+              </a:rPr>
+              <a:t>/</a:t>
+            </a:r>
+            <a:endParaRPr lang="pt-BR" sz="2400" dirty="0" smtClean="0"/>
+          </a:p>
+          <a:p>
+            <a:r>
+              <a:rPr lang="pt-BR" sz="2400" dirty="0" smtClean="0">
+                <a:hlinkClick r:id="rId6"/>
+              </a:rPr>
+              <a:t>https://rodrigouchoa.wordpress.com/2014/05/20/novidades-do-java-8-lambda-expressions</a:t>
+            </a:r>
+            <a:r>
+              <a:rPr lang="pt-BR" sz="2400" dirty="0" smtClean="0">
+                <a:hlinkClick r:id="rId6"/>
+              </a:rPr>
+              <a:t>/</a:t>
+            </a:r>
+            <a:endParaRPr lang="pt-BR" sz="2400" dirty="0" smtClean="0"/>
+          </a:p>
+          <a:p>
+            <a:r>
+              <a:rPr lang="pt-BR" sz="2400" dirty="0" smtClean="0">
+                <a:hlinkClick r:id="rId7"/>
+              </a:rPr>
+              <a:t>http://blog.takipi.com/compilando-expressoes-lambda-scala-vs-java-8</a:t>
+            </a:r>
+            <a:r>
+              <a:rPr lang="pt-BR" sz="2400" dirty="0" smtClean="0">
+                <a:hlinkClick r:id="rId7"/>
+              </a:rPr>
+              <a:t>/</a:t>
+            </a:r>
+            <a:endParaRPr lang="pt-BR" sz="2400" dirty="0" smtClean="0"/>
+          </a:p>
+          <a:p>
             <a:endParaRPr lang="pt-BR" sz="2400" dirty="0"/>
           </a:p>
         </p:txBody>
@@ -6899,12 +7221,12 @@
         <p:spPr/>
         <p:txBody>
           <a:bodyPr>
-            <a:normAutofit/>
+            <a:normAutofit fontScale="90000"/>
           </a:bodyPr>
           <a:lstStyle/>
           <a:p>
             <a:r>
-              <a:rPr lang="en-US" dirty="0" err="1" smtClean="0">
+              <a:rPr lang="en-US" dirty="0" smtClean="0">
                 <a:solidFill>
                   <a:srgbClr val="0070C0"/>
                 </a:solidFill>
@@ -6916,7 +7238,7 @@
                   </a:outerShdw>
                 </a:effectLst>
               </a:rPr>
-              <a:t>JUnit</a:t>
+              <a:t>Java 8 Lambda Expressions Revis</a:t>
             </a:r>
             <a:r>
               <a:rPr lang="en-US" dirty="0" smtClean="0">
@@ -6931,22 +7253,7 @@
                   </a:outerShdw>
                 </a:effectLst>
               </a:rPr>
-              <a:t> 5 Test </a:t>
-            </a:r>
-            <a:r>
-              <a:rPr lang="en-US" dirty="0" smtClean="0">
-                <a:solidFill>
-                  <a:srgbClr val="0070C0"/>
-                </a:solidFill>
-                <a:effectLst>
-                  <a:outerShdw blurRad="38100" dist="38100" dir="2700000" algn="tl">
-                    <a:srgbClr val="000000">
-                      <a:alpha val="43137"/>
-                    </a:srgbClr>
-                  </a:outerShdw>
-                </a:effectLst>
-              </a:rPr>
-              <a:t>Framework</a:t>
+              <a:t>ion</a:t>
             </a:r>
             <a:endParaRPr lang="en-US" dirty="0">
               <a:solidFill>
@@ -7045,7 +7352,7 @@
         <p:spPr>
           <a:xfrm>
             <a:off x="457200" y="1196752"/>
-            <a:ext cx="8229600" cy="4824536"/>
+            <a:ext cx="8229600" cy="5328592"/>
           </a:xfrm>
         </p:spPr>
         <p:txBody>
@@ -7064,82 +7371,49 @@
               <a:rPr lang="pt-BR" sz="2800" dirty="0" smtClean="0">
                 <a:hlinkClick r:id="rId2"/>
               </a:rPr>
-              <a:t>blog.codeleak.pl/2014/07/junit-testing-exception-with-java-8-and-lambda-expressions.html</a:t>
+              <a:t>radar.oreilly.com/2014/12/unit-testing-java-8-lambda-expressions-and-streams.html</a:t>
             </a:r>
             <a:endParaRPr lang="pt-BR" sz="2800" dirty="0" smtClean="0"/>
           </a:p>
           <a:p>
             <a:r>
+              <a:rPr lang="en-US" sz="2800" b="1" dirty="0" smtClean="0"/>
+              <a:t>Unit </a:t>
+            </a:r>
+            <a:r>
+              <a:rPr lang="en-US" sz="2800" b="1" dirty="0" smtClean="0"/>
+              <a:t>Testing Java 8 Lambda Expressions and Streams</a:t>
+            </a:r>
+          </a:p>
+          <a:p>
+            <a:r>
+              <a:rPr lang="en-US" sz="2800" b="1" dirty="0" smtClean="0"/>
+              <a:t>Two approaches to testing </a:t>
+            </a:r>
+            <a:r>
               <a:rPr lang="en-US" sz="2800" b="1" dirty="0" err="1" smtClean="0"/>
-              <a:t>JUnit</a:t>
+              <a:t>lambdafied</a:t>
             </a:r>
             <a:r>
               <a:rPr lang="en-US" sz="2800" b="1" dirty="0" smtClean="0"/>
-              <a:t>: testing exception with Java 8 and Lambda </a:t>
-            </a:r>
-            <a:r>
-              <a:rPr lang="en-US" sz="2800" b="1" dirty="0" smtClean="0"/>
-              <a:t>Expressions</a:t>
+              <a:t> code.</a:t>
             </a:r>
           </a:p>
           <a:p>
             <a:pPr lvl="1"/>
             <a:r>
               <a:rPr lang="en-US" sz="2400" dirty="0" smtClean="0"/>
-              <a:t>In </a:t>
-            </a:r>
-            <a:r>
-              <a:rPr lang="en-US" sz="2400" dirty="0" err="1" smtClean="0"/>
-              <a:t>JUnit</a:t>
+              <a:t>Lambda expressions pose a slightly different challenge when unit testing code. Because they don’t have a name, it’s impossible to directly call them in your test code. You could choose to copy the body of the lambda expression into your test and then test that copy, but this approach has the unfortunate side effect of not actually testing the behavior of your implementation. If you change the implementation code, your test will still pass even though the implementation is performing a different task</a:t>
             </a:r>
             <a:r>
               <a:rPr lang="en-US" sz="2400" dirty="0" smtClean="0"/>
-              <a:t> there are many ways of testing exceptions in test code, including </a:t>
-            </a:r>
-            <a:r>
-              <a:rPr lang="en-US" sz="2400" dirty="0" smtClean="0">
-                <a:hlinkClick r:id="rId3"/>
-              </a:rPr>
-              <a:t>try-catch idiom</a:t>
-            </a:r>
-            <a:r>
-              <a:rPr lang="en-US" sz="2400" dirty="0" smtClean="0"/>
-              <a:t>, </a:t>
-            </a:r>
-            <a:r>
-              <a:rPr lang="en-US" sz="2400" dirty="0" err="1" smtClean="0">
-                <a:hlinkClick r:id="rId4"/>
-              </a:rPr>
-              <a:t>JUnit</a:t>
-            </a:r>
-            <a:r>
-              <a:rPr lang="en-US" sz="2400" dirty="0" smtClean="0">
-                <a:hlinkClick r:id="rId4"/>
-              </a:rPr>
-              <a:t> @Rule</a:t>
-            </a:r>
-            <a:r>
-              <a:rPr lang="en-US" sz="2400" dirty="0" smtClean="0"/>
-              <a:t>, with </a:t>
-            </a:r>
-            <a:r>
-              <a:rPr lang="en-US" sz="2400" dirty="0" smtClean="0">
-                <a:hlinkClick r:id="rId5"/>
-              </a:rPr>
-              <a:t>catch-exception</a:t>
-            </a:r>
-            <a:r>
-              <a:rPr lang="en-US" sz="2400" dirty="0" smtClean="0"/>
-              <a:t> library. As of Java 8 we have another way of dealing with exceptions: with lambda expressions. In this short blog post I will demonstrate a simple example how one can utilize the power of Java 8 and lambda expressions to test exceptions in </a:t>
-            </a:r>
-            <a:r>
-              <a:rPr lang="en-US" sz="2400" dirty="0" err="1" smtClean="0"/>
-              <a:t>JUnit</a:t>
-            </a:r>
-            <a:r>
-              <a:rPr lang="en-US" sz="2400" dirty="0" smtClean="0"/>
-              <a:t>. </a:t>
-            </a:r>
+              <a:t>.</a:t>
+            </a:r>
+          </a:p>
+          <a:p>
+            <a:pPr lvl="1">
+              <a:buNone/>
+            </a:pPr>
             <a:endParaRPr lang="pt-BR" sz="2400" dirty="0"/>
           </a:p>
         </p:txBody>
@@ -7391,102 +7665,90 @@
           <a:lstStyle/>
           <a:p>
             <a:r>
-              <a:rPr lang="pt-BR" sz="2400" dirty="0" smtClean="0">
+              <a:rPr lang="pt-BR" sz="2800" dirty="0" smtClean="0">
                 <a:hlinkClick r:id="rId2"/>
               </a:rPr>
               <a:t>http://</a:t>
             </a:r>
             <a:r>
-              <a:rPr lang="pt-BR" sz="2400" dirty="0" smtClean="0">
+              <a:rPr lang="pt-BR" sz="2800" dirty="0" smtClean="0">
                 <a:hlinkClick r:id="rId2"/>
               </a:rPr>
-              <a:t>stackoverflow.com/questions/28688047/unit-test-code-with-java-8-lambdas</a:t>
-            </a:r>
-            <a:endParaRPr lang="pt-BR" sz="2400" dirty="0" smtClean="0"/>
-          </a:p>
-          <a:p>
-            <a:r>
-              <a:rPr lang="pt-BR" sz="2400" dirty="0" smtClean="0">
+              <a:t>blog.codeleak.pl/2014/07/junit-testing-exception-with-java-8-and-lambda-expressions.html</a:t>
+            </a:r>
+            <a:endParaRPr lang="pt-BR" sz="2800" dirty="0" smtClean="0"/>
+          </a:p>
+          <a:p>
+            <a:r>
+              <a:rPr lang="en-US" sz="2800" b="1" dirty="0" err="1" smtClean="0"/>
+              <a:t>JUnit</a:t>
+            </a:r>
+            <a:r>
+              <a:rPr lang="en-US" sz="2800" b="1" dirty="0" smtClean="0"/>
+              <a:t>: testing exception with Java 8 and Lambda </a:t>
+            </a:r>
+            <a:r>
+              <a:rPr lang="en-US" sz="2800" b="1" dirty="0" smtClean="0"/>
+              <a:t>Expressions</a:t>
+            </a:r>
+          </a:p>
+          <a:p>
+            <a:pPr lvl="1"/>
+            <a:r>
+              <a:rPr lang="en-US" sz="2400" dirty="0" smtClean="0"/>
+              <a:t>In </a:t>
+            </a:r>
+            <a:r>
+              <a:rPr lang="en-US" sz="2400" dirty="0" err="1" smtClean="0"/>
+              <a:t>JUnit</a:t>
+            </a:r>
+            <a:r>
+              <a:rPr lang="en-US" sz="2400" dirty="0" smtClean="0"/>
+              <a:t> there are many ways of testing exceptions in test code, including </a:t>
+            </a:r>
+            <a:r>
+              <a:rPr lang="en-US" sz="2400" dirty="0" smtClean="0">
                 <a:hlinkClick r:id="rId3"/>
               </a:rPr>
-              <a:t>http://</a:t>
-            </a:r>
-            <a:r>
-              <a:rPr lang="pt-BR" sz="2400" dirty="0" smtClean="0">
-                <a:hlinkClick r:id="rId3"/>
-              </a:rPr>
-              <a:t>stackoverflow.com/questions/34576710/how-to-test-lambda-functions</a:t>
-            </a:r>
-            <a:endParaRPr lang="pt-BR" sz="2400" dirty="0" smtClean="0"/>
-          </a:p>
-          <a:p>
-            <a:r>
-              <a:rPr lang="pt-BR" sz="2400" dirty="0" smtClean="0">
+              <a:t>try-catch idiom</a:t>
+            </a:r>
+            <a:r>
+              <a:rPr lang="en-US" sz="2400" dirty="0" smtClean="0"/>
+              <a:t>, </a:t>
+            </a:r>
+            <a:r>
+              <a:rPr lang="en-US" sz="2400" dirty="0" err="1" smtClean="0">
                 <a:hlinkClick r:id="rId4"/>
               </a:rPr>
-              <a:t>https://pythonconquerstheuniverse.wordpress.com/2011/08/29/lambda_tutorial</a:t>
-            </a:r>
-            <a:r>
-              <a:rPr lang="pt-BR" sz="2400" dirty="0" smtClean="0">
+              <a:t>JUnit</a:t>
+            </a:r>
+            <a:r>
+              <a:rPr lang="en-US" sz="2400" dirty="0" smtClean="0">
                 <a:hlinkClick r:id="rId4"/>
               </a:rPr>
-              <a:t>/</a:t>
-            </a:r>
-            <a:endParaRPr lang="pt-BR" sz="2400" dirty="0" smtClean="0"/>
-          </a:p>
-          <a:p>
-            <a:r>
-              <a:rPr lang="pt-BR" sz="2400" dirty="0" smtClean="0">
+              <a:t> @Rule</a:t>
+            </a:r>
+            <a:r>
+              <a:rPr lang="en-US" sz="2400" dirty="0" smtClean="0"/>
+              <a:t>, with </a:t>
+            </a:r>
+            <a:r>
+              <a:rPr lang="en-US" sz="2400" dirty="0" smtClean="0">
                 <a:hlinkClick r:id="rId5"/>
               </a:rPr>
-              <a:t>http://</a:t>
-            </a:r>
-            <a:r>
-              <a:rPr lang="pt-BR" sz="2400" dirty="0" smtClean="0">
-                <a:hlinkClick r:id="rId5"/>
-              </a:rPr>
-              <a:t>www.coderanch.com/t/647426/Testing/approach-testing-lambda-expressions</a:t>
-            </a:r>
-            <a:endParaRPr lang="pt-BR" sz="2400" dirty="0" smtClean="0"/>
-          </a:p>
-          <a:p>
-            <a:endParaRPr lang="pt-BR" sz="2400" dirty="0" smtClean="0"/>
-          </a:p>
-          <a:p>
-            <a:r>
-              <a:rPr lang="pt-BR" sz="2400" dirty="0" err="1" smtClean="0"/>
-              <a:t>Node</a:t>
-            </a:r>
-            <a:r>
-              <a:rPr lang="pt-BR" sz="2400" dirty="0" smtClean="0"/>
-              <a:t>.</a:t>
-            </a:r>
-            <a:r>
-              <a:rPr lang="pt-BR" sz="2400" dirty="0" err="1" smtClean="0"/>
-              <a:t>js</a:t>
-            </a:r>
-            <a:r>
-              <a:rPr lang="pt-BR" sz="2400" dirty="0" smtClean="0"/>
-              <a:t> </a:t>
-            </a:r>
-            <a:r>
-              <a:rPr lang="pt-BR" sz="2400" dirty="0" smtClean="0">
-                <a:hlinkClick r:id="rId6"/>
-              </a:rPr>
-              <a:t>https://pub.scotch.io/@</a:t>
-            </a:r>
-            <a:r>
-              <a:rPr lang="pt-BR" sz="2400" dirty="0" smtClean="0">
-                <a:hlinkClick r:id="rId6"/>
-              </a:rPr>
-              <a:t>richardhyatt/unit-testing-aws-lambda-functions-in-nodejs</a:t>
-            </a:r>
-            <a:endParaRPr lang="pt-BR" sz="2400" dirty="0" smtClean="0"/>
-          </a:p>
-          <a:p>
-            <a:r>
-              <a:rPr lang="pt-BR" sz="2400" smtClean="0"/>
-              <a:t>Python</a:t>
+              <a:t>catch-exception</a:t>
+            </a:r>
+            <a:r>
+              <a:rPr lang="en-US" sz="2400" dirty="0" smtClean="0"/>
+              <a:t> library. As of Java 8 we have another way of dealing with exceptions: with lambda expressions. In this short blog post I will demonstrate a simple example how one can utilize the power of Java 8 and lambda expressions to test exceptions in </a:t>
+            </a:r>
+            <a:r>
+              <a:rPr lang="en-US" sz="2400" dirty="0" err="1" smtClean="0"/>
+              <a:t>JUnit</a:t>
+            </a:r>
+            <a:r>
+              <a:rPr lang="en-US" sz="2400" dirty="0" smtClean="0"/>
+              <a:t>. </a:t>
             </a:r>
             <a:endParaRPr lang="pt-BR" sz="2400" dirty="0"/>
           </a:p>
@@ -7718,113 +7980,125 @@
       </p:sp>
       <p:sp>
         <p:nvSpPr>
-          <p:cNvPr id="4" name="Title 3"/>
-          <p:cNvSpPr>
-            <a:spLocks noGrp="1"/>
-          </p:cNvSpPr>
-          <p:nvPr>
-            <p:ph type="title"/>
+          <p:cNvPr id="2" name="Espaço Reservado para Conteúdo 1"/>
+          <p:cNvSpPr>
+            <a:spLocks noGrp="1"/>
+          </p:cNvSpPr>
+          <p:nvPr>
+            <p:ph idx="1"/>
           </p:nvPr>
         </p:nvSpPr>
         <p:spPr>
           <a:xfrm>
-            <a:off x="457200" y="228600"/>
-            <a:ext cx="8229600" cy="1400200"/>
+            <a:off x="457200" y="1196752"/>
+            <a:ext cx="8229600" cy="4824536"/>
           </a:xfrm>
         </p:spPr>
         <p:txBody>
           <a:bodyPr>
-            <a:normAutofit fontScale="90000"/>
+            <a:noAutofit/>
           </a:bodyPr>
           <a:lstStyle/>
           <a:p>
             <a:r>
-              <a:rPr lang="pt-BR" dirty="0" smtClean="0">
-                <a:solidFill>
-                  <a:srgbClr val="0070C0"/>
-                </a:solidFill>
-                <a:effectLst>
-                  <a:outerShdw blurRad="38100" dist="38100" dir="2700000" algn="tl">
-                    <a:srgbClr val="000000">
-                      <a:alpha val="43137"/>
-                    </a:srgbClr>
-                  </a:outerShdw>
-                </a:effectLst>
+              <a:rPr lang="pt-BR" sz="2400" dirty="0" smtClean="0">
+                <a:hlinkClick r:id="rId2"/>
               </a:rPr>
-              <a:t>Apresentação do </a:t>
-            </a:r>
-            <a:r>
-              <a:rPr lang="en-US" dirty="0">
-                <a:solidFill>
-                  <a:srgbClr val="0070C0"/>
-                </a:solidFill>
-                <a:effectLst>
-                  <a:outerShdw blurRad="38100" dist="38100" dir="2700000" algn="tl">
-                    <a:srgbClr val="000000">
-                      <a:alpha val="43137"/>
-                    </a:srgbClr>
-                  </a:outerShdw>
-                </a:effectLst>
+              <a:t>http://</a:t>
+            </a:r>
+            <a:r>
+              <a:rPr lang="pt-BR" sz="2400" dirty="0" smtClean="0">
+                <a:hlinkClick r:id="rId2"/>
               </a:rPr>
-              <a:t>MATLAB </a:t>
-            </a:r>
-            <a:r>
-              <a:rPr lang="en-US" dirty="0" err="1">
-                <a:solidFill>
-                  <a:srgbClr val="0070C0"/>
-                </a:solidFill>
-                <a:effectLst>
-                  <a:outerShdw blurRad="38100" dist="38100" dir="2700000" algn="tl">
-                    <a:srgbClr val="000000">
-                      <a:alpha val="43137"/>
-                    </a:srgbClr>
-                  </a:outerShdw>
-                </a:effectLst>
+              <a:t>stackoverflow.com/questions/28688047/unit-test-code-with-java-8-lambdas</a:t>
+            </a:r>
+            <a:endParaRPr lang="pt-BR" sz="2400" dirty="0" smtClean="0"/>
+          </a:p>
+          <a:p>
+            <a:r>
+              <a:rPr lang="pt-BR" sz="2400" dirty="0" smtClean="0">
+                <a:hlinkClick r:id="rId3"/>
               </a:rPr>
-              <a:t>xUnit</a:t>
-            </a:r>
-            <a:r>
-              <a:rPr lang="en-US" dirty="0">
-                <a:solidFill>
-                  <a:srgbClr val="0070C0"/>
-                </a:solidFill>
-                <a:effectLst>
-                  <a:outerShdw blurRad="38100" dist="38100" dir="2700000" algn="tl">
-                    <a:srgbClr val="000000">
-                      <a:alpha val="43137"/>
-                    </a:srgbClr>
-                  </a:outerShdw>
-                </a:effectLst>
+              <a:t>http://</a:t>
+            </a:r>
+            <a:r>
+              <a:rPr lang="pt-BR" sz="2400" dirty="0" smtClean="0">
+                <a:hlinkClick r:id="rId3"/>
               </a:rPr>
-              <a:t> Test </a:t>
-            </a:r>
-            <a:r>
-              <a:rPr lang="pt-BR" dirty="0" smtClean="0">
-                <a:solidFill>
-                  <a:srgbClr val="0070C0"/>
-                </a:solidFill>
-                <a:effectLst>
-                  <a:outerShdw blurRad="38100" dist="38100" dir="2700000" algn="tl">
-                    <a:srgbClr val="000000">
-                      <a:alpha val="43137"/>
-                    </a:srgbClr>
-                  </a:outerShdw>
-                </a:effectLst>
+              <a:t>stackoverflow.com/questions/34576710/how-to-test-lambda-functions</a:t>
+            </a:r>
+            <a:endParaRPr lang="pt-BR" sz="2400" dirty="0" smtClean="0"/>
+          </a:p>
+          <a:p>
+            <a:r>
+              <a:rPr lang="pt-BR" sz="2400" dirty="0" smtClean="0">
+                <a:hlinkClick r:id="rId4"/>
               </a:rPr>
-              <a:t>Framework</a:t>
-            </a:r>
-            <a:endParaRPr lang="pt-BR" dirty="0">
-              <a:solidFill>
-                <a:srgbClr val="0070C0"/>
-              </a:solidFill>
-              <a:effectLst>
-                <a:outerShdw blurRad="38100" dist="38100" dir="2700000" algn="tl">
-                  <a:srgbClr val="000000">
-                    <a:alpha val="43137"/>
-                  </a:srgbClr>
-                </a:outerShdw>
-              </a:effectLst>
-            </a:endParaRPr>
+              <a:t>https://pythonconquerstheuniverse.wordpress.com/2011/08/29/lambda_tutorial</a:t>
+            </a:r>
+            <a:r>
+              <a:rPr lang="pt-BR" sz="2400" dirty="0" smtClean="0">
+                <a:hlinkClick r:id="rId4"/>
+              </a:rPr>
+              <a:t>/</a:t>
+            </a:r>
+            <a:endParaRPr lang="pt-BR" sz="2400" dirty="0" smtClean="0"/>
+          </a:p>
+          <a:p>
+            <a:r>
+              <a:rPr lang="pt-BR" sz="2400" dirty="0" smtClean="0">
+                <a:hlinkClick r:id="rId5"/>
+              </a:rPr>
+              <a:t>http://</a:t>
+            </a:r>
+            <a:r>
+              <a:rPr lang="pt-BR" sz="2400" dirty="0" smtClean="0">
+                <a:hlinkClick r:id="rId5"/>
+              </a:rPr>
+              <a:t>www.coderanch.com/t/647426/Testing/approach-testing-lambda-expressions</a:t>
+            </a:r>
+            <a:endParaRPr lang="pt-BR" sz="2400" dirty="0" smtClean="0"/>
+          </a:p>
+          <a:p>
+            <a:endParaRPr lang="pt-BR" sz="2400" dirty="0" smtClean="0"/>
+          </a:p>
+          <a:p>
+            <a:r>
+              <a:rPr lang="pt-BR" sz="2400" dirty="0" err="1" smtClean="0"/>
+              <a:t>Node</a:t>
+            </a:r>
+            <a:r>
+              <a:rPr lang="pt-BR" sz="2400" dirty="0" smtClean="0"/>
+              <a:t>.</a:t>
+            </a:r>
+            <a:r>
+              <a:rPr lang="pt-BR" sz="2400" dirty="0" err="1" smtClean="0"/>
+              <a:t>js</a:t>
+            </a:r>
+            <a:r>
+              <a:rPr lang="pt-BR" sz="2400" dirty="0" smtClean="0"/>
+              <a:t> </a:t>
+            </a:r>
+            <a:r>
+              <a:rPr lang="pt-BR" sz="2400" dirty="0" smtClean="0">
+                <a:hlinkClick r:id="rId6"/>
+              </a:rPr>
+              <a:t>https://pub.scotch.io/@</a:t>
+            </a:r>
+            <a:r>
+              <a:rPr lang="pt-BR" sz="2400" dirty="0" smtClean="0">
+                <a:hlinkClick r:id="rId6"/>
+              </a:rPr>
+              <a:t>richardhyatt/unit-testing-aws-lambda-functions-in-nodejs</a:t>
+            </a:r>
+            <a:endParaRPr lang="pt-BR" sz="2400" dirty="0" smtClean="0"/>
+          </a:p>
+          <a:p>
+            <a:r>
+              <a:rPr lang="pt-BR" sz="2400" dirty="0" err="1" smtClean="0"/>
+              <a:t>Python</a:t>
+            </a:r>
+            <a:endParaRPr lang="pt-BR" sz="2400" dirty="0"/>
           </a:p>
         </p:txBody>
       </p:sp>
@@ -7906,53 +8180,87 @@
           </a:p>
         </p:txBody>
       </p:sp>
-      <p:pic>
-        <p:nvPicPr>
-          <p:cNvPr id="2050" name="Picture 2" descr="https://d1sui4xqepm0ps.cloudfront.net/categories/example"/>
-          <p:cNvPicPr>
-            <a:picLocks noGrp="1" noChangeAspect="1" noChangeArrowheads="1"/>
-          </p:cNvPicPr>
-          <p:nvPr>
-            <p:ph idx="1"/>
-          </p:nvPr>
-        </p:nvPicPr>
-        <p:blipFill>
-          <a:blip r:embed="rId2" cstate="print">
-            <a:extLst>
-              <a:ext uri="{28A0092B-C50C-407E-A947-70E740481C1C}">
-                <a14:useLocalDpi xmlns:a14="http://schemas.microsoft.com/office/drawing/2010/main" xmlns="" val="0"/>
-              </a:ext>
-            </a:extLst>
-          </a:blip>
-          <a:srcRect/>
-          <a:stretch>
-            <a:fillRect/>
-          </a:stretch>
-        </p:blipFill>
-        <p:spPr bwMode="auto">
-          <a:xfrm>
-            <a:off x="2540000" y="2612231"/>
-            <a:ext cx="4064000" cy="1968500"/>
-          </a:xfrm>
-          <a:prstGeom prst="rect">
-            <a:avLst/>
-          </a:prstGeom>
-          <a:noFill/>
-          <a:extLst>
-            <a:ext uri="{909E8E84-426E-40DD-AFC4-6F175D3DCCD1}">
-              <a14:hiddenFill xmlns:a14="http://schemas.microsoft.com/office/drawing/2010/main" xmlns="">
-                <a:solidFill>
-                  <a:srgbClr val="FFFFFF"/>
-                </a:solidFill>
-              </a14:hiddenFill>
-            </a:ext>
-          </a:extLst>
-        </p:spPr>
-      </p:pic>
+      <p:sp>
+        <p:nvSpPr>
+          <p:cNvPr id="9" name="Title 3"/>
+          <p:cNvSpPr>
+            <a:spLocks noGrp="1"/>
+          </p:cNvSpPr>
+          <p:nvPr>
+            <p:ph type="title"/>
+          </p:nvPr>
+        </p:nvSpPr>
+        <p:spPr/>
+        <p:txBody>
+          <a:bodyPr>
+            <a:normAutofit/>
+          </a:bodyPr>
+          <a:lstStyle/>
+          <a:p>
+            <a:r>
+              <a:rPr lang="en-US" dirty="0" err="1" smtClean="0">
+                <a:solidFill>
+                  <a:srgbClr val="0070C0"/>
+                </a:solidFill>
+                <a:effectLst>
+                  <a:outerShdw blurRad="38100" dist="38100" dir="2700000" algn="tl">
+                    <a:srgbClr val="000000">
+                      <a:alpha val="43137"/>
+                    </a:srgbClr>
+                  </a:outerShdw>
+                </a:effectLst>
+              </a:rPr>
+              <a:t>JUnit</a:t>
+            </a:r>
+            <a:r>
+              <a:rPr lang="en-US" dirty="0" smtClean="0">
+                <a:solidFill>
+                  <a:srgbClr val="0070C0"/>
+                </a:solidFill>
+                <a:effectLst>
+                  <a:outerShdw blurRad="38100" dist="38100" dir="2700000" algn="tl">
+                    <a:srgbClr val="000000">
+                      <a:alpha val="43137"/>
+                    </a:srgbClr>
+                  </a:outerShdw>
+                </a:effectLst>
+              </a:rPr>
+              <a:t> 5 Test </a:t>
+            </a:r>
+            <a:r>
+              <a:rPr lang="en-US" dirty="0" smtClean="0">
+                <a:solidFill>
+                  <a:srgbClr val="0070C0"/>
+                </a:solidFill>
+                <a:effectLst>
+                  <a:outerShdw blurRad="38100" dist="38100" dir="2700000" algn="tl">
+                    <a:srgbClr val="000000">
+                      <a:alpha val="43137"/>
+                    </a:srgbClr>
+                  </a:outerShdw>
+                </a:effectLst>
+              </a:rPr>
+              <a:t>Framework</a:t>
+            </a:r>
+            <a:endParaRPr lang="en-US" dirty="0">
+              <a:solidFill>
+                <a:srgbClr val="0070C0"/>
+              </a:solidFill>
+              <a:effectLst>
+                <a:outerShdw blurRad="38100" dist="38100" dir="2700000" algn="tl">
+                  <a:srgbClr val="000000">
+                    <a:alpha val="43137"/>
+                  </a:srgbClr>
+                </a:outerShdw>
+              </a:effectLst>
+            </a:endParaRPr>
+          </a:p>
+        </p:txBody>
+      </p:sp>
     </p:spTree>
     <p:extLst>
       <p:ext uri="{BB962C8B-B14F-4D97-AF65-F5344CB8AC3E}">
-        <p14:creationId xmlns:p14="http://schemas.microsoft.com/office/powerpoint/2010/main" xmlns="" val="3792145510"/>
+        <p14:creationId xmlns:p14="http://schemas.microsoft.com/office/powerpoint/2010/main" xmlns="" val="1979461865"/>
       </p:ext>
     </p:extLst>
   </p:cSld>
@@ -8020,6 +8328,118 @@
       </p:sp>
       <p:sp>
         <p:nvSpPr>
+          <p:cNvPr id="4" name="Title 3"/>
+          <p:cNvSpPr>
+            <a:spLocks noGrp="1"/>
+          </p:cNvSpPr>
+          <p:nvPr>
+            <p:ph type="title"/>
+          </p:nvPr>
+        </p:nvSpPr>
+        <p:spPr>
+          <a:xfrm>
+            <a:off x="457200" y="228600"/>
+            <a:ext cx="8229600" cy="1400200"/>
+          </a:xfrm>
+        </p:spPr>
+        <p:txBody>
+          <a:bodyPr>
+            <a:normAutofit fontScale="90000"/>
+          </a:bodyPr>
+          <a:lstStyle/>
+          <a:p>
+            <a:r>
+              <a:rPr lang="pt-BR" dirty="0" smtClean="0">
+                <a:solidFill>
+                  <a:srgbClr val="0070C0"/>
+                </a:solidFill>
+                <a:effectLst>
+                  <a:outerShdw blurRad="38100" dist="38100" dir="2700000" algn="tl">
+                    <a:srgbClr val="000000">
+                      <a:alpha val="43137"/>
+                    </a:srgbClr>
+                  </a:outerShdw>
+                </a:effectLst>
+              </a:rPr>
+              <a:t>Apresentação do </a:t>
+            </a:r>
+            <a:r>
+              <a:rPr lang="en-US" dirty="0">
+                <a:solidFill>
+                  <a:srgbClr val="0070C0"/>
+                </a:solidFill>
+                <a:effectLst>
+                  <a:outerShdw blurRad="38100" dist="38100" dir="2700000" algn="tl">
+                    <a:srgbClr val="000000">
+                      <a:alpha val="43137"/>
+                    </a:srgbClr>
+                  </a:outerShdw>
+                </a:effectLst>
+              </a:rPr>
+              <a:t>MATLAB </a:t>
+            </a:r>
+            <a:r>
+              <a:rPr lang="en-US" dirty="0" err="1">
+                <a:solidFill>
+                  <a:srgbClr val="0070C0"/>
+                </a:solidFill>
+                <a:effectLst>
+                  <a:outerShdw blurRad="38100" dist="38100" dir="2700000" algn="tl">
+                    <a:srgbClr val="000000">
+                      <a:alpha val="43137"/>
+                    </a:srgbClr>
+                  </a:outerShdw>
+                </a:effectLst>
+              </a:rPr>
+              <a:t>xUnit</a:t>
+            </a:r>
+            <a:r>
+              <a:rPr lang="en-US" dirty="0">
+                <a:solidFill>
+                  <a:srgbClr val="0070C0"/>
+                </a:solidFill>
+                <a:effectLst>
+                  <a:outerShdw blurRad="38100" dist="38100" dir="2700000" algn="tl">
+                    <a:srgbClr val="000000">
+                      <a:alpha val="43137"/>
+                    </a:srgbClr>
+                  </a:outerShdw>
+                </a:effectLst>
+              </a:rPr>
+              <a:t> Test </a:t>
+            </a:r>
+            <a:r>
+              <a:rPr lang="pt-BR" dirty="0" smtClean="0">
+                <a:solidFill>
+                  <a:srgbClr val="0070C0"/>
+                </a:solidFill>
+                <a:effectLst>
+                  <a:outerShdw blurRad="38100" dist="38100" dir="2700000" algn="tl">
+                    <a:srgbClr val="000000">
+                      <a:alpha val="43137"/>
+                    </a:srgbClr>
+                  </a:outerShdw>
+                </a:effectLst>
+              </a:rPr>
+              <a:t>Framework</a:t>
+            </a:r>
+            <a:endParaRPr lang="pt-BR" dirty="0">
+              <a:solidFill>
+                <a:srgbClr val="0070C0"/>
+              </a:solidFill>
+              <a:effectLst>
+                <a:outerShdw blurRad="38100" dist="38100" dir="2700000" algn="tl">
+                  <a:srgbClr val="000000">
+                    <a:alpha val="43137"/>
+                  </a:srgbClr>
+                </a:outerShdw>
+              </a:effectLst>
+            </a:endParaRPr>
+          </a:p>
+        </p:txBody>
+      </p:sp>
+      <p:sp>
+        <p:nvSpPr>
           <p:cNvPr id="5" name="AutoShape 2" descr="G:\HD-Games\GitRepos\DesignPatterns\CAP392-02-PloP\artigos\03 - Pattern Language\entrega final\family-guy-simpsons2.webp"/>
           <p:cNvSpPr>
             <a:spLocks noChangeAspect="1" noChangeArrowheads="1"/>
@@ -8098,11 +8518,13 @@
       </p:sp>
       <p:pic>
         <p:nvPicPr>
-          <p:cNvPr id="4099" name="Picture 3"/>
+          <p:cNvPr id="2050" name="Picture 2" descr="https://d1sui4xqepm0ps.cloudfront.net/categories/example"/>
           <p:cNvPicPr>
-            <a:picLocks noChangeAspect="1" noChangeArrowheads="1"/>
+            <a:picLocks noGrp="1" noChangeAspect="1" noChangeArrowheads="1"/>
           </p:cNvPicPr>
-          <p:nvPr/>
+          <p:nvPr>
+            <p:ph idx="1"/>
+          </p:nvPr>
         </p:nvPicPr>
         <p:blipFill>
           <a:blip r:embed="rId2" cstate="print">
@@ -8119,98 +8541,28 @@
         </p:blipFill>
         <p:spPr bwMode="auto">
           <a:xfrm>
-            <a:off x="457200" y="1268760"/>
-            <a:ext cx="8229600" cy="5238750"/>
+            <a:off x="2540000" y="2612231"/>
+            <a:ext cx="4064000" cy="1968500"/>
           </a:xfrm>
           <a:prstGeom prst="rect">
             <a:avLst/>
           </a:prstGeom>
           <a:noFill/>
-          <a:ln>
-            <a:noFill/>
-          </a:ln>
-          <a:effectLst/>
           <a:extLst>
             <a:ext uri="{909E8E84-426E-40DD-AFC4-6F175D3DCCD1}">
               <a14:hiddenFill xmlns:a14="http://schemas.microsoft.com/office/drawing/2010/main" xmlns="">
                 <a:solidFill>
-                  <a:schemeClr val="accent1"/>
+                  <a:srgbClr val="FFFFFF"/>
                 </a:solidFill>
               </a14:hiddenFill>
-            </a:ext>
-            <a:ext uri="{91240B29-F687-4F45-9708-019B960494DF}">
-              <a14:hiddenLine xmlns:a14="http://schemas.microsoft.com/office/drawing/2010/main" xmlns="" w="9525">
-                <a:solidFill>
-                  <a:schemeClr val="tx1"/>
-                </a:solidFill>
-                <a:miter lim="800000"/>
-                <a:headEnd/>
-                <a:tailEnd/>
-              </a14:hiddenLine>
-            </a:ext>
-            <a:ext uri="{AF507438-7753-43E0-B8FC-AC1667EBCBE1}">
-              <a14:hiddenEffects xmlns:a14="http://schemas.microsoft.com/office/drawing/2010/main" xmlns="">
-                <a:effectLst>
-                  <a:outerShdw dist="35921" dir="2700000" algn="ctr" rotWithShape="0">
-                    <a:schemeClr val="bg2"/>
-                  </a:outerShdw>
-                </a:effectLst>
-              </a14:hiddenEffects>
             </a:ext>
           </a:extLst>
         </p:spPr>
       </p:pic>
-      <p:sp>
-        <p:nvSpPr>
-          <p:cNvPr id="13" name="Title 3"/>
-          <p:cNvSpPr>
-            <a:spLocks noGrp="1"/>
-          </p:cNvSpPr>
-          <p:nvPr>
-            <p:ph type="title"/>
-          </p:nvPr>
-        </p:nvSpPr>
-        <p:spPr/>
-        <p:txBody>
-          <a:bodyPr>
-            <a:normAutofit/>
-          </a:bodyPr>
-          <a:lstStyle/>
-          <a:p>
-            <a:r>
-              <a:rPr lang="pt-BR" dirty="0" smtClean="0">
-                <a:solidFill>
-                  <a:srgbClr val="0070C0"/>
-                </a:solidFill>
-                <a:effectLst>
-                  <a:outerShdw blurRad="38100" dist="38100" dir="2700000" algn="tl">
-                    <a:srgbClr val="000000">
-                      <a:alpha val="43137"/>
-                    </a:srgbClr>
-                  </a:outerShdw>
-                </a:effectLst>
-              </a:rPr>
-              <a:t>Exemplo - Função</a:t>
-            </a:r>
-            <a:endParaRPr lang="pt-BR" dirty="0">
-              <a:solidFill>
-                <a:srgbClr val="0070C0"/>
-              </a:solidFill>
-              <a:effectLst>
-                <a:outerShdw blurRad="38100" dist="38100" dir="2700000" algn="tl">
-                  <a:srgbClr val="000000">
-                    <a:alpha val="43137"/>
-                  </a:srgbClr>
-                </a:outerShdw>
-              </a:effectLst>
-            </a:endParaRPr>
-          </a:p>
-        </p:txBody>
-      </p:sp>
     </p:spTree>
     <p:extLst>
       <p:ext uri="{BB962C8B-B14F-4D97-AF65-F5344CB8AC3E}">
-        <p14:creationId xmlns:p14="http://schemas.microsoft.com/office/powerpoint/2010/main" xmlns="" val="3659421261"/>
+        <p14:creationId xmlns:p14="http://schemas.microsoft.com/office/powerpoint/2010/main" xmlns="" val="3792145510"/>
       </p:ext>
     </p:extLst>
   </p:cSld>

</xml_diff>

<commit_message>
Tutorial Expressão Lambda em Java e API Stream, com filter e sum.
</commit_message>
<xml_diff>
--- a/CAP385-00-Presentations/02-JUnit 5/02-JUnit 5.pptx
+++ b/CAP385-00-Presentations/02-JUnit 5/02-JUnit 5.pptx
@@ -376,7 +376,7 @@
     </p:spTree>
     <p:extLst>
       <p:ext uri="{BB962C8B-B14F-4D97-AF65-F5344CB8AC3E}">
-        <p14:creationId xmlns:p14="http://schemas.microsoft.com/office/powerpoint/2010/main" xmlns="" val="931511881"/>
+        <p14:creationId xmlns:p14="http://schemas.microsoft.com/office/powerpoint/2010/main" val="931511881"/>
       </p:ext>
     </p:extLst>
   </p:cSld>
@@ -792,7 +792,7 @@
     </p:spTree>
     <p:extLst>
       <p:ext uri="{BB962C8B-B14F-4D97-AF65-F5344CB8AC3E}">
-        <p14:creationId xmlns:p14="http://schemas.microsoft.com/office/powerpoint/2010/main" xmlns="" val="232200043"/>
+        <p14:creationId xmlns:p14="http://schemas.microsoft.com/office/powerpoint/2010/main" val="232200043"/>
       </p:ext>
     </p:extLst>
   </p:cSld>
@@ -964,7 +964,7 @@
     </p:spTree>
     <p:extLst>
       <p:ext uri="{BB962C8B-B14F-4D97-AF65-F5344CB8AC3E}">
-        <p14:creationId xmlns:p14="http://schemas.microsoft.com/office/powerpoint/2010/main" xmlns="" val="4288294710"/>
+        <p14:creationId xmlns:p14="http://schemas.microsoft.com/office/powerpoint/2010/main" val="4288294710"/>
       </p:ext>
     </p:extLst>
   </p:cSld>
@@ -1146,7 +1146,7 @@
     </p:spTree>
     <p:extLst>
       <p:ext uri="{BB962C8B-B14F-4D97-AF65-F5344CB8AC3E}">
-        <p14:creationId xmlns:p14="http://schemas.microsoft.com/office/powerpoint/2010/main" xmlns="" val="1768894035"/>
+        <p14:creationId xmlns:p14="http://schemas.microsoft.com/office/powerpoint/2010/main" val="1768894035"/>
       </p:ext>
     </p:extLst>
   </p:cSld>
@@ -1325,7 +1325,7 @@
     </p:spTree>
     <p:extLst>
       <p:ext uri="{BB962C8B-B14F-4D97-AF65-F5344CB8AC3E}">
-        <p14:creationId xmlns:p14="http://schemas.microsoft.com/office/powerpoint/2010/main" xmlns="" val="3790790394"/>
+        <p14:creationId xmlns:p14="http://schemas.microsoft.com/office/powerpoint/2010/main" val="3790790394"/>
       </p:ext>
     </p:extLst>
   </p:cSld>
@@ -1500,7 +1500,7 @@
     </p:spTree>
     <p:extLst>
       <p:ext uri="{BB962C8B-B14F-4D97-AF65-F5344CB8AC3E}">
-        <p14:creationId xmlns:p14="http://schemas.microsoft.com/office/powerpoint/2010/main" xmlns="" val="1703672992"/>
+        <p14:creationId xmlns:p14="http://schemas.microsoft.com/office/powerpoint/2010/main" val="1703672992"/>
       </p:ext>
     </p:extLst>
   </p:cSld>
@@ -1748,7 +1748,7 @@
     </p:spTree>
     <p:extLst>
       <p:ext uri="{BB962C8B-B14F-4D97-AF65-F5344CB8AC3E}">
-        <p14:creationId xmlns:p14="http://schemas.microsoft.com/office/powerpoint/2010/main" xmlns="" val="3813910103"/>
+        <p14:creationId xmlns:p14="http://schemas.microsoft.com/office/powerpoint/2010/main" val="3813910103"/>
       </p:ext>
     </p:extLst>
   </p:cSld>
@@ -2038,7 +2038,7 @@
     </p:spTree>
     <p:extLst>
       <p:ext uri="{BB962C8B-B14F-4D97-AF65-F5344CB8AC3E}">
-        <p14:creationId xmlns:p14="http://schemas.microsoft.com/office/powerpoint/2010/main" xmlns="" val="1572770549"/>
+        <p14:creationId xmlns:p14="http://schemas.microsoft.com/office/powerpoint/2010/main" val="1572770549"/>
       </p:ext>
     </p:extLst>
   </p:cSld>
@@ -2462,7 +2462,7 @@
     </p:spTree>
     <p:extLst>
       <p:ext uri="{BB962C8B-B14F-4D97-AF65-F5344CB8AC3E}">
-        <p14:creationId xmlns:p14="http://schemas.microsoft.com/office/powerpoint/2010/main" xmlns="" val="2953487066"/>
+        <p14:creationId xmlns:p14="http://schemas.microsoft.com/office/powerpoint/2010/main" val="2953487066"/>
       </p:ext>
     </p:extLst>
   </p:cSld>
@@ -2582,7 +2582,7 @@
     </p:spTree>
     <p:extLst>
       <p:ext uri="{BB962C8B-B14F-4D97-AF65-F5344CB8AC3E}">
-        <p14:creationId xmlns:p14="http://schemas.microsoft.com/office/powerpoint/2010/main" xmlns="" val="2277560286"/>
+        <p14:creationId xmlns:p14="http://schemas.microsoft.com/office/powerpoint/2010/main" val="2277560286"/>
       </p:ext>
     </p:extLst>
   </p:cSld>
@@ -2679,7 +2679,7 @@
     </p:spTree>
     <p:extLst>
       <p:ext uri="{BB962C8B-B14F-4D97-AF65-F5344CB8AC3E}">
-        <p14:creationId xmlns:p14="http://schemas.microsoft.com/office/powerpoint/2010/main" xmlns="" val="3562573606"/>
+        <p14:creationId xmlns:p14="http://schemas.microsoft.com/office/powerpoint/2010/main" val="3562573606"/>
       </p:ext>
     </p:extLst>
   </p:cSld>
@@ -2958,7 +2958,7 @@
     </p:spTree>
     <p:extLst>
       <p:ext uri="{BB962C8B-B14F-4D97-AF65-F5344CB8AC3E}">
-        <p14:creationId xmlns:p14="http://schemas.microsoft.com/office/powerpoint/2010/main" xmlns="" val="1649560461"/>
+        <p14:creationId xmlns:p14="http://schemas.microsoft.com/office/powerpoint/2010/main" val="1649560461"/>
       </p:ext>
     </p:extLst>
   </p:cSld>
@@ -3213,7 +3213,7 @@
     </p:spTree>
     <p:extLst>
       <p:ext uri="{BB962C8B-B14F-4D97-AF65-F5344CB8AC3E}">
-        <p14:creationId xmlns:p14="http://schemas.microsoft.com/office/powerpoint/2010/main" xmlns="" val="3587138273"/>
+        <p14:creationId xmlns:p14="http://schemas.microsoft.com/office/powerpoint/2010/main" val="3587138273"/>
       </p:ext>
     </p:extLst>
   </p:cSld>
@@ -3464,7 +3464,7 @@
     </p:spTree>
     <p:extLst>
       <p:ext uri="{BB962C8B-B14F-4D97-AF65-F5344CB8AC3E}">
-        <p14:creationId xmlns:p14="http://schemas.microsoft.com/office/powerpoint/2010/main" xmlns="" val="1458671027"/>
+        <p14:creationId xmlns:p14="http://schemas.microsoft.com/office/powerpoint/2010/main" val="1458671027"/>
       </p:ext>
     </p:extLst>
   </p:cSld>
@@ -3836,6 +3836,30 @@
                   <a:srgbClr val="0070C0"/>
                 </a:solidFill>
               </a:rPr>
+              <a:t> </a:t>
+            </a:r>
+            <a:r>
+              <a:rPr lang="en-US" b="1" dirty="0" smtClean="0">
+                <a:solidFill>
+                  <a:srgbClr val="0070C0"/>
+                </a:solidFill>
+              </a:rPr>
+              <a:t>Lambda -&gt; </a:t>
+            </a:r>
+            <a:r>
+              <a:rPr lang="en-US" b="1" dirty="0" err="1" smtClean="0">
+                <a:solidFill>
+                  <a:srgbClr val="0070C0"/>
+                </a:solidFill>
+              </a:rPr>
+              <a:t>JUnit</a:t>
+            </a:r>
+            <a:r>
+              <a:rPr lang="en-US" b="1" dirty="0" smtClean="0">
+                <a:solidFill>
+                  <a:srgbClr val="0070C0"/>
+                </a:solidFill>
+              </a:rPr>
               <a:t> 5</a:t>
             </a:r>
             <a:r>
@@ -3859,7 +3883,7 @@
                   <a:srgbClr val="0070C0"/>
                 </a:solidFill>
               </a:rPr>
-              <a:t>Test </a:t>
+              <a:t>Java Unit Test </a:t>
             </a:r>
             <a:r>
               <a:rPr lang="en-US" b="1" dirty="0">
@@ -3944,15 +3968,7 @@
                   <a:schemeClr val="tx1"/>
                 </a:solidFill>
               </a:rPr>
-              <a:t>Luiz Wagner Tavares </a:t>
-            </a:r>
-            <a:r>
-              <a:rPr lang="pt-BR" sz="2800" dirty="0" smtClean="0">
-                <a:solidFill>
-                  <a:schemeClr val="tx1"/>
-                </a:solidFill>
-              </a:rPr>
-              <a:t>Nascimento</a:t>
+              <a:t>Luiz Wagner Tavares Nascimento</a:t>
             </a:r>
           </a:p>
           <a:p>
@@ -4078,18 +4094,18 @@
     </p:spTree>
     <p:extLst>
       <p:ext uri="{BB962C8B-B14F-4D97-AF65-F5344CB8AC3E}">
-        <p14:creationId xmlns:p14="http://schemas.microsoft.com/office/powerpoint/2010/main" xmlns="" val="1800453935"/>
+        <p14:creationId xmlns:p14="http://schemas.microsoft.com/office/powerpoint/2010/main" val="1800453935"/>
       </p:ext>
     </p:extLst>
   </p:cSld>
   <p:clrMapOvr>
     <a:masterClrMapping/>
   </p:clrMapOvr>
-  <mc:AlternateContent xmlns:mc="http://schemas.openxmlformats.org/markup-compatibility/2006">
-    <mc:Choice xmlns:p14="http://schemas.microsoft.com/office/powerpoint/2010/main" xmlns="" Requires="p14">
+  <mc:AlternateContent xmlns:mc="http://schemas.openxmlformats.org/markup-compatibility/2006" xmlns:p14="http://schemas.microsoft.com/office/powerpoint/2010/main">
+    <mc:Choice Requires="p14">
       <p:transition spd="slow" p14:dur="2000"/>
     </mc:Choice>
-    <mc:Fallback>
+    <mc:Fallback xmlns="">
       <p:transition spd="slow"/>
     </mc:Fallback>
   </mc:AlternateContent>
@@ -4163,7 +4179,7 @@
           <a:noFill/>
           <a:extLst>
             <a:ext uri="{909E8E84-426E-40DD-AFC4-6F175D3DCCD1}">
-              <a14:hiddenFill xmlns:a14="http://schemas.microsoft.com/office/drawing/2010/main" xmlns="">
+              <a14:hiddenFill xmlns:a14="http://schemas.microsoft.com/office/drawing/2010/main">
                 <a:solidFill>
                   <a:srgbClr val="FFFFFF"/>
                 </a:solidFill>
@@ -4202,7 +4218,7 @@
           <a:noFill/>
           <a:extLst>
             <a:ext uri="{909E8E84-426E-40DD-AFC4-6F175D3DCCD1}">
-              <a14:hiddenFill xmlns:a14="http://schemas.microsoft.com/office/drawing/2010/main" xmlns="">
+              <a14:hiddenFill xmlns:a14="http://schemas.microsoft.com/office/drawing/2010/main">
                 <a:solidFill>
                   <a:srgbClr val="FFFFFF"/>
                 </a:solidFill>
@@ -4234,7 +4250,7 @@
           <a:blip r:embed="rId2" cstate="print">
             <a:extLst>
               <a:ext uri="{28A0092B-C50C-407E-A947-70E740481C1C}">
-                <a14:useLocalDpi xmlns:a14="http://schemas.microsoft.com/office/drawing/2010/main" xmlns="" val="0"/>
+                <a14:useLocalDpi xmlns:a14="http://schemas.microsoft.com/office/drawing/2010/main" val="0"/>
               </a:ext>
             </a:extLst>
           </a:blip>
@@ -4258,14 +4274,14 @@
           <a:effectLst/>
           <a:extLst>
             <a:ext uri="{909E8E84-426E-40DD-AFC4-6F175D3DCCD1}">
-              <a14:hiddenFill xmlns:a14="http://schemas.microsoft.com/office/drawing/2010/main" xmlns="">
+              <a14:hiddenFill xmlns:a14="http://schemas.microsoft.com/office/drawing/2010/main">
                 <a:solidFill>
                   <a:schemeClr val="accent1"/>
                 </a:solidFill>
               </a14:hiddenFill>
             </a:ext>
             <a:ext uri="{91240B29-F687-4F45-9708-019B960494DF}">
-              <a14:hiddenLine xmlns:a14="http://schemas.microsoft.com/office/drawing/2010/main" xmlns="" w="9525">
+              <a14:hiddenLine xmlns:a14="http://schemas.microsoft.com/office/drawing/2010/main" w="9525">
                 <a:solidFill>
                   <a:schemeClr val="tx1"/>
                 </a:solidFill>
@@ -4275,7 +4291,7 @@
               </a14:hiddenLine>
             </a:ext>
             <a:ext uri="{AF507438-7753-43E0-B8FC-AC1667EBCBE1}">
-              <a14:hiddenEffects xmlns:a14="http://schemas.microsoft.com/office/drawing/2010/main" xmlns="">
+              <a14:hiddenEffects xmlns:a14="http://schemas.microsoft.com/office/drawing/2010/main">
                 <a:effectLst>
                   <a:outerShdw dist="35921" dir="2700000" algn="ctr" rotWithShape="0">
                     <a:schemeClr val="bg2"/>
@@ -4336,18 +4352,18 @@
     </p:spTree>
     <p:extLst>
       <p:ext uri="{BB962C8B-B14F-4D97-AF65-F5344CB8AC3E}">
-        <p14:creationId xmlns:p14="http://schemas.microsoft.com/office/powerpoint/2010/main" xmlns="" val="3659421261"/>
+        <p14:creationId xmlns:p14="http://schemas.microsoft.com/office/powerpoint/2010/main" val="3659421261"/>
       </p:ext>
     </p:extLst>
   </p:cSld>
   <p:clrMapOvr>
     <a:masterClrMapping/>
   </p:clrMapOvr>
-  <mc:AlternateContent xmlns:mc="http://schemas.openxmlformats.org/markup-compatibility/2006">
-    <mc:Choice xmlns:p14="http://schemas.microsoft.com/office/powerpoint/2010/main" xmlns="" Requires="p14">
+  <mc:AlternateContent xmlns:mc="http://schemas.openxmlformats.org/markup-compatibility/2006" xmlns:p14="http://schemas.microsoft.com/office/powerpoint/2010/main">
+    <mc:Choice Requires="p14">
       <p:transition p14:dur="0"/>
     </mc:Choice>
-    <mc:Fallback>
+    <mc:Fallback xmlns="">
       <p:transition/>
     </mc:Fallback>
   </mc:AlternateContent>
@@ -4421,7 +4437,7 @@
           <a:noFill/>
           <a:extLst>
             <a:ext uri="{909E8E84-426E-40DD-AFC4-6F175D3DCCD1}">
-              <a14:hiddenFill xmlns:a14="http://schemas.microsoft.com/office/drawing/2010/main" xmlns="">
+              <a14:hiddenFill xmlns:a14="http://schemas.microsoft.com/office/drawing/2010/main">
                 <a:solidFill>
                   <a:srgbClr val="FFFFFF"/>
                 </a:solidFill>
@@ -4460,7 +4476,7 @@
           <a:noFill/>
           <a:extLst>
             <a:ext uri="{909E8E84-426E-40DD-AFC4-6F175D3DCCD1}">
-              <a14:hiddenFill xmlns:a14="http://schemas.microsoft.com/office/drawing/2010/main" xmlns="">
+              <a14:hiddenFill xmlns:a14="http://schemas.microsoft.com/office/drawing/2010/main">
                 <a:solidFill>
                   <a:srgbClr val="FFFFFF"/>
                 </a:solidFill>
@@ -4539,7 +4555,7 @@
           <a:blip r:embed="rId2" cstate="print">
             <a:extLst>
               <a:ext uri="{28A0092B-C50C-407E-A947-70E740481C1C}">
-                <a14:useLocalDpi xmlns:a14="http://schemas.microsoft.com/office/drawing/2010/main" xmlns="" val="0"/>
+                <a14:useLocalDpi xmlns:a14="http://schemas.microsoft.com/office/drawing/2010/main" val="0"/>
               </a:ext>
             </a:extLst>
           </a:blip>
@@ -4563,14 +4579,14 @@
           <a:effectLst/>
           <a:extLst>
             <a:ext uri="{909E8E84-426E-40DD-AFC4-6F175D3DCCD1}">
-              <a14:hiddenFill xmlns:a14="http://schemas.microsoft.com/office/drawing/2010/main" xmlns="">
+              <a14:hiddenFill xmlns:a14="http://schemas.microsoft.com/office/drawing/2010/main">
                 <a:solidFill>
                   <a:schemeClr val="accent1"/>
                 </a:solidFill>
               </a14:hiddenFill>
             </a:ext>
             <a:ext uri="{91240B29-F687-4F45-9708-019B960494DF}">
-              <a14:hiddenLine xmlns:a14="http://schemas.microsoft.com/office/drawing/2010/main" xmlns="" w="9525">
+              <a14:hiddenLine xmlns:a14="http://schemas.microsoft.com/office/drawing/2010/main" w="9525">
                 <a:solidFill>
                   <a:schemeClr val="tx1"/>
                 </a:solidFill>
@@ -4580,7 +4596,7 @@
               </a14:hiddenLine>
             </a:ext>
             <a:ext uri="{AF507438-7753-43E0-B8FC-AC1667EBCBE1}">
-              <a14:hiddenEffects xmlns:a14="http://schemas.microsoft.com/office/drawing/2010/main" xmlns="">
+              <a14:hiddenEffects xmlns:a14="http://schemas.microsoft.com/office/drawing/2010/main">
                 <a:effectLst>
                   <a:outerShdw dist="35921" dir="2700000" algn="ctr" rotWithShape="0">
                     <a:schemeClr val="bg2"/>
@@ -4603,7 +4619,7 @@
           <a:blip r:embed="rId3" cstate="print">
             <a:extLst>
               <a:ext uri="{28A0092B-C50C-407E-A947-70E740481C1C}">
-                <a14:useLocalDpi xmlns:a14="http://schemas.microsoft.com/office/drawing/2010/main" xmlns="" val="0"/>
+                <a14:useLocalDpi xmlns:a14="http://schemas.microsoft.com/office/drawing/2010/main" val="0"/>
               </a:ext>
             </a:extLst>
           </a:blip>
@@ -4627,14 +4643,14 @@
           <a:effectLst/>
           <a:extLst>
             <a:ext uri="{909E8E84-426E-40DD-AFC4-6F175D3DCCD1}">
-              <a14:hiddenFill xmlns:a14="http://schemas.microsoft.com/office/drawing/2010/main" xmlns="">
+              <a14:hiddenFill xmlns:a14="http://schemas.microsoft.com/office/drawing/2010/main">
                 <a:solidFill>
                   <a:schemeClr val="accent1"/>
                 </a:solidFill>
               </a14:hiddenFill>
             </a:ext>
             <a:ext uri="{91240B29-F687-4F45-9708-019B960494DF}">
-              <a14:hiddenLine xmlns:a14="http://schemas.microsoft.com/office/drawing/2010/main" xmlns="" w="9525">
+              <a14:hiddenLine xmlns:a14="http://schemas.microsoft.com/office/drawing/2010/main" w="9525">
                 <a:solidFill>
                   <a:schemeClr val="tx1"/>
                 </a:solidFill>
@@ -4644,7 +4660,7 @@
               </a14:hiddenLine>
             </a:ext>
             <a:ext uri="{AF507438-7753-43E0-B8FC-AC1667EBCBE1}">
-              <a14:hiddenEffects xmlns:a14="http://schemas.microsoft.com/office/drawing/2010/main" xmlns="">
+              <a14:hiddenEffects xmlns:a14="http://schemas.microsoft.com/office/drawing/2010/main">
                 <a:effectLst>
                   <a:outerShdw dist="35921" dir="2700000" algn="ctr" rotWithShape="0">
                     <a:schemeClr val="bg2"/>
@@ -4658,18 +4674,18 @@
     </p:spTree>
     <p:extLst>
       <p:ext uri="{BB962C8B-B14F-4D97-AF65-F5344CB8AC3E}">
-        <p14:creationId xmlns:p14="http://schemas.microsoft.com/office/powerpoint/2010/main" xmlns="" val="3372461043"/>
+        <p14:creationId xmlns:p14="http://schemas.microsoft.com/office/powerpoint/2010/main" val="3372461043"/>
       </p:ext>
     </p:extLst>
   </p:cSld>
   <p:clrMapOvr>
     <a:masterClrMapping/>
   </p:clrMapOvr>
-  <mc:AlternateContent xmlns:mc="http://schemas.openxmlformats.org/markup-compatibility/2006">
-    <mc:Choice xmlns:p14="http://schemas.microsoft.com/office/powerpoint/2010/main" xmlns="" Requires="p14">
+  <mc:AlternateContent xmlns:mc="http://schemas.openxmlformats.org/markup-compatibility/2006" xmlns:p14="http://schemas.microsoft.com/office/powerpoint/2010/main">
+    <mc:Choice Requires="p14">
       <p:transition p14:dur="10"/>
     </mc:Choice>
-    <mc:Fallback>
+    <mc:Fallback xmlns="">
       <p:transition/>
     </mc:Fallback>
   </mc:AlternateContent>
@@ -4819,7 +4835,7 @@
           <a:noFill/>
           <a:extLst>
             <a:ext uri="{909E8E84-426E-40DD-AFC4-6F175D3DCCD1}">
-              <a14:hiddenFill xmlns:a14="http://schemas.microsoft.com/office/drawing/2010/main" xmlns="">
+              <a14:hiddenFill xmlns:a14="http://schemas.microsoft.com/office/drawing/2010/main">
                 <a:solidFill>
                   <a:srgbClr val="FFFFFF"/>
                 </a:solidFill>
@@ -4858,7 +4874,7 @@
           <a:noFill/>
           <a:extLst>
             <a:ext uri="{909E8E84-426E-40DD-AFC4-6F175D3DCCD1}">
-              <a14:hiddenFill xmlns:a14="http://schemas.microsoft.com/office/drawing/2010/main" xmlns="">
+              <a14:hiddenFill xmlns:a14="http://schemas.microsoft.com/office/drawing/2010/main">
                 <a:solidFill>
                   <a:srgbClr val="FFFFFF"/>
                 </a:solidFill>
@@ -4937,7 +4953,7 @@
           <a:blip r:embed="rId2" cstate="print">
             <a:extLst>
               <a:ext uri="{28A0092B-C50C-407E-A947-70E740481C1C}">
-                <a14:useLocalDpi xmlns:a14="http://schemas.microsoft.com/office/drawing/2010/main" xmlns="" val="0"/>
+                <a14:useLocalDpi xmlns:a14="http://schemas.microsoft.com/office/drawing/2010/main" val="0"/>
               </a:ext>
             </a:extLst>
           </a:blip>
@@ -4961,14 +4977,14 @@
           <a:effectLst/>
           <a:extLst>
             <a:ext uri="{909E8E84-426E-40DD-AFC4-6F175D3DCCD1}">
-              <a14:hiddenFill xmlns:a14="http://schemas.microsoft.com/office/drawing/2010/main" xmlns="">
+              <a14:hiddenFill xmlns:a14="http://schemas.microsoft.com/office/drawing/2010/main">
                 <a:solidFill>
                   <a:schemeClr val="accent1"/>
                 </a:solidFill>
               </a14:hiddenFill>
             </a:ext>
             <a:ext uri="{91240B29-F687-4F45-9708-019B960494DF}">
-              <a14:hiddenLine xmlns:a14="http://schemas.microsoft.com/office/drawing/2010/main" xmlns="" w="9525">
+              <a14:hiddenLine xmlns:a14="http://schemas.microsoft.com/office/drawing/2010/main" w="9525">
                 <a:solidFill>
                   <a:schemeClr val="tx1"/>
                 </a:solidFill>
@@ -4978,7 +4994,7 @@
               </a14:hiddenLine>
             </a:ext>
             <a:ext uri="{AF507438-7753-43E0-B8FC-AC1667EBCBE1}">
-              <a14:hiddenEffects xmlns:a14="http://schemas.microsoft.com/office/drawing/2010/main" xmlns="">
+              <a14:hiddenEffects xmlns:a14="http://schemas.microsoft.com/office/drawing/2010/main">
                 <a:effectLst>
                   <a:outerShdw dist="35921" dir="2700000" algn="ctr" rotWithShape="0">
                     <a:schemeClr val="bg2"/>
@@ -4992,18 +5008,18 @@
     </p:spTree>
     <p:extLst>
       <p:ext uri="{BB962C8B-B14F-4D97-AF65-F5344CB8AC3E}">
-        <p14:creationId xmlns:p14="http://schemas.microsoft.com/office/powerpoint/2010/main" xmlns="" val="1999292767"/>
+        <p14:creationId xmlns:p14="http://schemas.microsoft.com/office/powerpoint/2010/main" val="1999292767"/>
       </p:ext>
     </p:extLst>
   </p:cSld>
   <p:clrMapOvr>
     <a:masterClrMapping/>
   </p:clrMapOvr>
-  <mc:AlternateContent xmlns:mc="http://schemas.openxmlformats.org/markup-compatibility/2006">
-    <mc:Choice xmlns:p14="http://schemas.microsoft.com/office/powerpoint/2010/main" xmlns="" Requires="p14">
+  <mc:AlternateContent xmlns:mc="http://schemas.openxmlformats.org/markup-compatibility/2006" xmlns:p14="http://schemas.microsoft.com/office/powerpoint/2010/main">
+    <mc:Choice Requires="p14">
       <p:transition p14:dur="0"/>
     </mc:Choice>
-    <mc:Fallback>
+    <mc:Fallback xmlns="">
       <p:transition/>
     </mc:Fallback>
   </mc:AlternateContent>
@@ -5077,7 +5093,7 @@
           <a:noFill/>
           <a:extLst>
             <a:ext uri="{909E8E84-426E-40DD-AFC4-6F175D3DCCD1}">
-              <a14:hiddenFill xmlns:a14="http://schemas.microsoft.com/office/drawing/2010/main" xmlns="">
+              <a14:hiddenFill xmlns:a14="http://schemas.microsoft.com/office/drawing/2010/main">
                 <a:solidFill>
                   <a:srgbClr val="FFFFFF"/>
                 </a:solidFill>
@@ -5116,7 +5132,7 @@
           <a:noFill/>
           <a:extLst>
             <a:ext uri="{909E8E84-426E-40DD-AFC4-6F175D3DCCD1}">
-              <a14:hiddenFill xmlns:a14="http://schemas.microsoft.com/office/drawing/2010/main" xmlns="">
+              <a14:hiddenFill xmlns:a14="http://schemas.microsoft.com/office/drawing/2010/main">
                 <a:solidFill>
                   <a:srgbClr val="FFFFFF"/>
                 </a:solidFill>
@@ -5209,7 +5225,7 @@
             <a:blip r:embed="rId2" cstate="print">
               <a:extLst>
                 <a:ext uri="{28A0092B-C50C-407E-A947-70E740481C1C}">
-                  <a14:useLocalDpi xmlns:a14="http://schemas.microsoft.com/office/drawing/2010/main" xmlns="" val="0"/>
+                  <a14:useLocalDpi xmlns:a14="http://schemas.microsoft.com/office/drawing/2010/main" val="0"/>
                 </a:ext>
               </a:extLst>
             </a:blip>
@@ -5233,14 +5249,14 @@
             <a:effectLst/>
             <a:extLst>
               <a:ext uri="{909E8E84-426E-40DD-AFC4-6F175D3DCCD1}">
-                <a14:hiddenFill xmlns:a14="http://schemas.microsoft.com/office/drawing/2010/main" xmlns="">
+                <a14:hiddenFill xmlns:a14="http://schemas.microsoft.com/office/drawing/2010/main">
                   <a:solidFill>
                     <a:schemeClr val="accent1"/>
                   </a:solidFill>
                 </a14:hiddenFill>
               </a:ext>
               <a:ext uri="{91240B29-F687-4F45-9708-019B960494DF}">
-                <a14:hiddenLine xmlns:a14="http://schemas.microsoft.com/office/drawing/2010/main" xmlns="" w="9525">
+                <a14:hiddenLine xmlns:a14="http://schemas.microsoft.com/office/drawing/2010/main" w="9525">
                   <a:solidFill>
                     <a:schemeClr val="tx1"/>
                   </a:solidFill>
@@ -5250,7 +5266,7 @@
                 </a14:hiddenLine>
               </a:ext>
               <a:ext uri="{AF507438-7753-43E0-B8FC-AC1667EBCBE1}">
-                <a14:hiddenEffects xmlns:a14="http://schemas.microsoft.com/office/drawing/2010/main" xmlns="">
+                <a14:hiddenEffects xmlns:a14="http://schemas.microsoft.com/office/drawing/2010/main">
                   <a:effectLst>
                     <a:outerShdw dist="35921" dir="2700000" algn="ctr" rotWithShape="0">
                       <a:schemeClr val="bg2"/>
@@ -5320,7 +5336,7 @@
           <a:blip r:embed="rId3" cstate="print">
             <a:extLst>
               <a:ext uri="{28A0092B-C50C-407E-A947-70E740481C1C}">
-                <a14:useLocalDpi xmlns:a14="http://schemas.microsoft.com/office/drawing/2010/main" xmlns="" val="0"/>
+                <a14:useLocalDpi xmlns:a14="http://schemas.microsoft.com/office/drawing/2010/main" val="0"/>
               </a:ext>
             </a:extLst>
           </a:blip>
@@ -5344,14 +5360,14 @@
           <a:effectLst/>
           <a:extLst>
             <a:ext uri="{909E8E84-426E-40DD-AFC4-6F175D3DCCD1}">
-              <a14:hiddenFill xmlns:a14="http://schemas.microsoft.com/office/drawing/2010/main" xmlns="">
+              <a14:hiddenFill xmlns:a14="http://schemas.microsoft.com/office/drawing/2010/main">
                 <a:solidFill>
                   <a:schemeClr val="accent1"/>
                 </a:solidFill>
               </a14:hiddenFill>
             </a:ext>
             <a:ext uri="{91240B29-F687-4F45-9708-019B960494DF}">
-              <a14:hiddenLine xmlns:a14="http://schemas.microsoft.com/office/drawing/2010/main" xmlns="" w="9525">
+              <a14:hiddenLine xmlns:a14="http://schemas.microsoft.com/office/drawing/2010/main" w="9525">
                 <a:solidFill>
                   <a:schemeClr val="tx1"/>
                 </a:solidFill>
@@ -5361,7 +5377,7 @@
               </a14:hiddenLine>
             </a:ext>
             <a:ext uri="{AF507438-7753-43E0-B8FC-AC1667EBCBE1}">
-              <a14:hiddenEffects xmlns:a14="http://schemas.microsoft.com/office/drawing/2010/main" xmlns="">
+              <a14:hiddenEffects xmlns:a14="http://schemas.microsoft.com/office/drawing/2010/main">
                 <a:effectLst>
                   <a:outerShdw dist="35921" dir="2700000" algn="ctr" rotWithShape="0">
                     <a:schemeClr val="bg2"/>
@@ -5375,18 +5391,18 @@
     </p:spTree>
     <p:extLst>
       <p:ext uri="{BB962C8B-B14F-4D97-AF65-F5344CB8AC3E}">
-        <p14:creationId xmlns:p14="http://schemas.microsoft.com/office/powerpoint/2010/main" xmlns="" val="333763139"/>
+        <p14:creationId xmlns:p14="http://schemas.microsoft.com/office/powerpoint/2010/main" val="333763139"/>
       </p:ext>
     </p:extLst>
   </p:cSld>
   <p:clrMapOvr>
     <a:masterClrMapping/>
   </p:clrMapOvr>
-  <mc:AlternateContent xmlns:mc="http://schemas.openxmlformats.org/markup-compatibility/2006">
-    <mc:Choice xmlns:p14="http://schemas.microsoft.com/office/powerpoint/2010/main" xmlns="" Requires="p14">
+  <mc:AlternateContent xmlns:mc="http://schemas.openxmlformats.org/markup-compatibility/2006" xmlns:p14="http://schemas.microsoft.com/office/powerpoint/2010/main">
+    <mc:Choice Requires="p14">
       <p:transition p14:dur="10"/>
     </mc:Choice>
-    <mc:Fallback>
+    <mc:Fallback xmlns="">
       <p:transition/>
     </mc:Fallback>
   </mc:AlternateContent>
@@ -5460,7 +5476,7 @@
           <a:noFill/>
           <a:extLst>
             <a:ext uri="{909E8E84-426E-40DD-AFC4-6F175D3DCCD1}">
-              <a14:hiddenFill xmlns:a14="http://schemas.microsoft.com/office/drawing/2010/main" xmlns="">
+              <a14:hiddenFill xmlns:a14="http://schemas.microsoft.com/office/drawing/2010/main">
                 <a:solidFill>
                   <a:srgbClr val="FFFFFF"/>
                 </a:solidFill>
@@ -5499,7 +5515,7 @@
           <a:noFill/>
           <a:extLst>
             <a:ext uri="{909E8E84-426E-40DD-AFC4-6F175D3DCCD1}">
-              <a14:hiddenFill xmlns:a14="http://schemas.microsoft.com/office/drawing/2010/main" xmlns="">
+              <a14:hiddenFill xmlns:a14="http://schemas.microsoft.com/office/drawing/2010/main">
                 <a:solidFill>
                   <a:srgbClr val="FFFFFF"/>
                 </a:solidFill>
@@ -5578,7 +5594,7 @@
           <a:blip r:embed="rId2" cstate="print">
             <a:extLst>
               <a:ext uri="{28A0092B-C50C-407E-A947-70E740481C1C}">
-                <a14:useLocalDpi xmlns:a14="http://schemas.microsoft.com/office/drawing/2010/main" xmlns="" val="0"/>
+                <a14:useLocalDpi xmlns:a14="http://schemas.microsoft.com/office/drawing/2010/main" val="0"/>
               </a:ext>
             </a:extLst>
           </a:blip>
@@ -5602,14 +5618,14 @@
           <a:effectLst/>
           <a:extLst>
             <a:ext uri="{909E8E84-426E-40DD-AFC4-6F175D3DCCD1}">
-              <a14:hiddenFill xmlns:a14="http://schemas.microsoft.com/office/drawing/2010/main" xmlns="">
+              <a14:hiddenFill xmlns:a14="http://schemas.microsoft.com/office/drawing/2010/main">
                 <a:solidFill>
                   <a:schemeClr val="accent1"/>
                 </a:solidFill>
               </a14:hiddenFill>
             </a:ext>
             <a:ext uri="{91240B29-F687-4F45-9708-019B960494DF}">
-              <a14:hiddenLine xmlns:a14="http://schemas.microsoft.com/office/drawing/2010/main" xmlns="" w="9525">
+              <a14:hiddenLine xmlns:a14="http://schemas.microsoft.com/office/drawing/2010/main" w="9525">
                 <a:solidFill>
                   <a:schemeClr val="tx1"/>
                 </a:solidFill>
@@ -5619,7 +5635,7 @@
               </a14:hiddenLine>
             </a:ext>
             <a:ext uri="{AF507438-7753-43E0-B8FC-AC1667EBCBE1}">
-              <a14:hiddenEffects xmlns:a14="http://schemas.microsoft.com/office/drawing/2010/main" xmlns="">
+              <a14:hiddenEffects xmlns:a14="http://schemas.microsoft.com/office/drawing/2010/main">
                 <a:effectLst>
                   <a:outerShdw dist="35921" dir="2700000" algn="ctr" rotWithShape="0">
                     <a:schemeClr val="bg2"/>
@@ -5633,18 +5649,18 @@
     </p:spTree>
     <p:extLst>
       <p:ext uri="{BB962C8B-B14F-4D97-AF65-F5344CB8AC3E}">
-        <p14:creationId xmlns:p14="http://schemas.microsoft.com/office/powerpoint/2010/main" xmlns="" val="3022737950"/>
+        <p14:creationId xmlns:p14="http://schemas.microsoft.com/office/powerpoint/2010/main" val="3022737950"/>
       </p:ext>
     </p:extLst>
   </p:cSld>
   <p:clrMapOvr>
     <a:masterClrMapping/>
   </p:clrMapOvr>
-  <mc:AlternateContent xmlns:mc="http://schemas.openxmlformats.org/markup-compatibility/2006">
-    <mc:Choice xmlns:p14="http://schemas.microsoft.com/office/powerpoint/2010/main" xmlns="" Requires="p14">
+  <mc:AlternateContent xmlns:mc="http://schemas.openxmlformats.org/markup-compatibility/2006" xmlns:p14="http://schemas.microsoft.com/office/powerpoint/2010/main">
+    <mc:Choice Requires="p14">
       <p:transition p14:dur="0"/>
     </mc:Choice>
-    <mc:Fallback>
+    <mc:Fallback xmlns="">
       <p:transition/>
     </mc:Fallback>
   </mc:AlternateContent>
@@ -5883,7 +5899,7 @@
           <a:noFill/>
           <a:extLst>
             <a:ext uri="{909E8E84-426E-40DD-AFC4-6F175D3DCCD1}">
-              <a14:hiddenFill xmlns:a14="http://schemas.microsoft.com/office/drawing/2010/main" xmlns="">
+              <a14:hiddenFill xmlns:a14="http://schemas.microsoft.com/office/drawing/2010/main">
                 <a:solidFill>
                   <a:srgbClr val="FFFFFF"/>
                 </a:solidFill>
@@ -5922,7 +5938,7 @@
           <a:noFill/>
           <a:extLst>
             <a:ext uri="{909E8E84-426E-40DD-AFC4-6F175D3DCCD1}">
-              <a14:hiddenFill xmlns:a14="http://schemas.microsoft.com/office/drawing/2010/main" xmlns="">
+              <a14:hiddenFill xmlns:a14="http://schemas.microsoft.com/office/drawing/2010/main">
                 <a:solidFill>
                   <a:srgbClr val="FFFFFF"/>
                 </a:solidFill>
@@ -5945,18 +5961,18 @@
     </p:spTree>
     <p:extLst>
       <p:ext uri="{BB962C8B-B14F-4D97-AF65-F5344CB8AC3E}">
-        <p14:creationId xmlns:p14="http://schemas.microsoft.com/office/powerpoint/2010/main" xmlns="" val="4243044682"/>
+        <p14:creationId xmlns:p14="http://schemas.microsoft.com/office/powerpoint/2010/main" val="4243044682"/>
       </p:ext>
     </p:extLst>
   </p:cSld>
   <p:clrMapOvr>
     <a:masterClrMapping/>
   </p:clrMapOvr>
-  <mc:AlternateContent xmlns:mc="http://schemas.openxmlformats.org/markup-compatibility/2006">
-    <mc:Choice xmlns:p14="http://schemas.microsoft.com/office/powerpoint/2010/main" xmlns="" Requires="p14">
+  <mc:AlternateContent xmlns:mc="http://schemas.openxmlformats.org/markup-compatibility/2006" xmlns:p14="http://schemas.microsoft.com/office/powerpoint/2010/main">
+    <mc:Choice Requires="p14">
       <p:transition p14:dur="0"/>
     </mc:Choice>
-    <mc:Fallback>
+    <mc:Fallback xmlns="">
       <p:transition/>
     </mc:Fallback>
   </mc:AlternateContent>
@@ -6056,22 +6072,7 @@
                   </a:outerShdw>
                 </a:effectLst>
               </a:rPr>
-              <a:t> 5 Test </a:t>
-            </a:r>
-            <a:r>
-              <a:rPr lang="en-US" dirty="0" smtClean="0">
-                <a:solidFill>
-                  <a:srgbClr val="0070C0"/>
-                </a:solidFill>
-                <a:effectLst>
-                  <a:outerShdw blurRad="38100" dist="38100" dir="2700000" algn="tl">
-                    <a:srgbClr val="000000">
-                      <a:alpha val="43137"/>
-                    </a:srgbClr>
-                  </a:outerShdw>
-                </a:effectLst>
-              </a:rPr>
-              <a:t>Framework</a:t>
+              <a:t> 5 Test Framework</a:t>
             </a:r>
             <a:endParaRPr lang="en-US" dirty="0">
               <a:solidFill>
@@ -6135,14 +6136,12 @@
               <a:rPr lang="pt-BR" dirty="0" smtClean="0"/>
               <a:t> 5</a:t>
             </a:r>
-            <a:endParaRPr lang="pt-BR" dirty="0" smtClean="0"/>
           </a:p>
           <a:p>
             <a:r>
               <a:rPr lang="pt-BR" dirty="0" smtClean="0"/>
               <a:t>Exemplos</a:t>
             </a:r>
-            <a:endParaRPr lang="pt-BR" dirty="0" smtClean="0"/>
           </a:p>
           <a:p>
             <a:r>
@@ -6171,7 +6170,7 @@
           <a:noFill/>
           <a:extLst>
             <a:ext uri="{909E8E84-426E-40DD-AFC4-6F175D3DCCD1}">
-              <a14:hiddenFill xmlns:a14="http://schemas.microsoft.com/office/drawing/2010/main" xmlns="">
+              <a14:hiddenFill xmlns:a14="http://schemas.microsoft.com/office/drawing/2010/main">
                 <a:solidFill>
                   <a:srgbClr val="FFFFFF"/>
                 </a:solidFill>
@@ -6210,7 +6209,7 @@
           <a:noFill/>
           <a:extLst>
             <a:ext uri="{909E8E84-426E-40DD-AFC4-6F175D3DCCD1}">
-              <a14:hiddenFill xmlns:a14="http://schemas.microsoft.com/office/drawing/2010/main" xmlns="">
+              <a14:hiddenFill xmlns:a14="http://schemas.microsoft.com/office/drawing/2010/main">
                 <a:solidFill>
                   <a:srgbClr val="FFFFFF"/>
                 </a:solidFill>
@@ -6233,18 +6232,18 @@
     </p:spTree>
     <p:extLst>
       <p:ext uri="{BB962C8B-B14F-4D97-AF65-F5344CB8AC3E}">
-        <p14:creationId xmlns:p14="http://schemas.microsoft.com/office/powerpoint/2010/main" xmlns="" val="1899240751"/>
+        <p14:creationId xmlns:p14="http://schemas.microsoft.com/office/powerpoint/2010/main" val="1899240751"/>
       </p:ext>
     </p:extLst>
   </p:cSld>
   <p:clrMapOvr>
     <a:masterClrMapping/>
   </p:clrMapOvr>
-  <mc:AlternateContent xmlns:mc="http://schemas.openxmlformats.org/markup-compatibility/2006">
-    <mc:Choice xmlns:p14="http://schemas.microsoft.com/office/powerpoint/2010/main" xmlns="" Requires="p14">
+  <mc:AlternateContent xmlns:mc="http://schemas.openxmlformats.org/markup-compatibility/2006" xmlns:p14="http://schemas.microsoft.com/office/powerpoint/2010/main">
+    <mc:Choice Requires="p14">
       <p:transition p14:dur="0"/>
     </mc:Choice>
-    <mc:Fallback>
+    <mc:Fallback xmlns="">
       <p:transition/>
     </mc:Fallback>
   </mc:AlternateContent>
@@ -6380,11 +6379,7 @@
             <a:pPr lvl="1"/>
             <a:r>
               <a:rPr lang="pt-BR" dirty="0" smtClean="0"/>
-              <a:t>Linguagem para computação científica, usando como base o cálculo de matrizes e suas </a:t>
-            </a:r>
-            <a:r>
-              <a:rPr lang="pt-BR" dirty="0" smtClean="0"/>
-              <a:t>aplicações</a:t>
+              <a:t>Linguagem para computação científica, usando como base o cálculo de matrizes e suas aplicações</a:t>
             </a:r>
           </a:p>
           <a:p>
@@ -6393,13 +6388,7 @@
               <a:rPr lang="pt-BR" i="1" dirty="0" smtClean="0">
                 <a:hlinkClick r:id="rId2"/>
               </a:rPr>
-              <a:t>https://</a:t>
-            </a:r>
-            <a:r>
-              <a:rPr lang="pt-BR" i="1" dirty="0" smtClean="0">
-                <a:hlinkClick r:id="rId2"/>
-              </a:rPr>
-              <a:t>www.youtube.com/watch?v=Ai6M5G90Ml</a:t>
+              <a:t>https://www.youtube.com/watch?v=Ai6M5G90Ml</a:t>
             </a:r>
             <a:endParaRPr lang="pt-BR" i="1" dirty="0" smtClean="0"/>
           </a:p>
@@ -6439,7 +6428,7 @@
           <a:noFill/>
           <a:extLst>
             <a:ext uri="{909E8E84-426E-40DD-AFC4-6F175D3DCCD1}">
-              <a14:hiddenFill xmlns:a14="http://schemas.microsoft.com/office/drawing/2010/main" xmlns="">
+              <a14:hiddenFill xmlns:a14="http://schemas.microsoft.com/office/drawing/2010/main">
                 <a:solidFill>
                   <a:srgbClr val="FFFFFF"/>
                 </a:solidFill>
@@ -6478,7 +6467,7 @@
           <a:noFill/>
           <a:extLst>
             <a:ext uri="{909E8E84-426E-40DD-AFC4-6F175D3DCCD1}">
-              <a14:hiddenFill xmlns:a14="http://schemas.microsoft.com/office/drawing/2010/main" xmlns="">
+              <a14:hiddenFill xmlns:a14="http://schemas.microsoft.com/office/drawing/2010/main">
                 <a:solidFill>
                   <a:srgbClr val="FFFFFF"/>
                 </a:solidFill>
@@ -6510,7 +6499,7 @@
           <a:blip r:embed="rId3" cstate="print">
             <a:extLst>
               <a:ext uri="{28A0092B-C50C-407E-A947-70E740481C1C}">
-                <a14:useLocalDpi xmlns:a14="http://schemas.microsoft.com/office/drawing/2010/main" xmlns="" val="0"/>
+                <a14:useLocalDpi xmlns:a14="http://schemas.microsoft.com/office/drawing/2010/main" val="0"/>
               </a:ext>
             </a:extLst>
           </a:blip>
@@ -6530,7 +6519,7 @@
           <a:noFill/>
           <a:extLst>
             <a:ext uri="{909E8E84-426E-40DD-AFC4-6F175D3DCCD1}">
-              <a14:hiddenFill xmlns:a14="http://schemas.microsoft.com/office/drawing/2010/main" xmlns="">
+              <a14:hiddenFill xmlns:a14="http://schemas.microsoft.com/office/drawing/2010/main">
                 <a:solidFill>
                   <a:srgbClr val="FFFFFF"/>
                 </a:solidFill>
@@ -6551,7 +6540,7 @@
           <a:blip r:embed="rId4" cstate="print">
             <a:extLst>
               <a:ext uri="{28A0092B-C50C-407E-A947-70E740481C1C}">
-                <a14:useLocalDpi xmlns:a14="http://schemas.microsoft.com/office/drawing/2010/main" xmlns="" val="0"/>
+                <a14:useLocalDpi xmlns:a14="http://schemas.microsoft.com/office/drawing/2010/main" val="0"/>
               </a:ext>
             </a:extLst>
           </a:blip>
@@ -6571,7 +6560,7 @@
           <a:noFill/>
           <a:extLst>
             <a:ext uri="{909E8E84-426E-40DD-AFC4-6F175D3DCCD1}">
-              <a14:hiddenFill xmlns:a14="http://schemas.microsoft.com/office/drawing/2010/main" xmlns="">
+              <a14:hiddenFill xmlns:a14="http://schemas.microsoft.com/office/drawing/2010/main">
                 <a:solidFill>
                   <a:srgbClr val="FFFFFF"/>
                 </a:solidFill>
@@ -6583,18 +6572,18 @@
     </p:spTree>
     <p:extLst>
       <p:ext uri="{BB962C8B-B14F-4D97-AF65-F5344CB8AC3E}">
-        <p14:creationId xmlns:p14="http://schemas.microsoft.com/office/powerpoint/2010/main" xmlns="" val="2942898102"/>
+        <p14:creationId xmlns:p14="http://schemas.microsoft.com/office/powerpoint/2010/main" val="2942898102"/>
       </p:ext>
     </p:extLst>
   </p:cSld>
   <p:clrMapOvr>
     <a:masterClrMapping/>
   </p:clrMapOvr>
-  <mc:AlternateContent xmlns:mc="http://schemas.openxmlformats.org/markup-compatibility/2006">
-    <mc:Choice xmlns:p14="http://schemas.microsoft.com/office/powerpoint/2010/main" xmlns="" Requires="p14">
+  <mc:AlternateContent xmlns:mc="http://schemas.openxmlformats.org/markup-compatibility/2006" xmlns:p14="http://schemas.microsoft.com/office/powerpoint/2010/main">
+    <mc:Choice Requires="p14">
       <p:transition p14:dur="0"/>
     </mc:Choice>
-    <mc:Fallback>
+    <mc:Fallback xmlns="">
       <p:transition/>
     </mc:Fallback>
   </mc:AlternateContent>
@@ -6673,11 +6662,7 @@
           <a:p>
             <a:r>
               <a:rPr lang="pt-BR" sz="2800" dirty="0" smtClean="0"/>
-              <a:t>Testar a funcionalidade e desempenho do código </a:t>
-            </a:r>
-            <a:r>
-              <a:rPr lang="pt-BR" sz="2800" dirty="0" smtClean="0"/>
-              <a:t>MATLAB</a:t>
+              <a:t>Testar a funcionalidade e desempenho do código MATLAB</a:t>
             </a:r>
           </a:p>
           <a:p>
@@ -6685,13 +6670,7 @@
               <a:rPr lang="pt-BR" sz="2800" dirty="0" smtClean="0">
                 <a:hlinkClick r:id="rId2"/>
               </a:rPr>
-              <a:t>http://www.codeaffine.com/2016/02/18/junit-5-first-look</a:t>
-            </a:r>
-            <a:r>
-              <a:rPr lang="pt-BR" sz="2800" dirty="0" smtClean="0">
-                <a:hlinkClick r:id="rId2"/>
-              </a:rPr>
-              <a:t>/</a:t>
+              <a:t>http://www.codeaffine.com/2016/02/18/junit-5-first-look/</a:t>
             </a:r>
             <a:endParaRPr lang="pt-BR" sz="2800" dirty="0" smtClean="0"/>
           </a:p>
@@ -6714,11 +6693,7 @@
             <a:pPr lvl="1"/>
             <a:r>
               <a:rPr lang="en-US" sz="2400" dirty="0" smtClean="0"/>
-              <a:t>In </a:t>
-            </a:r>
-            <a:r>
-              <a:rPr lang="en-US" sz="2400" dirty="0" smtClean="0"/>
-              <a:t>the beginning of February, the </a:t>
+              <a:t>In the beginning of February, the </a:t>
             </a:r>
             <a:r>
               <a:rPr lang="en-US" sz="2400" dirty="0" err="1" smtClean="0">
@@ -6754,11 +6729,7 @@
             </a:r>
             <a:r>
               <a:rPr lang="en-US" sz="2400" dirty="0" smtClean="0"/>
-              <a:t> 4 is among the most used items in my toolbox I thought it might be worth to have a look at the next major release</a:t>
-            </a:r>
-            <a:r>
-              <a:rPr lang="en-US" sz="2400" dirty="0" smtClean="0"/>
-              <a:t>.</a:t>
+              <a:t> 4 is among the most used items in my toolbox I thought it might be worth to have a look at the next major release.</a:t>
             </a:r>
             <a:endParaRPr lang="pt-BR" sz="2400" dirty="0"/>
           </a:p>
@@ -6783,7 +6754,7 @@
           <a:noFill/>
           <a:extLst>
             <a:ext uri="{909E8E84-426E-40DD-AFC4-6F175D3DCCD1}">
-              <a14:hiddenFill xmlns:a14="http://schemas.microsoft.com/office/drawing/2010/main" xmlns="">
+              <a14:hiddenFill xmlns:a14="http://schemas.microsoft.com/office/drawing/2010/main">
                 <a:solidFill>
                   <a:srgbClr val="FFFFFF"/>
                 </a:solidFill>
@@ -6822,7 +6793,7 @@
           <a:noFill/>
           <a:extLst>
             <a:ext uri="{909E8E84-426E-40DD-AFC4-6F175D3DCCD1}">
-              <a14:hiddenFill xmlns:a14="http://schemas.microsoft.com/office/drawing/2010/main" xmlns="">
+              <a14:hiddenFill xmlns:a14="http://schemas.microsoft.com/office/drawing/2010/main">
                 <a:solidFill>
                   <a:srgbClr val="FFFFFF"/>
                 </a:solidFill>
@@ -6887,22 +6858,7 @@
                   </a:outerShdw>
                 </a:effectLst>
               </a:rPr>
-              <a:t> 5 Test </a:t>
-            </a:r>
-            <a:r>
-              <a:rPr lang="en-US" dirty="0" smtClean="0">
-                <a:solidFill>
-                  <a:srgbClr val="0070C0"/>
-                </a:solidFill>
-                <a:effectLst>
-                  <a:outerShdw blurRad="38100" dist="38100" dir="2700000" algn="tl">
-                    <a:srgbClr val="000000">
-                      <a:alpha val="43137"/>
-                    </a:srgbClr>
-                  </a:outerShdw>
-                </a:effectLst>
-              </a:rPr>
-              <a:t>Framework</a:t>
+              <a:t> 5 Test Framework</a:t>
             </a:r>
             <a:endParaRPr lang="en-US" dirty="0">
               <a:solidFill>
@@ -6922,18 +6878,18 @@
     </p:spTree>
     <p:extLst>
       <p:ext uri="{BB962C8B-B14F-4D97-AF65-F5344CB8AC3E}">
-        <p14:creationId xmlns:p14="http://schemas.microsoft.com/office/powerpoint/2010/main" xmlns="" val="1979461865"/>
+        <p14:creationId xmlns:p14="http://schemas.microsoft.com/office/powerpoint/2010/main" val="1979461865"/>
       </p:ext>
     </p:extLst>
   </p:cSld>
   <p:clrMapOvr>
     <a:masterClrMapping/>
   </p:clrMapOvr>
-  <mc:AlternateContent xmlns:mc="http://schemas.openxmlformats.org/markup-compatibility/2006">
-    <mc:Choice xmlns:p14="http://schemas.microsoft.com/office/powerpoint/2010/main" xmlns="" Requires="p14">
+  <mc:AlternateContent xmlns:mc="http://schemas.openxmlformats.org/markup-compatibility/2006" xmlns:p14="http://schemas.microsoft.com/office/powerpoint/2010/main">
+    <mc:Choice Requires="p14">
       <p:transition p14:dur="0"/>
     </mc:Choice>
-    <mc:Fallback>
+    <mc:Fallback xmlns="">
       <p:transition/>
     </mc:Fallback>
   </mc:AlternateContent>
@@ -7022,19 +6978,7 @@
               <a:rPr lang="pt-BR" sz="2800" dirty="0" smtClean="0">
                 <a:hlinkClick r:id="rId2"/>
               </a:rPr>
-              <a:t>http</a:t>
-            </a:r>
-            <a:r>
-              <a:rPr lang="pt-BR" sz="2800" dirty="0" smtClean="0">
-                <a:hlinkClick r:id="rId2"/>
-              </a:rPr>
-              <a:t>://</a:t>
-            </a:r>
-            <a:r>
-              <a:rPr lang="pt-BR" sz="2800" dirty="0" smtClean="0">
-                <a:hlinkClick r:id="rId2"/>
-              </a:rPr>
-              <a:t>pt.stackoverflow.com/questions/269/quais-as-vantagens-das-express%C3%B5es-</a:t>
+              <a:t>http://pt.stackoverflow.com/questions/269/quais-as-vantagens-das-express%C3%B5es-</a:t>
             </a:r>
             <a:r>
               <a:rPr lang="pt-BR" sz="2800" dirty="0" err="1" smtClean="0">
@@ -7055,13 +6999,7 @@
               <a:rPr lang="pt-BR" sz="2400" dirty="0" smtClean="0">
                 <a:hlinkClick r:id="rId3"/>
               </a:rPr>
-              <a:t>http://</a:t>
-            </a:r>
-            <a:r>
-              <a:rPr lang="pt-BR" sz="2400" dirty="0" smtClean="0">
-                <a:hlinkClick r:id="rId3"/>
-              </a:rPr>
-              <a:t>www.devmedia.com.br/como-usar-funcoes-lambda-em-java/32826</a:t>
+              <a:t>http://www.devmedia.com.br/como-usar-funcoes-lambda-em-java/32826</a:t>
             </a:r>
             <a:endParaRPr lang="pt-BR" sz="2400" dirty="0" smtClean="0"/>
           </a:p>
@@ -7070,13 +7008,7 @@
               <a:rPr lang="pt-BR" sz="2400" dirty="0" smtClean="0">
                 <a:hlinkClick r:id="rId4"/>
               </a:rPr>
-              <a:t>http://</a:t>
-            </a:r>
-            <a:r>
-              <a:rPr lang="pt-BR" sz="2400" dirty="0" smtClean="0">
-                <a:hlinkClick r:id="rId4"/>
-              </a:rPr>
-              <a:t>www.devmedia.com.br/novidades-do-java-8-do-lambda-ao-metaspace/29056</a:t>
+              <a:t>http://www.devmedia.com.br/novidades-do-java-8-do-lambda-ao-metaspace/29056</a:t>
             </a:r>
             <a:endParaRPr lang="pt-BR" sz="2400" dirty="0" smtClean="0"/>
           </a:p>
@@ -7085,13 +7017,7 @@
               <a:rPr lang="pt-BR" sz="2400" dirty="0" smtClean="0">
                 <a:hlinkClick r:id="rId5"/>
               </a:rPr>
-              <a:t>http://www.teclogica.com.br/blog/java-8-o-que-e-lambda</a:t>
-            </a:r>
-            <a:r>
-              <a:rPr lang="pt-BR" sz="2400" dirty="0" smtClean="0">
-                <a:hlinkClick r:id="rId5"/>
-              </a:rPr>
-              <a:t>/</a:t>
+              <a:t>http://www.teclogica.com.br/blog/java-8-o-que-e-lambda/</a:t>
             </a:r>
             <a:endParaRPr lang="pt-BR" sz="2400" dirty="0" smtClean="0"/>
           </a:p>
@@ -7100,13 +7026,7 @@
               <a:rPr lang="pt-BR" sz="2400" dirty="0" smtClean="0">
                 <a:hlinkClick r:id="rId6"/>
               </a:rPr>
-              <a:t>https://rodrigouchoa.wordpress.com/2014/05/20/novidades-do-java-8-lambda-expressions</a:t>
-            </a:r>
-            <a:r>
-              <a:rPr lang="pt-BR" sz="2400" dirty="0" smtClean="0">
-                <a:hlinkClick r:id="rId6"/>
-              </a:rPr>
-              <a:t>/</a:t>
+              <a:t>https://rodrigouchoa.wordpress.com/2014/05/20/novidades-do-java-8-lambda-expressions/</a:t>
             </a:r>
             <a:endParaRPr lang="pt-BR" sz="2400" dirty="0" smtClean="0"/>
           </a:p>
@@ -7115,13 +7035,7 @@
               <a:rPr lang="pt-BR" sz="2400" dirty="0" smtClean="0">
                 <a:hlinkClick r:id="rId7"/>
               </a:rPr>
-              <a:t>http://blog.takipi.com/compilando-expressoes-lambda-scala-vs-java-8</a:t>
-            </a:r>
-            <a:r>
-              <a:rPr lang="pt-BR" sz="2400" dirty="0" smtClean="0">
-                <a:hlinkClick r:id="rId7"/>
-              </a:rPr>
-              <a:t>/</a:t>
+              <a:t>http://blog.takipi.com/compilando-expressoes-lambda-scala-vs-java-8/</a:t>
             </a:r>
             <a:endParaRPr lang="pt-BR" sz="2400" dirty="0" smtClean="0"/>
           </a:p>
@@ -7149,7 +7063,7 @@
           <a:noFill/>
           <a:extLst>
             <a:ext uri="{909E8E84-426E-40DD-AFC4-6F175D3DCCD1}">
-              <a14:hiddenFill xmlns:a14="http://schemas.microsoft.com/office/drawing/2010/main" xmlns="">
+              <a14:hiddenFill xmlns:a14="http://schemas.microsoft.com/office/drawing/2010/main">
                 <a:solidFill>
                   <a:srgbClr val="FFFFFF"/>
                 </a:solidFill>
@@ -7188,7 +7102,7 @@
           <a:noFill/>
           <a:extLst>
             <a:ext uri="{909E8E84-426E-40DD-AFC4-6F175D3DCCD1}">
-              <a14:hiddenFill xmlns:a14="http://schemas.microsoft.com/office/drawing/2010/main" xmlns="">
+              <a14:hiddenFill xmlns:a14="http://schemas.microsoft.com/office/drawing/2010/main">
                 <a:solidFill>
                   <a:srgbClr val="FFFFFF"/>
                 </a:solidFill>
@@ -7238,22 +7152,7 @@
                   </a:outerShdw>
                 </a:effectLst>
               </a:rPr>
-              <a:t>Java 8 Lambda Expressions Revis</a:t>
-            </a:r>
-            <a:r>
-              <a:rPr lang="en-US" dirty="0" smtClean="0">
-                <a:solidFill>
-                  <a:srgbClr val="0070C0"/>
-                </a:solidFill>
-                <a:effectLst>
-                  <a:outerShdw blurRad="38100" dist="38100" dir="2700000" algn="tl">
-                    <a:srgbClr val="000000">
-                      <a:alpha val="43137"/>
-                    </a:srgbClr>
-                  </a:outerShdw>
-                </a:effectLst>
-              </a:rPr>
-              <a:t>ion</a:t>
+              <a:t>Java 8 Lambda Expressions Revision</a:t>
             </a:r>
             <a:endParaRPr lang="en-US" dirty="0">
               <a:solidFill>
@@ -7273,18 +7172,18 @@
     </p:spTree>
     <p:extLst>
       <p:ext uri="{BB962C8B-B14F-4D97-AF65-F5344CB8AC3E}">
-        <p14:creationId xmlns:p14="http://schemas.microsoft.com/office/powerpoint/2010/main" xmlns="" val="1979461865"/>
+        <p14:creationId xmlns:p14="http://schemas.microsoft.com/office/powerpoint/2010/main" val="1979461865"/>
       </p:ext>
     </p:extLst>
   </p:cSld>
   <p:clrMapOvr>
     <a:masterClrMapping/>
   </p:clrMapOvr>
-  <mc:AlternateContent xmlns:mc="http://schemas.openxmlformats.org/markup-compatibility/2006">
-    <mc:Choice xmlns:p14="http://schemas.microsoft.com/office/powerpoint/2010/main" xmlns="" Requires="p14">
+  <mc:AlternateContent xmlns:mc="http://schemas.openxmlformats.org/markup-compatibility/2006" xmlns:p14="http://schemas.microsoft.com/office/powerpoint/2010/main">
+    <mc:Choice Requires="p14">
       <p:transition p14:dur="0"/>
     </mc:Choice>
-    <mc:Fallback>
+    <mc:Fallback xmlns="">
       <p:transition/>
     </mc:Fallback>
   </mc:AlternateContent>
@@ -7365,24 +7264,14 @@
               <a:rPr lang="pt-BR" sz="2800" dirty="0" smtClean="0">
                 <a:hlinkClick r:id="rId2"/>
               </a:rPr>
-              <a:t>http://</a:t>
-            </a:r>
-            <a:r>
-              <a:rPr lang="pt-BR" sz="2800" dirty="0" smtClean="0">
-                <a:hlinkClick r:id="rId2"/>
-              </a:rPr>
-              <a:t>radar.oreilly.com/2014/12/unit-testing-java-8-lambda-expressions-and-streams.html</a:t>
+              <a:t>http://radar.oreilly.com/2014/12/unit-testing-java-8-lambda-expressions-and-streams.html</a:t>
             </a:r>
             <a:endParaRPr lang="pt-BR" sz="2800" dirty="0" smtClean="0"/>
           </a:p>
           <a:p>
             <a:r>
               <a:rPr lang="en-US" sz="2800" b="1" dirty="0" smtClean="0"/>
-              <a:t>Unit </a:t>
-            </a:r>
-            <a:r>
-              <a:rPr lang="en-US" sz="2800" b="1" dirty="0" smtClean="0"/>
-              <a:t>Testing Java 8 Lambda Expressions and Streams</a:t>
+              <a:t>Unit Testing Java 8 Lambda Expressions and Streams</a:t>
             </a:r>
           </a:p>
           <a:p>
@@ -7403,11 +7292,7 @@
             <a:pPr lvl="1"/>
             <a:r>
               <a:rPr lang="en-US" sz="2400" dirty="0" smtClean="0"/>
-              <a:t>Lambda expressions pose a slightly different challenge when unit testing code. Because they don’t have a name, it’s impossible to directly call them in your test code. You could choose to copy the body of the lambda expression into your test and then test that copy, but this approach has the unfortunate side effect of not actually testing the behavior of your implementation. If you change the implementation code, your test will still pass even though the implementation is performing a different task</a:t>
-            </a:r>
-            <a:r>
-              <a:rPr lang="en-US" sz="2400" dirty="0" smtClean="0"/>
-              <a:t>.</a:t>
+              <a:t>Lambda expressions pose a slightly different challenge when unit testing code. Because they don’t have a name, it’s impossible to directly call them in your test code. You could choose to copy the body of the lambda expression into your test and then test that copy, but this approach has the unfortunate side effect of not actually testing the behavior of your implementation. If you change the implementation code, your test will still pass even though the implementation is performing a different task.</a:t>
             </a:r>
           </a:p>
           <a:p>
@@ -7437,7 +7322,7 @@
           <a:noFill/>
           <a:extLst>
             <a:ext uri="{909E8E84-426E-40DD-AFC4-6F175D3DCCD1}">
-              <a14:hiddenFill xmlns:a14="http://schemas.microsoft.com/office/drawing/2010/main" xmlns="">
+              <a14:hiddenFill xmlns:a14="http://schemas.microsoft.com/office/drawing/2010/main">
                 <a:solidFill>
                   <a:srgbClr val="FFFFFF"/>
                 </a:solidFill>
@@ -7476,7 +7361,7 @@
           <a:noFill/>
           <a:extLst>
             <a:ext uri="{909E8E84-426E-40DD-AFC4-6F175D3DCCD1}">
-              <a14:hiddenFill xmlns:a14="http://schemas.microsoft.com/office/drawing/2010/main" xmlns="">
+              <a14:hiddenFill xmlns:a14="http://schemas.microsoft.com/office/drawing/2010/main">
                 <a:solidFill>
                   <a:srgbClr val="FFFFFF"/>
                 </a:solidFill>
@@ -7541,22 +7426,7 @@
                   </a:outerShdw>
                 </a:effectLst>
               </a:rPr>
-              <a:t> 5 Test </a:t>
-            </a:r>
-            <a:r>
-              <a:rPr lang="en-US" dirty="0" smtClean="0">
-                <a:solidFill>
-                  <a:srgbClr val="0070C0"/>
-                </a:solidFill>
-                <a:effectLst>
-                  <a:outerShdw blurRad="38100" dist="38100" dir="2700000" algn="tl">
-                    <a:srgbClr val="000000">
-                      <a:alpha val="43137"/>
-                    </a:srgbClr>
-                  </a:outerShdw>
-                </a:effectLst>
-              </a:rPr>
-              <a:t>Framework</a:t>
+              <a:t> 5 Test Framework</a:t>
             </a:r>
             <a:endParaRPr lang="en-US" dirty="0">
               <a:solidFill>
@@ -7576,18 +7446,18 @@
     </p:spTree>
     <p:extLst>
       <p:ext uri="{BB962C8B-B14F-4D97-AF65-F5344CB8AC3E}">
-        <p14:creationId xmlns:p14="http://schemas.microsoft.com/office/powerpoint/2010/main" xmlns="" val="1979461865"/>
+        <p14:creationId xmlns:p14="http://schemas.microsoft.com/office/powerpoint/2010/main" val="1979461865"/>
       </p:ext>
     </p:extLst>
   </p:cSld>
   <p:clrMapOvr>
     <a:masterClrMapping/>
   </p:clrMapOvr>
-  <mc:AlternateContent xmlns:mc="http://schemas.openxmlformats.org/markup-compatibility/2006">
-    <mc:Choice xmlns:p14="http://schemas.microsoft.com/office/powerpoint/2010/main" xmlns="" Requires="p14">
+  <mc:AlternateContent xmlns:mc="http://schemas.openxmlformats.org/markup-compatibility/2006" xmlns:p14="http://schemas.microsoft.com/office/powerpoint/2010/main">
+    <mc:Choice Requires="p14">
       <p:transition p14:dur="0"/>
     </mc:Choice>
-    <mc:Fallback>
+    <mc:Fallback xmlns="">
       <p:transition/>
     </mc:Fallback>
   </mc:AlternateContent>
@@ -7668,13 +7538,7 @@
               <a:rPr lang="pt-BR" sz="2800" dirty="0" smtClean="0">
                 <a:hlinkClick r:id="rId2"/>
               </a:rPr>
-              <a:t>http://</a:t>
-            </a:r>
-            <a:r>
-              <a:rPr lang="pt-BR" sz="2800" dirty="0" smtClean="0">
-                <a:hlinkClick r:id="rId2"/>
-              </a:rPr>
-              <a:t>blog.codeleak.pl/2014/07/junit-testing-exception-with-java-8-and-lambda-expressions.html</a:t>
+              <a:t>http://blog.codeleak.pl/2014/07/junit-testing-exception-with-java-8-and-lambda-expressions.html</a:t>
             </a:r>
             <a:endParaRPr lang="pt-BR" sz="2800" dirty="0" smtClean="0"/>
           </a:p>
@@ -7685,11 +7549,7 @@
             </a:r>
             <a:r>
               <a:rPr lang="en-US" sz="2800" b="1" dirty="0" smtClean="0"/>
-              <a:t>: testing exception with Java 8 and Lambda </a:t>
-            </a:r>
-            <a:r>
-              <a:rPr lang="en-US" sz="2800" b="1" dirty="0" smtClean="0"/>
-              <a:t>Expressions</a:t>
+              <a:t>: testing exception with Java 8 and Lambda Expressions</a:t>
             </a:r>
           </a:p>
           <a:p>
@@ -7773,7 +7633,7 @@
           <a:noFill/>
           <a:extLst>
             <a:ext uri="{909E8E84-426E-40DD-AFC4-6F175D3DCCD1}">
-              <a14:hiddenFill xmlns:a14="http://schemas.microsoft.com/office/drawing/2010/main" xmlns="">
+              <a14:hiddenFill xmlns:a14="http://schemas.microsoft.com/office/drawing/2010/main">
                 <a:solidFill>
                   <a:srgbClr val="FFFFFF"/>
                 </a:solidFill>
@@ -7812,7 +7672,7 @@
           <a:noFill/>
           <a:extLst>
             <a:ext uri="{909E8E84-426E-40DD-AFC4-6F175D3DCCD1}">
-              <a14:hiddenFill xmlns:a14="http://schemas.microsoft.com/office/drawing/2010/main" xmlns="">
+              <a14:hiddenFill xmlns:a14="http://schemas.microsoft.com/office/drawing/2010/main">
                 <a:solidFill>
                   <a:srgbClr val="FFFFFF"/>
                 </a:solidFill>
@@ -7877,22 +7737,7 @@
                   </a:outerShdw>
                 </a:effectLst>
               </a:rPr>
-              <a:t> 5 Test </a:t>
-            </a:r>
-            <a:r>
-              <a:rPr lang="en-US" dirty="0" smtClean="0">
-                <a:solidFill>
-                  <a:srgbClr val="0070C0"/>
-                </a:solidFill>
-                <a:effectLst>
-                  <a:outerShdw blurRad="38100" dist="38100" dir="2700000" algn="tl">
-                    <a:srgbClr val="000000">
-                      <a:alpha val="43137"/>
-                    </a:srgbClr>
-                  </a:outerShdw>
-                </a:effectLst>
-              </a:rPr>
-              <a:t>Framework</a:t>
+              <a:t> 5 Test Framework</a:t>
             </a:r>
             <a:endParaRPr lang="en-US" dirty="0">
               <a:solidFill>
@@ -7912,18 +7757,18 @@
     </p:spTree>
     <p:extLst>
       <p:ext uri="{BB962C8B-B14F-4D97-AF65-F5344CB8AC3E}">
-        <p14:creationId xmlns:p14="http://schemas.microsoft.com/office/powerpoint/2010/main" xmlns="" val="1979461865"/>
+        <p14:creationId xmlns:p14="http://schemas.microsoft.com/office/powerpoint/2010/main" val="1979461865"/>
       </p:ext>
     </p:extLst>
   </p:cSld>
   <p:clrMapOvr>
     <a:masterClrMapping/>
   </p:clrMapOvr>
-  <mc:AlternateContent xmlns:mc="http://schemas.openxmlformats.org/markup-compatibility/2006">
-    <mc:Choice xmlns:p14="http://schemas.microsoft.com/office/powerpoint/2010/main" xmlns="" Requires="p14">
+  <mc:AlternateContent xmlns:mc="http://schemas.openxmlformats.org/markup-compatibility/2006" xmlns:p14="http://schemas.microsoft.com/office/powerpoint/2010/main">
+    <mc:Choice Requires="p14">
       <p:transition p14:dur="0"/>
     </mc:Choice>
-    <mc:Fallback>
+    <mc:Fallback xmlns="">
       <p:transition/>
     </mc:Fallback>
   </mc:AlternateContent>
@@ -8004,13 +7849,7 @@
               <a:rPr lang="pt-BR" sz="2400" dirty="0" smtClean="0">
                 <a:hlinkClick r:id="rId2"/>
               </a:rPr>
-              <a:t>http://</a:t>
-            </a:r>
-            <a:r>
-              <a:rPr lang="pt-BR" sz="2400" dirty="0" smtClean="0">
-                <a:hlinkClick r:id="rId2"/>
-              </a:rPr>
-              <a:t>stackoverflow.com/questions/28688047/unit-test-code-with-java-8-lambdas</a:t>
+              <a:t>http://stackoverflow.com/questions/28688047/unit-test-code-with-java-8-lambdas</a:t>
             </a:r>
             <a:endParaRPr lang="pt-BR" sz="2400" dirty="0" smtClean="0"/>
           </a:p>
@@ -8019,13 +7858,7 @@
               <a:rPr lang="pt-BR" sz="2400" dirty="0" smtClean="0">
                 <a:hlinkClick r:id="rId3"/>
               </a:rPr>
-              <a:t>http://</a:t>
-            </a:r>
-            <a:r>
-              <a:rPr lang="pt-BR" sz="2400" dirty="0" smtClean="0">
-                <a:hlinkClick r:id="rId3"/>
-              </a:rPr>
-              <a:t>stackoverflow.com/questions/34576710/how-to-test-lambda-functions</a:t>
+              <a:t>http://stackoverflow.com/questions/34576710/how-to-test-lambda-functions</a:t>
             </a:r>
             <a:endParaRPr lang="pt-BR" sz="2400" dirty="0" smtClean="0"/>
           </a:p>
@@ -8034,13 +7867,7 @@
               <a:rPr lang="pt-BR" sz="2400" dirty="0" smtClean="0">
                 <a:hlinkClick r:id="rId4"/>
               </a:rPr>
-              <a:t>https://pythonconquerstheuniverse.wordpress.com/2011/08/29/lambda_tutorial</a:t>
-            </a:r>
-            <a:r>
-              <a:rPr lang="pt-BR" sz="2400" dirty="0" smtClean="0">
-                <a:hlinkClick r:id="rId4"/>
-              </a:rPr>
-              <a:t>/</a:t>
+              <a:t>https://pythonconquerstheuniverse.wordpress.com/2011/08/29/lambda_tutorial/</a:t>
             </a:r>
             <a:endParaRPr lang="pt-BR" sz="2400" dirty="0" smtClean="0"/>
           </a:p>
@@ -8049,13 +7876,7 @@
               <a:rPr lang="pt-BR" sz="2400" dirty="0" smtClean="0">
                 <a:hlinkClick r:id="rId5"/>
               </a:rPr>
-              <a:t>http://</a:t>
-            </a:r>
-            <a:r>
-              <a:rPr lang="pt-BR" sz="2400" dirty="0" smtClean="0">
-                <a:hlinkClick r:id="rId5"/>
-              </a:rPr>
-              <a:t>www.coderanch.com/t/647426/Testing/approach-testing-lambda-expressions</a:t>
+              <a:t>http://www.coderanch.com/t/647426/Testing/approach-testing-lambda-expressions</a:t>
             </a:r>
             <a:endParaRPr lang="pt-BR" sz="2400" dirty="0" smtClean="0"/>
           </a:p>
@@ -8083,13 +7904,7 @@
               <a:rPr lang="pt-BR" sz="2400" dirty="0" smtClean="0">
                 <a:hlinkClick r:id="rId6"/>
               </a:rPr>
-              <a:t>https://pub.scotch.io/@</a:t>
-            </a:r>
-            <a:r>
-              <a:rPr lang="pt-BR" sz="2400" dirty="0" smtClean="0">
-                <a:hlinkClick r:id="rId6"/>
-              </a:rPr>
-              <a:t>richardhyatt/unit-testing-aws-lambda-functions-in-nodejs</a:t>
+              <a:t>https://pub.scotch.io/@richardhyatt/unit-testing-aws-lambda-functions-in-nodejs</a:t>
             </a:r>
             <a:endParaRPr lang="pt-BR" sz="2400" dirty="0" smtClean="0"/>
           </a:p>
@@ -8121,7 +7936,7 @@
           <a:noFill/>
           <a:extLst>
             <a:ext uri="{909E8E84-426E-40DD-AFC4-6F175D3DCCD1}">
-              <a14:hiddenFill xmlns:a14="http://schemas.microsoft.com/office/drawing/2010/main" xmlns="">
+              <a14:hiddenFill xmlns:a14="http://schemas.microsoft.com/office/drawing/2010/main">
                 <a:solidFill>
                   <a:srgbClr val="FFFFFF"/>
                 </a:solidFill>
@@ -8160,7 +7975,7 @@
           <a:noFill/>
           <a:extLst>
             <a:ext uri="{909E8E84-426E-40DD-AFC4-6F175D3DCCD1}">
-              <a14:hiddenFill xmlns:a14="http://schemas.microsoft.com/office/drawing/2010/main" xmlns="">
+              <a14:hiddenFill xmlns:a14="http://schemas.microsoft.com/office/drawing/2010/main">
                 <a:solidFill>
                   <a:srgbClr val="FFFFFF"/>
                 </a:solidFill>
@@ -8225,22 +8040,7 @@
                   </a:outerShdw>
                 </a:effectLst>
               </a:rPr>
-              <a:t> 5 Test </a:t>
-            </a:r>
-            <a:r>
-              <a:rPr lang="en-US" dirty="0" smtClean="0">
-                <a:solidFill>
-                  <a:srgbClr val="0070C0"/>
-                </a:solidFill>
-                <a:effectLst>
-                  <a:outerShdw blurRad="38100" dist="38100" dir="2700000" algn="tl">
-                    <a:srgbClr val="000000">
-                      <a:alpha val="43137"/>
-                    </a:srgbClr>
-                  </a:outerShdw>
-                </a:effectLst>
-              </a:rPr>
-              <a:t>Framework</a:t>
+              <a:t> 5 Test Framework</a:t>
             </a:r>
             <a:endParaRPr lang="en-US" dirty="0">
               <a:solidFill>
@@ -8260,18 +8060,18 @@
     </p:spTree>
     <p:extLst>
       <p:ext uri="{BB962C8B-B14F-4D97-AF65-F5344CB8AC3E}">
-        <p14:creationId xmlns:p14="http://schemas.microsoft.com/office/powerpoint/2010/main" xmlns="" val="1979461865"/>
+        <p14:creationId xmlns:p14="http://schemas.microsoft.com/office/powerpoint/2010/main" val="1979461865"/>
       </p:ext>
     </p:extLst>
   </p:cSld>
   <p:clrMapOvr>
     <a:masterClrMapping/>
   </p:clrMapOvr>
-  <mc:AlternateContent xmlns:mc="http://schemas.openxmlformats.org/markup-compatibility/2006">
-    <mc:Choice xmlns:p14="http://schemas.microsoft.com/office/powerpoint/2010/main" xmlns="" Requires="p14">
+  <mc:AlternateContent xmlns:mc="http://schemas.openxmlformats.org/markup-compatibility/2006" xmlns:p14="http://schemas.microsoft.com/office/powerpoint/2010/main">
+    <mc:Choice Requires="p14">
       <p:transition p14:dur="0"/>
     </mc:Choice>
-    <mc:Fallback>
+    <mc:Fallback xmlns="">
       <p:transition/>
     </mc:Fallback>
   </mc:AlternateContent>
@@ -8457,7 +8257,7 @@
           <a:noFill/>
           <a:extLst>
             <a:ext uri="{909E8E84-426E-40DD-AFC4-6F175D3DCCD1}">
-              <a14:hiddenFill xmlns:a14="http://schemas.microsoft.com/office/drawing/2010/main" xmlns="">
+              <a14:hiddenFill xmlns:a14="http://schemas.microsoft.com/office/drawing/2010/main">
                 <a:solidFill>
                   <a:srgbClr val="FFFFFF"/>
                 </a:solidFill>
@@ -8496,7 +8296,7 @@
           <a:noFill/>
           <a:extLst>
             <a:ext uri="{909E8E84-426E-40DD-AFC4-6F175D3DCCD1}">
-              <a14:hiddenFill xmlns:a14="http://schemas.microsoft.com/office/drawing/2010/main" xmlns="">
+              <a14:hiddenFill xmlns:a14="http://schemas.microsoft.com/office/drawing/2010/main">
                 <a:solidFill>
                   <a:srgbClr val="FFFFFF"/>
                 </a:solidFill>
@@ -8530,7 +8330,7 @@
           <a:blip r:embed="rId2" cstate="print">
             <a:extLst>
               <a:ext uri="{28A0092B-C50C-407E-A947-70E740481C1C}">
-                <a14:useLocalDpi xmlns:a14="http://schemas.microsoft.com/office/drawing/2010/main" xmlns="" val="0"/>
+                <a14:useLocalDpi xmlns:a14="http://schemas.microsoft.com/office/drawing/2010/main" val="0"/>
               </a:ext>
             </a:extLst>
           </a:blip>
@@ -8550,7 +8350,7 @@
           <a:noFill/>
           <a:extLst>
             <a:ext uri="{909E8E84-426E-40DD-AFC4-6F175D3DCCD1}">
-              <a14:hiddenFill xmlns:a14="http://schemas.microsoft.com/office/drawing/2010/main" xmlns="">
+              <a14:hiddenFill xmlns:a14="http://schemas.microsoft.com/office/drawing/2010/main">
                 <a:solidFill>
                   <a:srgbClr val="FFFFFF"/>
                 </a:solidFill>
@@ -8562,18 +8362,18 @@
     </p:spTree>
     <p:extLst>
       <p:ext uri="{BB962C8B-B14F-4D97-AF65-F5344CB8AC3E}">
-        <p14:creationId xmlns:p14="http://schemas.microsoft.com/office/powerpoint/2010/main" xmlns="" val="3792145510"/>
+        <p14:creationId xmlns:p14="http://schemas.microsoft.com/office/powerpoint/2010/main" val="3792145510"/>
       </p:ext>
     </p:extLst>
   </p:cSld>
   <p:clrMapOvr>
     <a:masterClrMapping/>
   </p:clrMapOvr>
-  <mc:AlternateContent xmlns:mc="http://schemas.openxmlformats.org/markup-compatibility/2006">
-    <mc:Choice xmlns:p14="http://schemas.microsoft.com/office/powerpoint/2010/main" xmlns="" Requires="p14">
+  <mc:AlternateContent xmlns:mc="http://schemas.openxmlformats.org/markup-compatibility/2006" xmlns:p14="http://schemas.microsoft.com/office/powerpoint/2010/main">
+    <mc:Choice Requires="p14">
       <p:transition p14:dur="0"/>
     </mc:Choice>
-    <mc:Fallback>
+    <mc:Fallback xmlns="">
       <p:transition/>
     </mc:Fallback>
   </mc:AlternateContent>

</xml_diff>

<commit_message>
Leitura da referência separada.
</commit_message>
<xml_diff>
--- a/CAP385-00-Presentations/02-JUnit 5/02-JUnit 5.pptx
+++ b/CAP385-00-Presentations/02-JUnit 5/02-JUnit 5.pptx
@@ -12,17 +12,17 @@
     <p:sldId id="271" r:id="rId3"/>
     <p:sldId id="265" r:id="rId4"/>
     <p:sldId id="272" r:id="rId5"/>
-    <p:sldId id="283" r:id="rId6"/>
-    <p:sldId id="281" r:id="rId7"/>
-    <p:sldId id="280" r:id="rId8"/>
-    <p:sldId id="282" r:id="rId9"/>
-    <p:sldId id="273" r:id="rId10"/>
-    <p:sldId id="274" r:id="rId11"/>
-    <p:sldId id="275" r:id="rId12"/>
-    <p:sldId id="276" r:id="rId13"/>
-    <p:sldId id="277" r:id="rId14"/>
-    <p:sldId id="278" r:id="rId15"/>
-    <p:sldId id="279" r:id="rId16"/>
+    <p:sldId id="281" r:id="rId6"/>
+    <p:sldId id="280" r:id="rId7"/>
+    <p:sldId id="273" r:id="rId8"/>
+    <p:sldId id="274" r:id="rId9"/>
+    <p:sldId id="275" r:id="rId10"/>
+    <p:sldId id="276" r:id="rId11"/>
+    <p:sldId id="277" r:id="rId12"/>
+    <p:sldId id="278" r:id="rId13"/>
+    <p:sldId id="279" r:id="rId14"/>
+    <p:sldId id="283" r:id="rId15"/>
+    <p:sldId id="282" r:id="rId16"/>
   </p:sldIdLst>
   <p:sldSz cx="9144000" cy="6858000" type="screen4x3"/>
   <p:notesSz cx="6858000" cy="9144000"/>
@@ -207,7 +207,7 @@
             <a:fld id="{3DB25566-8A38-405D-AF46-A7AC913A6215}" type="datetimeFigureOut">
               <a:rPr lang="pt-BR" smtClean="0"/>
               <a:pPr/>
-              <a:t>13/07/2016</a:t>
+              <a:t>14/07/2016</a:t>
             </a:fld>
             <a:endParaRPr lang="pt-BR"/>
           </a:p>
@@ -740,7 +740,7 @@
             <a:fld id="{97BE082F-75F0-4080-8642-9DC0E9DA7233}" type="datetimeFigureOut">
               <a:rPr lang="pt-BR" smtClean="0"/>
               <a:pPr/>
-              <a:t>13/07/2016</a:t>
+              <a:t>14/07/2016</a:t>
             </a:fld>
             <a:endParaRPr lang="pt-BR"/>
           </a:p>
@@ -912,7 +912,7 @@
             <a:fld id="{97BE082F-75F0-4080-8642-9DC0E9DA7233}" type="datetimeFigureOut">
               <a:rPr lang="pt-BR" smtClean="0"/>
               <a:pPr/>
-              <a:t>13/07/2016</a:t>
+              <a:t>14/07/2016</a:t>
             </a:fld>
             <a:endParaRPr lang="pt-BR"/>
           </a:p>
@@ -1094,7 +1094,7 @@
             <a:fld id="{97BE082F-75F0-4080-8642-9DC0E9DA7233}" type="datetimeFigureOut">
               <a:rPr lang="pt-BR" smtClean="0"/>
               <a:pPr/>
-              <a:t>13/07/2016</a:t>
+              <a:t>14/07/2016</a:t>
             </a:fld>
             <a:endParaRPr lang="pt-BR"/>
           </a:p>
@@ -1448,7 +1448,7 @@
             <a:fld id="{97BE082F-75F0-4080-8642-9DC0E9DA7233}" type="datetimeFigureOut">
               <a:rPr lang="pt-BR" smtClean="0"/>
               <a:pPr/>
-              <a:t>13/07/2016</a:t>
+              <a:t>14/07/2016</a:t>
             </a:fld>
             <a:endParaRPr lang="pt-BR"/>
           </a:p>
@@ -1696,7 +1696,7 @@
             <a:fld id="{97BE082F-75F0-4080-8642-9DC0E9DA7233}" type="datetimeFigureOut">
               <a:rPr lang="pt-BR" smtClean="0"/>
               <a:pPr/>
-              <a:t>13/07/2016</a:t>
+              <a:t>14/07/2016</a:t>
             </a:fld>
             <a:endParaRPr lang="pt-BR"/>
           </a:p>
@@ -1986,7 +1986,7 @@
             <a:fld id="{97BE082F-75F0-4080-8642-9DC0E9DA7233}" type="datetimeFigureOut">
               <a:rPr lang="pt-BR" smtClean="0"/>
               <a:pPr/>
-              <a:t>13/07/2016</a:t>
+              <a:t>14/07/2016</a:t>
             </a:fld>
             <a:endParaRPr lang="pt-BR"/>
           </a:p>
@@ -2410,7 +2410,7 @@
             <a:fld id="{97BE082F-75F0-4080-8642-9DC0E9DA7233}" type="datetimeFigureOut">
               <a:rPr lang="pt-BR" smtClean="0"/>
               <a:pPr/>
-              <a:t>13/07/2016</a:t>
+              <a:t>14/07/2016</a:t>
             </a:fld>
             <a:endParaRPr lang="pt-BR"/>
           </a:p>
@@ -2530,7 +2530,7 @@
             <a:fld id="{97BE082F-75F0-4080-8642-9DC0E9DA7233}" type="datetimeFigureOut">
               <a:rPr lang="pt-BR" smtClean="0"/>
               <a:pPr/>
-              <a:t>13/07/2016</a:t>
+              <a:t>14/07/2016</a:t>
             </a:fld>
             <a:endParaRPr lang="pt-BR"/>
           </a:p>
@@ -2627,7 +2627,7 @@
             <a:fld id="{97BE082F-75F0-4080-8642-9DC0E9DA7233}" type="datetimeFigureOut">
               <a:rPr lang="pt-BR" smtClean="0"/>
               <a:pPr/>
-              <a:t>13/07/2016</a:t>
+              <a:t>14/07/2016</a:t>
             </a:fld>
             <a:endParaRPr lang="pt-BR"/>
           </a:p>
@@ -2906,7 +2906,7 @@
             <a:fld id="{97BE082F-75F0-4080-8642-9DC0E9DA7233}" type="datetimeFigureOut">
               <a:rPr lang="pt-BR" smtClean="0"/>
               <a:pPr/>
-              <a:t>13/07/2016</a:t>
+              <a:t>14/07/2016</a:t>
             </a:fld>
             <a:endParaRPr lang="pt-BR"/>
           </a:p>
@@ -3161,7 +3161,7 @@
             <a:fld id="{97BE082F-75F0-4080-8642-9DC0E9DA7233}" type="datetimeFigureOut">
               <a:rPr lang="pt-BR" smtClean="0"/>
               <a:pPr/>
-              <a:t>13/07/2016</a:t>
+              <a:t>14/07/2016</a:t>
             </a:fld>
             <a:endParaRPr lang="pt-BR"/>
           </a:p>
@@ -3376,7 +3376,7 @@
             <a:fld id="{97BE082F-75F0-4080-8642-9DC0E9DA7233}" type="datetimeFigureOut">
               <a:rPr lang="pt-BR" smtClean="0"/>
               <a:pPr/>
-              <a:t>13/07/2016</a:t>
+              <a:t>14/07/2016</a:t>
             </a:fld>
             <a:endParaRPr lang="pt-BR"/>
           </a:p>
@@ -3836,15 +3836,7 @@
                   <a:srgbClr val="0070C0"/>
                 </a:solidFill>
               </a:rPr>
-              <a:t> </a:t>
-            </a:r>
-            <a:r>
-              <a:rPr lang="en-US" b="1" dirty="0" smtClean="0">
-                <a:solidFill>
-                  <a:srgbClr val="0070C0"/>
-                </a:solidFill>
-              </a:rPr>
-              <a:t>Lambda -&gt; </a:t>
+              <a:t> Lambda -&gt; </a:t>
             </a:r>
             <a:r>
               <a:rPr lang="en-US" b="1" dirty="0" err="1" smtClean="0">
@@ -3861,14 +3853,6 @@
                 </a:solidFill>
               </a:rPr>
               <a:t> 5</a:t>
-            </a:r>
-            <a:r>
-              <a:rPr lang="en-US" b="1" dirty="0" smtClean="0">
-                <a:solidFill>
-                  <a:srgbClr val="0070C0"/>
-                </a:solidFill>
-              </a:rPr>
-              <a:t/>
             </a:r>
             <a:br>
               <a:rPr lang="en-US" b="1" dirty="0" smtClean="0">
@@ -4238,662 +4222,6 @@
           </a:p>
         </p:txBody>
       </p:sp>
-      <p:pic>
-        <p:nvPicPr>
-          <p:cNvPr id="4099" name="Picture 3"/>
-          <p:cNvPicPr>
-            <a:picLocks noChangeAspect="1" noChangeArrowheads="1"/>
-          </p:cNvPicPr>
-          <p:nvPr/>
-        </p:nvPicPr>
-        <p:blipFill>
-          <a:blip r:embed="rId2" cstate="print">
-            <a:extLst>
-              <a:ext uri="{28A0092B-C50C-407E-A947-70E740481C1C}">
-                <a14:useLocalDpi xmlns:a14="http://schemas.microsoft.com/office/drawing/2010/main" val="0"/>
-              </a:ext>
-            </a:extLst>
-          </a:blip>
-          <a:srcRect/>
-          <a:stretch>
-            <a:fillRect/>
-          </a:stretch>
-        </p:blipFill>
-        <p:spPr bwMode="auto">
-          <a:xfrm>
-            <a:off x="457200" y="1268760"/>
-            <a:ext cx="8229600" cy="5238750"/>
-          </a:xfrm>
-          <a:prstGeom prst="rect">
-            <a:avLst/>
-          </a:prstGeom>
-          <a:noFill/>
-          <a:ln>
-            <a:noFill/>
-          </a:ln>
-          <a:effectLst/>
-          <a:extLst>
-            <a:ext uri="{909E8E84-426E-40DD-AFC4-6F175D3DCCD1}">
-              <a14:hiddenFill xmlns:a14="http://schemas.microsoft.com/office/drawing/2010/main">
-                <a:solidFill>
-                  <a:schemeClr val="accent1"/>
-                </a:solidFill>
-              </a14:hiddenFill>
-            </a:ext>
-            <a:ext uri="{91240B29-F687-4F45-9708-019B960494DF}">
-              <a14:hiddenLine xmlns:a14="http://schemas.microsoft.com/office/drawing/2010/main" w="9525">
-                <a:solidFill>
-                  <a:schemeClr val="tx1"/>
-                </a:solidFill>
-                <a:miter lim="800000"/>
-                <a:headEnd/>
-                <a:tailEnd/>
-              </a14:hiddenLine>
-            </a:ext>
-            <a:ext uri="{AF507438-7753-43E0-B8FC-AC1667EBCBE1}">
-              <a14:hiddenEffects xmlns:a14="http://schemas.microsoft.com/office/drawing/2010/main">
-                <a:effectLst>
-                  <a:outerShdw dist="35921" dir="2700000" algn="ctr" rotWithShape="0">
-                    <a:schemeClr val="bg2"/>
-                  </a:outerShdw>
-                </a:effectLst>
-              </a14:hiddenEffects>
-            </a:ext>
-          </a:extLst>
-        </p:spPr>
-      </p:pic>
-      <p:sp>
-        <p:nvSpPr>
-          <p:cNvPr id="13" name="Title 3"/>
-          <p:cNvSpPr>
-            <a:spLocks noGrp="1"/>
-          </p:cNvSpPr>
-          <p:nvPr>
-            <p:ph type="title"/>
-          </p:nvPr>
-        </p:nvSpPr>
-        <p:spPr/>
-        <p:txBody>
-          <a:bodyPr>
-            <a:normAutofit/>
-          </a:bodyPr>
-          <a:lstStyle/>
-          <a:p>
-            <a:r>
-              <a:rPr lang="pt-BR" dirty="0" smtClean="0">
-                <a:solidFill>
-                  <a:srgbClr val="0070C0"/>
-                </a:solidFill>
-                <a:effectLst>
-                  <a:outerShdw blurRad="38100" dist="38100" dir="2700000" algn="tl">
-                    <a:srgbClr val="000000">
-                      <a:alpha val="43137"/>
-                    </a:srgbClr>
-                  </a:outerShdw>
-                </a:effectLst>
-              </a:rPr>
-              <a:t>Exemplo - Função</a:t>
-            </a:r>
-            <a:endParaRPr lang="pt-BR" dirty="0">
-              <a:solidFill>
-                <a:srgbClr val="0070C0"/>
-              </a:solidFill>
-              <a:effectLst>
-                <a:outerShdw blurRad="38100" dist="38100" dir="2700000" algn="tl">
-                  <a:srgbClr val="000000">
-                    <a:alpha val="43137"/>
-                  </a:srgbClr>
-                </a:outerShdw>
-              </a:effectLst>
-            </a:endParaRPr>
-          </a:p>
-        </p:txBody>
-      </p:sp>
-    </p:spTree>
-    <p:extLst>
-      <p:ext uri="{BB962C8B-B14F-4D97-AF65-F5344CB8AC3E}">
-        <p14:creationId xmlns:p14="http://schemas.microsoft.com/office/powerpoint/2010/main" val="3659421261"/>
-      </p:ext>
-    </p:extLst>
-  </p:cSld>
-  <p:clrMapOvr>
-    <a:masterClrMapping/>
-  </p:clrMapOvr>
-  <mc:AlternateContent xmlns:mc="http://schemas.openxmlformats.org/markup-compatibility/2006" xmlns:p14="http://schemas.microsoft.com/office/powerpoint/2010/main">
-    <mc:Choice Requires="p14">
-      <p:transition p14:dur="0"/>
-    </mc:Choice>
-    <mc:Fallback xmlns="">
-      <p:transition/>
-    </mc:Fallback>
-  </mc:AlternateContent>
-  <p:timing>
-    <p:tnLst>
-      <p:par>
-        <p:cTn id="1" dur="indefinite" restart="never" nodeType="tmRoot"/>
-      </p:par>
-    </p:tnLst>
-  </p:timing>
-</p:sld>
-</file>
-
-<file path=ppt/slides/slide11.xml><?xml version="1.0" encoding="utf-8"?>
-<p:sld xmlns:a="http://schemas.openxmlformats.org/drawingml/2006/main" xmlns:r="http://schemas.openxmlformats.org/officeDocument/2006/relationships" xmlns:p="http://schemas.openxmlformats.org/presentationml/2006/main">
-  <p:cSld>
-    <p:spTree>
-      <p:nvGrpSpPr>
-        <p:cNvPr id="1" name=""/>
-        <p:cNvGrpSpPr/>
-        <p:nvPr/>
-      </p:nvGrpSpPr>
-      <p:grpSpPr>
-        <a:xfrm>
-          <a:off x="0" y="0"/>
-          <a:ext cx="0" cy="0"/>
-          <a:chOff x="0" y="0"/>
-          <a:chExt cx="0" cy="0"/>
-        </a:xfrm>
-      </p:grpSpPr>
-      <p:sp>
-        <p:nvSpPr>
-          <p:cNvPr id="3" name="Slide Number Placeholder 2"/>
-          <p:cNvSpPr>
-            <a:spLocks noGrp="1"/>
-          </p:cNvSpPr>
-          <p:nvPr>
-            <p:ph type="sldNum" sz="quarter" idx="11"/>
-          </p:nvPr>
-        </p:nvSpPr>
-        <p:spPr/>
-        <p:txBody>
-          <a:bodyPr/>
-          <a:lstStyle/>
-          <a:p>
-            <a:fld id="{338BD863-DCDC-5F43-A029-265BB7DA4A17}" type="slidenum">
-              <a:rPr lang="en-US" smtClean="0"/>
-              <a:pPr/>
-              <a:t>11</a:t>
-            </a:fld>
-            <a:endParaRPr lang="en-US" dirty="0"/>
-          </a:p>
-        </p:txBody>
-      </p:sp>
-      <p:sp>
-        <p:nvSpPr>
-          <p:cNvPr id="5" name="AutoShape 2" descr="G:\HD-Games\GitRepos\DesignPatterns\CAP392-02-PloP\artigos\03 - Pattern Language\entrega final\family-guy-simpsons2.webp"/>
-          <p:cNvSpPr>
-            <a:spLocks noChangeAspect="1" noChangeArrowheads="1"/>
-          </p:cNvSpPr>
-          <p:nvPr/>
-        </p:nvSpPr>
-        <p:spPr bwMode="auto">
-          <a:xfrm>
-            <a:off x="155575" y="-144463"/>
-            <a:ext cx="304800" cy="304801"/>
-          </a:xfrm>
-          <a:prstGeom prst="rect">
-            <a:avLst/>
-          </a:prstGeom>
-          <a:noFill/>
-          <a:extLst>
-            <a:ext uri="{909E8E84-426E-40DD-AFC4-6F175D3DCCD1}">
-              <a14:hiddenFill xmlns:a14="http://schemas.microsoft.com/office/drawing/2010/main">
-                <a:solidFill>
-                  <a:srgbClr val="FFFFFF"/>
-                </a:solidFill>
-              </a14:hiddenFill>
-            </a:ext>
-          </a:extLst>
-        </p:spPr>
-        <p:txBody>
-          <a:bodyPr vert="horz" wrap="square" lIns="91440" tIns="45720" rIns="91440" bIns="45720" numCol="1" anchor="t" anchorCtr="0" compatLnSpc="1">
-            <a:prstTxWarp prst="textNoShape">
-              <a:avLst/>
-            </a:prstTxWarp>
-          </a:bodyPr>
-          <a:lstStyle/>
-          <a:p>
-            <a:endParaRPr lang="pt-BR"/>
-          </a:p>
-        </p:txBody>
-      </p:sp>
-      <p:sp>
-        <p:nvSpPr>
-          <p:cNvPr id="7" name="AutoShape 4" descr="G:\HD-Games\GitRepos\DesignPatterns\CAP392-02-PloP\artigos\03 - Pattern Language\entrega final\family-guy-simpsons2.webp"/>
-          <p:cNvSpPr>
-            <a:spLocks noChangeAspect="1" noChangeArrowheads="1"/>
-          </p:cNvSpPr>
-          <p:nvPr/>
-        </p:nvSpPr>
-        <p:spPr bwMode="auto">
-          <a:xfrm>
-            <a:off x="307975" y="7937"/>
-            <a:ext cx="304800" cy="304801"/>
-          </a:xfrm>
-          <a:prstGeom prst="rect">
-            <a:avLst/>
-          </a:prstGeom>
-          <a:noFill/>
-          <a:extLst>
-            <a:ext uri="{909E8E84-426E-40DD-AFC4-6F175D3DCCD1}">
-              <a14:hiddenFill xmlns:a14="http://schemas.microsoft.com/office/drawing/2010/main">
-                <a:solidFill>
-                  <a:srgbClr val="FFFFFF"/>
-                </a:solidFill>
-              </a14:hiddenFill>
-            </a:ext>
-          </a:extLst>
-        </p:spPr>
-        <p:txBody>
-          <a:bodyPr vert="horz" wrap="square" lIns="91440" tIns="45720" rIns="91440" bIns="45720" numCol="1" anchor="t" anchorCtr="0" compatLnSpc="1">
-            <a:prstTxWarp prst="textNoShape">
-              <a:avLst/>
-            </a:prstTxWarp>
-          </a:bodyPr>
-          <a:lstStyle/>
-          <a:p>
-            <a:endParaRPr lang="pt-BR"/>
-          </a:p>
-        </p:txBody>
-      </p:sp>
-      <p:sp>
-        <p:nvSpPr>
-          <p:cNvPr id="13" name="Title 3"/>
-          <p:cNvSpPr>
-            <a:spLocks noGrp="1"/>
-          </p:cNvSpPr>
-          <p:nvPr>
-            <p:ph type="title"/>
-          </p:nvPr>
-        </p:nvSpPr>
-        <p:spPr/>
-        <p:txBody>
-          <a:bodyPr>
-            <a:normAutofit/>
-          </a:bodyPr>
-          <a:lstStyle/>
-          <a:p>
-            <a:r>
-              <a:rPr lang="pt-BR" dirty="0" smtClean="0">
-                <a:solidFill>
-                  <a:srgbClr val="0070C0"/>
-                </a:solidFill>
-                <a:effectLst>
-                  <a:outerShdw blurRad="38100" dist="38100" dir="2700000" algn="tl">
-                    <a:srgbClr val="000000">
-                      <a:alpha val="43137"/>
-                    </a:srgbClr>
-                  </a:outerShdw>
-                </a:effectLst>
-              </a:rPr>
-              <a:t>Exemplo – Função (Código Teste)</a:t>
-            </a:r>
-            <a:endParaRPr lang="pt-BR" dirty="0">
-              <a:solidFill>
-                <a:srgbClr val="0070C0"/>
-              </a:solidFill>
-              <a:effectLst>
-                <a:outerShdw blurRad="38100" dist="38100" dir="2700000" algn="tl">
-                  <a:srgbClr val="000000">
-                    <a:alpha val="43137"/>
-                  </a:srgbClr>
-                </a:outerShdw>
-              </a:effectLst>
-            </a:endParaRPr>
-          </a:p>
-        </p:txBody>
-      </p:sp>
-      <p:pic>
-        <p:nvPicPr>
-          <p:cNvPr id="5123" name="Picture 3"/>
-          <p:cNvPicPr>
-            <a:picLocks noChangeAspect="1" noChangeArrowheads="1"/>
-          </p:cNvPicPr>
-          <p:nvPr/>
-        </p:nvPicPr>
-        <p:blipFill>
-          <a:blip r:embed="rId2" cstate="print">
-            <a:extLst>
-              <a:ext uri="{28A0092B-C50C-407E-A947-70E740481C1C}">
-                <a14:useLocalDpi xmlns:a14="http://schemas.microsoft.com/office/drawing/2010/main" val="0"/>
-              </a:ext>
-            </a:extLst>
-          </a:blip>
-          <a:srcRect/>
-          <a:stretch>
-            <a:fillRect/>
-          </a:stretch>
-        </p:blipFill>
-        <p:spPr bwMode="auto">
-          <a:xfrm>
-            <a:off x="321645" y="1124744"/>
-            <a:ext cx="8210550" cy="3990975"/>
-          </a:xfrm>
-          <a:prstGeom prst="rect">
-            <a:avLst/>
-          </a:prstGeom>
-          <a:noFill/>
-          <a:ln>
-            <a:noFill/>
-          </a:ln>
-          <a:effectLst/>
-          <a:extLst>
-            <a:ext uri="{909E8E84-426E-40DD-AFC4-6F175D3DCCD1}">
-              <a14:hiddenFill xmlns:a14="http://schemas.microsoft.com/office/drawing/2010/main">
-                <a:solidFill>
-                  <a:schemeClr val="accent1"/>
-                </a:solidFill>
-              </a14:hiddenFill>
-            </a:ext>
-            <a:ext uri="{91240B29-F687-4F45-9708-019B960494DF}">
-              <a14:hiddenLine xmlns:a14="http://schemas.microsoft.com/office/drawing/2010/main" w="9525">
-                <a:solidFill>
-                  <a:schemeClr val="tx1"/>
-                </a:solidFill>
-                <a:miter lim="800000"/>
-                <a:headEnd/>
-                <a:tailEnd/>
-              </a14:hiddenLine>
-            </a:ext>
-            <a:ext uri="{AF507438-7753-43E0-B8FC-AC1667EBCBE1}">
-              <a14:hiddenEffects xmlns:a14="http://schemas.microsoft.com/office/drawing/2010/main">
-                <a:effectLst>
-                  <a:outerShdw dist="35921" dir="2700000" algn="ctr" rotWithShape="0">
-                    <a:schemeClr val="bg2"/>
-                  </a:outerShdw>
-                </a:effectLst>
-              </a14:hiddenEffects>
-            </a:ext>
-          </a:extLst>
-        </p:spPr>
-      </p:pic>
-      <p:pic>
-        <p:nvPicPr>
-          <p:cNvPr id="5124" name="Picture 4"/>
-          <p:cNvPicPr>
-            <a:picLocks noChangeAspect="1" noChangeArrowheads="1"/>
-          </p:cNvPicPr>
-          <p:nvPr/>
-        </p:nvPicPr>
-        <p:blipFill>
-          <a:blip r:embed="rId3" cstate="print">
-            <a:extLst>
-              <a:ext uri="{28A0092B-C50C-407E-A947-70E740481C1C}">
-                <a14:useLocalDpi xmlns:a14="http://schemas.microsoft.com/office/drawing/2010/main" val="0"/>
-              </a:ext>
-            </a:extLst>
-          </a:blip>
-          <a:srcRect/>
-          <a:stretch>
-            <a:fillRect/>
-          </a:stretch>
-        </p:blipFill>
-        <p:spPr bwMode="auto">
-          <a:xfrm>
-            <a:off x="647071" y="2276872"/>
-            <a:ext cx="8210550" cy="4000500"/>
-          </a:xfrm>
-          <a:prstGeom prst="rect">
-            <a:avLst/>
-          </a:prstGeom>
-          <a:noFill/>
-          <a:ln>
-            <a:noFill/>
-          </a:ln>
-          <a:effectLst/>
-          <a:extLst>
-            <a:ext uri="{909E8E84-426E-40DD-AFC4-6F175D3DCCD1}">
-              <a14:hiddenFill xmlns:a14="http://schemas.microsoft.com/office/drawing/2010/main">
-                <a:solidFill>
-                  <a:schemeClr val="accent1"/>
-                </a:solidFill>
-              </a14:hiddenFill>
-            </a:ext>
-            <a:ext uri="{91240B29-F687-4F45-9708-019B960494DF}">
-              <a14:hiddenLine xmlns:a14="http://schemas.microsoft.com/office/drawing/2010/main" w="9525">
-                <a:solidFill>
-                  <a:schemeClr val="tx1"/>
-                </a:solidFill>
-                <a:miter lim="800000"/>
-                <a:headEnd/>
-                <a:tailEnd/>
-              </a14:hiddenLine>
-            </a:ext>
-            <a:ext uri="{AF507438-7753-43E0-B8FC-AC1667EBCBE1}">
-              <a14:hiddenEffects xmlns:a14="http://schemas.microsoft.com/office/drawing/2010/main">
-                <a:effectLst>
-                  <a:outerShdw dist="35921" dir="2700000" algn="ctr" rotWithShape="0">
-                    <a:schemeClr val="bg2"/>
-                  </a:outerShdw>
-                </a:effectLst>
-              </a14:hiddenEffects>
-            </a:ext>
-          </a:extLst>
-        </p:spPr>
-      </p:pic>
-    </p:spTree>
-    <p:extLst>
-      <p:ext uri="{BB962C8B-B14F-4D97-AF65-F5344CB8AC3E}">
-        <p14:creationId xmlns:p14="http://schemas.microsoft.com/office/powerpoint/2010/main" val="3372461043"/>
-      </p:ext>
-    </p:extLst>
-  </p:cSld>
-  <p:clrMapOvr>
-    <a:masterClrMapping/>
-  </p:clrMapOvr>
-  <mc:AlternateContent xmlns:mc="http://schemas.openxmlformats.org/markup-compatibility/2006" xmlns:p14="http://schemas.microsoft.com/office/powerpoint/2010/main">
-    <mc:Choice Requires="p14">
-      <p:transition p14:dur="10"/>
-    </mc:Choice>
-    <mc:Fallback xmlns="">
-      <p:transition/>
-    </mc:Fallback>
-  </mc:AlternateContent>
-  <p:timing>
-    <p:tnLst>
-      <p:par>
-        <p:cTn id="1" dur="indefinite" restart="never" nodeType="tmRoot">
-          <p:childTnLst>
-            <p:seq concurrent="1" nextAc="seek">
-              <p:cTn id="2" dur="indefinite" nodeType="mainSeq">
-                <p:childTnLst>
-                  <p:par>
-                    <p:cTn id="3" fill="hold">
-                      <p:stCondLst>
-                        <p:cond delay="indefinite"/>
-                      </p:stCondLst>
-                      <p:childTnLst>
-                        <p:par>
-                          <p:cTn id="4" fill="hold">
-                            <p:stCondLst>
-                              <p:cond delay="0"/>
-                            </p:stCondLst>
-                            <p:childTnLst>
-                              <p:par>
-                                <p:cTn id="5" presetID="22" presetClass="entr" presetSubtype="1" fill="hold" nodeType="clickEffect">
-                                  <p:stCondLst>
-                                    <p:cond delay="0"/>
-                                  </p:stCondLst>
-                                  <p:childTnLst>
-                                    <p:set>
-                                      <p:cBhvr>
-                                        <p:cTn id="6" dur="1" fill="hold">
-                                          <p:stCondLst>
-                                            <p:cond delay="0"/>
-                                          </p:stCondLst>
-                                        </p:cTn>
-                                        <p:tgtEl>
-                                          <p:spTgt spid="5124"/>
-                                        </p:tgtEl>
-                                        <p:attrNameLst>
-                                          <p:attrName>style.visibility</p:attrName>
-                                        </p:attrNameLst>
-                                      </p:cBhvr>
-                                      <p:to>
-                                        <p:strVal val="visible"/>
-                                      </p:to>
-                                    </p:set>
-                                    <p:animEffect transition="in" filter="wipe(up)">
-                                      <p:cBhvr>
-                                        <p:cTn id="7" dur="500"/>
-                                        <p:tgtEl>
-                                          <p:spTgt spid="5124"/>
-                                        </p:tgtEl>
-                                      </p:cBhvr>
-                                    </p:animEffect>
-                                  </p:childTnLst>
-                                </p:cTn>
-                              </p:par>
-                            </p:childTnLst>
-                          </p:cTn>
-                        </p:par>
-                      </p:childTnLst>
-                    </p:cTn>
-                  </p:par>
-                </p:childTnLst>
-              </p:cTn>
-              <p:prevCondLst>
-                <p:cond evt="onPrev" delay="0">
-                  <p:tgtEl>
-                    <p:sldTgt/>
-                  </p:tgtEl>
-                </p:cond>
-              </p:prevCondLst>
-              <p:nextCondLst>
-                <p:cond evt="onNext" delay="0">
-                  <p:tgtEl>
-                    <p:sldTgt/>
-                  </p:tgtEl>
-                </p:cond>
-              </p:nextCondLst>
-            </p:seq>
-          </p:childTnLst>
-        </p:cTn>
-      </p:par>
-    </p:tnLst>
-  </p:timing>
-</p:sld>
-</file>
-
-<file path=ppt/slides/slide12.xml><?xml version="1.0" encoding="utf-8"?>
-<p:sld xmlns:a="http://schemas.openxmlformats.org/drawingml/2006/main" xmlns:r="http://schemas.openxmlformats.org/officeDocument/2006/relationships" xmlns:p="http://schemas.openxmlformats.org/presentationml/2006/main">
-  <p:cSld>
-    <p:spTree>
-      <p:nvGrpSpPr>
-        <p:cNvPr id="1" name=""/>
-        <p:cNvGrpSpPr/>
-        <p:nvPr/>
-      </p:nvGrpSpPr>
-      <p:grpSpPr>
-        <a:xfrm>
-          <a:off x="0" y="0"/>
-          <a:ext cx="0" cy="0"/>
-          <a:chOff x="0" y="0"/>
-          <a:chExt cx="0" cy="0"/>
-        </a:xfrm>
-      </p:grpSpPr>
-      <p:sp>
-        <p:nvSpPr>
-          <p:cNvPr id="3" name="Slide Number Placeholder 2"/>
-          <p:cNvSpPr>
-            <a:spLocks noGrp="1"/>
-          </p:cNvSpPr>
-          <p:nvPr>
-            <p:ph type="sldNum" sz="quarter" idx="11"/>
-          </p:nvPr>
-        </p:nvSpPr>
-        <p:spPr/>
-        <p:txBody>
-          <a:bodyPr/>
-          <a:lstStyle/>
-          <a:p>
-            <a:fld id="{338BD863-DCDC-5F43-A029-265BB7DA4A17}" type="slidenum">
-              <a:rPr lang="en-US" smtClean="0"/>
-              <a:pPr/>
-              <a:t>12</a:t>
-            </a:fld>
-            <a:endParaRPr lang="en-US" dirty="0"/>
-          </a:p>
-        </p:txBody>
-      </p:sp>
-      <p:sp>
-        <p:nvSpPr>
-          <p:cNvPr id="5" name="AutoShape 2" descr="G:\HD-Games\GitRepos\DesignPatterns\CAP392-02-PloP\artigos\03 - Pattern Language\entrega final\family-guy-simpsons2.webp"/>
-          <p:cNvSpPr>
-            <a:spLocks noChangeAspect="1" noChangeArrowheads="1"/>
-          </p:cNvSpPr>
-          <p:nvPr/>
-        </p:nvSpPr>
-        <p:spPr bwMode="auto">
-          <a:xfrm>
-            <a:off x="155575" y="-144463"/>
-            <a:ext cx="304800" cy="304801"/>
-          </a:xfrm>
-          <a:prstGeom prst="rect">
-            <a:avLst/>
-          </a:prstGeom>
-          <a:noFill/>
-          <a:extLst>
-            <a:ext uri="{909E8E84-426E-40DD-AFC4-6F175D3DCCD1}">
-              <a14:hiddenFill xmlns:a14="http://schemas.microsoft.com/office/drawing/2010/main">
-                <a:solidFill>
-                  <a:srgbClr val="FFFFFF"/>
-                </a:solidFill>
-              </a14:hiddenFill>
-            </a:ext>
-          </a:extLst>
-        </p:spPr>
-        <p:txBody>
-          <a:bodyPr vert="horz" wrap="square" lIns="91440" tIns="45720" rIns="91440" bIns="45720" numCol="1" anchor="t" anchorCtr="0" compatLnSpc="1">
-            <a:prstTxWarp prst="textNoShape">
-              <a:avLst/>
-            </a:prstTxWarp>
-          </a:bodyPr>
-          <a:lstStyle/>
-          <a:p>
-            <a:endParaRPr lang="pt-BR"/>
-          </a:p>
-        </p:txBody>
-      </p:sp>
-      <p:sp>
-        <p:nvSpPr>
-          <p:cNvPr id="7" name="AutoShape 4" descr="G:\HD-Games\GitRepos\DesignPatterns\CAP392-02-PloP\artigos\03 - Pattern Language\entrega final\family-guy-simpsons2.webp"/>
-          <p:cNvSpPr>
-            <a:spLocks noChangeAspect="1" noChangeArrowheads="1"/>
-          </p:cNvSpPr>
-          <p:nvPr/>
-        </p:nvSpPr>
-        <p:spPr bwMode="auto">
-          <a:xfrm>
-            <a:off x="307975" y="7937"/>
-            <a:ext cx="304800" cy="304801"/>
-          </a:xfrm>
-          <a:prstGeom prst="rect">
-            <a:avLst/>
-          </a:prstGeom>
-          <a:noFill/>
-          <a:extLst>
-            <a:ext uri="{909E8E84-426E-40DD-AFC4-6F175D3DCCD1}">
-              <a14:hiddenFill xmlns:a14="http://schemas.microsoft.com/office/drawing/2010/main">
-                <a:solidFill>
-                  <a:srgbClr val="FFFFFF"/>
-                </a:solidFill>
-              </a14:hiddenFill>
-            </a:ext>
-          </a:extLst>
-        </p:spPr>
-        <p:txBody>
-          <a:bodyPr vert="horz" wrap="square" lIns="91440" tIns="45720" rIns="91440" bIns="45720" numCol="1" anchor="t" anchorCtr="0" compatLnSpc="1">
-            <a:prstTxWarp prst="textNoShape">
-              <a:avLst/>
-            </a:prstTxWarp>
-          </a:bodyPr>
-          <a:lstStyle/>
-          <a:p>
-            <a:endParaRPr lang="pt-BR"/>
-          </a:p>
-        </p:txBody>
-      </p:sp>
       <p:sp>
         <p:nvSpPr>
           <p:cNvPr id="13" name="Title 3"/>
@@ -5033,7 +4361,7 @@
 </p:sld>
 </file>
 
-<file path=ppt/slides/slide13.xml><?xml version="1.0" encoding="utf-8"?>
+<file path=ppt/slides/slide11.xml><?xml version="1.0" encoding="utf-8"?>
 <p:sld xmlns:a="http://schemas.openxmlformats.org/drawingml/2006/main" xmlns:r="http://schemas.openxmlformats.org/officeDocument/2006/relationships" xmlns:p="http://schemas.openxmlformats.org/presentationml/2006/main">
   <p:cSld>
     <p:spTree>
@@ -5068,7 +4396,7 @@
             <a:fld id="{338BD863-DCDC-5F43-A029-265BB7DA4A17}" type="slidenum">
               <a:rPr lang="en-US" smtClean="0"/>
               <a:pPr/>
-              <a:t>13</a:t>
+              <a:t>11</a:t>
             </a:fld>
             <a:endParaRPr lang="en-US" dirty="0"/>
           </a:p>
@@ -5416,7 +4744,7 @@
 </p:sld>
 </file>
 
-<file path=ppt/slides/slide14.xml><?xml version="1.0" encoding="utf-8"?>
+<file path=ppt/slides/slide12.xml><?xml version="1.0" encoding="utf-8"?>
 <p:sld xmlns:a="http://schemas.openxmlformats.org/drawingml/2006/main" xmlns:r="http://schemas.openxmlformats.org/officeDocument/2006/relationships" xmlns:p="http://schemas.openxmlformats.org/presentationml/2006/main">
   <p:cSld>
     <p:spTree>
@@ -5451,7 +4779,7 @@
             <a:fld id="{338BD863-DCDC-5F43-A029-265BB7DA4A17}" type="slidenum">
               <a:rPr lang="en-US" smtClean="0"/>
               <a:pPr/>
-              <a:t>14</a:t>
+              <a:t>12</a:t>
             </a:fld>
             <a:endParaRPr lang="en-US" dirty="0"/>
           </a:p>
@@ -5674,6 +5002,612 @@
 </p:sld>
 </file>
 
+<file path=ppt/slides/slide13.xml><?xml version="1.0" encoding="utf-8"?>
+<p:sld xmlns:a="http://schemas.openxmlformats.org/drawingml/2006/main" xmlns:r="http://schemas.openxmlformats.org/officeDocument/2006/relationships" xmlns:p="http://schemas.openxmlformats.org/presentationml/2006/main">
+  <p:cSld>
+    <p:spTree>
+      <p:nvGrpSpPr>
+        <p:cNvPr id="1" name=""/>
+        <p:cNvGrpSpPr/>
+        <p:nvPr/>
+      </p:nvGrpSpPr>
+      <p:grpSpPr>
+        <a:xfrm>
+          <a:off x="0" y="0"/>
+          <a:ext cx="0" cy="0"/>
+          <a:chOff x="0" y="0"/>
+          <a:chExt cx="0" cy="0"/>
+        </a:xfrm>
+      </p:grpSpPr>
+      <p:sp>
+        <p:nvSpPr>
+          <p:cNvPr id="3" name="Slide Number Placeholder 2"/>
+          <p:cNvSpPr>
+            <a:spLocks noGrp="1"/>
+          </p:cNvSpPr>
+          <p:nvPr>
+            <p:ph type="sldNum" sz="quarter" idx="11"/>
+          </p:nvPr>
+        </p:nvSpPr>
+        <p:spPr/>
+        <p:txBody>
+          <a:bodyPr/>
+          <a:lstStyle/>
+          <a:p>
+            <a:fld id="{338BD863-DCDC-5F43-A029-265BB7DA4A17}" type="slidenum">
+              <a:rPr lang="en-US" smtClean="0"/>
+              <a:pPr/>
+              <a:t>13</a:t>
+            </a:fld>
+            <a:endParaRPr lang="en-US" dirty="0"/>
+          </a:p>
+        </p:txBody>
+      </p:sp>
+      <p:sp>
+        <p:nvSpPr>
+          <p:cNvPr id="4" name="Title 3"/>
+          <p:cNvSpPr>
+            <a:spLocks noGrp="1"/>
+          </p:cNvSpPr>
+          <p:nvPr>
+            <p:ph type="title"/>
+          </p:nvPr>
+        </p:nvSpPr>
+        <p:spPr/>
+        <p:txBody>
+          <a:bodyPr>
+            <a:normAutofit/>
+          </a:bodyPr>
+          <a:lstStyle/>
+          <a:p>
+            <a:r>
+              <a:rPr lang="pt-BR" dirty="0" smtClean="0">
+                <a:solidFill>
+                  <a:srgbClr val="0070C0"/>
+                </a:solidFill>
+                <a:effectLst>
+                  <a:outerShdw blurRad="38100" dist="38100" dir="2700000" algn="tl">
+                    <a:srgbClr val="000000">
+                      <a:alpha val="43137"/>
+                    </a:srgbClr>
+                  </a:outerShdw>
+                </a:effectLst>
+              </a:rPr>
+              <a:t>Considerações</a:t>
+            </a:r>
+            <a:endParaRPr lang="pt-BR" dirty="0">
+              <a:solidFill>
+                <a:srgbClr val="0070C0"/>
+              </a:solidFill>
+              <a:effectLst>
+                <a:outerShdw blurRad="38100" dist="38100" dir="2700000" algn="tl">
+                  <a:srgbClr val="000000">
+                    <a:alpha val="43137"/>
+                  </a:srgbClr>
+                </a:outerShdw>
+              </a:effectLst>
+            </a:endParaRPr>
+          </a:p>
+        </p:txBody>
+      </p:sp>
+      <p:sp>
+        <p:nvSpPr>
+          <p:cNvPr id="2" name="Espaço Reservado para Conteúdo 1"/>
+          <p:cNvSpPr>
+            <a:spLocks noGrp="1"/>
+          </p:cNvSpPr>
+          <p:nvPr>
+            <p:ph idx="1"/>
+          </p:nvPr>
+        </p:nvSpPr>
+        <p:spPr/>
+        <p:txBody>
+          <a:bodyPr>
+            <a:normAutofit/>
+          </a:bodyPr>
+          <a:lstStyle/>
+          <a:p>
+            <a:r>
+              <a:rPr lang="pt-BR" dirty="0" smtClean="0"/>
+              <a:t>Framework ?</a:t>
+            </a:r>
+          </a:p>
+          <a:p>
+            <a:pPr lvl="1"/>
+            <a:r>
+              <a:rPr lang="pt-BR" dirty="0" err="1" smtClean="0"/>
+              <a:t>runtests</a:t>
+            </a:r>
+            <a:r>
+              <a:rPr lang="pt-BR" dirty="0" smtClean="0"/>
+              <a:t>(‘</a:t>
+            </a:r>
+            <a:r>
+              <a:rPr lang="pt-BR" dirty="0" err="1" smtClean="0"/>
+              <a:t>test_suite</a:t>
+            </a:r>
+            <a:r>
+              <a:rPr lang="pt-BR" dirty="0" smtClean="0"/>
+              <a:t>’)</a:t>
+            </a:r>
+          </a:p>
+          <a:p>
+            <a:pPr lvl="1"/>
+            <a:r>
+              <a:rPr lang="pt-BR" dirty="0" smtClean="0"/>
+              <a:t>Assertivas / Instrumentação</a:t>
+            </a:r>
+          </a:p>
+          <a:p>
+            <a:pPr lvl="1"/>
+            <a:r>
+              <a:rPr lang="pt-BR" dirty="0" smtClean="0"/>
+              <a:t>Resultados tabelados</a:t>
+            </a:r>
+          </a:p>
+          <a:p>
+            <a:pPr lvl="1"/>
+            <a:r>
+              <a:rPr lang="pt-BR" dirty="0" smtClean="0"/>
+              <a:t>Desempenho</a:t>
+            </a:r>
+          </a:p>
+          <a:p>
+            <a:pPr lvl="1"/>
+            <a:r>
+              <a:rPr lang="pt-BR" dirty="0" smtClean="0"/>
+              <a:t>Extensões</a:t>
+            </a:r>
+          </a:p>
+          <a:p>
+            <a:pPr lvl="2"/>
+            <a:r>
+              <a:rPr lang="pt-BR" dirty="0" err="1" smtClean="0"/>
+              <a:t>TestRunner</a:t>
+            </a:r>
+            <a:endParaRPr lang="pt-BR" dirty="0" smtClean="0"/>
+          </a:p>
+          <a:p>
+            <a:pPr lvl="2"/>
+            <a:r>
+              <a:rPr lang="pt-BR" dirty="0" err="1" smtClean="0"/>
+              <a:t>Constraints</a:t>
+            </a:r>
+            <a:endParaRPr lang="pt-BR" dirty="0" smtClean="0"/>
+          </a:p>
+          <a:p>
+            <a:pPr lvl="2"/>
+            <a:r>
+              <a:rPr lang="pt-BR" dirty="0" err="1" smtClean="0"/>
+              <a:t>Tolerance</a:t>
+            </a:r>
+            <a:endParaRPr lang="pt-BR" dirty="0" smtClean="0"/>
+          </a:p>
+          <a:p>
+            <a:pPr lvl="2"/>
+            <a:r>
+              <a:rPr lang="pt-BR" dirty="0" err="1" smtClean="0"/>
+              <a:t>Fixtures</a:t>
+            </a:r>
+            <a:endParaRPr lang="pt-BR" dirty="0" smtClean="0"/>
+          </a:p>
+          <a:p>
+            <a:pPr lvl="1"/>
+            <a:endParaRPr lang="pt-BR" dirty="0" smtClean="0"/>
+          </a:p>
+          <a:p>
+            <a:endParaRPr lang="pt-BR" dirty="0" smtClean="0"/>
+          </a:p>
+          <a:p>
+            <a:pPr lvl="1"/>
+            <a:endParaRPr lang="pt-BR" dirty="0" smtClean="0"/>
+          </a:p>
+          <a:p>
+            <a:pPr lvl="1"/>
+            <a:endParaRPr lang="pt-BR" dirty="0" smtClean="0"/>
+          </a:p>
+        </p:txBody>
+      </p:sp>
+      <p:sp>
+        <p:nvSpPr>
+          <p:cNvPr id="5" name="AutoShape 2" descr="G:\HD-Games\GitRepos\DesignPatterns\CAP392-02-PloP\artigos\03 - Pattern Language\entrega final\family-guy-simpsons2.webp"/>
+          <p:cNvSpPr>
+            <a:spLocks noChangeAspect="1" noChangeArrowheads="1"/>
+          </p:cNvSpPr>
+          <p:nvPr/>
+        </p:nvSpPr>
+        <p:spPr bwMode="auto">
+          <a:xfrm>
+            <a:off x="155575" y="-144463"/>
+            <a:ext cx="304800" cy="304801"/>
+          </a:xfrm>
+          <a:prstGeom prst="rect">
+            <a:avLst/>
+          </a:prstGeom>
+          <a:noFill/>
+          <a:extLst>
+            <a:ext uri="{909E8E84-426E-40DD-AFC4-6F175D3DCCD1}">
+              <a14:hiddenFill xmlns:a14="http://schemas.microsoft.com/office/drawing/2010/main">
+                <a:solidFill>
+                  <a:srgbClr val="FFFFFF"/>
+                </a:solidFill>
+              </a14:hiddenFill>
+            </a:ext>
+          </a:extLst>
+        </p:spPr>
+        <p:txBody>
+          <a:bodyPr vert="horz" wrap="square" lIns="91440" tIns="45720" rIns="91440" bIns="45720" numCol="1" anchor="t" anchorCtr="0" compatLnSpc="1">
+            <a:prstTxWarp prst="textNoShape">
+              <a:avLst/>
+            </a:prstTxWarp>
+          </a:bodyPr>
+          <a:lstStyle/>
+          <a:p>
+            <a:endParaRPr lang="pt-BR"/>
+          </a:p>
+        </p:txBody>
+      </p:sp>
+      <p:sp>
+        <p:nvSpPr>
+          <p:cNvPr id="7" name="AutoShape 4" descr="G:\HD-Games\GitRepos\DesignPatterns\CAP392-02-PloP\artigos\03 - Pattern Language\entrega final\family-guy-simpsons2.webp"/>
+          <p:cNvSpPr>
+            <a:spLocks noChangeAspect="1" noChangeArrowheads="1"/>
+          </p:cNvSpPr>
+          <p:nvPr/>
+        </p:nvSpPr>
+        <p:spPr bwMode="auto">
+          <a:xfrm>
+            <a:off x="307975" y="7937"/>
+            <a:ext cx="304800" cy="304801"/>
+          </a:xfrm>
+          <a:prstGeom prst="rect">
+            <a:avLst/>
+          </a:prstGeom>
+          <a:noFill/>
+          <a:extLst>
+            <a:ext uri="{909E8E84-426E-40DD-AFC4-6F175D3DCCD1}">
+              <a14:hiddenFill xmlns:a14="http://schemas.microsoft.com/office/drawing/2010/main">
+                <a:solidFill>
+                  <a:srgbClr val="FFFFFF"/>
+                </a:solidFill>
+              </a14:hiddenFill>
+            </a:ext>
+          </a:extLst>
+        </p:spPr>
+        <p:txBody>
+          <a:bodyPr vert="horz" wrap="square" lIns="91440" tIns="45720" rIns="91440" bIns="45720" numCol="1" anchor="t" anchorCtr="0" compatLnSpc="1">
+            <a:prstTxWarp prst="textNoShape">
+              <a:avLst/>
+            </a:prstTxWarp>
+          </a:bodyPr>
+          <a:lstStyle/>
+          <a:p>
+            <a:endParaRPr lang="pt-BR"/>
+          </a:p>
+        </p:txBody>
+      </p:sp>
+    </p:spTree>
+    <p:extLst>
+      <p:ext uri="{BB962C8B-B14F-4D97-AF65-F5344CB8AC3E}">
+        <p14:creationId xmlns:p14="http://schemas.microsoft.com/office/powerpoint/2010/main" val="4243044682"/>
+      </p:ext>
+    </p:extLst>
+  </p:cSld>
+  <p:clrMapOvr>
+    <a:masterClrMapping/>
+  </p:clrMapOvr>
+  <mc:AlternateContent xmlns:mc="http://schemas.openxmlformats.org/markup-compatibility/2006" xmlns:p14="http://schemas.microsoft.com/office/powerpoint/2010/main">
+    <mc:Choice Requires="p14">
+      <p:transition p14:dur="0"/>
+    </mc:Choice>
+    <mc:Fallback xmlns="">
+      <p:transition/>
+    </mc:Fallback>
+  </mc:AlternateContent>
+  <p:timing>
+    <p:tnLst>
+      <p:par>
+        <p:cTn id="1" dur="indefinite" restart="never" nodeType="tmRoot"/>
+      </p:par>
+    </p:tnLst>
+  </p:timing>
+</p:sld>
+</file>
+
+<file path=ppt/slides/slide14.xml><?xml version="1.0" encoding="utf-8"?>
+<p:sld xmlns:a="http://schemas.openxmlformats.org/drawingml/2006/main" xmlns:r="http://schemas.openxmlformats.org/officeDocument/2006/relationships" xmlns:p="http://schemas.openxmlformats.org/presentationml/2006/main">
+  <p:cSld>
+    <p:spTree>
+      <p:nvGrpSpPr>
+        <p:cNvPr id="1" name=""/>
+        <p:cNvGrpSpPr/>
+        <p:nvPr/>
+      </p:nvGrpSpPr>
+      <p:grpSpPr>
+        <a:xfrm>
+          <a:off x="0" y="0"/>
+          <a:ext cx="0" cy="0"/>
+          <a:chOff x="0" y="0"/>
+          <a:chExt cx="0" cy="0"/>
+        </a:xfrm>
+      </p:grpSpPr>
+      <p:sp>
+        <p:nvSpPr>
+          <p:cNvPr id="3" name="Slide Number Placeholder 2"/>
+          <p:cNvSpPr>
+            <a:spLocks noGrp="1"/>
+          </p:cNvSpPr>
+          <p:nvPr>
+            <p:ph type="sldNum" sz="quarter" idx="11"/>
+          </p:nvPr>
+        </p:nvSpPr>
+        <p:spPr/>
+        <p:txBody>
+          <a:bodyPr/>
+          <a:lstStyle/>
+          <a:p>
+            <a:fld id="{338BD863-DCDC-5F43-A029-265BB7DA4A17}" type="slidenum">
+              <a:rPr lang="en-US" smtClean="0"/>
+              <a:pPr/>
+              <a:t>14</a:t>
+            </a:fld>
+            <a:endParaRPr lang="en-US" dirty="0"/>
+          </a:p>
+        </p:txBody>
+      </p:sp>
+      <p:sp>
+        <p:nvSpPr>
+          <p:cNvPr id="2" name="Espaço Reservado para Conteúdo 1"/>
+          <p:cNvSpPr>
+            <a:spLocks noGrp="1"/>
+          </p:cNvSpPr>
+          <p:nvPr>
+            <p:ph idx="1"/>
+          </p:nvPr>
+        </p:nvSpPr>
+        <p:spPr>
+          <a:xfrm>
+            <a:off x="457200" y="1196752"/>
+            <a:ext cx="8229600" cy="5328592"/>
+          </a:xfrm>
+        </p:spPr>
+        <p:txBody>
+          <a:bodyPr>
+            <a:noAutofit/>
+          </a:bodyPr>
+          <a:lstStyle/>
+          <a:p>
+            <a:r>
+              <a:rPr lang="pt-BR" sz="2800" dirty="0" smtClean="0">
+                <a:hlinkClick r:id="rId2"/>
+              </a:rPr>
+              <a:t>http://blog.caelum.com.br/o-minimo-que-voce-deve-saber-de-java-8/</a:t>
+            </a:r>
+          </a:p>
+          <a:p>
+            <a:r>
+              <a:rPr lang="pt-BR" sz="2800" dirty="0" smtClean="0">
+                <a:hlinkClick r:id="rId2"/>
+              </a:rPr>
+              <a:t>http://pt.stackoverflow.com/questions/269/quais-as-vantagens-das-express%C3%B5es-</a:t>
+            </a:r>
+            <a:r>
+              <a:rPr lang="pt-BR" sz="2800" dirty="0" err="1" smtClean="0">
+                <a:hlinkClick r:id="rId2"/>
+              </a:rPr>
+              <a:t>lambda-presentes-no-java</a:t>
+            </a:r>
+            <a:r>
+              <a:rPr lang="pt-BR" sz="2800" dirty="0" smtClean="0">
+                <a:hlinkClick r:id="rId2"/>
+              </a:rPr>
+              <a:t>-8</a:t>
+            </a:r>
+            <a:endParaRPr lang="pt-BR" sz="2800" dirty="0" smtClean="0"/>
+          </a:p>
+          <a:p>
+            <a:r>
+              <a:rPr lang="pt-BR" sz="2400" dirty="0" smtClean="0">
+                <a:hlinkClick r:id="rId3"/>
+              </a:rPr>
+              <a:t>http://www.devmedia.com.br/como-usar-funcoes-lambda-em-java/32826</a:t>
+            </a:r>
+            <a:endParaRPr lang="pt-BR" sz="2400" dirty="0" smtClean="0"/>
+          </a:p>
+          <a:p>
+            <a:r>
+              <a:rPr lang="pt-BR" sz="2400" dirty="0" smtClean="0">
+                <a:hlinkClick r:id="rId4"/>
+              </a:rPr>
+              <a:t>http://www.devmedia.com.br/novidades-do-java-8-do-lambda-ao-metaspace/29056</a:t>
+            </a:r>
+            <a:endParaRPr lang="pt-BR" sz="2400" dirty="0" smtClean="0"/>
+          </a:p>
+          <a:p>
+            <a:r>
+              <a:rPr lang="pt-BR" sz="2400" dirty="0" smtClean="0">
+                <a:hlinkClick r:id="rId5"/>
+              </a:rPr>
+              <a:t>http://www.teclogica.com.br/blog/java-8-o-que-e-lambda/</a:t>
+            </a:r>
+            <a:endParaRPr lang="pt-BR" sz="2400" dirty="0" smtClean="0"/>
+          </a:p>
+          <a:p>
+            <a:r>
+              <a:rPr lang="pt-BR" sz="2400" dirty="0" smtClean="0">
+                <a:hlinkClick r:id="rId6"/>
+              </a:rPr>
+              <a:t>https://rodrigouchoa.wordpress.com/2014/05/20/novidades-do-java-8-lambda-expressions/</a:t>
+            </a:r>
+            <a:endParaRPr lang="pt-BR" sz="2400" dirty="0" smtClean="0"/>
+          </a:p>
+          <a:p>
+            <a:r>
+              <a:rPr lang="pt-BR" sz="2400" dirty="0" smtClean="0">
+                <a:hlinkClick r:id="rId7"/>
+              </a:rPr>
+              <a:t>http://blog.takipi.com/compilando-expressoes-lambda-scala-vs-java-8/</a:t>
+            </a:r>
+            <a:endParaRPr lang="pt-BR" sz="2400" dirty="0" smtClean="0"/>
+          </a:p>
+          <a:p>
+            <a:endParaRPr lang="pt-BR" sz="2400" dirty="0"/>
+          </a:p>
+        </p:txBody>
+      </p:sp>
+      <p:sp>
+        <p:nvSpPr>
+          <p:cNvPr id="5" name="AutoShape 2" descr="G:\HD-Games\GitRepos\DesignPatterns\CAP392-02-PloP\artigos\03 - Pattern Language\entrega final\family-guy-simpsons2.webp"/>
+          <p:cNvSpPr>
+            <a:spLocks noChangeAspect="1" noChangeArrowheads="1"/>
+          </p:cNvSpPr>
+          <p:nvPr/>
+        </p:nvSpPr>
+        <p:spPr bwMode="auto">
+          <a:xfrm>
+            <a:off x="155575" y="-144463"/>
+            <a:ext cx="304800" cy="304801"/>
+          </a:xfrm>
+          <a:prstGeom prst="rect">
+            <a:avLst/>
+          </a:prstGeom>
+          <a:noFill/>
+          <a:extLst>
+            <a:ext uri="{909E8E84-426E-40DD-AFC4-6F175D3DCCD1}">
+              <a14:hiddenFill xmlns:a14="http://schemas.microsoft.com/office/drawing/2010/main">
+                <a:solidFill>
+                  <a:srgbClr val="FFFFFF"/>
+                </a:solidFill>
+              </a14:hiddenFill>
+            </a:ext>
+          </a:extLst>
+        </p:spPr>
+        <p:txBody>
+          <a:bodyPr vert="horz" wrap="square" lIns="91440" tIns="45720" rIns="91440" bIns="45720" numCol="1" anchor="t" anchorCtr="0" compatLnSpc="1">
+            <a:prstTxWarp prst="textNoShape">
+              <a:avLst/>
+            </a:prstTxWarp>
+          </a:bodyPr>
+          <a:lstStyle/>
+          <a:p>
+            <a:endParaRPr lang="pt-BR"/>
+          </a:p>
+        </p:txBody>
+      </p:sp>
+      <p:sp>
+        <p:nvSpPr>
+          <p:cNvPr id="7" name="AutoShape 4" descr="G:\HD-Games\GitRepos\DesignPatterns\CAP392-02-PloP\artigos\03 - Pattern Language\entrega final\family-guy-simpsons2.webp"/>
+          <p:cNvSpPr>
+            <a:spLocks noChangeAspect="1" noChangeArrowheads="1"/>
+          </p:cNvSpPr>
+          <p:nvPr/>
+        </p:nvSpPr>
+        <p:spPr bwMode="auto">
+          <a:xfrm>
+            <a:off x="307975" y="7937"/>
+            <a:ext cx="304800" cy="304801"/>
+          </a:xfrm>
+          <a:prstGeom prst="rect">
+            <a:avLst/>
+          </a:prstGeom>
+          <a:noFill/>
+          <a:extLst>
+            <a:ext uri="{909E8E84-426E-40DD-AFC4-6F175D3DCCD1}">
+              <a14:hiddenFill xmlns:a14="http://schemas.microsoft.com/office/drawing/2010/main">
+                <a:solidFill>
+                  <a:srgbClr val="FFFFFF"/>
+                </a:solidFill>
+              </a14:hiddenFill>
+            </a:ext>
+          </a:extLst>
+        </p:spPr>
+        <p:txBody>
+          <a:bodyPr vert="horz" wrap="square" lIns="91440" tIns="45720" rIns="91440" bIns="45720" numCol="1" anchor="t" anchorCtr="0" compatLnSpc="1">
+            <a:prstTxWarp prst="textNoShape">
+              <a:avLst/>
+            </a:prstTxWarp>
+          </a:bodyPr>
+          <a:lstStyle/>
+          <a:p>
+            <a:endParaRPr lang="pt-BR"/>
+          </a:p>
+        </p:txBody>
+      </p:sp>
+      <p:sp>
+        <p:nvSpPr>
+          <p:cNvPr id="9" name="Title 3"/>
+          <p:cNvSpPr>
+            <a:spLocks noGrp="1"/>
+          </p:cNvSpPr>
+          <p:nvPr>
+            <p:ph type="title"/>
+          </p:nvPr>
+        </p:nvSpPr>
+        <p:spPr/>
+        <p:txBody>
+          <a:bodyPr>
+            <a:normAutofit fontScale="90000"/>
+          </a:bodyPr>
+          <a:lstStyle/>
+          <a:p>
+            <a:r>
+              <a:rPr lang="en-US" dirty="0" smtClean="0">
+                <a:solidFill>
+                  <a:srgbClr val="0070C0"/>
+                </a:solidFill>
+                <a:effectLst>
+                  <a:outerShdw blurRad="38100" dist="38100" dir="2700000" algn="tl">
+                    <a:srgbClr val="000000">
+                      <a:alpha val="43137"/>
+                    </a:srgbClr>
+                  </a:outerShdw>
+                </a:effectLst>
+              </a:rPr>
+              <a:t>Java 8 Lambda Expressions Revision</a:t>
+            </a:r>
+            <a:endParaRPr lang="en-US" dirty="0">
+              <a:solidFill>
+                <a:srgbClr val="0070C0"/>
+              </a:solidFill>
+              <a:effectLst>
+                <a:outerShdw blurRad="38100" dist="38100" dir="2700000" algn="tl">
+                  <a:srgbClr val="000000">
+                    <a:alpha val="43137"/>
+                  </a:srgbClr>
+                </a:outerShdw>
+              </a:effectLst>
+            </a:endParaRPr>
+          </a:p>
+        </p:txBody>
+      </p:sp>
+    </p:spTree>
+    <p:extLst>
+      <p:ext uri="{BB962C8B-B14F-4D97-AF65-F5344CB8AC3E}">
+        <p14:creationId xmlns:p14="http://schemas.microsoft.com/office/powerpoint/2010/main" val="1979461865"/>
+      </p:ext>
+    </p:extLst>
+  </p:cSld>
+  <p:clrMapOvr>
+    <a:masterClrMapping/>
+  </p:clrMapOvr>
+  <mc:AlternateContent xmlns:mc="http://schemas.openxmlformats.org/markup-compatibility/2006" xmlns:p14="http://schemas.microsoft.com/office/powerpoint/2010/main">
+    <mc:Choice Requires="p14">
+      <p:transition p14:dur="0"/>
+    </mc:Choice>
+    <mc:Fallback xmlns="">
+      <p:transition/>
+    </mc:Fallback>
+  </mc:AlternateContent>
+  <p:timing>
+    <p:tnLst>
+      <p:par>
+        <p:cTn id="1" dur="indefinite" restart="never" nodeType="tmRoot"/>
+      </p:par>
+    </p:tnLst>
+  </p:timing>
+</p:sld>
+</file>
+
 <file path=ppt/slides/slide15.xml><?xml version="1.0" encoding="utf-8"?>
 <p:sld xmlns:a="http://schemas.openxmlformats.org/drawingml/2006/main" xmlns:r="http://schemas.openxmlformats.org/officeDocument/2006/relationships" xmlns:p="http://schemas.openxmlformats.org/presentationml/2006/main">
   <p:cSld>
@@ -5717,166 +5651,95 @@
       </p:sp>
       <p:sp>
         <p:nvSpPr>
-          <p:cNvPr id="4" name="Title 3"/>
-          <p:cNvSpPr>
-            <a:spLocks noGrp="1"/>
-          </p:cNvSpPr>
-          <p:nvPr>
-            <p:ph type="title"/>
-          </p:nvPr>
-        </p:nvSpPr>
-        <p:spPr/>
+          <p:cNvPr id="2" name="Espaço Reservado para Conteúdo 1"/>
+          <p:cNvSpPr>
+            <a:spLocks noGrp="1"/>
+          </p:cNvSpPr>
+          <p:nvPr>
+            <p:ph idx="1"/>
+          </p:nvPr>
+        </p:nvSpPr>
+        <p:spPr>
+          <a:xfrm>
+            <a:off x="457200" y="1196752"/>
+            <a:ext cx="8229600" cy="4824536"/>
+          </a:xfrm>
+        </p:spPr>
         <p:txBody>
           <a:bodyPr>
-            <a:normAutofit/>
+            <a:noAutofit/>
           </a:bodyPr>
           <a:lstStyle/>
           <a:p>
             <a:r>
-              <a:rPr lang="pt-BR" dirty="0" smtClean="0">
-                <a:solidFill>
-                  <a:srgbClr val="0070C0"/>
-                </a:solidFill>
-                <a:effectLst>
-                  <a:outerShdw blurRad="38100" dist="38100" dir="2700000" algn="tl">
-                    <a:srgbClr val="000000">
-                      <a:alpha val="43137"/>
-                    </a:srgbClr>
-                  </a:outerShdw>
-                </a:effectLst>
+              <a:rPr lang="pt-BR" sz="2400" dirty="0" smtClean="0">
+                <a:hlinkClick r:id="rId2"/>
               </a:rPr>
-              <a:t>Considerações</a:t>
-            </a:r>
-            <a:endParaRPr lang="pt-BR" dirty="0">
-              <a:solidFill>
-                <a:srgbClr val="0070C0"/>
-              </a:solidFill>
-              <a:effectLst>
-                <a:outerShdw blurRad="38100" dist="38100" dir="2700000" algn="tl">
-                  <a:srgbClr val="000000">
-                    <a:alpha val="43137"/>
-                  </a:srgbClr>
-                </a:outerShdw>
-              </a:effectLst>
-            </a:endParaRPr>
-          </a:p>
-        </p:txBody>
-      </p:sp>
-      <p:sp>
-        <p:nvSpPr>
-          <p:cNvPr id="2" name="Espaço Reservado para Conteúdo 1"/>
-          <p:cNvSpPr>
-            <a:spLocks noGrp="1"/>
-          </p:cNvSpPr>
-          <p:nvPr>
-            <p:ph idx="1"/>
-          </p:nvPr>
-        </p:nvSpPr>
-        <p:spPr/>
-        <p:txBody>
-          <a:bodyPr>
-            <a:normAutofit/>
-          </a:bodyPr>
-          <a:lstStyle/>
-          <a:p>
-            <a:r>
-              <a:rPr lang="pt-BR" dirty="0" smtClean="0"/>
-              <a:t>Framework ?</a:t>
-            </a:r>
-          </a:p>
-          <a:p>
-            <a:pPr lvl="1"/>
-            <a:r>
-              <a:rPr lang="pt-BR" dirty="0" err="1" smtClean="0"/>
-              <a:t>runtests</a:t>
-            </a:r>
-            <a:r>
-              <a:rPr lang="pt-BR" dirty="0" smtClean="0"/>
-              <a:t>(‘</a:t>
-            </a:r>
-            <a:r>
-              <a:rPr lang="pt-BR" dirty="0" err="1" smtClean="0"/>
-              <a:t>test_suite</a:t>
-            </a:r>
-            <a:r>
-              <a:rPr lang="pt-BR" dirty="0" smtClean="0"/>
-              <a:t>’)</a:t>
-            </a:r>
-          </a:p>
-          <a:p>
-            <a:pPr lvl="1"/>
-            <a:r>
-              <a:rPr lang="pt-BR" dirty="0" smtClean="0"/>
-              <a:t>Assertivas / Instrumentação</a:t>
-            </a:r>
-          </a:p>
-          <a:p>
-            <a:pPr lvl="1"/>
-            <a:r>
-              <a:rPr lang="pt-BR" dirty="0" smtClean="0"/>
-              <a:t>Resultados tabelados</a:t>
-            </a:r>
-          </a:p>
-          <a:p>
-            <a:pPr lvl="1"/>
-            <a:r>
-              <a:rPr lang="pt-BR" dirty="0" smtClean="0"/>
-              <a:t>Desempenho</a:t>
-            </a:r>
-          </a:p>
-          <a:p>
-            <a:pPr lvl="1"/>
-            <a:r>
-              <a:rPr lang="pt-BR" dirty="0" smtClean="0"/>
-              <a:t>Extensões</a:t>
-            </a:r>
-          </a:p>
-          <a:p>
-            <a:pPr lvl="2"/>
-            <a:r>
-              <a:rPr lang="pt-BR" dirty="0" err="1" smtClean="0"/>
-              <a:t>TestRunner</a:t>
-            </a:r>
-            <a:endParaRPr lang="pt-BR" dirty="0" smtClean="0"/>
-          </a:p>
-          <a:p>
-            <a:pPr lvl="2"/>
-            <a:r>
-              <a:rPr lang="pt-BR" dirty="0" err="1" smtClean="0"/>
-              <a:t>Constraints</a:t>
-            </a:r>
-            <a:endParaRPr lang="pt-BR" dirty="0" smtClean="0"/>
-          </a:p>
-          <a:p>
-            <a:pPr lvl="2"/>
-            <a:r>
-              <a:rPr lang="pt-BR" dirty="0" err="1" smtClean="0"/>
-              <a:t>Tolerance</a:t>
-            </a:r>
-            <a:endParaRPr lang="pt-BR" dirty="0" smtClean="0"/>
-          </a:p>
-          <a:p>
-            <a:pPr lvl="2"/>
-            <a:r>
-              <a:rPr lang="pt-BR" dirty="0" err="1" smtClean="0"/>
-              <a:t>Fixtures</a:t>
-            </a:r>
-            <a:endParaRPr lang="pt-BR" dirty="0" smtClean="0"/>
-          </a:p>
-          <a:p>
-            <a:pPr lvl="1"/>
-            <a:endParaRPr lang="pt-BR" dirty="0" smtClean="0"/>
-          </a:p>
-          <a:p>
-            <a:endParaRPr lang="pt-BR" dirty="0" smtClean="0"/>
-          </a:p>
-          <a:p>
-            <a:pPr lvl="1"/>
-            <a:endParaRPr lang="pt-BR" dirty="0" smtClean="0"/>
-          </a:p>
-          <a:p>
-            <a:pPr lvl="1"/>
-            <a:endParaRPr lang="pt-BR" dirty="0" smtClean="0"/>
+              <a:t>http://stackoverflow.com/questions/28688047/unit-test-code-with-java-8-lambdas</a:t>
+            </a:r>
+            <a:endParaRPr lang="pt-BR" sz="2400" dirty="0" smtClean="0"/>
+          </a:p>
+          <a:p>
+            <a:r>
+              <a:rPr lang="pt-BR" sz="2400" dirty="0" smtClean="0">
+                <a:hlinkClick r:id="rId3"/>
+              </a:rPr>
+              <a:t>http://stackoverflow.com/questions/34576710/how-to-test-lambda-functions</a:t>
+            </a:r>
+            <a:endParaRPr lang="pt-BR" sz="2400" dirty="0" smtClean="0"/>
+          </a:p>
+          <a:p>
+            <a:r>
+              <a:rPr lang="pt-BR" sz="2400" dirty="0" smtClean="0">
+                <a:hlinkClick r:id="rId4"/>
+              </a:rPr>
+              <a:t>https://pythonconquerstheuniverse.wordpress.com/2011/08/29/lambda_tutorial/</a:t>
+            </a:r>
+            <a:endParaRPr lang="pt-BR" sz="2400" dirty="0" smtClean="0"/>
+          </a:p>
+          <a:p>
+            <a:r>
+              <a:rPr lang="pt-BR" sz="2400" dirty="0" smtClean="0">
+                <a:hlinkClick r:id="rId5"/>
+              </a:rPr>
+              <a:t>http://www.coderanch.com/t/647426/Testing/approach-testing-lambda-expressions</a:t>
+            </a:r>
+            <a:endParaRPr lang="pt-BR" sz="2400" dirty="0" smtClean="0"/>
+          </a:p>
+          <a:p>
+            <a:endParaRPr lang="pt-BR" sz="2400" dirty="0" smtClean="0"/>
+          </a:p>
+          <a:p>
+            <a:r>
+              <a:rPr lang="pt-BR" sz="2400" dirty="0" err="1" smtClean="0"/>
+              <a:t>Node</a:t>
+            </a:r>
+            <a:r>
+              <a:rPr lang="pt-BR" sz="2400" dirty="0" smtClean="0"/>
+              <a:t>.</a:t>
+            </a:r>
+            <a:r>
+              <a:rPr lang="pt-BR" sz="2400" dirty="0" err="1" smtClean="0"/>
+              <a:t>js</a:t>
+            </a:r>
+            <a:r>
+              <a:rPr lang="pt-BR" sz="2400" dirty="0" smtClean="0"/>
+              <a:t> </a:t>
+            </a:r>
+            <a:r>
+              <a:rPr lang="pt-BR" sz="2400" dirty="0" smtClean="0">
+                <a:hlinkClick r:id="rId6"/>
+              </a:rPr>
+              <a:t>https://pub.scotch.io/@richardhyatt/unit-testing-aws-lambda-functions-in-nodejs</a:t>
+            </a:r>
+            <a:endParaRPr lang="pt-BR" sz="2400" dirty="0" smtClean="0"/>
+          </a:p>
+          <a:p>
+            <a:r>
+              <a:rPr lang="pt-BR" sz="2400" dirty="0" err="1" smtClean="0"/>
+              <a:t>Python</a:t>
+            </a:r>
+            <a:endParaRPr lang="pt-BR" sz="2400" dirty="0"/>
           </a:p>
         </p:txBody>
       </p:sp>
@@ -5958,10 +5821,72 @@
           </a:p>
         </p:txBody>
       </p:sp>
+      <p:sp>
+        <p:nvSpPr>
+          <p:cNvPr id="9" name="Title 3"/>
+          <p:cNvSpPr>
+            <a:spLocks noGrp="1"/>
+          </p:cNvSpPr>
+          <p:nvPr>
+            <p:ph type="title"/>
+          </p:nvPr>
+        </p:nvSpPr>
+        <p:spPr/>
+        <p:txBody>
+          <a:bodyPr>
+            <a:normAutofit/>
+          </a:bodyPr>
+          <a:lstStyle/>
+          <a:p>
+            <a:r>
+              <a:rPr lang="en-US" dirty="0" err="1" smtClean="0">
+                <a:solidFill>
+                  <a:srgbClr val="0070C0"/>
+                </a:solidFill>
+                <a:effectLst>
+                  <a:outerShdw blurRad="38100" dist="38100" dir="2700000" algn="tl">
+                    <a:srgbClr val="000000">
+                      <a:alpha val="43137"/>
+                    </a:srgbClr>
+                  </a:outerShdw>
+                </a:effectLst>
+              </a:rPr>
+              <a:t>JUnit</a:t>
+            </a:r>
+            <a:r>
+              <a:rPr lang="en-US" dirty="0" smtClean="0">
+                <a:solidFill>
+                  <a:srgbClr val="0070C0"/>
+                </a:solidFill>
+                <a:effectLst>
+                  <a:outerShdw blurRad="38100" dist="38100" dir="2700000" algn="tl">
+                    <a:srgbClr val="000000">
+                      <a:alpha val="43137"/>
+                    </a:srgbClr>
+                  </a:outerShdw>
+                </a:effectLst>
+              </a:rPr>
+              <a:t> 5 Test Framework</a:t>
+            </a:r>
+            <a:endParaRPr lang="en-US" dirty="0">
+              <a:solidFill>
+                <a:srgbClr val="0070C0"/>
+              </a:solidFill>
+              <a:effectLst>
+                <a:outerShdw blurRad="38100" dist="38100" dir="2700000" algn="tl">
+                  <a:srgbClr val="000000">
+                    <a:alpha val="43137"/>
+                  </a:srgbClr>
+                </a:outerShdw>
+              </a:effectLst>
+            </a:endParaRPr>
+          </a:p>
+        </p:txBody>
+      </p:sp>
     </p:spTree>
     <p:extLst>
       <p:ext uri="{BB962C8B-B14F-4D97-AF65-F5344CB8AC3E}">
-        <p14:creationId xmlns:p14="http://schemas.microsoft.com/office/powerpoint/2010/main" val="4243044682"/>
+        <p14:creationId xmlns:p14="http://schemas.microsoft.com/office/powerpoint/2010/main" val="1979461865"/>
       </p:ext>
     </p:extLst>
   </p:cSld>
@@ -6970,76 +6895,41 @@
               <a:rPr lang="pt-BR" sz="2800" dirty="0" smtClean="0">
                 <a:hlinkClick r:id="rId2"/>
               </a:rPr>
-              <a:t>http://blog.caelum.com.br/o-minimo-que-voce-deve-saber-de-java-8/</a:t>
-            </a:r>
-          </a:p>
-          <a:p>
-            <a:r>
-              <a:rPr lang="pt-BR" sz="2800" dirty="0" smtClean="0">
-                <a:hlinkClick r:id="rId2"/>
-              </a:rPr>
-              <a:t>http://pt.stackoverflow.com/questions/269/quais-as-vantagens-das-express%C3%B5es-</a:t>
-            </a:r>
-            <a:r>
-              <a:rPr lang="pt-BR" sz="2800" dirty="0" err="1" smtClean="0">
-                <a:hlinkClick r:id="rId2"/>
-              </a:rPr>
-              <a:t>lambda-presentes-no-java</a:t>
-            </a:r>
-            <a:r>
-              <a:rPr lang="pt-BR" sz="2800" dirty="0" smtClean="0">
-                <a:hlinkClick r:id="rId2"/>
-              </a:rPr>
-              <a:t>-8</a:t>
+              <a:t>http://radar.oreilly.com/2014/12/unit-testing-java-8-lambda-expressions-and-streams.html</a:t>
             </a:r>
             <a:endParaRPr lang="pt-BR" sz="2800" dirty="0" smtClean="0"/>
           </a:p>
           <a:p>
             <a:r>
-              <a:rPr lang="pt-BR" sz="2400" dirty="0" smtClean="0">
-                <a:hlinkClick r:id="rId3"/>
-              </a:rPr>
-              <a:t>http://www.devmedia.com.br/como-usar-funcoes-lambda-em-java/32826</a:t>
-            </a:r>
-            <a:endParaRPr lang="pt-BR" sz="2400" dirty="0" smtClean="0"/>
-          </a:p>
-          <a:p>
-            <a:r>
-              <a:rPr lang="pt-BR" sz="2400" dirty="0" smtClean="0">
-                <a:hlinkClick r:id="rId4"/>
-              </a:rPr>
-              <a:t>http://www.devmedia.com.br/novidades-do-java-8-do-lambda-ao-metaspace/29056</a:t>
-            </a:r>
-            <a:endParaRPr lang="pt-BR" sz="2400" dirty="0" smtClean="0"/>
-          </a:p>
-          <a:p>
-            <a:r>
-              <a:rPr lang="pt-BR" sz="2400" dirty="0" smtClean="0">
-                <a:hlinkClick r:id="rId5"/>
-              </a:rPr>
-              <a:t>http://www.teclogica.com.br/blog/java-8-o-que-e-lambda/</a:t>
-            </a:r>
-            <a:endParaRPr lang="pt-BR" sz="2400" dirty="0" smtClean="0"/>
-          </a:p>
-          <a:p>
-            <a:r>
-              <a:rPr lang="pt-BR" sz="2400" dirty="0" smtClean="0">
-                <a:hlinkClick r:id="rId6"/>
-              </a:rPr>
-              <a:t>https://rodrigouchoa.wordpress.com/2014/05/20/novidades-do-java-8-lambda-expressions/</a:t>
-            </a:r>
-            <a:endParaRPr lang="pt-BR" sz="2400" dirty="0" smtClean="0"/>
-          </a:p>
-          <a:p>
-            <a:r>
-              <a:rPr lang="pt-BR" sz="2400" dirty="0" smtClean="0">
-                <a:hlinkClick r:id="rId7"/>
-              </a:rPr>
-              <a:t>http://blog.takipi.com/compilando-expressoes-lambda-scala-vs-java-8/</a:t>
-            </a:r>
-            <a:endParaRPr lang="pt-BR" sz="2400" dirty="0" smtClean="0"/>
-          </a:p>
-          <a:p>
+              <a:rPr lang="en-US" sz="2800" b="1" dirty="0" smtClean="0"/>
+              <a:t>Unit Testing Java 8 Lambda Expressions and Streams</a:t>
+            </a:r>
+          </a:p>
+          <a:p>
+            <a:r>
+              <a:rPr lang="en-US" sz="2800" b="1" dirty="0" smtClean="0"/>
+              <a:t>Two approaches to testing </a:t>
+            </a:r>
+            <a:r>
+              <a:rPr lang="en-US" sz="2800" b="1" dirty="0" err="1" smtClean="0"/>
+              <a:t>lambdafied</a:t>
+            </a:r>
+            <a:r>
+              <a:rPr lang="en-US" sz="2800" b="1" dirty="0" smtClean="0"/>
+              <a:t> code.</a:t>
+            </a:r>
+          </a:p>
+          <a:p>
+            <a:pPr lvl="1"/>
+            <a:r>
+              <a:rPr lang="en-US" sz="2400" dirty="0" smtClean="0"/>
+              <a:t>Lambda expressions pose a slightly different challenge when unit testing code. Because they don’t have a name, it’s impossible to directly call them in your test code. You could choose to copy the body of the lambda expression into your test and then test that copy, but this approach has the unfortunate side effect of not actually testing the behavior of your implementation. If you change the implementation code, your test will still pass even though the implementation is performing a different task.</a:t>
+            </a:r>
+          </a:p>
+          <a:p>
+            <a:pPr lvl="1">
+              <a:buNone/>
+            </a:pPr>
             <a:endParaRPr lang="pt-BR" sz="2400" dirty="0"/>
           </a:p>
         </p:txBody>
@@ -7135,12 +7025,12 @@
         <p:spPr/>
         <p:txBody>
           <a:bodyPr>
-            <a:normAutofit fontScale="90000"/>
+            <a:normAutofit/>
           </a:bodyPr>
           <a:lstStyle/>
           <a:p>
             <a:r>
-              <a:rPr lang="en-US" dirty="0" smtClean="0">
+              <a:rPr lang="en-US" dirty="0" err="1" smtClean="0">
                 <a:solidFill>
                   <a:srgbClr val="0070C0"/>
                 </a:solidFill>
@@ -7152,7 +7042,22 @@
                   </a:outerShdw>
                 </a:effectLst>
               </a:rPr>
-              <a:t>Java 8 Lambda Expressions Revision</a:t>
+              <a:t>JUnit</a:t>
+            </a:r>
+            <a:r>
+              <a:rPr lang="en-US" dirty="0" smtClean="0">
+                <a:solidFill>
+                  <a:srgbClr val="0070C0"/>
+                </a:solidFill>
+                <a:effectLst>
+                  <a:outerShdw blurRad="38100" dist="38100" dir="2700000" algn="tl">
+                    <a:srgbClr val="000000">
+                      <a:alpha val="43137"/>
+                    </a:srgbClr>
+                  </a:outerShdw>
+                </a:effectLst>
+              </a:rPr>
+              <a:t> 5 Test Framework</a:t>
             </a:r>
             <a:endParaRPr lang="en-US" dirty="0">
               <a:solidFill>
@@ -7251,7 +7156,7 @@
         <p:spPr>
           <a:xfrm>
             <a:off x="457200" y="1196752"/>
-            <a:ext cx="8229600" cy="5328592"/>
+            <a:ext cx="8229600" cy="4824536"/>
           </a:xfrm>
         </p:spPr>
         <p:txBody>
@@ -7264,41 +7169,78 @@
               <a:rPr lang="pt-BR" sz="2800" dirty="0" smtClean="0">
                 <a:hlinkClick r:id="rId2"/>
               </a:rPr>
-              <a:t>http://radar.oreilly.com/2014/12/unit-testing-java-8-lambda-expressions-and-streams.html</a:t>
+              <a:t>http://blog.codeleak.pl/2014/07/junit-testing-exception-with-java-8-and-lambda-expressions.html</a:t>
             </a:r>
             <a:endParaRPr lang="pt-BR" sz="2800" dirty="0" smtClean="0"/>
           </a:p>
           <a:p>
             <a:r>
+              <a:rPr lang="en-US" sz="2800" b="1" dirty="0" err="1" smtClean="0"/>
+              <a:t>JUnit</a:t>
+            </a:r>
+            <a:r>
               <a:rPr lang="en-US" sz="2800" b="1" dirty="0" smtClean="0"/>
-              <a:t>Unit Testing Java 8 Lambda Expressions and Streams</a:t>
-            </a:r>
-          </a:p>
-          <a:p>
-            <a:r>
-              <a:rPr lang="en-US" sz="2800" b="1" dirty="0" smtClean="0"/>
-              <a:t>Two approaches to testing </a:t>
-            </a:r>
-            <a:r>
-              <a:rPr lang="en-US" sz="2800" b="1" dirty="0" err="1" smtClean="0"/>
-              <a:t>lambdafied</a:t>
-            </a:r>
-            <a:r>
-              <a:rPr lang="en-US" sz="2800" b="1" dirty="0" smtClean="0"/>
-              <a:t> code.</a:t>
+              <a:t>: testing exception with Java 8 and Lambda Expressions</a:t>
             </a:r>
           </a:p>
           <a:p>
             <a:pPr lvl="1"/>
             <a:r>
               <a:rPr lang="en-US" sz="2400" dirty="0" smtClean="0"/>
-              <a:t>Lambda expressions pose a slightly different challenge when unit testing code. Because they don’t have a name, it’s impossible to directly call them in your test code. You could choose to copy the body of the lambda expression into your test and then test that copy, but this approach has the unfortunate side effect of not actually testing the behavior of your implementation. If you change the implementation code, your test will still pass even though the implementation is performing a different task.</a:t>
-            </a:r>
-          </a:p>
-          <a:p>
-            <a:pPr lvl="1">
-              <a:buNone/>
-            </a:pPr>
+              <a:t>In </a:t>
+            </a:r>
+            <a:r>
+              <a:rPr lang="en-US" sz="2400" dirty="0" err="1" smtClean="0"/>
+              <a:t>JUnit</a:t>
+            </a:r>
+            <a:r>
+              <a:rPr lang="en-US" sz="2400" dirty="0" smtClean="0"/>
+              <a:t> there are many ways of testing exceptions in test code, including </a:t>
+            </a:r>
+            <a:r>
+              <a:rPr lang="en-US" sz="2400" dirty="0" smtClean="0">
+                <a:hlinkClick r:id="rId3"/>
+              </a:rPr>
+              <a:t>try-catch idiom</a:t>
+            </a:r>
+            <a:r>
+              <a:rPr lang="en-US" sz="2400" dirty="0" smtClean="0"/>
+              <a:t>, </a:t>
+            </a:r>
+            <a:r>
+              <a:rPr lang="en-US" sz="2400" dirty="0" err="1" smtClean="0">
+                <a:hlinkClick r:id="rId4"/>
+              </a:rPr>
+              <a:t>JUnit</a:t>
+            </a:r>
+            <a:r>
+              <a:rPr lang="en-US" sz="2400" dirty="0" smtClean="0">
+                <a:hlinkClick r:id="rId4"/>
+              </a:rPr>
+              <a:t> @Rule</a:t>
+            </a:r>
+            <a:r>
+              <a:rPr lang="en-US" sz="2400" dirty="0" smtClean="0"/>
+              <a:t>, with </a:t>
+            </a:r>
+            <a:r>
+              <a:rPr lang="en-US" sz="2400" dirty="0" smtClean="0">
+                <a:hlinkClick r:id="rId5"/>
+              </a:rPr>
+              <a:t>catch-exception</a:t>
+            </a:r>
+            <a:r>
+              <a:rPr lang="en-US" sz="2400" dirty="0" smtClean="0"/>
+              <a:t> library. As of Java 8 we have another way of dealing with exceptions: with lambda expressions. In this short blog post I will demonstrate a simple example how one can utilize the power of Java 8 and lambda expressions to test exceptions in </a:t>
+            </a:r>
+            <a:r>
+              <a:rPr lang="en-US" sz="2400" dirty="0" err="1" smtClean="0"/>
+              <a:t>JUnit</a:t>
+            </a:r>
+            <a:r>
+              <a:rPr lang="en-US" sz="2400" dirty="0" smtClean="0"/>
+              <a:t>. </a:t>
+            </a:r>
             <a:endParaRPr lang="pt-BR" sz="2400" dirty="0"/>
           </a:p>
         </p:txBody>
@@ -7514,103 +7456,113 @@
       </p:sp>
       <p:sp>
         <p:nvSpPr>
-          <p:cNvPr id="2" name="Espaço Reservado para Conteúdo 1"/>
-          <p:cNvSpPr>
-            <a:spLocks noGrp="1"/>
-          </p:cNvSpPr>
-          <p:nvPr>
-            <p:ph idx="1"/>
+          <p:cNvPr id="4" name="Title 3"/>
+          <p:cNvSpPr>
+            <a:spLocks noGrp="1"/>
+          </p:cNvSpPr>
+          <p:nvPr>
+            <p:ph type="title"/>
           </p:nvPr>
         </p:nvSpPr>
         <p:spPr>
           <a:xfrm>
-            <a:off x="457200" y="1196752"/>
-            <a:ext cx="8229600" cy="4824536"/>
+            <a:off x="457200" y="228600"/>
+            <a:ext cx="8229600" cy="1400200"/>
           </a:xfrm>
         </p:spPr>
         <p:txBody>
           <a:bodyPr>
-            <a:noAutofit/>
+            <a:normAutofit fontScale="90000"/>
           </a:bodyPr>
           <a:lstStyle/>
           <a:p>
             <a:r>
-              <a:rPr lang="pt-BR" sz="2800" dirty="0" smtClean="0">
-                <a:hlinkClick r:id="rId2"/>
+              <a:rPr lang="pt-BR" dirty="0" smtClean="0">
+                <a:solidFill>
+                  <a:srgbClr val="0070C0"/>
+                </a:solidFill>
+                <a:effectLst>
+                  <a:outerShdw blurRad="38100" dist="38100" dir="2700000" algn="tl">
+                    <a:srgbClr val="000000">
+                      <a:alpha val="43137"/>
+                    </a:srgbClr>
+                  </a:outerShdw>
+                </a:effectLst>
               </a:rPr>
-              <a:t>http://blog.codeleak.pl/2014/07/junit-testing-exception-with-java-8-and-lambda-expressions.html</a:t>
-            </a:r>
-            <a:endParaRPr lang="pt-BR" sz="2800" dirty="0" smtClean="0"/>
-          </a:p>
-          <a:p>
-            <a:r>
-              <a:rPr lang="en-US" sz="2800" b="1" dirty="0" err="1" smtClean="0"/>
-              <a:t>JUnit</a:t>
-            </a:r>
-            <a:r>
-              <a:rPr lang="en-US" sz="2800" b="1" dirty="0" smtClean="0"/>
-              <a:t>: testing exception with Java 8 and Lambda Expressions</a:t>
-            </a:r>
-          </a:p>
-          <a:p>
-            <a:pPr lvl="1"/>
-            <a:r>
-              <a:rPr lang="en-US" sz="2400" dirty="0" smtClean="0"/>
-              <a:t>In </a:t>
-            </a:r>
-            <a:r>
-              <a:rPr lang="en-US" sz="2400" dirty="0" err="1" smtClean="0"/>
-              <a:t>JUnit</a:t>
-            </a:r>
-            <a:r>
-              <a:rPr lang="en-US" sz="2400" dirty="0" smtClean="0"/>
-              <a:t> there are many ways of testing exceptions in test code, including </a:t>
-            </a:r>
-            <a:r>
-              <a:rPr lang="en-US" sz="2400" dirty="0" smtClean="0">
-                <a:hlinkClick r:id="rId3"/>
+              <a:t>Apresentação do </a:t>
+            </a:r>
+            <a:r>
+              <a:rPr lang="en-US" dirty="0">
+                <a:solidFill>
+                  <a:srgbClr val="0070C0"/>
+                </a:solidFill>
+                <a:effectLst>
+                  <a:outerShdw blurRad="38100" dist="38100" dir="2700000" algn="tl">
+                    <a:srgbClr val="000000">
+                      <a:alpha val="43137"/>
+                    </a:srgbClr>
+                  </a:outerShdw>
+                </a:effectLst>
               </a:rPr>
-              <a:t>try-catch idiom</a:t>
-            </a:r>
-            <a:r>
-              <a:rPr lang="en-US" sz="2400" dirty="0" smtClean="0"/>
-              <a:t>, </a:t>
-            </a:r>
-            <a:r>
-              <a:rPr lang="en-US" sz="2400" dirty="0" err="1" smtClean="0">
-                <a:hlinkClick r:id="rId4"/>
+              <a:t>MATLAB </a:t>
+            </a:r>
+            <a:r>
+              <a:rPr lang="en-US" dirty="0" err="1">
+                <a:solidFill>
+                  <a:srgbClr val="0070C0"/>
+                </a:solidFill>
+                <a:effectLst>
+                  <a:outerShdw blurRad="38100" dist="38100" dir="2700000" algn="tl">
+                    <a:srgbClr val="000000">
+                      <a:alpha val="43137"/>
+                    </a:srgbClr>
+                  </a:outerShdw>
+                </a:effectLst>
               </a:rPr>
-              <a:t>JUnit</a:t>
-            </a:r>
-            <a:r>
-              <a:rPr lang="en-US" sz="2400" dirty="0" smtClean="0">
-                <a:hlinkClick r:id="rId4"/>
+              <a:t>xUnit</a:t>
+            </a:r>
+            <a:r>
+              <a:rPr lang="en-US" dirty="0">
+                <a:solidFill>
+                  <a:srgbClr val="0070C0"/>
+                </a:solidFill>
+                <a:effectLst>
+                  <a:outerShdw blurRad="38100" dist="38100" dir="2700000" algn="tl">
+                    <a:srgbClr val="000000">
+                      <a:alpha val="43137"/>
+                    </a:srgbClr>
+                  </a:outerShdw>
+                </a:effectLst>
               </a:rPr>
-              <a:t> @Rule</a:t>
-            </a:r>
-            <a:r>
-              <a:rPr lang="en-US" sz="2400" dirty="0" smtClean="0"/>
-              <a:t>, with </a:t>
-            </a:r>
-            <a:r>
-              <a:rPr lang="en-US" sz="2400" dirty="0" smtClean="0">
-                <a:hlinkClick r:id="rId5"/>
+              <a:t> Test </a:t>
+            </a:r>
+            <a:r>
+              <a:rPr lang="pt-BR" dirty="0" smtClean="0">
+                <a:solidFill>
+                  <a:srgbClr val="0070C0"/>
+                </a:solidFill>
+                <a:effectLst>
+                  <a:outerShdw blurRad="38100" dist="38100" dir="2700000" algn="tl">
+                    <a:srgbClr val="000000">
+                      <a:alpha val="43137"/>
+                    </a:srgbClr>
+                  </a:outerShdw>
+                </a:effectLst>
               </a:rPr>
-              <a:t>catch-exception</a:t>
-            </a:r>
-            <a:r>
-              <a:rPr lang="en-US" sz="2400" dirty="0" smtClean="0"/>
-              <a:t> library. As of Java 8 we have another way of dealing with exceptions: with lambda expressions. In this short blog post I will demonstrate a simple example how one can utilize the power of Java 8 and lambda expressions to test exceptions in </a:t>
-            </a:r>
-            <a:r>
-              <a:rPr lang="en-US" sz="2400" dirty="0" err="1" smtClean="0"/>
-              <a:t>JUnit</a:t>
-            </a:r>
-            <a:r>
-              <a:rPr lang="en-US" sz="2400" dirty="0" smtClean="0"/>
-              <a:t>. </a:t>
-            </a:r>
-            <a:endParaRPr lang="pt-BR" sz="2400" dirty="0"/>
+              <a:t>Framework</a:t>
+            </a:r>
+            <a:endParaRPr lang="pt-BR" dirty="0">
+              <a:solidFill>
+                <a:srgbClr val="0070C0"/>
+              </a:solidFill>
+              <a:effectLst>
+                <a:outerShdw blurRad="38100" dist="38100" dir="2700000" algn="tl">
+                  <a:srgbClr val="000000">
+                    <a:alpha val="43137"/>
+                  </a:srgbClr>
+                </a:outerShdw>
+              </a:effectLst>
+            </a:endParaRPr>
           </a:p>
         </p:txBody>
       </p:sp>
@@ -7692,72 +7644,53 @@
           </a:p>
         </p:txBody>
       </p:sp>
-      <p:sp>
-        <p:nvSpPr>
-          <p:cNvPr id="9" name="Title 3"/>
-          <p:cNvSpPr>
-            <a:spLocks noGrp="1"/>
-          </p:cNvSpPr>
-          <p:nvPr>
-            <p:ph type="title"/>
-          </p:nvPr>
-        </p:nvSpPr>
-        <p:spPr/>
-        <p:txBody>
-          <a:bodyPr>
-            <a:normAutofit/>
-          </a:bodyPr>
-          <a:lstStyle/>
-          <a:p>
-            <a:r>
-              <a:rPr lang="en-US" dirty="0" err="1" smtClean="0">
-                <a:solidFill>
-                  <a:srgbClr val="0070C0"/>
-                </a:solidFill>
-                <a:effectLst>
-                  <a:outerShdw blurRad="38100" dist="38100" dir="2700000" algn="tl">
-                    <a:srgbClr val="000000">
-                      <a:alpha val="43137"/>
-                    </a:srgbClr>
-                  </a:outerShdw>
-                </a:effectLst>
-              </a:rPr>
-              <a:t>JUnit</a:t>
-            </a:r>
-            <a:r>
-              <a:rPr lang="en-US" dirty="0" smtClean="0">
-                <a:solidFill>
-                  <a:srgbClr val="0070C0"/>
-                </a:solidFill>
-                <a:effectLst>
-                  <a:outerShdw blurRad="38100" dist="38100" dir="2700000" algn="tl">
-                    <a:srgbClr val="000000">
-                      <a:alpha val="43137"/>
-                    </a:srgbClr>
-                  </a:outerShdw>
-                </a:effectLst>
-              </a:rPr>
-              <a:t> 5 Test Framework</a:t>
-            </a:r>
-            <a:endParaRPr lang="en-US" dirty="0">
-              <a:solidFill>
-                <a:srgbClr val="0070C0"/>
-              </a:solidFill>
-              <a:effectLst>
-                <a:outerShdw blurRad="38100" dist="38100" dir="2700000" algn="tl">
-                  <a:srgbClr val="000000">
-                    <a:alpha val="43137"/>
-                  </a:srgbClr>
-                </a:outerShdw>
-              </a:effectLst>
-            </a:endParaRPr>
-          </a:p>
-        </p:txBody>
-      </p:sp>
+      <p:pic>
+        <p:nvPicPr>
+          <p:cNvPr id="2050" name="Picture 2" descr="https://d1sui4xqepm0ps.cloudfront.net/categories/example"/>
+          <p:cNvPicPr>
+            <a:picLocks noGrp="1" noChangeAspect="1" noChangeArrowheads="1"/>
+          </p:cNvPicPr>
+          <p:nvPr>
+            <p:ph idx="1"/>
+          </p:nvPr>
+        </p:nvPicPr>
+        <p:blipFill>
+          <a:blip r:embed="rId2" cstate="print">
+            <a:extLst>
+              <a:ext uri="{28A0092B-C50C-407E-A947-70E740481C1C}">
+                <a14:useLocalDpi xmlns:a14="http://schemas.microsoft.com/office/drawing/2010/main" val="0"/>
+              </a:ext>
+            </a:extLst>
+          </a:blip>
+          <a:srcRect/>
+          <a:stretch>
+            <a:fillRect/>
+          </a:stretch>
+        </p:blipFill>
+        <p:spPr bwMode="auto">
+          <a:xfrm>
+            <a:off x="2540000" y="2612231"/>
+            <a:ext cx="4064000" cy="1968500"/>
+          </a:xfrm>
+          <a:prstGeom prst="rect">
+            <a:avLst/>
+          </a:prstGeom>
+          <a:noFill/>
+          <a:extLst>
+            <a:ext uri="{909E8E84-426E-40DD-AFC4-6F175D3DCCD1}">
+              <a14:hiddenFill xmlns:a14="http://schemas.microsoft.com/office/drawing/2010/main">
+                <a:solidFill>
+                  <a:srgbClr val="FFFFFF"/>
+                </a:solidFill>
+              </a14:hiddenFill>
+            </a:ext>
+          </a:extLst>
+        </p:spPr>
+      </p:pic>
     </p:spTree>
     <p:extLst>
       <p:ext uri="{BB962C8B-B14F-4D97-AF65-F5344CB8AC3E}">
-        <p14:creationId xmlns:p14="http://schemas.microsoft.com/office/powerpoint/2010/main" val="1979461865"/>
+        <p14:creationId xmlns:p14="http://schemas.microsoft.com/office/powerpoint/2010/main" val="3792145510"/>
       </p:ext>
     </p:extLst>
   </p:cSld>
@@ -7825,100 +7758,6 @@
       </p:sp>
       <p:sp>
         <p:nvSpPr>
-          <p:cNvPr id="2" name="Espaço Reservado para Conteúdo 1"/>
-          <p:cNvSpPr>
-            <a:spLocks noGrp="1"/>
-          </p:cNvSpPr>
-          <p:nvPr>
-            <p:ph idx="1"/>
-          </p:nvPr>
-        </p:nvSpPr>
-        <p:spPr>
-          <a:xfrm>
-            <a:off x="457200" y="1196752"/>
-            <a:ext cx="8229600" cy="4824536"/>
-          </a:xfrm>
-        </p:spPr>
-        <p:txBody>
-          <a:bodyPr>
-            <a:noAutofit/>
-          </a:bodyPr>
-          <a:lstStyle/>
-          <a:p>
-            <a:r>
-              <a:rPr lang="pt-BR" sz="2400" dirty="0" smtClean="0">
-                <a:hlinkClick r:id="rId2"/>
-              </a:rPr>
-              <a:t>http://stackoverflow.com/questions/28688047/unit-test-code-with-java-8-lambdas</a:t>
-            </a:r>
-            <a:endParaRPr lang="pt-BR" sz="2400" dirty="0" smtClean="0"/>
-          </a:p>
-          <a:p>
-            <a:r>
-              <a:rPr lang="pt-BR" sz="2400" dirty="0" smtClean="0">
-                <a:hlinkClick r:id="rId3"/>
-              </a:rPr>
-              <a:t>http://stackoverflow.com/questions/34576710/how-to-test-lambda-functions</a:t>
-            </a:r>
-            <a:endParaRPr lang="pt-BR" sz="2400" dirty="0" smtClean="0"/>
-          </a:p>
-          <a:p>
-            <a:r>
-              <a:rPr lang="pt-BR" sz="2400" dirty="0" smtClean="0">
-                <a:hlinkClick r:id="rId4"/>
-              </a:rPr>
-              <a:t>https://pythonconquerstheuniverse.wordpress.com/2011/08/29/lambda_tutorial/</a:t>
-            </a:r>
-            <a:endParaRPr lang="pt-BR" sz="2400" dirty="0" smtClean="0"/>
-          </a:p>
-          <a:p>
-            <a:r>
-              <a:rPr lang="pt-BR" sz="2400" dirty="0" smtClean="0">
-                <a:hlinkClick r:id="rId5"/>
-              </a:rPr>
-              <a:t>http://www.coderanch.com/t/647426/Testing/approach-testing-lambda-expressions</a:t>
-            </a:r>
-            <a:endParaRPr lang="pt-BR" sz="2400" dirty="0" smtClean="0"/>
-          </a:p>
-          <a:p>
-            <a:endParaRPr lang="pt-BR" sz="2400" dirty="0" smtClean="0"/>
-          </a:p>
-          <a:p>
-            <a:r>
-              <a:rPr lang="pt-BR" sz="2400" dirty="0" err="1" smtClean="0"/>
-              <a:t>Node</a:t>
-            </a:r>
-            <a:r>
-              <a:rPr lang="pt-BR" sz="2400" dirty="0" smtClean="0"/>
-              <a:t>.</a:t>
-            </a:r>
-            <a:r>
-              <a:rPr lang="pt-BR" sz="2400" dirty="0" err="1" smtClean="0"/>
-              <a:t>js</a:t>
-            </a:r>
-            <a:r>
-              <a:rPr lang="pt-BR" sz="2400" dirty="0" smtClean="0"/>
-              <a:t> </a:t>
-            </a:r>
-            <a:r>
-              <a:rPr lang="pt-BR" sz="2400" dirty="0" smtClean="0">
-                <a:hlinkClick r:id="rId6"/>
-              </a:rPr>
-              <a:t>https://pub.scotch.io/@richardhyatt/unit-testing-aws-lambda-functions-in-nodejs</a:t>
-            </a:r>
-            <a:endParaRPr lang="pt-BR" sz="2400" dirty="0" smtClean="0"/>
-          </a:p>
-          <a:p>
-            <a:r>
-              <a:rPr lang="pt-BR" sz="2400" dirty="0" err="1" smtClean="0"/>
-              <a:t>Python</a:t>
-            </a:r>
-            <a:endParaRPr lang="pt-BR" sz="2400" dirty="0"/>
-          </a:p>
-        </p:txBody>
-      </p:sp>
-      <p:sp>
-        <p:nvSpPr>
           <p:cNvPr id="5" name="AutoShape 2" descr="G:\HD-Games\GitRepos\DesignPatterns\CAP392-02-PloP\artigos\03 - Pattern Language\entrega final\family-guy-simpsons2.webp"/>
           <p:cNvSpPr>
             <a:spLocks noChangeAspect="1" noChangeArrowheads="1"/>
@@ -7995,9 +7834,73 @@
           </a:p>
         </p:txBody>
       </p:sp>
-      <p:sp>
-        <p:nvSpPr>
-          <p:cNvPr id="9" name="Title 3"/>
+      <p:pic>
+        <p:nvPicPr>
+          <p:cNvPr id="4099" name="Picture 3"/>
+          <p:cNvPicPr>
+            <a:picLocks noChangeAspect="1" noChangeArrowheads="1"/>
+          </p:cNvPicPr>
+          <p:nvPr/>
+        </p:nvPicPr>
+        <p:blipFill>
+          <a:blip r:embed="rId2" cstate="print">
+            <a:extLst>
+              <a:ext uri="{28A0092B-C50C-407E-A947-70E740481C1C}">
+                <a14:useLocalDpi xmlns:a14="http://schemas.microsoft.com/office/drawing/2010/main" val="0"/>
+              </a:ext>
+            </a:extLst>
+          </a:blip>
+          <a:srcRect/>
+          <a:stretch>
+            <a:fillRect/>
+          </a:stretch>
+        </p:blipFill>
+        <p:spPr bwMode="auto">
+          <a:xfrm>
+            <a:off x="457200" y="1268760"/>
+            <a:ext cx="8229600" cy="5238750"/>
+          </a:xfrm>
+          <a:prstGeom prst="rect">
+            <a:avLst/>
+          </a:prstGeom>
+          <a:noFill/>
+          <a:ln>
+            <a:noFill/>
+          </a:ln>
+          <a:effectLst/>
+          <a:extLst>
+            <a:ext uri="{909E8E84-426E-40DD-AFC4-6F175D3DCCD1}">
+              <a14:hiddenFill xmlns:a14="http://schemas.microsoft.com/office/drawing/2010/main">
+                <a:solidFill>
+                  <a:schemeClr val="accent1"/>
+                </a:solidFill>
+              </a14:hiddenFill>
+            </a:ext>
+            <a:ext uri="{91240B29-F687-4F45-9708-019B960494DF}">
+              <a14:hiddenLine xmlns:a14="http://schemas.microsoft.com/office/drawing/2010/main" w="9525">
+                <a:solidFill>
+                  <a:schemeClr val="tx1"/>
+                </a:solidFill>
+                <a:miter lim="800000"/>
+                <a:headEnd/>
+                <a:tailEnd/>
+              </a14:hiddenLine>
+            </a:ext>
+            <a:ext uri="{AF507438-7753-43E0-B8FC-AC1667EBCBE1}">
+              <a14:hiddenEffects xmlns:a14="http://schemas.microsoft.com/office/drawing/2010/main">
+                <a:effectLst>
+                  <a:outerShdw dist="35921" dir="2700000" algn="ctr" rotWithShape="0">
+                    <a:schemeClr val="bg2"/>
+                  </a:outerShdw>
+                </a:effectLst>
+              </a14:hiddenEffects>
+            </a:ext>
+          </a:extLst>
+        </p:spPr>
+      </p:pic>
+      <p:sp>
+        <p:nvSpPr>
+          <p:cNvPr id="13" name="Title 3"/>
           <p:cNvSpPr>
             <a:spLocks noGrp="1"/>
           </p:cNvSpPr>
@@ -8013,7 +7916,7 @@
           <a:lstStyle/>
           <a:p>
             <a:r>
-              <a:rPr lang="en-US" dirty="0" err="1" smtClean="0">
+              <a:rPr lang="pt-BR" dirty="0" smtClean="0">
                 <a:solidFill>
                   <a:srgbClr val="0070C0"/>
                 </a:solidFill>
@@ -8025,24 +7928,9 @@
                   </a:outerShdw>
                 </a:effectLst>
               </a:rPr>
-              <a:t>JUnit</a:t>
-            </a:r>
-            <a:r>
-              <a:rPr lang="en-US" dirty="0" smtClean="0">
-                <a:solidFill>
-                  <a:srgbClr val="0070C0"/>
-                </a:solidFill>
-                <a:effectLst>
-                  <a:outerShdw blurRad="38100" dist="38100" dir="2700000" algn="tl">
-                    <a:srgbClr val="000000">
-                      <a:alpha val="43137"/>
-                    </a:srgbClr>
-                  </a:outerShdw>
-                </a:effectLst>
-              </a:rPr>
-              <a:t> 5 Test Framework</a:t>
-            </a:r>
-            <a:endParaRPr lang="en-US" dirty="0">
+              <a:t>Exemplo - Função</a:t>
+            </a:r>
+            <a:endParaRPr lang="pt-BR" dirty="0">
               <a:solidFill>
                 <a:srgbClr val="0070C0"/>
               </a:solidFill>
@@ -8060,7 +7948,7 @@
     </p:spTree>
     <p:extLst>
       <p:ext uri="{BB962C8B-B14F-4D97-AF65-F5344CB8AC3E}">
-        <p14:creationId xmlns:p14="http://schemas.microsoft.com/office/powerpoint/2010/main" val="1979461865"/>
+        <p14:creationId xmlns:p14="http://schemas.microsoft.com/office/powerpoint/2010/main" val="3659421261"/>
       </p:ext>
     </p:extLst>
   </p:cSld>
@@ -8128,7 +8016,85 @@
       </p:sp>
       <p:sp>
         <p:nvSpPr>
-          <p:cNvPr id="4" name="Title 3"/>
+          <p:cNvPr id="5" name="AutoShape 2" descr="G:\HD-Games\GitRepos\DesignPatterns\CAP392-02-PloP\artigos\03 - Pattern Language\entrega final\family-guy-simpsons2.webp"/>
+          <p:cNvSpPr>
+            <a:spLocks noChangeAspect="1" noChangeArrowheads="1"/>
+          </p:cNvSpPr>
+          <p:nvPr/>
+        </p:nvSpPr>
+        <p:spPr bwMode="auto">
+          <a:xfrm>
+            <a:off x="155575" y="-144463"/>
+            <a:ext cx="304800" cy="304801"/>
+          </a:xfrm>
+          <a:prstGeom prst="rect">
+            <a:avLst/>
+          </a:prstGeom>
+          <a:noFill/>
+          <a:extLst>
+            <a:ext uri="{909E8E84-426E-40DD-AFC4-6F175D3DCCD1}">
+              <a14:hiddenFill xmlns:a14="http://schemas.microsoft.com/office/drawing/2010/main">
+                <a:solidFill>
+                  <a:srgbClr val="FFFFFF"/>
+                </a:solidFill>
+              </a14:hiddenFill>
+            </a:ext>
+          </a:extLst>
+        </p:spPr>
+        <p:txBody>
+          <a:bodyPr vert="horz" wrap="square" lIns="91440" tIns="45720" rIns="91440" bIns="45720" numCol="1" anchor="t" anchorCtr="0" compatLnSpc="1">
+            <a:prstTxWarp prst="textNoShape">
+              <a:avLst/>
+            </a:prstTxWarp>
+          </a:bodyPr>
+          <a:lstStyle/>
+          <a:p>
+            <a:endParaRPr lang="pt-BR"/>
+          </a:p>
+        </p:txBody>
+      </p:sp>
+      <p:sp>
+        <p:nvSpPr>
+          <p:cNvPr id="7" name="AutoShape 4" descr="G:\HD-Games\GitRepos\DesignPatterns\CAP392-02-PloP\artigos\03 - Pattern Language\entrega final\family-guy-simpsons2.webp"/>
+          <p:cNvSpPr>
+            <a:spLocks noChangeAspect="1" noChangeArrowheads="1"/>
+          </p:cNvSpPr>
+          <p:nvPr/>
+        </p:nvSpPr>
+        <p:spPr bwMode="auto">
+          <a:xfrm>
+            <a:off x="307975" y="7937"/>
+            <a:ext cx="304800" cy="304801"/>
+          </a:xfrm>
+          <a:prstGeom prst="rect">
+            <a:avLst/>
+          </a:prstGeom>
+          <a:noFill/>
+          <a:extLst>
+            <a:ext uri="{909E8E84-426E-40DD-AFC4-6F175D3DCCD1}">
+              <a14:hiddenFill xmlns:a14="http://schemas.microsoft.com/office/drawing/2010/main">
+                <a:solidFill>
+                  <a:srgbClr val="FFFFFF"/>
+                </a:solidFill>
+              </a14:hiddenFill>
+            </a:ext>
+          </a:extLst>
+        </p:spPr>
+        <p:txBody>
+          <a:bodyPr vert="horz" wrap="square" lIns="91440" tIns="45720" rIns="91440" bIns="45720" numCol="1" anchor="t" anchorCtr="0" compatLnSpc="1">
+            <a:prstTxWarp prst="textNoShape">
+              <a:avLst/>
+            </a:prstTxWarp>
+          </a:bodyPr>
+          <a:lstStyle/>
+          <a:p>
+            <a:endParaRPr lang="pt-BR"/>
+          </a:p>
+        </p:txBody>
+      </p:sp>
+      <p:sp>
+        <p:nvSpPr>
+          <p:cNvPr id="13" name="Title 3"/>
           <p:cNvSpPr>
             <a:spLocks noGrp="1"/>
           </p:cNvSpPr>
@@ -8136,15 +8102,10 @@
             <p:ph type="title"/>
           </p:nvPr>
         </p:nvSpPr>
-        <p:spPr>
-          <a:xfrm>
-            <a:off x="457200" y="228600"/>
-            <a:ext cx="8229600" cy="1400200"/>
-          </a:xfrm>
-        </p:spPr>
+        <p:spPr/>
         <p:txBody>
           <a:bodyPr>
-            <a:normAutofit fontScale="90000"/>
+            <a:normAutofit/>
           </a:bodyPr>
           <a:lstStyle/>
           <a:p>
@@ -8161,67 +8122,7 @@
                   </a:outerShdw>
                 </a:effectLst>
               </a:rPr>
-              <a:t>Apresentação do </a:t>
-            </a:r>
-            <a:r>
-              <a:rPr lang="en-US" dirty="0">
-                <a:solidFill>
-                  <a:srgbClr val="0070C0"/>
-                </a:solidFill>
-                <a:effectLst>
-                  <a:outerShdw blurRad="38100" dist="38100" dir="2700000" algn="tl">
-                    <a:srgbClr val="000000">
-                      <a:alpha val="43137"/>
-                    </a:srgbClr>
-                  </a:outerShdw>
-                </a:effectLst>
-              </a:rPr>
-              <a:t>MATLAB </a:t>
-            </a:r>
-            <a:r>
-              <a:rPr lang="en-US" dirty="0" err="1">
-                <a:solidFill>
-                  <a:srgbClr val="0070C0"/>
-                </a:solidFill>
-                <a:effectLst>
-                  <a:outerShdw blurRad="38100" dist="38100" dir="2700000" algn="tl">
-                    <a:srgbClr val="000000">
-                      <a:alpha val="43137"/>
-                    </a:srgbClr>
-                  </a:outerShdw>
-                </a:effectLst>
-              </a:rPr>
-              <a:t>xUnit</a:t>
-            </a:r>
-            <a:r>
-              <a:rPr lang="en-US" dirty="0">
-                <a:solidFill>
-                  <a:srgbClr val="0070C0"/>
-                </a:solidFill>
-                <a:effectLst>
-                  <a:outerShdw blurRad="38100" dist="38100" dir="2700000" algn="tl">
-                    <a:srgbClr val="000000">
-                      <a:alpha val="43137"/>
-                    </a:srgbClr>
-                  </a:outerShdw>
-                </a:effectLst>
-              </a:rPr>
-              <a:t> Test </a:t>
-            </a:r>
-            <a:r>
-              <a:rPr lang="pt-BR" dirty="0" smtClean="0">
-                <a:solidFill>
-                  <a:srgbClr val="0070C0"/>
-                </a:solidFill>
-                <a:effectLst>
-                  <a:outerShdw blurRad="38100" dist="38100" dir="2700000" algn="tl">
-                    <a:srgbClr val="000000">
-                      <a:alpha val="43137"/>
-                    </a:srgbClr>
-                  </a:outerShdw>
-                </a:effectLst>
-              </a:rPr>
-              <a:t>Framework</a:t>
+              <a:t>Exemplo – Função (Código Teste)</a:t>
             </a:r>
             <a:endParaRPr lang="pt-BR" dirty="0">
               <a:solidFill>
@@ -8238,93 +8139,13 @@
           </a:p>
         </p:txBody>
       </p:sp>
-      <p:sp>
-        <p:nvSpPr>
-          <p:cNvPr id="5" name="AutoShape 2" descr="G:\HD-Games\GitRepos\DesignPatterns\CAP392-02-PloP\artigos\03 - Pattern Language\entrega final\family-guy-simpsons2.webp"/>
-          <p:cNvSpPr>
-            <a:spLocks noChangeAspect="1" noChangeArrowheads="1"/>
-          </p:cNvSpPr>
-          <p:nvPr/>
-        </p:nvSpPr>
-        <p:spPr bwMode="auto">
-          <a:xfrm>
-            <a:off x="155575" y="-144463"/>
-            <a:ext cx="304800" cy="304801"/>
-          </a:xfrm>
-          <a:prstGeom prst="rect">
-            <a:avLst/>
-          </a:prstGeom>
-          <a:noFill/>
-          <a:extLst>
-            <a:ext uri="{909E8E84-426E-40DD-AFC4-6F175D3DCCD1}">
-              <a14:hiddenFill xmlns:a14="http://schemas.microsoft.com/office/drawing/2010/main">
-                <a:solidFill>
-                  <a:srgbClr val="FFFFFF"/>
-                </a:solidFill>
-              </a14:hiddenFill>
-            </a:ext>
-          </a:extLst>
-        </p:spPr>
-        <p:txBody>
-          <a:bodyPr vert="horz" wrap="square" lIns="91440" tIns="45720" rIns="91440" bIns="45720" numCol="1" anchor="t" anchorCtr="0" compatLnSpc="1">
-            <a:prstTxWarp prst="textNoShape">
-              <a:avLst/>
-            </a:prstTxWarp>
-          </a:bodyPr>
-          <a:lstStyle/>
-          <a:p>
-            <a:endParaRPr lang="pt-BR"/>
-          </a:p>
-        </p:txBody>
-      </p:sp>
-      <p:sp>
-        <p:nvSpPr>
-          <p:cNvPr id="7" name="AutoShape 4" descr="G:\HD-Games\GitRepos\DesignPatterns\CAP392-02-PloP\artigos\03 - Pattern Language\entrega final\family-guy-simpsons2.webp"/>
-          <p:cNvSpPr>
-            <a:spLocks noChangeAspect="1" noChangeArrowheads="1"/>
-          </p:cNvSpPr>
-          <p:nvPr/>
-        </p:nvSpPr>
-        <p:spPr bwMode="auto">
-          <a:xfrm>
-            <a:off x="307975" y="7937"/>
-            <a:ext cx="304800" cy="304801"/>
-          </a:xfrm>
-          <a:prstGeom prst="rect">
-            <a:avLst/>
-          </a:prstGeom>
-          <a:noFill/>
-          <a:extLst>
-            <a:ext uri="{909E8E84-426E-40DD-AFC4-6F175D3DCCD1}">
-              <a14:hiddenFill xmlns:a14="http://schemas.microsoft.com/office/drawing/2010/main">
-                <a:solidFill>
-                  <a:srgbClr val="FFFFFF"/>
-                </a:solidFill>
-              </a14:hiddenFill>
-            </a:ext>
-          </a:extLst>
-        </p:spPr>
-        <p:txBody>
-          <a:bodyPr vert="horz" wrap="square" lIns="91440" tIns="45720" rIns="91440" bIns="45720" numCol="1" anchor="t" anchorCtr="0" compatLnSpc="1">
-            <a:prstTxWarp prst="textNoShape">
-              <a:avLst/>
-            </a:prstTxWarp>
-          </a:bodyPr>
-          <a:lstStyle/>
-          <a:p>
-            <a:endParaRPr lang="pt-BR"/>
-          </a:p>
-        </p:txBody>
-      </p:sp>
       <p:pic>
         <p:nvPicPr>
-          <p:cNvPr id="2050" name="Picture 2" descr="https://d1sui4xqepm0ps.cloudfront.net/categories/example"/>
+          <p:cNvPr id="5123" name="Picture 3"/>
           <p:cNvPicPr>
-            <a:picLocks noGrp="1" noChangeAspect="1" noChangeArrowheads="1"/>
+            <a:picLocks noChangeAspect="1" noChangeArrowheads="1"/>
           </p:cNvPicPr>
-          <p:nvPr>
-            <p:ph idx="1"/>
-          </p:nvPr>
+          <p:nvPr/>
         </p:nvPicPr>
         <p:blipFill>
           <a:blip r:embed="rId2" cstate="print">
@@ -8341,20 +8162,107 @@
         </p:blipFill>
         <p:spPr bwMode="auto">
           <a:xfrm>
-            <a:off x="2540000" y="2612231"/>
-            <a:ext cx="4064000" cy="1968500"/>
+            <a:off x="321645" y="1124744"/>
+            <a:ext cx="8210550" cy="3990975"/>
           </a:xfrm>
           <a:prstGeom prst="rect">
             <a:avLst/>
           </a:prstGeom>
           <a:noFill/>
+          <a:ln>
+            <a:noFill/>
+          </a:ln>
+          <a:effectLst/>
           <a:extLst>
             <a:ext uri="{909E8E84-426E-40DD-AFC4-6F175D3DCCD1}">
               <a14:hiddenFill xmlns:a14="http://schemas.microsoft.com/office/drawing/2010/main">
                 <a:solidFill>
-                  <a:srgbClr val="FFFFFF"/>
+                  <a:schemeClr val="accent1"/>
                 </a:solidFill>
               </a14:hiddenFill>
+            </a:ext>
+            <a:ext uri="{91240B29-F687-4F45-9708-019B960494DF}">
+              <a14:hiddenLine xmlns:a14="http://schemas.microsoft.com/office/drawing/2010/main" w="9525">
+                <a:solidFill>
+                  <a:schemeClr val="tx1"/>
+                </a:solidFill>
+                <a:miter lim="800000"/>
+                <a:headEnd/>
+                <a:tailEnd/>
+              </a14:hiddenLine>
+            </a:ext>
+            <a:ext uri="{AF507438-7753-43E0-B8FC-AC1667EBCBE1}">
+              <a14:hiddenEffects xmlns:a14="http://schemas.microsoft.com/office/drawing/2010/main">
+                <a:effectLst>
+                  <a:outerShdw dist="35921" dir="2700000" algn="ctr" rotWithShape="0">
+                    <a:schemeClr val="bg2"/>
+                  </a:outerShdw>
+                </a:effectLst>
+              </a14:hiddenEffects>
+            </a:ext>
+          </a:extLst>
+        </p:spPr>
+      </p:pic>
+      <p:pic>
+        <p:nvPicPr>
+          <p:cNvPr id="5124" name="Picture 4"/>
+          <p:cNvPicPr>
+            <a:picLocks noChangeAspect="1" noChangeArrowheads="1"/>
+          </p:cNvPicPr>
+          <p:nvPr/>
+        </p:nvPicPr>
+        <p:blipFill>
+          <a:blip r:embed="rId3" cstate="print">
+            <a:extLst>
+              <a:ext uri="{28A0092B-C50C-407E-A947-70E740481C1C}">
+                <a14:useLocalDpi xmlns:a14="http://schemas.microsoft.com/office/drawing/2010/main" val="0"/>
+              </a:ext>
+            </a:extLst>
+          </a:blip>
+          <a:srcRect/>
+          <a:stretch>
+            <a:fillRect/>
+          </a:stretch>
+        </p:blipFill>
+        <p:spPr bwMode="auto">
+          <a:xfrm>
+            <a:off x="647071" y="2276872"/>
+            <a:ext cx="8210550" cy="4000500"/>
+          </a:xfrm>
+          <a:prstGeom prst="rect">
+            <a:avLst/>
+          </a:prstGeom>
+          <a:noFill/>
+          <a:ln>
+            <a:noFill/>
+          </a:ln>
+          <a:effectLst/>
+          <a:extLst>
+            <a:ext uri="{909E8E84-426E-40DD-AFC4-6F175D3DCCD1}">
+              <a14:hiddenFill xmlns:a14="http://schemas.microsoft.com/office/drawing/2010/main">
+                <a:solidFill>
+                  <a:schemeClr val="accent1"/>
+                </a:solidFill>
+              </a14:hiddenFill>
+            </a:ext>
+            <a:ext uri="{91240B29-F687-4F45-9708-019B960494DF}">
+              <a14:hiddenLine xmlns:a14="http://schemas.microsoft.com/office/drawing/2010/main" w="9525">
+                <a:solidFill>
+                  <a:schemeClr val="tx1"/>
+                </a:solidFill>
+                <a:miter lim="800000"/>
+                <a:headEnd/>
+                <a:tailEnd/>
+              </a14:hiddenLine>
+            </a:ext>
+            <a:ext uri="{AF507438-7753-43E0-B8FC-AC1667EBCBE1}">
+              <a14:hiddenEffects xmlns:a14="http://schemas.microsoft.com/office/drawing/2010/main">
+                <a:effectLst>
+                  <a:outerShdw dist="35921" dir="2700000" algn="ctr" rotWithShape="0">
+                    <a:schemeClr val="bg2"/>
+                  </a:outerShdw>
+                </a:effectLst>
+              </a14:hiddenEffects>
             </a:ext>
           </a:extLst>
         </p:spPr>
@@ -8362,7 +8270,7 @@
     </p:spTree>
     <p:extLst>
       <p:ext uri="{BB962C8B-B14F-4D97-AF65-F5344CB8AC3E}">
-        <p14:creationId xmlns:p14="http://schemas.microsoft.com/office/powerpoint/2010/main" val="3792145510"/>
+        <p14:creationId xmlns:p14="http://schemas.microsoft.com/office/powerpoint/2010/main" val="3372461043"/>
       </p:ext>
     </p:extLst>
   </p:cSld>
@@ -8371,7 +8279,7 @@
   </p:clrMapOvr>
   <mc:AlternateContent xmlns:mc="http://schemas.openxmlformats.org/markup-compatibility/2006" xmlns:p14="http://schemas.microsoft.com/office/powerpoint/2010/main">
     <mc:Choice Requires="p14">
-      <p:transition p14:dur="0"/>
+      <p:transition p14:dur="10"/>
     </mc:Choice>
     <mc:Fallback xmlns="">
       <p:transition/>
@@ -8380,7 +8288,83 @@
   <p:timing>
     <p:tnLst>
       <p:par>
-        <p:cTn id="1" dur="indefinite" restart="never" nodeType="tmRoot"/>
+        <p:cTn id="1" dur="indefinite" restart="never" nodeType="tmRoot">
+          <p:childTnLst>
+            <p:seq concurrent="1" nextAc="seek">
+              <p:cTn id="2" dur="indefinite" nodeType="mainSeq">
+                <p:childTnLst>
+                  <p:par>
+                    <p:cTn id="3" fill="hold">
+                      <p:stCondLst>
+                        <p:cond delay="indefinite"/>
+                      </p:stCondLst>
+                      <p:childTnLst>
+                        <p:par>
+                          <p:cTn id="4" fill="hold">
+                            <p:stCondLst>
+                              <p:cond delay="0"/>
+                            </p:stCondLst>
+                            <p:childTnLst>
+                              <p:par>
+                                <p:cTn id="5" presetID="22" presetClass="entr" presetSubtype="1" fill="hold" nodeType="clickEffect">
+                                  <p:stCondLst>
+                                    <p:cond delay="0"/>
+                                  </p:stCondLst>
+                                  <p:childTnLst>
+                                    <p:set>
+                                      <p:cBhvr>
+                                        <p:cTn id="6" dur="1" fill="hold">
+                                          <p:stCondLst>
+                                            <p:cond delay="0"/>
+                                          </p:stCondLst>
+                                        </p:cTn>
+                                        <p:tgtEl>
+                                          <p:spTgt spid="5124"/>
+                                        </p:tgtEl>
+                                        <p:attrNameLst>
+                                          <p:attrName>style.visibility</p:attrName>
+                                        </p:attrNameLst>
+                                      </p:cBhvr>
+                                      <p:to>
+                                        <p:strVal val="visible"/>
+                                      </p:to>
+                                    </p:set>
+                                    <p:animEffect transition="in" filter="wipe(up)">
+                                      <p:cBhvr>
+                                        <p:cTn id="7" dur="500"/>
+                                        <p:tgtEl>
+                                          <p:spTgt spid="5124"/>
+                                        </p:tgtEl>
+                                      </p:cBhvr>
+                                    </p:animEffect>
+                                  </p:childTnLst>
+                                </p:cTn>
+                              </p:par>
+                            </p:childTnLst>
+                          </p:cTn>
+                        </p:par>
+                      </p:childTnLst>
+                    </p:cTn>
+                  </p:par>
+                </p:childTnLst>
+              </p:cTn>
+              <p:prevCondLst>
+                <p:cond evt="onPrev" delay="0">
+                  <p:tgtEl>
+                    <p:sldTgt/>
+                  </p:tgtEl>
+                </p:cond>
+              </p:prevCondLst>
+              <p:nextCondLst>
+                <p:cond evt="onNext" delay="0">
+                  <p:tgtEl>
+                    <p:sldTgt/>
+                  </p:tgtEl>
+                </p:cond>
+              </p:nextCondLst>
+            </p:seq>
+          </p:childTnLst>
+        </p:cTn>
       </p:par>
     </p:tnLst>
   </p:timing>

</xml_diff>

<commit_message>
Leitura dos sites, estrutura da apresentação de sites com as novidades.
</commit_message>
<xml_diff>
--- a/CAP385-00-Presentations/02-JUnit 5/02-JUnit 5.pptx
+++ b/CAP385-00-Presentations/02-JUnit 5/02-JUnit 5.pptx
@@ -5,24 +5,28 @@
     <p:sldMasterId id="2147483648" r:id="rId1"/>
   </p:sldMasterIdLst>
   <p:notesMasterIdLst>
-    <p:notesMasterId r:id="rId17"/>
+    <p:notesMasterId r:id="rId21"/>
   </p:notesMasterIdLst>
   <p:sldIdLst>
     <p:sldId id="257" r:id="rId2"/>
     <p:sldId id="271" r:id="rId3"/>
     <p:sldId id="265" r:id="rId4"/>
     <p:sldId id="272" r:id="rId5"/>
-    <p:sldId id="281" r:id="rId6"/>
-    <p:sldId id="280" r:id="rId7"/>
-    <p:sldId id="273" r:id="rId8"/>
-    <p:sldId id="274" r:id="rId9"/>
-    <p:sldId id="275" r:id="rId10"/>
-    <p:sldId id="276" r:id="rId11"/>
-    <p:sldId id="277" r:id="rId12"/>
-    <p:sldId id="278" r:id="rId13"/>
-    <p:sldId id="279" r:id="rId14"/>
-    <p:sldId id="283" r:id="rId15"/>
-    <p:sldId id="282" r:id="rId16"/>
+    <p:sldId id="284" r:id="rId6"/>
+    <p:sldId id="287" r:id="rId7"/>
+    <p:sldId id="285" r:id="rId8"/>
+    <p:sldId id="286" r:id="rId9"/>
+    <p:sldId id="281" r:id="rId10"/>
+    <p:sldId id="280" r:id="rId11"/>
+    <p:sldId id="273" r:id="rId12"/>
+    <p:sldId id="274" r:id="rId13"/>
+    <p:sldId id="275" r:id="rId14"/>
+    <p:sldId id="276" r:id="rId15"/>
+    <p:sldId id="277" r:id="rId16"/>
+    <p:sldId id="278" r:id="rId17"/>
+    <p:sldId id="279" r:id="rId18"/>
+    <p:sldId id="283" r:id="rId19"/>
+    <p:sldId id="282" r:id="rId20"/>
   </p:sldIdLst>
   <p:sldSz cx="9144000" cy="6858000" type="screen4x3"/>
   <p:notesSz cx="6858000" cy="9144000"/>
@@ -207,7 +211,7 @@
             <a:fld id="{3DB25566-8A38-405D-AF46-A7AC913A6215}" type="datetimeFigureOut">
               <a:rPr lang="pt-BR" smtClean="0"/>
               <a:pPr/>
-              <a:t>14/07/2016</a:t>
+              <a:t>15/07/2016</a:t>
             </a:fld>
             <a:endParaRPr lang="pt-BR"/>
           </a:p>
@@ -740,7 +744,7 @@
             <a:fld id="{97BE082F-75F0-4080-8642-9DC0E9DA7233}" type="datetimeFigureOut">
               <a:rPr lang="pt-BR" smtClean="0"/>
               <a:pPr/>
-              <a:t>14/07/2016</a:t>
+              <a:t>15/07/2016</a:t>
             </a:fld>
             <a:endParaRPr lang="pt-BR"/>
           </a:p>
@@ -912,7 +916,7 @@
             <a:fld id="{97BE082F-75F0-4080-8642-9DC0E9DA7233}" type="datetimeFigureOut">
               <a:rPr lang="pt-BR" smtClean="0"/>
               <a:pPr/>
-              <a:t>14/07/2016</a:t>
+              <a:t>15/07/2016</a:t>
             </a:fld>
             <a:endParaRPr lang="pt-BR"/>
           </a:p>
@@ -1094,7 +1098,7 @@
             <a:fld id="{97BE082F-75F0-4080-8642-9DC0E9DA7233}" type="datetimeFigureOut">
               <a:rPr lang="pt-BR" smtClean="0"/>
               <a:pPr/>
-              <a:t>14/07/2016</a:t>
+              <a:t>15/07/2016</a:t>
             </a:fld>
             <a:endParaRPr lang="pt-BR"/>
           </a:p>
@@ -1448,7 +1452,7 @@
             <a:fld id="{97BE082F-75F0-4080-8642-9DC0E9DA7233}" type="datetimeFigureOut">
               <a:rPr lang="pt-BR" smtClean="0"/>
               <a:pPr/>
-              <a:t>14/07/2016</a:t>
+              <a:t>15/07/2016</a:t>
             </a:fld>
             <a:endParaRPr lang="pt-BR"/>
           </a:p>
@@ -1696,7 +1700,7 @@
             <a:fld id="{97BE082F-75F0-4080-8642-9DC0E9DA7233}" type="datetimeFigureOut">
               <a:rPr lang="pt-BR" smtClean="0"/>
               <a:pPr/>
-              <a:t>14/07/2016</a:t>
+              <a:t>15/07/2016</a:t>
             </a:fld>
             <a:endParaRPr lang="pt-BR"/>
           </a:p>
@@ -1986,7 +1990,7 @@
             <a:fld id="{97BE082F-75F0-4080-8642-9DC0E9DA7233}" type="datetimeFigureOut">
               <a:rPr lang="pt-BR" smtClean="0"/>
               <a:pPr/>
-              <a:t>14/07/2016</a:t>
+              <a:t>15/07/2016</a:t>
             </a:fld>
             <a:endParaRPr lang="pt-BR"/>
           </a:p>
@@ -2410,7 +2414,7 @@
             <a:fld id="{97BE082F-75F0-4080-8642-9DC0E9DA7233}" type="datetimeFigureOut">
               <a:rPr lang="pt-BR" smtClean="0"/>
               <a:pPr/>
-              <a:t>14/07/2016</a:t>
+              <a:t>15/07/2016</a:t>
             </a:fld>
             <a:endParaRPr lang="pt-BR"/>
           </a:p>
@@ -2530,7 +2534,7 @@
             <a:fld id="{97BE082F-75F0-4080-8642-9DC0E9DA7233}" type="datetimeFigureOut">
               <a:rPr lang="pt-BR" smtClean="0"/>
               <a:pPr/>
-              <a:t>14/07/2016</a:t>
+              <a:t>15/07/2016</a:t>
             </a:fld>
             <a:endParaRPr lang="pt-BR"/>
           </a:p>
@@ -2627,7 +2631,7 @@
             <a:fld id="{97BE082F-75F0-4080-8642-9DC0E9DA7233}" type="datetimeFigureOut">
               <a:rPr lang="pt-BR" smtClean="0"/>
               <a:pPr/>
-              <a:t>14/07/2016</a:t>
+              <a:t>15/07/2016</a:t>
             </a:fld>
             <a:endParaRPr lang="pt-BR"/>
           </a:p>
@@ -2906,7 +2910,7 @@
             <a:fld id="{97BE082F-75F0-4080-8642-9DC0E9DA7233}" type="datetimeFigureOut">
               <a:rPr lang="pt-BR" smtClean="0"/>
               <a:pPr/>
-              <a:t>14/07/2016</a:t>
+              <a:t>15/07/2016</a:t>
             </a:fld>
             <a:endParaRPr lang="pt-BR"/>
           </a:p>
@@ -3161,7 +3165,7 @@
             <a:fld id="{97BE082F-75F0-4080-8642-9DC0E9DA7233}" type="datetimeFigureOut">
               <a:rPr lang="pt-BR" smtClean="0"/>
               <a:pPr/>
-              <a:t>14/07/2016</a:t>
+              <a:t>15/07/2016</a:t>
             </a:fld>
             <a:endParaRPr lang="pt-BR"/>
           </a:p>
@@ -3376,7 +3380,7 @@
             <a:fld id="{97BE082F-75F0-4080-8642-9DC0E9DA7233}" type="datetimeFigureOut">
               <a:rPr lang="pt-BR" smtClean="0"/>
               <a:pPr/>
-              <a:t>14/07/2016</a:t>
+              <a:t>15/07/2016</a:t>
             </a:fld>
             <a:endParaRPr lang="pt-BR"/>
           </a:p>
@@ -4146,6 +4150,1275 @@
       </p:sp>
       <p:sp>
         <p:nvSpPr>
+          <p:cNvPr id="2" name="Espaço Reservado para Conteúdo 1"/>
+          <p:cNvSpPr>
+            <a:spLocks noGrp="1"/>
+          </p:cNvSpPr>
+          <p:nvPr>
+            <p:ph idx="1"/>
+          </p:nvPr>
+        </p:nvSpPr>
+        <p:spPr>
+          <a:xfrm>
+            <a:off x="457200" y="1196752"/>
+            <a:ext cx="8229600" cy="4824536"/>
+          </a:xfrm>
+        </p:spPr>
+        <p:txBody>
+          <a:bodyPr>
+            <a:noAutofit/>
+          </a:bodyPr>
+          <a:lstStyle/>
+          <a:p>
+            <a:r>
+              <a:rPr lang="pt-BR" sz="2800" dirty="0" smtClean="0">
+                <a:hlinkClick r:id="rId2"/>
+              </a:rPr>
+              <a:t>http://blog.codeleak.pl/2014/07/junit-testing-exception-with-java-8-and-lambda-expressions.html</a:t>
+            </a:r>
+            <a:endParaRPr lang="pt-BR" sz="2800" dirty="0" smtClean="0"/>
+          </a:p>
+          <a:p>
+            <a:r>
+              <a:rPr lang="en-US" sz="2800" b="1" dirty="0" err="1" smtClean="0"/>
+              <a:t>JUnit</a:t>
+            </a:r>
+            <a:r>
+              <a:rPr lang="en-US" sz="2800" b="1" dirty="0" smtClean="0"/>
+              <a:t>: testing exception with Java 8 and Lambda Expressions</a:t>
+            </a:r>
+          </a:p>
+          <a:p>
+            <a:pPr lvl="1"/>
+            <a:r>
+              <a:rPr lang="en-US" sz="2400" dirty="0" smtClean="0"/>
+              <a:t>In </a:t>
+            </a:r>
+            <a:r>
+              <a:rPr lang="en-US" sz="2400" dirty="0" err="1" smtClean="0"/>
+              <a:t>JUnit</a:t>
+            </a:r>
+            <a:r>
+              <a:rPr lang="en-US" sz="2400" dirty="0" smtClean="0"/>
+              <a:t> there are many ways of testing exceptions in test code, including </a:t>
+            </a:r>
+            <a:r>
+              <a:rPr lang="en-US" sz="2400" dirty="0" smtClean="0">
+                <a:hlinkClick r:id="rId3"/>
+              </a:rPr>
+              <a:t>try-catch idiom</a:t>
+            </a:r>
+            <a:r>
+              <a:rPr lang="en-US" sz="2400" dirty="0" smtClean="0"/>
+              <a:t>, </a:t>
+            </a:r>
+            <a:r>
+              <a:rPr lang="en-US" sz="2400" dirty="0" err="1" smtClean="0">
+                <a:hlinkClick r:id="rId4"/>
+              </a:rPr>
+              <a:t>JUnit</a:t>
+            </a:r>
+            <a:r>
+              <a:rPr lang="en-US" sz="2400" dirty="0" smtClean="0">
+                <a:hlinkClick r:id="rId4"/>
+              </a:rPr>
+              <a:t> @Rule</a:t>
+            </a:r>
+            <a:r>
+              <a:rPr lang="en-US" sz="2400" dirty="0" smtClean="0"/>
+              <a:t>, with </a:t>
+            </a:r>
+            <a:r>
+              <a:rPr lang="en-US" sz="2400" dirty="0" smtClean="0">
+                <a:hlinkClick r:id="rId5"/>
+              </a:rPr>
+              <a:t>catch-exception</a:t>
+            </a:r>
+            <a:r>
+              <a:rPr lang="en-US" sz="2400" dirty="0" smtClean="0"/>
+              <a:t> library. As of Java 8 we have another way of dealing with exceptions: with lambda expressions. In this short blog post I will demonstrate a simple example how one can utilize the power of Java 8 and lambda expressions to test exceptions in </a:t>
+            </a:r>
+            <a:r>
+              <a:rPr lang="en-US" sz="2400" dirty="0" err="1" smtClean="0"/>
+              <a:t>JUnit</a:t>
+            </a:r>
+            <a:r>
+              <a:rPr lang="en-US" sz="2400" dirty="0" smtClean="0"/>
+              <a:t>. </a:t>
+            </a:r>
+            <a:endParaRPr lang="pt-BR" sz="2400" dirty="0"/>
+          </a:p>
+        </p:txBody>
+      </p:sp>
+      <p:sp>
+        <p:nvSpPr>
+          <p:cNvPr id="5" name="AutoShape 2" descr="G:\HD-Games\GitRepos\DesignPatterns\CAP392-02-PloP\artigos\03 - Pattern Language\entrega final\family-guy-simpsons2.webp"/>
+          <p:cNvSpPr>
+            <a:spLocks noChangeAspect="1" noChangeArrowheads="1"/>
+          </p:cNvSpPr>
+          <p:nvPr/>
+        </p:nvSpPr>
+        <p:spPr bwMode="auto">
+          <a:xfrm>
+            <a:off x="155575" y="-144463"/>
+            <a:ext cx="304800" cy="304801"/>
+          </a:xfrm>
+          <a:prstGeom prst="rect">
+            <a:avLst/>
+          </a:prstGeom>
+          <a:noFill/>
+          <a:extLst>
+            <a:ext uri="{909E8E84-426E-40DD-AFC4-6F175D3DCCD1}">
+              <a14:hiddenFill xmlns:a14="http://schemas.microsoft.com/office/drawing/2010/main">
+                <a:solidFill>
+                  <a:srgbClr val="FFFFFF"/>
+                </a:solidFill>
+              </a14:hiddenFill>
+            </a:ext>
+          </a:extLst>
+        </p:spPr>
+        <p:txBody>
+          <a:bodyPr vert="horz" wrap="square" lIns="91440" tIns="45720" rIns="91440" bIns="45720" numCol="1" anchor="t" anchorCtr="0" compatLnSpc="1">
+            <a:prstTxWarp prst="textNoShape">
+              <a:avLst/>
+            </a:prstTxWarp>
+          </a:bodyPr>
+          <a:lstStyle/>
+          <a:p>
+            <a:endParaRPr lang="pt-BR"/>
+          </a:p>
+        </p:txBody>
+      </p:sp>
+      <p:sp>
+        <p:nvSpPr>
+          <p:cNvPr id="7" name="AutoShape 4" descr="G:\HD-Games\GitRepos\DesignPatterns\CAP392-02-PloP\artigos\03 - Pattern Language\entrega final\family-guy-simpsons2.webp"/>
+          <p:cNvSpPr>
+            <a:spLocks noChangeAspect="1" noChangeArrowheads="1"/>
+          </p:cNvSpPr>
+          <p:nvPr/>
+        </p:nvSpPr>
+        <p:spPr bwMode="auto">
+          <a:xfrm>
+            <a:off x="307975" y="7937"/>
+            <a:ext cx="304800" cy="304801"/>
+          </a:xfrm>
+          <a:prstGeom prst="rect">
+            <a:avLst/>
+          </a:prstGeom>
+          <a:noFill/>
+          <a:extLst>
+            <a:ext uri="{909E8E84-426E-40DD-AFC4-6F175D3DCCD1}">
+              <a14:hiddenFill xmlns:a14="http://schemas.microsoft.com/office/drawing/2010/main">
+                <a:solidFill>
+                  <a:srgbClr val="FFFFFF"/>
+                </a:solidFill>
+              </a14:hiddenFill>
+            </a:ext>
+          </a:extLst>
+        </p:spPr>
+        <p:txBody>
+          <a:bodyPr vert="horz" wrap="square" lIns="91440" tIns="45720" rIns="91440" bIns="45720" numCol="1" anchor="t" anchorCtr="0" compatLnSpc="1">
+            <a:prstTxWarp prst="textNoShape">
+              <a:avLst/>
+            </a:prstTxWarp>
+          </a:bodyPr>
+          <a:lstStyle/>
+          <a:p>
+            <a:endParaRPr lang="pt-BR"/>
+          </a:p>
+        </p:txBody>
+      </p:sp>
+      <p:sp>
+        <p:nvSpPr>
+          <p:cNvPr id="9" name="Title 3"/>
+          <p:cNvSpPr>
+            <a:spLocks noGrp="1"/>
+          </p:cNvSpPr>
+          <p:nvPr>
+            <p:ph type="title"/>
+          </p:nvPr>
+        </p:nvSpPr>
+        <p:spPr/>
+        <p:txBody>
+          <a:bodyPr>
+            <a:normAutofit/>
+          </a:bodyPr>
+          <a:lstStyle/>
+          <a:p>
+            <a:r>
+              <a:rPr lang="en-US" dirty="0" err="1" smtClean="0">
+                <a:solidFill>
+                  <a:srgbClr val="0070C0"/>
+                </a:solidFill>
+                <a:effectLst>
+                  <a:outerShdw blurRad="38100" dist="38100" dir="2700000" algn="tl">
+                    <a:srgbClr val="000000">
+                      <a:alpha val="43137"/>
+                    </a:srgbClr>
+                  </a:outerShdw>
+                </a:effectLst>
+              </a:rPr>
+              <a:t>JUnit</a:t>
+            </a:r>
+            <a:r>
+              <a:rPr lang="en-US" dirty="0" smtClean="0">
+                <a:solidFill>
+                  <a:srgbClr val="0070C0"/>
+                </a:solidFill>
+                <a:effectLst>
+                  <a:outerShdw blurRad="38100" dist="38100" dir="2700000" algn="tl">
+                    <a:srgbClr val="000000">
+                      <a:alpha val="43137"/>
+                    </a:srgbClr>
+                  </a:outerShdw>
+                </a:effectLst>
+              </a:rPr>
+              <a:t> 5 Test Framework</a:t>
+            </a:r>
+            <a:endParaRPr lang="en-US" dirty="0">
+              <a:solidFill>
+                <a:srgbClr val="0070C0"/>
+              </a:solidFill>
+              <a:effectLst>
+                <a:outerShdw blurRad="38100" dist="38100" dir="2700000" algn="tl">
+                  <a:srgbClr val="000000">
+                    <a:alpha val="43137"/>
+                  </a:srgbClr>
+                </a:outerShdw>
+              </a:effectLst>
+            </a:endParaRPr>
+          </a:p>
+        </p:txBody>
+      </p:sp>
+    </p:spTree>
+    <p:extLst>
+      <p:ext uri="{BB962C8B-B14F-4D97-AF65-F5344CB8AC3E}">
+        <p14:creationId xmlns:p14="http://schemas.microsoft.com/office/powerpoint/2010/main" val="1979461865"/>
+      </p:ext>
+    </p:extLst>
+  </p:cSld>
+  <p:clrMapOvr>
+    <a:masterClrMapping/>
+  </p:clrMapOvr>
+  <mc:AlternateContent xmlns:mc="http://schemas.openxmlformats.org/markup-compatibility/2006" xmlns:p14="http://schemas.microsoft.com/office/powerpoint/2010/main">
+    <mc:Choice Requires="p14">
+      <p:transition p14:dur="0"/>
+    </mc:Choice>
+    <mc:Fallback xmlns="">
+      <p:transition/>
+    </mc:Fallback>
+  </mc:AlternateContent>
+  <p:timing>
+    <p:tnLst>
+      <p:par>
+        <p:cTn id="1" dur="indefinite" restart="never" nodeType="tmRoot"/>
+      </p:par>
+    </p:tnLst>
+  </p:timing>
+</p:sld>
+</file>
+
+<file path=ppt/slides/slide11.xml><?xml version="1.0" encoding="utf-8"?>
+<p:sld xmlns:a="http://schemas.openxmlformats.org/drawingml/2006/main" xmlns:r="http://schemas.openxmlformats.org/officeDocument/2006/relationships" xmlns:p="http://schemas.openxmlformats.org/presentationml/2006/main">
+  <p:cSld>
+    <p:spTree>
+      <p:nvGrpSpPr>
+        <p:cNvPr id="1" name=""/>
+        <p:cNvGrpSpPr/>
+        <p:nvPr/>
+      </p:nvGrpSpPr>
+      <p:grpSpPr>
+        <a:xfrm>
+          <a:off x="0" y="0"/>
+          <a:ext cx="0" cy="0"/>
+          <a:chOff x="0" y="0"/>
+          <a:chExt cx="0" cy="0"/>
+        </a:xfrm>
+      </p:grpSpPr>
+      <p:sp>
+        <p:nvSpPr>
+          <p:cNvPr id="3" name="Slide Number Placeholder 2"/>
+          <p:cNvSpPr>
+            <a:spLocks noGrp="1"/>
+          </p:cNvSpPr>
+          <p:nvPr>
+            <p:ph type="sldNum" sz="quarter" idx="11"/>
+          </p:nvPr>
+        </p:nvSpPr>
+        <p:spPr/>
+        <p:txBody>
+          <a:bodyPr/>
+          <a:lstStyle/>
+          <a:p>
+            <a:fld id="{338BD863-DCDC-5F43-A029-265BB7DA4A17}" type="slidenum">
+              <a:rPr lang="en-US" smtClean="0"/>
+              <a:pPr/>
+              <a:t>11</a:t>
+            </a:fld>
+            <a:endParaRPr lang="en-US" dirty="0"/>
+          </a:p>
+        </p:txBody>
+      </p:sp>
+      <p:sp>
+        <p:nvSpPr>
+          <p:cNvPr id="4" name="Title 3"/>
+          <p:cNvSpPr>
+            <a:spLocks noGrp="1"/>
+          </p:cNvSpPr>
+          <p:nvPr>
+            <p:ph type="title"/>
+          </p:nvPr>
+        </p:nvSpPr>
+        <p:spPr>
+          <a:xfrm>
+            <a:off x="457200" y="228600"/>
+            <a:ext cx="8229600" cy="1400200"/>
+          </a:xfrm>
+        </p:spPr>
+        <p:txBody>
+          <a:bodyPr>
+            <a:normAutofit fontScale="90000"/>
+          </a:bodyPr>
+          <a:lstStyle/>
+          <a:p>
+            <a:r>
+              <a:rPr lang="pt-BR" dirty="0" smtClean="0">
+                <a:solidFill>
+                  <a:srgbClr val="0070C0"/>
+                </a:solidFill>
+                <a:effectLst>
+                  <a:outerShdw blurRad="38100" dist="38100" dir="2700000" algn="tl">
+                    <a:srgbClr val="000000">
+                      <a:alpha val="43137"/>
+                    </a:srgbClr>
+                  </a:outerShdw>
+                </a:effectLst>
+              </a:rPr>
+              <a:t>Apresentação do </a:t>
+            </a:r>
+            <a:r>
+              <a:rPr lang="en-US" dirty="0">
+                <a:solidFill>
+                  <a:srgbClr val="0070C0"/>
+                </a:solidFill>
+                <a:effectLst>
+                  <a:outerShdw blurRad="38100" dist="38100" dir="2700000" algn="tl">
+                    <a:srgbClr val="000000">
+                      <a:alpha val="43137"/>
+                    </a:srgbClr>
+                  </a:outerShdw>
+                </a:effectLst>
+              </a:rPr>
+              <a:t>MATLAB </a:t>
+            </a:r>
+            <a:r>
+              <a:rPr lang="en-US" dirty="0" err="1">
+                <a:solidFill>
+                  <a:srgbClr val="0070C0"/>
+                </a:solidFill>
+                <a:effectLst>
+                  <a:outerShdw blurRad="38100" dist="38100" dir="2700000" algn="tl">
+                    <a:srgbClr val="000000">
+                      <a:alpha val="43137"/>
+                    </a:srgbClr>
+                  </a:outerShdw>
+                </a:effectLst>
+              </a:rPr>
+              <a:t>xUnit</a:t>
+            </a:r>
+            <a:r>
+              <a:rPr lang="en-US" dirty="0">
+                <a:solidFill>
+                  <a:srgbClr val="0070C0"/>
+                </a:solidFill>
+                <a:effectLst>
+                  <a:outerShdw blurRad="38100" dist="38100" dir="2700000" algn="tl">
+                    <a:srgbClr val="000000">
+                      <a:alpha val="43137"/>
+                    </a:srgbClr>
+                  </a:outerShdw>
+                </a:effectLst>
+              </a:rPr>
+              <a:t> Test </a:t>
+            </a:r>
+            <a:r>
+              <a:rPr lang="pt-BR" dirty="0" smtClean="0">
+                <a:solidFill>
+                  <a:srgbClr val="0070C0"/>
+                </a:solidFill>
+                <a:effectLst>
+                  <a:outerShdw blurRad="38100" dist="38100" dir="2700000" algn="tl">
+                    <a:srgbClr val="000000">
+                      <a:alpha val="43137"/>
+                    </a:srgbClr>
+                  </a:outerShdw>
+                </a:effectLst>
+              </a:rPr>
+              <a:t>Framework</a:t>
+            </a:r>
+            <a:endParaRPr lang="pt-BR" dirty="0">
+              <a:solidFill>
+                <a:srgbClr val="0070C0"/>
+              </a:solidFill>
+              <a:effectLst>
+                <a:outerShdw blurRad="38100" dist="38100" dir="2700000" algn="tl">
+                  <a:srgbClr val="000000">
+                    <a:alpha val="43137"/>
+                  </a:srgbClr>
+                </a:outerShdw>
+              </a:effectLst>
+            </a:endParaRPr>
+          </a:p>
+        </p:txBody>
+      </p:sp>
+      <p:sp>
+        <p:nvSpPr>
+          <p:cNvPr id="5" name="AutoShape 2" descr="G:\HD-Games\GitRepos\DesignPatterns\CAP392-02-PloP\artigos\03 - Pattern Language\entrega final\family-guy-simpsons2.webp"/>
+          <p:cNvSpPr>
+            <a:spLocks noChangeAspect="1" noChangeArrowheads="1"/>
+          </p:cNvSpPr>
+          <p:nvPr/>
+        </p:nvSpPr>
+        <p:spPr bwMode="auto">
+          <a:xfrm>
+            <a:off x="155575" y="-144463"/>
+            <a:ext cx="304800" cy="304801"/>
+          </a:xfrm>
+          <a:prstGeom prst="rect">
+            <a:avLst/>
+          </a:prstGeom>
+          <a:noFill/>
+          <a:extLst>
+            <a:ext uri="{909E8E84-426E-40DD-AFC4-6F175D3DCCD1}">
+              <a14:hiddenFill xmlns:a14="http://schemas.microsoft.com/office/drawing/2010/main">
+                <a:solidFill>
+                  <a:srgbClr val="FFFFFF"/>
+                </a:solidFill>
+              </a14:hiddenFill>
+            </a:ext>
+          </a:extLst>
+        </p:spPr>
+        <p:txBody>
+          <a:bodyPr vert="horz" wrap="square" lIns="91440" tIns="45720" rIns="91440" bIns="45720" numCol="1" anchor="t" anchorCtr="0" compatLnSpc="1">
+            <a:prstTxWarp prst="textNoShape">
+              <a:avLst/>
+            </a:prstTxWarp>
+          </a:bodyPr>
+          <a:lstStyle/>
+          <a:p>
+            <a:endParaRPr lang="pt-BR"/>
+          </a:p>
+        </p:txBody>
+      </p:sp>
+      <p:sp>
+        <p:nvSpPr>
+          <p:cNvPr id="7" name="AutoShape 4" descr="G:\HD-Games\GitRepos\DesignPatterns\CAP392-02-PloP\artigos\03 - Pattern Language\entrega final\family-guy-simpsons2.webp"/>
+          <p:cNvSpPr>
+            <a:spLocks noChangeAspect="1" noChangeArrowheads="1"/>
+          </p:cNvSpPr>
+          <p:nvPr/>
+        </p:nvSpPr>
+        <p:spPr bwMode="auto">
+          <a:xfrm>
+            <a:off x="307975" y="7937"/>
+            <a:ext cx="304800" cy="304801"/>
+          </a:xfrm>
+          <a:prstGeom prst="rect">
+            <a:avLst/>
+          </a:prstGeom>
+          <a:noFill/>
+          <a:extLst>
+            <a:ext uri="{909E8E84-426E-40DD-AFC4-6F175D3DCCD1}">
+              <a14:hiddenFill xmlns:a14="http://schemas.microsoft.com/office/drawing/2010/main">
+                <a:solidFill>
+                  <a:srgbClr val="FFFFFF"/>
+                </a:solidFill>
+              </a14:hiddenFill>
+            </a:ext>
+          </a:extLst>
+        </p:spPr>
+        <p:txBody>
+          <a:bodyPr vert="horz" wrap="square" lIns="91440" tIns="45720" rIns="91440" bIns="45720" numCol="1" anchor="t" anchorCtr="0" compatLnSpc="1">
+            <a:prstTxWarp prst="textNoShape">
+              <a:avLst/>
+            </a:prstTxWarp>
+          </a:bodyPr>
+          <a:lstStyle/>
+          <a:p>
+            <a:endParaRPr lang="pt-BR"/>
+          </a:p>
+        </p:txBody>
+      </p:sp>
+      <p:pic>
+        <p:nvPicPr>
+          <p:cNvPr id="2050" name="Picture 2" descr="https://d1sui4xqepm0ps.cloudfront.net/categories/example"/>
+          <p:cNvPicPr>
+            <a:picLocks noGrp="1" noChangeAspect="1" noChangeArrowheads="1"/>
+          </p:cNvPicPr>
+          <p:nvPr>
+            <p:ph idx="1"/>
+          </p:nvPr>
+        </p:nvPicPr>
+        <p:blipFill>
+          <a:blip r:embed="rId2" cstate="print">
+            <a:extLst>
+              <a:ext uri="{28A0092B-C50C-407E-A947-70E740481C1C}">
+                <a14:useLocalDpi xmlns:a14="http://schemas.microsoft.com/office/drawing/2010/main" val="0"/>
+              </a:ext>
+            </a:extLst>
+          </a:blip>
+          <a:srcRect/>
+          <a:stretch>
+            <a:fillRect/>
+          </a:stretch>
+        </p:blipFill>
+        <p:spPr bwMode="auto">
+          <a:xfrm>
+            <a:off x="2540000" y="2612231"/>
+            <a:ext cx="4064000" cy="1968500"/>
+          </a:xfrm>
+          <a:prstGeom prst="rect">
+            <a:avLst/>
+          </a:prstGeom>
+          <a:noFill/>
+          <a:extLst>
+            <a:ext uri="{909E8E84-426E-40DD-AFC4-6F175D3DCCD1}">
+              <a14:hiddenFill xmlns:a14="http://schemas.microsoft.com/office/drawing/2010/main">
+                <a:solidFill>
+                  <a:srgbClr val="FFFFFF"/>
+                </a:solidFill>
+              </a14:hiddenFill>
+            </a:ext>
+          </a:extLst>
+        </p:spPr>
+      </p:pic>
+    </p:spTree>
+    <p:extLst>
+      <p:ext uri="{BB962C8B-B14F-4D97-AF65-F5344CB8AC3E}">
+        <p14:creationId xmlns:p14="http://schemas.microsoft.com/office/powerpoint/2010/main" val="3792145510"/>
+      </p:ext>
+    </p:extLst>
+  </p:cSld>
+  <p:clrMapOvr>
+    <a:masterClrMapping/>
+  </p:clrMapOvr>
+  <mc:AlternateContent xmlns:mc="http://schemas.openxmlformats.org/markup-compatibility/2006" xmlns:p14="http://schemas.microsoft.com/office/powerpoint/2010/main">
+    <mc:Choice Requires="p14">
+      <p:transition p14:dur="0"/>
+    </mc:Choice>
+    <mc:Fallback xmlns="">
+      <p:transition/>
+    </mc:Fallback>
+  </mc:AlternateContent>
+  <p:timing>
+    <p:tnLst>
+      <p:par>
+        <p:cTn id="1" dur="indefinite" restart="never" nodeType="tmRoot"/>
+      </p:par>
+    </p:tnLst>
+  </p:timing>
+</p:sld>
+</file>
+
+<file path=ppt/slides/slide12.xml><?xml version="1.0" encoding="utf-8"?>
+<p:sld xmlns:a="http://schemas.openxmlformats.org/drawingml/2006/main" xmlns:r="http://schemas.openxmlformats.org/officeDocument/2006/relationships" xmlns:p="http://schemas.openxmlformats.org/presentationml/2006/main">
+  <p:cSld>
+    <p:spTree>
+      <p:nvGrpSpPr>
+        <p:cNvPr id="1" name=""/>
+        <p:cNvGrpSpPr/>
+        <p:nvPr/>
+      </p:nvGrpSpPr>
+      <p:grpSpPr>
+        <a:xfrm>
+          <a:off x="0" y="0"/>
+          <a:ext cx="0" cy="0"/>
+          <a:chOff x="0" y="0"/>
+          <a:chExt cx="0" cy="0"/>
+        </a:xfrm>
+      </p:grpSpPr>
+      <p:sp>
+        <p:nvSpPr>
+          <p:cNvPr id="3" name="Slide Number Placeholder 2"/>
+          <p:cNvSpPr>
+            <a:spLocks noGrp="1"/>
+          </p:cNvSpPr>
+          <p:nvPr>
+            <p:ph type="sldNum" sz="quarter" idx="11"/>
+          </p:nvPr>
+        </p:nvSpPr>
+        <p:spPr/>
+        <p:txBody>
+          <a:bodyPr/>
+          <a:lstStyle/>
+          <a:p>
+            <a:fld id="{338BD863-DCDC-5F43-A029-265BB7DA4A17}" type="slidenum">
+              <a:rPr lang="en-US" smtClean="0"/>
+              <a:pPr/>
+              <a:t>12</a:t>
+            </a:fld>
+            <a:endParaRPr lang="en-US" dirty="0"/>
+          </a:p>
+        </p:txBody>
+      </p:sp>
+      <p:sp>
+        <p:nvSpPr>
+          <p:cNvPr id="5" name="AutoShape 2" descr="G:\HD-Games\GitRepos\DesignPatterns\CAP392-02-PloP\artigos\03 - Pattern Language\entrega final\family-guy-simpsons2.webp"/>
+          <p:cNvSpPr>
+            <a:spLocks noChangeAspect="1" noChangeArrowheads="1"/>
+          </p:cNvSpPr>
+          <p:nvPr/>
+        </p:nvSpPr>
+        <p:spPr bwMode="auto">
+          <a:xfrm>
+            <a:off x="155575" y="-144463"/>
+            <a:ext cx="304800" cy="304801"/>
+          </a:xfrm>
+          <a:prstGeom prst="rect">
+            <a:avLst/>
+          </a:prstGeom>
+          <a:noFill/>
+          <a:extLst>
+            <a:ext uri="{909E8E84-426E-40DD-AFC4-6F175D3DCCD1}">
+              <a14:hiddenFill xmlns:a14="http://schemas.microsoft.com/office/drawing/2010/main">
+                <a:solidFill>
+                  <a:srgbClr val="FFFFFF"/>
+                </a:solidFill>
+              </a14:hiddenFill>
+            </a:ext>
+          </a:extLst>
+        </p:spPr>
+        <p:txBody>
+          <a:bodyPr vert="horz" wrap="square" lIns="91440" tIns="45720" rIns="91440" bIns="45720" numCol="1" anchor="t" anchorCtr="0" compatLnSpc="1">
+            <a:prstTxWarp prst="textNoShape">
+              <a:avLst/>
+            </a:prstTxWarp>
+          </a:bodyPr>
+          <a:lstStyle/>
+          <a:p>
+            <a:endParaRPr lang="pt-BR"/>
+          </a:p>
+        </p:txBody>
+      </p:sp>
+      <p:sp>
+        <p:nvSpPr>
+          <p:cNvPr id="7" name="AutoShape 4" descr="G:\HD-Games\GitRepos\DesignPatterns\CAP392-02-PloP\artigos\03 - Pattern Language\entrega final\family-guy-simpsons2.webp"/>
+          <p:cNvSpPr>
+            <a:spLocks noChangeAspect="1" noChangeArrowheads="1"/>
+          </p:cNvSpPr>
+          <p:nvPr/>
+        </p:nvSpPr>
+        <p:spPr bwMode="auto">
+          <a:xfrm>
+            <a:off x="307975" y="7937"/>
+            <a:ext cx="304800" cy="304801"/>
+          </a:xfrm>
+          <a:prstGeom prst="rect">
+            <a:avLst/>
+          </a:prstGeom>
+          <a:noFill/>
+          <a:extLst>
+            <a:ext uri="{909E8E84-426E-40DD-AFC4-6F175D3DCCD1}">
+              <a14:hiddenFill xmlns:a14="http://schemas.microsoft.com/office/drawing/2010/main">
+                <a:solidFill>
+                  <a:srgbClr val="FFFFFF"/>
+                </a:solidFill>
+              </a14:hiddenFill>
+            </a:ext>
+          </a:extLst>
+        </p:spPr>
+        <p:txBody>
+          <a:bodyPr vert="horz" wrap="square" lIns="91440" tIns="45720" rIns="91440" bIns="45720" numCol="1" anchor="t" anchorCtr="0" compatLnSpc="1">
+            <a:prstTxWarp prst="textNoShape">
+              <a:avLst/>
+            </a:prstTxWarp>
+          </a:bodyPr>
+          <a:lstStyle/>
+          <a:p>
+            <a:endParaRPr lang="pt-BR"/>
+          </a:p>
+        </p:txBody>
+      </p:sp>
+      <p:pic>
+        <p:nvPicPr>
+          <p:cNvPr id="4099" name="Picture 3"/>
+          <p:cNvPicPr>
+            <a:picLocks noChangeAspect="1" noChangeArrowheads="1"/>
+          </p:cNvPicPr>
+          <p:nvPr/>
+        </p:nvPicPr>
+        <p:blipFill>
+          <a:blip r:embed="rId2" cstate="print">
+            <a:extLst>
+              <a:ext uri="{28A0092B-C50C-407E-A947-70E740481C1C}">
+                <a14:useLocalDpi xmlns:a14="http://schemas.microsoft.com/office/drawing/2010/main" val="0"/>
+              </a:ext>
+            </a:extLst>
+          </a:blip>
+          <a:srcRect/>
+          <a:stretch>
+            <a:fillRect/>
+          </a:stretch>
+        </p:blipFill>
+        <p:spPr bwMode="auto">
+          <a:xfrm>
+            <a:off x="457200" y="1268760"/>
+            <a:ext cx="8229600" cy="5238750"/>
+          </a:xfrm>
+          <a:prstGeom prst="rect">
+            <a:avLst/>
+          </a:prstGeom>
+          <a:noFill/>
+          <a:ln>
+            <a:noFill/>
+          </a:ln>
+          <a:effectLst/>
+          <a:extLst>
+            <a:ext uri="{909E8E84-426E-40DD-AFC4-6F175D3DCCD1}">
+              <a14:hiddenFill xmlns:a14="http://schemas.microsoft.com/office/drawing/2010/main">
+                <a:solidFill>
+                  <a:schemeClr val="accent1"/>
+                </a:solidFill>
+              </a14:hiddenFill>
+            </a:ext>
+            <a:ext uri="{91240B29-F687-4F45-9708-019B960494DF}">
+              <a14:hiddenLine xmlns:a14="http://schemas.microsoft.com/office/drawing/2010/main" w="9525">
+                <a:solidFill>
+                  <a:schemeClr val="tx1"/>
+                </a:solidFill>
+                <a:miter lim="800000"/>
+                <a:headEnd/>
+                <a:tailEnd/>
+              </a14:hiddenLine>
+            </a:ext>
+            <a:ext uri="{AF507438-7753-43E0-B8FC-AC1667EBCBE1}">
+              <a14:hiddenEffects xmlns:a14="http://schemas.microsoft.com/office/drawing/2010/main">
+                <a:effectLst>
+                  <a:outerShdw dist="35921" dir="2700000" algn="ctr" rotWithShape="0">
+                    <a:schemeClr val="bg2"/>
+                  </a:outerShdw>
+                </a:effectLst>
+              </a14:hiddenEffects>
+            </a:ext>
+          </a:extLst>
+        </p:spPr>
+      </p:pic>
+      <p:sp>
+        <p:nvSpPr>
+          <p:cNvPr id="13" name="Title 3"/>
+          <p:cNvSpPr>
+            <a:spLocks noGrp="1"/>
+          </p:cNvSpPr>
+          <p:nvPr>
+            <p:ph type="title"/>
+          </p:nvPr>
+        </p:nvSpPr>
+        <p:spPr/>
+        <p:txBody>
+          <a:bodyPr>
+            <a:normAutofit/>
+          </a:bodyPr>
+          <a:lstStyle/>
+          <a:p>
+            <a:r>
+              <a:rPr lang="pt-BR" dirty="0" smtClean="0">
+                <a:solidFill>
+                  <a:srgbClr val="0070C0"/>
+                </a:solidFill>
+                <a:effectLst>
+                  <a:outerShdw blurRad="38100" dist="38100" dir="2700000" algn="tl">
+                    <a:srgbClr val="000000">
+                      <a:alpha val="43137"/>
+                    </a:srgbClr>
+                  </a:outerShdw>
+                </a:effectLst>
+              </a:rPr>
+              <a:t>Exemplo - Função</a:t>
+            </a:r>
+            <a:endParaRPr lang="pt-BR" dirty="0">
+              <a:solidFill>
+                <a:srgbClr val="0070C0"/>
+              </a:solidFill>
+              <a:effectLst>
+                <a:outerShdw blurRad="38100" dist="38100" dir="2700000" algn="tl">
+                  <a:srgbClr val="000000">
+                    <a:alpha val="43137"/>
+                  </a:srgbClr>
+                </a:outerShdw>
+              </a:effectLst>
+            </a:endParaRPr>
+          </a:p>
+        </p:txBody>
+      </p:sp>
+    </p:spTree>
+    <p:extLst>
+      <p:ext uri="{BB962C8B-B14F-4D97-AF65-F5344CB8AC3E}">
+        <p14:creationId xmlns:p14="http://schemas.microsoft.com/office/powerpoint/2010/main" val="3659421261"/>
+      </p:ext>
+    </p:extLst>
+  </p:cSld>
+  <p:clrMapOvr>
+    <a:masterClrMapping/>
+  </p:clrMapOvr>
+  <mc:AlternateContent xmlns:mc="http://schemas.openxmlformats.org/markup-compatibility/2006" xmlns:p14="http://schemas.microsoft.com/office/powerpoint/2010/main">
+    <mc:Choice Requires="p14">
+      <p:transition p14:dur="0"/>
+    </mc:Choice>
+    <mc:Fallback xmlns="">
+      <p:transition/>
+    </mc:Fallback>
+  </mc:AlternateContent>
+  <p:timing>
+    <p:tnLst>
+      <p:par>
+        <p:cTn id="1" dur="indefinite" restart="never" nodeType="tmRoot"/>
+      </p:par>
+    </p:tnLst>
+  </p:timing>
+</p:sld>
+</file>
+
+<file path=ppt/slides/slide13.xml><?xml version="1.0" encoding="utf-8"?>
+<p:sld xmlns:a="http://schemas.openxmlformats.org/drawingml/2006/main" xmlns:r="http://schemas.openxmlformats.org/officeDocument/2006/relationships" xmlns:p="http://schemas.openxmlformats.org/presentationml/2006/main">
+  <p:cSld>
+    <p:spTree>
+      <p:nvGrpSpPr>
+        <p:cNvPr id="1" name=""/>
+        <p:cNvGrpSpPr/>
+        <p:nvPr/>
+      </p:nvGrpSpPr>
+      <p:grpSpPr>
+        <a:xfrm>
+          <a:off x="0" y="0"/>
+          <a:ext cx="0" cy="0"/>
+          <a:chOff x="0" y="0"/>
+          <a:chExt cx="0" cy="0"/>
+        </a:xfrm>
+      </p:grpSpPr>
+      <p:sp>
+        <p:nvSpPr>
+          <p:cNvPr id="3" name="Slide Number Placeholder 2"/>
+          <p:cNvSpPr>
+            <a:spLocks noGrp="1"/>
+          </p:cNvSpPr>
+          <p:nvPr>
+            <p:ph type="sldNum" sz="quarter" idx="11"/>
+          </p:nvPr>
+        </p:nvSpPr>
+        <p:spPr/>
+        <p:txBody>
+          <a:bodyPr/>
+          <a:lstStyle/>
+          <a:p>
+            <a:fld id="{338BD863-DCDC-5F43-A029-265BB7DA4A17}" type="slidenum">
+              <a:rPr lang="en-US" smtClean="0"/>
+              <a:pPr/>
+              <a:t>13</a:t>
+            </a:fld>
+            <a:endParaRPr lang="en-US" dirty="0"/>
+          </a:p>
+        </p:txBody>
+      </p:sp>
+      <p:sp>
+        <p:nvSpPr>
+          <p:cNvPr id="5" name="AutoShape 2" descr="G:\HD-Games\GitRepos\DesignPatterns\CAP392-02-PloP\artigos\03 - Pattern Language\entrega final\family-guy-simpsons2.webp"/>
+          <p:cNvSpPr>
+            <a:spLocks noChangeAspect="1" noChangeArrowheads="1"/>
+          </p:cNvSpPr>
+          <p:nvPr/>
+        </p:nvSpPr>
+        <p:spPr bwMode="auto">
+          <a:xfrm>
+            <a:off x="155575" y="-144463"/>
+            <a:ext cx="304800" cy="304801"/>
+          </a:xfrm>
+          <a:prstGeom prst="rect">
+            <a:avLst/>
+          </a:prstGeom>
+          <a:noFill/>
+          <a:extLst>
+            <a:ext uri="{909E8E84-426E-40DD-AFC4-6F175D3DCCD1}">
+              <a14:hiddenFill xmlns:a14="http://schemas.microsoft.com/office/drawing/2010/main">
+                <a:solidFill>
+                  <a:srgbClr val="FFFFFF"/>
+                </a:solidFill>
+              </a14:hiddenFill>
+            </a:ext>
+          </a:extLst>
+        </p:spPr>
+        <p:txBody>
+          <a:bodyPr vert="horz" wrap="square" lIns="91440" tIns="45720" rIns="91440" bIns="45720" numCol="1" anchor="t" anchorCtr="0" compatLnSpc="1">
+            <a:prstTxWarp prst="textNoShape">
+              <a:avLst/>
+            </a:prstTxWarp>
+          </a:bodyPr>
+          <a:lstStyle/>
+          <a:p>
+            <a:endParaRPr lang="pt-BR"/>
+          </a:p>
+        </p:txBody>
+      </p:sp>
+      <p:sp>
+        <p:nvSpPr>
+          <p:cNvPr id="7" name="AutoShape 4" descr="G:\HD-Games\GitRepos\DesignPatterns\CAP392-02-PloP\artigos\03 - Pattern Language\entrega final\family-guy-simpsons2.webp"/>
+          <p:cNvSpPr>
+            <a:spLocks noChangeAspect="1" noChangeArrowheads="1"/>
+          </p:cNvSpPr>
+          <p:nvPr/>
+        </p:nvSpPr>
+        <p:spPr bwMode="auto">
+          <a:xfrm>
+            <a:off x="307975" y="7937"/>
+            <a:ext cx="304800" cy="304801"/>
+          </a:xfrm>
+          <a:prstGeom prst="rect">
+            <a:avLst/>
+          </a:prstGeom>
+          <a:noFill/>
+          <a:extLst>
+            <a:ext uri="{909E8E84-426E-40DD-AFC4-6F175D3DCCD1}">
+              <a14:hiddenFill xmlns:a14="http://schemas.microsoft.com/office/drawing/2010/main">
+                <a:solidFill>
+                  <a:srgbClr val="FFFFFF"/>
+                </a:solidFill>
+              </a14:hiddenFill>
+            </a:ext>
+          </a:extLst>
+        </p:spPr>
+        <p:txBody>
+          <a:bodyPr vert="horz" wrap="square" lIns="91440" tIns="45720" rIns="91440" bIns="45720" numCol="1" anchor="t" anchorCtr="0" compatLnSpc="1">
+            <a:prstTxWarp prst="textNoShape">
+              <a:avLst/>
+            </a:prstTxWarp>
+          </a:bodyPr>
+          <a:lstStyle/>
+          <a:p>
+            <a:endParaRPr lang="pt-BR"/>
+          </a:p>
+        </p:txBody>
+      </p:sp>
+      <p:sp>
+        <p:nvSpPr>
+          <p:cNvPr id="13" name="Title 3"/>
+          <p:cNvSpPr>
+            <a:spLocks noGrp="1"/>
+          </p:cNvSpPr>
+          <p:nvPr>
+            <p:ph type="title"/>
+          </p:nvPr>
+        </p:nvSpPr>
+        <p:spPr/>
+        <p:txBody>
+          <a:bodyPr>
+            <a:normAutofit/>
+          </a:bodyPr>
+          <a:lstStyle/>
+          <a:p>
+            <a:r>
+              <a:rPr lang="pt-BR" dirty="0" smtClean="0">
+                <a:solidFill>
+                  <a:srgbClr val="0070C0"/>
+                </a:solidFill>
+                <a:effectLst>
+                  <a:outerShdw blurRad="38100" dist="38100" dir="2700000" algn="tl">
+                    <a:srgbClr val="000000">
+                      <a:alpha val="43137"/>
+                    </a:srgbClr>
+                  </a:outerShdw>
+                </a:effectLst>
+              </a:rPr>
+              <a:t>Exemplo – Função (Código Teste)</a:t>
+            </a:r>
+            <a:endParaRPr lang="pt-BR" dirty="0">
+              <a:solidFill>
+                <a:srgbClr val="0070C0"/>
+              </a:solidFill>
+              <a:effectLst>
+                <a:outerShdw blurRad="38100" dist="38100" dir="2700000" algn="tl">
+                  <a:srgbClr val="000000">
+                    <a:alpha val="43137"/>
+                  </a:srgbClr>
+                </a:outerShdw>
+              </a:effectLst>
+            </a:endParaRPr>
+          </a:p>
+        </p:txBody>
+      </p:sp>
+      <p:pic>
+        <p:nvPicPr>
+          <p:cNvPr id="5123" name="Picture 3"/>
+          <p:cNvPicPr>
+            <a:picLocks noChangeAspect="1" noChangeArrowheads="1"/>
+          </p:cNvPicPr>
+          <p:nvPr/>
+        </p:nvPicPr>
+        <p:blipFill>
+          <a:blip r:embed="rId2" cstate="print">
+            <a:extLst>
+              <a:ext uri="{28A0092B-C50C-407E-A947-70E740481C1C}">
+                <a14:useLocalDpi xmlns:a14="http://schemas.microsoft.com/office/drawing/2010/main" val="0"/>
+              </a:ext>
+            </a:extLst>
+          </a:blip>
+          <a:srcRect/>
+          <a:stretch>
+            <a:fillRect/>
+          </a:stretch>
+        </p:blipFill>
+        <p:spPr bwMode="auto">
+          <a:xfrm>
+            <a:off x="321645" y="1124744"/>
+            <a:ext cx="8210550" cy="3990975"/>
+          </a:xfrm>
+          <a:prstGeom prst="rect">
+            <a:avLst/>
+          </a:prstGeom>
+          <a:noFill/>
+          <a:ln>
+            <a:noFill/>
+          </a:ln>
+          <a:effectLst/>
+          <a:extLst>
+            <a:ext uri="{909E8E84-426E-40DD-AFC4-6F175D3DCCD1}">
+              <a14:hiddenFill xmlns:a14="http://schemas.microsoft.com/office/drawing/2010/main">
+                <a:solidFill>
+                  <a:schemeClr val="accent1"/>
+                </a:solidFill>
+              </a14:hiddenFill>
+            </a:ext>
+            <a:ext uri="{91240B29-F687-4F45-9708-019B960494DF}">
+              <a14:hiddenLine xmlns:a14="http://schemas.microsoft.com/office/drawing/2010/main" w="9525">
+                <a:solidFill>
+                  <a:schemeClr val="tx1"/>
+                </a:solidFill>
+                <a:miter lim="800000"/>
+                <a:headEnd/>
+                <a:tailEnd/>
+              </a14:hiddenLine>
+            </a:ext>
+            <a:ext uri="{AF507438-7753-43E0-B8FC-AC1667EBCBE1}">
+              <a14:hiddenEffects xmlns:a14="http://schemas.microsoft.com/office/drawing/2010/main">
+                <a:effectLst>
+                  <a:outerShdw dist="35921" dir="2700000" algn="ctr" rotWithShape="0">
+                    <a:schemeClr val="bg2"/>
+                  </a:outerShdw>
+                </a:effectLst>
+              </a14:hiddenEffects>
+            </a:ext>
+          </a:extLst>
+        </p:spPr>
+      </p:pic>
+      <p:pic>
+        <p:nvPicPr>
+          <p:cNvPr id="5124" name="Picture 4"/>
+          <p:cNvPicPr>
+            <a:picLocks noChangeAspect="1" noChangeArrowheads="1"/>
+          </p:cNvPicPr>
+          <p:nvPr/>
+        </p:nvPicPr>
+        <p:blipFill>
+          <a:blip r:embed="rId3" cstate="print">
+            <a:extLst>
+              <a:ext uri="{28A0092B-C50C-407E-A947-70E740481C1C}">
+                <a14:useLocalDpi xmlns:a14="http://schemas.microsoft.com/office/drawing/2010/main" val="0"/>
+              </a:ext>
+            </a:extLst>
+          </a:blip>
+          <a:srcRect/>
+          <a:stretch>
+            <a:fillRect/>
+          </a:stretch>
+        </p:blipFill>
+        <p:spPr bwMode="auto">
+          <a:xfrm>
+            <a:off x="647071" y="2276872"/>
+            <a:ext cx="8210550" cy="4000500"/>
+          </a:xfrm>
+          <a:prstGeom prst="rect">
+            <a:avLst/>
+          </a:prstGeom>
+          <a:noFill/>
+          <a:ln>
+            <a:noFill/>
+          </a:ln>
+          <a:effectLst/>
+          <a:extLst>
+            <a:ext uri="{909E8E84-426E-40DD-AFC4-6F175D3DCCD1}">
+              <a14:hiddenFill xmlns:a14="http://schemas.microsoft.com/office/drawing/2010/main">
+                <a:solidFill>
+                  <a:schemeClr val="accent1"/>
+                </a:solidFill>
+              </a14:hiddenFill>
+            </a:ext>
+            <a:ext uri="{91240B29-F687-4F45-9708-019B960494DF}">
+              <a14:hiddenLine xmlns:a14="http://schemas.microsoft.com/office/drawing/2010/main" w="9525">
+                <a:solidFill>
+                  <a:schemeClr val="tx1"/>
+                </a:solidFill>
+                <a:miter lim="800000"/>
+                <a:headEnd/>
+                <a:tailEnd/>
+              </a14:hiddenLine>
+            </a:ext>
+            <a:ext uri="{AF507438-7753-43E0-B8FC-AC1667EBCBE1}">
+              <a14:hiddenEffects xmlns:a14="http://schemas.microsoft.com/office/drawing/2010/main">
+                <a:effectLst>
+                  <a:outerShdw dist="35921" dir="2700000" algn="ctr" rotWithShape="0">
+                    <a:schemeClr val="bg2"/>
+                  </a:outerShdw>
+                </a:effectLst>
+              </a14:hiddenEffects>
+            </a:ext>
+          </a:extLst>
+        </p:spPr>
+      </p:pic>
+    </p:spTree>
+    <p:extLst>
+      <p:ext uri="{BB962C8B-B14F-4D97-AF65-F5344CB8AC3E}">
+        <p14:creationId xmlns:p14="http://schemas.microsoft.com/office/powerpoint/2010/main" val="3372461043"/>
+      </p:ext>
+    </p:extLst>
+  </p:cSld>
+  <p:clrMapOvr>
+    <a:masterClrMapping/>
+  </p:clrMapOvr>
+  <mc:AlternateContent xmlns:mc="http://schemas.openxmlformats.org/markup-compatibility/2006" xmlns:p14="http://schemas.microsoft.com/office/powerpoint/2010/main">
+    <mc:Choice Requires="p14">
+      <p:transition p14:dur="10"/>
+    </mc:Choice>
+    <mc:Fallback xmlns="">
+      <p:transition/>
+    </mc:Fallback>
+  </mc:AlternateContent>
+  <p:timing>
+    <p:tnLst>
+      <p:par>
+        <p:cTn id="1" dur="indefinite" restart="never" nodeType="tmRoot">
+          <p:childTnLst>
+            <p:seq concurrent="1" nextAc="seek">
+              <p:cTn id="2" dur="indefinite" nodeType="mainSeq">
+                <p:childTnLst>
+                  <p:par>
+                    <p:cTn id="3" fill="hold">
+                      <p:stCondLst>
+                        <p:cond delay="indefinite"/>
+                      </p:stCondLst>
+                      <p:childTnLst>
+                        <p:par>
+                          <p:cTn id="4" fill="hold">
+                            <p:stCondLst>
+                              <p:cond delay="0"/>
+                            </p:stCondLst>
+                            <p:childTnLst>
+                              <p:par>
+                                <p:cTn id="5" presetID="22" presetClass="entr" presetSubtype="1" fill="hold" nodeType="clickEffect">
+                                  <p:stCondLst>
+                                    <p:cond delay="0"/>
+                                  </p:stCondLst>
+                                  <p:childTnLst>
+                                    <p:set>
+                                      <p:cBhvr>
+                                        <p:cTn id="6" dur="1" fill="hold">
+                                          <p:stCondLst>
+                                            <p:cond delay="0"/>
+                                          </p:stCondLst>
+                                        </p:cTn>
+                                        <p:tgtEl>
+                                          <p:spTgt spid="5124"/>
+                                        </p:tgtEl>
+                                        <p:attrNameLst>
+                                          <p:attrName>style.visibility</p:attrName>
+                                        </p:attrNameLst>
+                                      </p:cBhvr>
+                                      <p:to>
+                                        <p:strVal val="visible"/>
+                                      </p:to>
+                                    </p:set>
+                                    <p:animEffect transition="in" filter="wipe(up)">
+                                      <p:cBhvr>
+                                        <p:cTn id="7" dur="500"/>
+                                        <p:tgtEl>
+                                          <p:spTgt spid="5124"/>
+                                        </p:tgtEl>
+                                      </p:cBhvr>
+                                    </p:animEffect>
+                                  </p:childTnLst>
+                                </p:cTn>
+                              </p:par>
+                            </p:childTnLst>
+                          </p:cTn>
+                        </p:par>
+                      </p:childTnLst>
+                    </p:cTn>
+                  </p:par>
+                </p:childTnLst>
+              </p:cTn>
+              <p:prevCondLst>
+                <p:cond evt="onPrev" delay="0">
+                  <p:tgtEl>
+                    <p:sldTgt/>
+                  </p:tgtEl>
+                </p:cond>
+              </p:prevCondLst>
+              <p:nextCondLst>
+                <p:cond evt="onNext" delay="0">
+                  <p:tgtEl>
+                    <p:sldTgt/>
+                  </p:tgtEl>
+                </p:cond>
+              </p:nextCondLst>
+            </p:seq>
+          </p:childTnLst>
+        </p:cTn>
+      </p:par>
+    </p:tnLst>
+  </p:timing>
+</p:sld>
+</file>
+
+<file path=ppt/slides/slide14.xml><?xml version="1.0" encoding="utf-8"?>
+<p:sld xmlns:a="http://schemas.openxmlformats.org/drawingml/2006/main" xmlns:r="http://schemas.openxmlformats.org/officeDocument/2006/relationships" xmlns:p="http://schemas.openxmlformats.org/presentationml/2006/main">
+  <p:cSld>
+    <p:spTree>
+      <p:nvGrpSpPr>
+        <p:cNvPr id="1" name=""/>
+        <p:cNvGrpSpPr/>
+        <p:nvPr/>
+      </p:nvGrpSpPr>
+      <p:grpSpPr>
+        <a:xfrm>
+          <a:off x="0" y="0"/>
+          <a:ext cx="0" cy="0"/>
+          <a:chOff x="0" y="0"/>
+          <a:chExt cx="0" cy="0"/>
+        </a:xfrm>
+      </p:grpSpPr>
+      <p:sp>
+        <p:nvSpPr>
+          <p:cNvPr id="3" name="Slide Number Placeholder 2"/>
+          <p:cNvSpPr>
+            <a:spLocks noGrp="1"/>
+          </p:cNvSpPr>
+          <p:nvPr>
+            <p:ph type="sldNum" sz="quarter" idx="11"/>
+          </p:nvPr>
+        </p:nvSpPr>
+        <p:spPr/>
+        <p:txBody>
+          <a:bodyPr/>
+          <a:lstStyle/>
+          <a:p>
+            <a:fld id="{338BD863-DCDC-5F43-A029-265BB7DA4A17}" type="slidenum">
+              <a:rPr lang="en-US" smtClean="0"/>
+              <a:pPr/>
+              <a:t>14</a:t>
+            </a:fld>
+            <a:endParaRPr lang="en-US" dirty="0"/>
+          </a:p>
+        </p:txBody>
+      </p:sp>
+      <p:sp>
+        <p:nvSpPr>
           <p:cNvPr id="5" name="AutoShape 2" descr="G:\HD-Games\GitRepos\DesignPatterns\CAP392-02-PloP\artigos\03 - Pattern Language\entrega final\family-guy-simpsons2.webp"/>
           <p:cNvSpPr>
             <a:spLocks noChangeAspect="1" noChangeArrowheads="1"/>
@@ -4361,7 +5634,7 @@
 </p:sld>
 </file>
 
-<file path=ppt/slides/slide11.xml><?xml version="1.0" encoding="utf-8"?>
+<file path=ppt/slides/slide15.xml><?xml version="1.0" encoding="utf-8"?>
 <p:sld xmlns:a="http://schemas.openxmlformats.org/drawingml/2006/main" xmlns:r="http://schemas.openxmlformats.org/officeDocument/2006/relationships" xmlns:p="http://schemas.openxmlformats.org/presentationml/2006/main">
   <p:cSld>
     <p:spTree>
@@ -4396,7 +5669,7 @@
             <a:fld id="{338BD863-DCDC-5F43-A029-265BB7DA4A17}" type="slidenum">
               <a:rPr lang="en-US" smtClean="0"/>
               <a:pPr/>
-              <a:t>11</a:t>
+              <a:t>15</a:t>
             </a:fld>
             <a:endParaRPr lang="en-US" dirty="0"/>
           </a:p>
@@ -4744,7 +6017,7 @@
 </p:sld>
 </file>
 
-<file path=ppt/slides/slide12.xml><?xml version="1.0" encoding="utf-8"?>
+<file path=ppt/slides/slide16.xml><?xml version="1.0" encoding="utf-8"?>
 <p:sld xmlns:a="http://schemas.openxmlformats.org/drawingml/2006/main" xmlns:r="http://schemas.openxmlformats.org/officeDocument/2006/relationships" xmlns:p="http://schemas.openxmlformats.org/presentationml/2006/main">
   <p:cSld>
     <p:spTree>
@@ -4779,7 +6052,7 @@
             <a:fld id="{338BD863-DCDC-5F43-A029-265BB7DA4A17}" type="slidenum">
               <a:rPr lang="en-US" smtClean="0"/>
               <a:pPr/>
-              <a:t>12</a:t>
+              <a:t>16</a:t>
             </a:fld>
             <a:endParaRPr lang="en-US" dirty="0"/>
           </a:p>
@@ -5002,7 +6275,7 @@
 </p:sld>
 </file>
 
-<file path=ppt/slides/slide13.xml><?xml version="1.0" encoding="utf-8"?>
+<file path=ppt/slides/slide17.xml><?xml version="1.0" encoding="utf-8"?>
 <p:sld xmlns:a="http://schemas.openxmlformats.org/drawingml/2006/main" xmlns:r="http://schemas.openxmlformats.org/officeDocument/2006/relationships" xmlns:p="http://schemas.openxmlformats.org/presentationml/2006/main">
   <p:cSld>
     <p:spTree>
@@ -5037,7 +6310,7 @@
             <a:fld id="{338BD863-DCDC-5F43-A029-265BB7DA4A17}" type="slidenum">
               <a:rPr lang="en-US" smtClean="0"/>
               <a:pPr/>
-              <a:t>13</a:t>
+              <a:t>17</a:t>
             </a:fld>
             <a:endParaRPr lang="en-US" dirty="0"/>
           </a:p>
@@ -5314,7 +6587,7 @@
 </p:sld>
 </file>
 
-<file path=ppt/slides/slide14.xml><?xml version="1.0" encoding="utf-8"?>
+<file path=ppt/slides/slide18.xml><?xml version="1.0" encoding="utf-8"?>
 <p:sld xmlns:a="http://schemas.openxmlformats.org/drawingml/2006/main" xmlns:r="http://schemas.openxmlformats.org/officeDocument/2006/relationships" xmlns:p="http://schemas.openxmlformats.org/presentationml/2006/main">
   <p:cSld>
     <p:spTree>
@@ -5349,7 +6622,7 @@
             <a:fld id="{338BD863-DCDC-5F43-A029-265BB7DA4A17}" type="slidenum">
               <a:rPr lang="en-US" smtClean="0"/>
               <a:pPr/>
-              <a:t>14</a:t>
+              <a:t>18</a:t>
             </a:fld>
             <a:endParaRPr lang="en-US" dirty="0"/>
           </a:p>
@@ -5608,7 +6881,7 @@
 </p:sld>
 </file>
 
-<file path=ppt/slides/slide15.xml><?xml version="1.0" encoding="utf-8"?>
+<file path=ppt/slides/slide19.xml><?xml version="1.0" encoding="utf-8"?>
 <p:sld xmlns:a="http://schemas.openxmlformats.org/drawingml/2006/main" xmlns:r="http://schemas.openxmlformats.org/officeDocument/2006/relationships" xmlns:p="http://schemas.openxmlformats.org/presentationml/2006/main">
   <p:cSld>
     <p:spTree>
@@ -5643,7 +6916,7 @@
             <a:fld id="{338BD863-DCDC-5F43-A029-265BB7DA4A17}" type="slidenum">
               <a:rPr lang="en-US" smtClean="0"/>
               <a:pPr/>
-              <a:t>15</a:t>
+              <a:t>19</a:t>
             </a:fld>
             <a:endParaRPr lang="en-US" dirty="0"/>
           </a:p>
@@ -6882,7 +8155,7 @@
         <p:spPr>
           <a:xfrm>
             <a:off x="457200" y="1196752"/>
-            <a:ext cx="8229600" cy="5328592"/>
+            <a:ext cx="8229600" cy="4824536"/>
           </a:xfrm>
         </p:spPr>
         <p:txBody>
@@ -6895,42 +8168,21 @@
               <a:rPr lang="pt-BR" sz="2800" dirty="0" smtClean="0">
                 <a:hlinkClick r:id="rId2"/>
               </a:rPr>
-              <a:t>http://radar.oreilly.com/2014/12/unit-testing-java-8-lambda-expressions-and-streams.html</a:t>
+              <a:t>https</a:t>
+            </a:r>
+            <a:r>
+              <a:rPr lang="pt-BR" sz="2800" dirty="0">
+                <a:hlinkClick r:id="rId2"/>
+              </a:rPr>
+              <a:t>://</a:t>
+            </a:r>
+            <a:r>
+              <a:rPr lang="pt-BR" sz="2800" dirty="0" smtClean="0">
+                <a:hlinkClick r:id="rId2"/>
+              </a:rPr>
+              <a:t>www.infoq.com/news/2016/03/junit5-alpha</a:t>
             </a:r>
             <a:endParaRPr lang="pt-BR" sz="2800" dirty="0" smtClean="0"/>
-          </a:p>
-          <a:p>
-            <a:r>
-              <a:rPr lang="en-US" sz="2800" b="1" dirty="0" smtClean="0"/>
-              <a:t>Unit Testing Java 8 Lambda Expressions and Streams</a:t>
-            </a:r>
-          </a:p>
-          <a:p>
-            <a:r>
-              <a:rPr lang="en-US" sz="2800" b="1" dirty="0" smtClean="0"/>
-              <a:t>Two approaches to testing </a:t>
-            </a:r>
-            <a:r>
-              <a:rPr lang="en-US" sz="2800" b="1" dirty="0" err="1" smtClean="0"/>
-              <a:t>lambdafied</a:t>
-            </a:r>
-            <a:r>
-              <a:rPr lang="en-US" sz="2800" b="1" dirty="0" smtClean="0"/>
-              <a:t> code.</a:t>
-            </a:r>
-          </a:p>
-          <a:p>
-            <a:pPr lvl="1"/>
-            <a:r>
-              <a:rPr lang="en-US" sz="2400" dirty="0" smtClean="0"/>
-              <a:t>Lambda expressions pose a slightly different challenge when unit testing code. Because they don’t have a name, it’s impossible to directly call them in your test code. You could choose to copy the body of the lambda expression into your test and then test that copy, but this approach has the unfortunate side effect of not actually testing the behavior of your implementation. If you change the implementation code, your test will still pass even though the implementation is performing a different task.</a:t>
-            </a:r>
-          </a:p>
-          <a:p>
-            <a:pPr lvl="1">
-              <a:buNone/>
-            </a:pPr>
-            <a:endParaRPr lang="pt-BR" sz="2400" dirty="0"/>
           </a:p>
         </p:txBody>
       </p:sp>
@@ -7074,10 +8326,202 @@
           </a:p>
         </p:txBody>
       </p:sp>
+      <p:pic>
+        <p:nvPicPr>
+          <p:cNvPr id="1026" name="Picture 2"/>
+          <p:cNvPicPr>
+            <a:picLocks noChangeAspect="1" noChangeArrowheads="1"/>
+          </p:cNvPicPr>
+          <p:nvPr/>
+        </p:nvPicPr>
+        <p:blipFill>
+          <a:blip r:embed="rId3">
+            <a:extLst>
+              <a:ext uri="{28A0092B-C50C-407E-A947-70E740481C1C}">
+                <a14:useLocalDpi xmlns:a14="http://schemas.microsoft.com/office/drawing/2010/main" val="0"/>
+              </a:ext>
+            </a:extLst>
+          </a:blip>
+          <a:srcRect/>
+          <a:stretch>
+            <a:fillRect/>
+          </a:stretch>
+        </p:blipFill>
+        <p:spPr bwMode="auto">
+          <a:xfrm>
+            <a:off x="307975" y="1788749"/>
+            <a:ext cx="7048500" cy="2038350"/>
+          </a:xfrm>
+          <a:prstGeom prst="rect">
+            <a:avLst/>
+          </a:prstGeom>
+          <a:noFill/>
+          <a:ln>
+            <a:noFill/>
+          </a:ln>
+          <a:effectLst/>
+          <a:extLst>
+            <a:ext uri="{909E8E84-426E-40DD-AFC4-6F175D3DCCD1}">
+              <a14:hiddenFill xmlns:a14="http://schemas.microsoft.com/office/drawing/2010/main">
+                <a:solidFill>
+                  <a:schemeClr val="accent1"/>
+                </a:solidFill>
+              </a14:hiddenFill>
+            </a:ext>
+            <a:ext uri="{91240B29-F687-4F45-9708-019B960494DF}">
+              <a14:hiddenLine xmlns:a14="http://schemas.microsoft.com/office/drawing/2010/main" w="9525">
+                <a:solidFill>
+                  <a:schemeClr val="tx1"/>
+                </a:solidFill>
+                <a:miter lim="800000"/>
+                <a:headEnd/>
+                <a:tailEnd/>
+              </a14:hiddenLine>
+            </a:ext>
+            <a:ext uri="{AF507438-7753-43E0-B8FC-AC1667EBCBE1}">
+              <a14:hiddenEffects xmlns:a14="http://schemas.microsoft.com/office/drawing/2010/main">
+                <a:effectLst>
+                  <a:outerShdw dist="35921" dir="2700000" algn="ctr" rotWithShape="0">
+                    <a:schemeClr val="bg2"/>
+                  </a:outerShdw>
+                </a:effectLst>
+              </a14:hiddenEffects>
+            </a:ext>
+          </a:extLst>
+        </p:spPr>
+      </p:pic>
+      <p:pic>
+        <p:nvPicPr>
+          <p:cNvPr id="1027" name="Picture 3"/>
+          <p:cNvPicPr>
+            <a:picLocks noChangeAspect="1" noChangeArrowheads="1"/>
+          </p:cNvPicPr>
+          <p:nvPr/>
+        </p:nvPicPr>
+        <p:blipFill>
+          <a:blip r:embed="rId4">
+            <a:extLst>
+              <a:ext uri="{28A0092B-C50C-407E-A947-70E740481C1C}">
+                <a14:useLocalDpi xmlns:a14="http://schemas.microsoft.com/office/drawing/2010/main" val="0"/>
+              </a:ext>
+            </a:extLst>
+          </a:blip>
+          <a:srcRect/>
+          <a:stretch>
+            <a:fillRect/>
+          </a:stretch>
+        </p:blipFill>
+        <p:spPr bwMode="auto">
+          <a:xfrm>
+            <a:off x="655329" y="2668509"/>
+            <a:ext cx="7858125" cy="2400300"/>
+          </a:xfrm>
+          <a:prstGeom prst="rect">
+            <a:avLst/>
+          </a:prstGeom>
+          <a:noFill/>
+          <a:ln>
+            <a:noFill/>
+          </a:ln>
+          <a:effectLst/>
+          <a:extLst>
+            <a:ext uri="{909E8E84-426E-40DD-AFC4-6F175D3DCCD1}">
+              <a14:hiddenFill xmlns:a14="http://schemas.microsoft.com/office/drawing/2010/main">
+                <a:solidFill>
+                  <a:schemeClr val="accent1"/>
+                </a:solidFill>
+              </a14:hiddenFill>
+            </a:ext>
+            <a:ext uri="{91240B29-F687-4F45-9708-019B960494DF}">
+              <a14:hiddenLine xmlns:a14="http://schemas.microsoft.com/office/drawing/2010/main" w="9525">
+                <a:solidFill>
+                  <a:schemeClr val="tx1"/>
+                </a:solidFill>
+                <a:miter lim="800000"/>
+                <a:headEnd/>
+                <a:tailEnd/>
+              </a14:hiddenLine>
+            </a:ext>
+            <a:ext uri="{AF507438-7753-43E0-B8FC-AC1667EBCBE1}">
+              <a14:hiddenEffects xmlns:a14="http://schemas.microsoft.com/office/drawing/2010/main">
+                <a:effectLst>
+                  <a:outerShdw dist="35921" dir="2700000" algn="ctr" rotWithShape="0">
+                    <a:schemeClr val="bg2"/>
+                  </a:outerShdw>
+                </a:effectLst>
+              </a14:hiddenEffects>
+            </a:ext>
+          </a:extLst>
+        </p:spPr>
+      </p:pic>
+      <p:pic>
+        <p:nvPicPr>
+          <p:cNvPr id="1028" name="Picture 4"/>
+          <p:cNvPicPr>
+            <a:picLocks noChangeAspect="1" noChangeArrowheads="1"/>
+          </p:cNvPicPr>
+          <p:nvPr/>
+        </p:nvPicPr>
+        <p:blipFill>
+          <a:blip r:embed="rId5">
+            <a:extLst>
+              <a:ext uri="{28A0092B-C50C-407E-A947-70E740481C1C}">
+                <a14:useLocalDpi xmlns:a14="http://schemas.microsoft.com/office/drawing/2010/main" val="0"/>
+              </a:ext>
+            </a:extLst>
+          </a:blip>
+          <a:srcRect/>
+          <a:stretch>
+            <a:fillRect/>
+          </a:stretch>
+        </p:blipFill>
+        <p:spPr bwMode="auto">
+          <a:xfrm>
+            <a:off x="3203848" y="3667658"/>
+            <a:ext cx="5359595" cy="2857686"/>
+          </a:xfrm>
+          <a:prstGeom prst="rect">
+            <a:avLst/>
+          </a:prstGeom>
+          <a:noFill/>
+          <a:ln>
+            <a:noFill/>
+          </a:ln>
+          <a:effectLst/>
+          <a:extLst>
+            <a:ext uri="{909E8E84-426E-40DD-AFC4-6F175D3DCCD1}">
+              <a14:hiddenFill xmlns:a14="http://schemas.microsoft.com/office/drawing/2010/main">
+                <a:solidFill>
+                  <a:schemeClr val="accent1"/>
+                </a:solidFill>
+              </a14:hiddenFill>
+            </a:ext>
+            <a:ext uri="{91240B29-F687-4F45-9708-019B960494DF}">
+              <a14:hiddenLine xmlns:a14="http://schemas.microsoft.com/office/drawing/2010/main" w="9525">
+                <a:solidFill>
+                  <a:schemeClr val="tx1"/>
+                </a:solidFill>
+                <a:miter lim="800000"/>
+                <a:headEnd/>
+                <a:tailEnd/>
+              </a14:hiddenLine>
+            </a:ext>
+            <a:ext uri="{AF507438-7753-43E0-B8FC-AC1667EBCBE1}">
+              <a14:hiddenEffects xmlns:a14="http://schemas.microsoft.com/office/drawing/2010/main">
+                <a:effectLst>
+                  <a:outerShdw dist="35921" dir="2700000" algn="ctr" rotWithShape="0">
+                    <a:schemeClr val="bg2"/>
+                  </a:outerShdw>
+                </a:effectLst>
+              </a14:hiddenEffects>
+            </a:ext>
+          </a:extLst>
+        </p:spPr>
+      </p:pic>
     </p:spTree>
     <p:extLst>
       <p:ext uri="{BB962C8B-B14F-4D97-AF65-F5344CB8AC3E}">
-        <p14:creationId xmlns:p14="http://schemas.microsoft.com/office/powerpoint/2010/main" val="1979461865"/>
+        <p14:creationId xmlns:p14="http://schemas.microsoft.com/office/powerpoint/2010/main" val="1913660680"/>
       </p:ext>
     </p:extLst>
   </p:cSld>
@@ -7166,82 +8610,127 @@
           <a:lstStyle/>
           <a:p>
             <a:r>
+              <a:rPr lang="pt-BR" sz="2800" dirty="0">
+                <a:hlinkClick r:id="rId2"/>
+              </a:rPr>
+              <a:t>http://blog.codefx.org/libraries/junit-5-setup</a:t>
+            </a:r>
+            <a:r>
               <a:rPr lang="pt-BR" sz="2800" dirty="0" smtClean="0">
                 <a:hlinkClick r:id="rId2"/>
               </a:rPr>
-              <a:t>http://blog.codeleak.pl/2014/07/junit-testing-exception-with-java-8-and-lambda-expressions.html</a:t>
+              <a:t>/</a:t>
             </a:r>
             <a:endParaRPr lang="pt-BR" sz="2800" dirty="0" smtClean="0"/>
           </a:p>
           <a:p>
-            <a:r>
-              <a:rPr lang="en-US" sz="2800" b="1" dirty="0" err="1" smtClean="0"/>
-              <a:t>JUnit</a:t>
-            </a:r>
-            <a:r>
-              <a:rPr lang="en-US" sz="2800" b="1" dirty="0" smtClean="0"/>
-              <a:t>: testing exception with Java 8 and Lambda Expressions</a:t>
-            </a:r>
-          </a:p>
-          <a:p>
             <a:pPr lvl="1"/>
             <a:r>
-              <a:rPr lang="en-US" sz="2400" dirty="0" smtClean="0"/>
-              <a:t>In </a:t>
-            </a:r>
-            <a:r>
-              <a:rPr lang="en-US" sz="2400" dirty="0" err="1" smtClean="0"/>
-              <a:t>JUnit</a:t>
-            </a:r>
-            <a:r>
-              <a:rPr lang="en-US" sz="2400" dirty="0" smtClean="0"/>
-              <a:t> there are many ways of testing exceptions in test code, including </a:t>
-            </a:r>
-            <a:r>
-              <a:rPr lang="en-US" sz="2400" dirty="0" smtClean="0">
+              <a:rPr lang="en-US" sz="2000" b="1" dirty="0"/>
+              <a:t>Setup</a:t>
+            </a:r>
+          </a:p>
+          <a:p>
+            <a:pPr lvl="1"/>
+            <a:r>
+              <a:rPr lang="en-US" sz="2000" b="1" dirty="0"/>
+              <a:t>Basics</a:t>
+            </a:r>
+          </a:p>
+          <a:p>
+            <a:pPr lvl="1"/>
+            <a:r>
+              <a:rPr lang="en-US" sz="2000" b="1" dirty="0"/>
+              <a:t>Architecture</a:t>
+            </a:r>
+          </a:p>
+          <a:p>
+            <a:pPr lvl="1"/>
+            <a:r>
+              <a:rPr lang="en-US" sz="2000" b="1" dirty="0"/>
+              <a:t>Extension Model</a:t>
+            </a:r>
+          </a:p>
+          <a:p>
+            <a:pPr lvl="1"/>
+            <a:r>
+              <a:rPr lang="en-US" sz="2000" b="1" dirty="0"/>
+              <a:t>Conditions</a:t>
+            </a:r>
+          </a:p>
+          <a:p>
+            <a:pPr lvl="1"/>
+            <a:r>
+              <a:rPr lang="en-US" sz="2000" b="1" dirty="0"/>
+              <a:t>Injection</a:t>
+            </a:r>
+          </a:p>
+          <a:p>
+            <a:pPr lvl="1"/>
+            <a:r>
+              <a:rPr lang="en-US" sz="2000" b="1" dirty="0"/>
+              <a:t>Dynamic Tests</a:t>
+            </a:r>
+            <a:endParaRPr lang="pt-BR" b="1" dirty="0"/>
+          </a:p>
+          <a:p>
+            <a:r>
+              <a:rPr lang="pt-BR" sz="2800">
                 <a:hlinkClick r:id="rId3"/>
               </a:rPr>
-              <a:t>try-catch idiom</a:t>
-            </a:r>
-            <a:r>
-              <a:rPr lang="en-US" sz="2400" dirty="0" smtClean="0"/>
-              <a:t>, </a:t>
-            </a:r>
-            <a:r>
-              <a:rPr lang="en-US" sz="2400" dirty="0" err="1" smtClean="0">
+              <a:t>http://</a:t>
+            </a:r>
+            <a:r>
+              <a:rPr lang="pt-BR" sz="2800">
+                <a:hlinkClick r:id="rId3"/>
+              </a:rPr>
+              <a:t>blog.codefx.org/design/architecture/junit-5-architecture</a:t>
+            </a:r>
+            <a:r>
+              <a:rPr lang="pt-BR" sz="2800" smtClean="0">
+                <a:hlinkClick r:id="rId3"/>
+              </a:rPr>
+              <a:t>/</a:t>
+            </a:r>
+          </a:p>
+          <a:p>
+            <a:r>
+              <a:rPr lang="pt-BR" sz="2800" smtClean="0">
+                <a:hlinkClick r:id="rId3"/>
+              </a:rPr>
+              <a:t>http</a:t>
+            </a:r>
+            <a:r>
+              <a:rPr lang="pt-BR" sz="2800" dirty="0">
+                <a:hlinkClick r:id="rId3"/>
+              </a:rPr>
+              <a:t>://blog.codefx.org/libraries/junit-5-basics</a:t>
+            </a:r>
+            <a:r>
+              <a:rPr lang="pt-BR" sz="2800" dirty="0" smtClean="0">
+                <a:hlinkClick r:id="rId3"/>
+              </a:rPr>
+              <a:t>/</a:t>
+            </a:r>
+            <a:endParaRPr lang="pt-BR" sz="2800" dirty="0" smtClean="0"/>
+          </a:p>
+          <a:p>
+            <a:r>
+              <a:rPr lang="pt-BR" sz="2800" dirty="0">
                 <a:hlinkClick r:id="rId4"/>
               </a:rPr>
-              <a:t>JUnit</a:t>
-            </a:r>
-            <a:r>
-              <a:rPr lang="en-US" sz="2400" dirty="0" smtClean="0">
+              <a:t>http://blog.codefx.org/design/architecture/junit-5-extension-model</a:t>
+            </a:r>
+            <a:r>
+              <a:rPr lang="pt-BR" sz="2800" dirty="0" smtClean="0">
                 <a:hlinkClick r:id="rId4"/>
               </a:rPr>
-              <a:t> @Rule</a:t>
-            </a:r>
-            <a:r>
-              <a:rPr lang="en-US" sz="2400" dirty="0" smtClean="0"/>
-              <a:t>, with </a:t>
-            </a:r>
-            <a:r>
-              <a:rPr lang="en-US" sz="2400" dirty="0" smtClean="0">
-                <a:hlinkClick r:id="rId5"/>
-              </a:rPr>
-              <a:t>catch-exception</a:t>
-            </a:r>
-            <a:r>
-              <a:rPr lang="en-US" sz="2400" dirty="0" smtClean="0"/>
-              <a:t> library. As of Java 8 we have another way of dealing with exceptions: with lambda expressions. In this short blog post I will demonstrate a simple example how one can utilize the power of Java 8 and lambda expressions to test exceptions in </a:t>
-            </a:r>
-            <a:r>
-              <a:rPr lang="en-US" sz="2400" dirty="0" err="1" smtClean="0"/>
-              <a:t>JUnit</a:t>
-            </a:r>
-            <a:r>
-              <a:rPr lang="en-US" sz="2400" dirty="0" smtClean="0"/>
-              <a:t>. </a:t>
-            </a:r>
-            <a:endParaRPr lang="pt-BR" sz="2400" dirty="0"/>
+              <a:t>/</a:t>
+            </a:r>
+            <a:endParaRPr lang="pt-BR" sz="2800" dirty="0" smtClean="0"/>
+          </a:p>
+          <a:p>
+            <a:endParaRPr lang="pt-BR" sz="2800" dirty="0" smtClean="0"/>
           </a:p>
         </p:txBody>
       </p:sp>
@@ -7385,10 +8874,74 @@
           </a:p>
         </p:txBody>
       </p:sp>
+      <p:pic>
+        <p:nvPicPr>
+          <p:cNvPr id="2050" name="Picture 2"/>
+          <p:cNvPicPr>
+            <a:picLocks noChangeAspect="1" noChangeArrowheads="1"/>
+          </p:cNvPicPr>
+          <p:nvPr/>
+        </p:nvPicPr>
+        <p:blipFill>
+          <a:blip r:embed="rId5">
+            <a:extLst>
+              <a:ext uri="{28A0092B-C50C-407E-A947-70E740481C1C}">
+                <a14:useLocalDpi xmlns:a14="http://schemas.microsoft.com/office/drawing/2010/main" val="0"/>
+              </a:ext>
+            </a:extLst>
+          </a:blip>
+          <a:srcRect/>
+          <a:stretch>
+            <a:fillRect/>
+          </a:stretch>
+        </p:blipFill>
+        <p:spPr bwMode="auto">
+          <a:xfrm>
+            <a:off x="5652120" y="3573016"/>
+            <a:ext cx="2876104" cy="2770881"/>
+          </a:xfrm>
+          <a:prstGeom prst="rect">
+            <a:avLst/>
+          </a:prstGeom>
+          <a:noFill/>
+          <a:ln>
+            <a:noFill/>
+          </a:ln>
+          <a:effectLst/>
+          <a:extLst>
+            <a:ext uri="{909E8E84-426E-40DD-AFC4-6F175D3DCCD1}">
+              <a14:hiddenFill xmlns:a14="http://schemas.microsoft.com/office/drawing/2010/main">
+                <a:solidFill>
+                  <a:schemeClr val="accent1"/>
+                </a:solidFill>
+              </a14:hiddenFill>
+            </a:ext>
+            <a:ext uri="{91240B29-F687-4F45-9708-019B960494DF}">
+              <a14:hiddenLine xmlns:a14="http://schemas.microsoft.com/office/drawing/2010/main" w="9525">
+                <a:solidFill>
+                  <a:schemeClr val="tx1"/>
+                </a:solidFill>
+                <a:miter lim="800000"/>
+                <a:headEnd/>
+                <a:tailEnd/>
+              </a14:hiddenLine>
+            </a:ext>
+            <a:ext uri="{AF507438-7753-43E0-B8FC-AC1667EBCBE1}">
+              <a14:hiddenEffects xmlns:a14="http://schemas.microsoft.com/office/drawing/2010/main">
+                <a:effectLst>
+                  <a:outerShdw dist="35921" dir="2700000" algn="ctr" rotWithShape="0">
+                    <a:schemeClr val="bg2"/>
+                  </a:outerShdw>
+                </a:effectLst>
+              </a14:hiddenEffects>
+            </a:ext>
+          </a:extLst>
+        </p:spPr>
+      </p:pic>
     </p:spTree>
     <p:extLst>
       <p:ext uri="{BB962C8B-B14F-4D97-AF65-F5344CB8AC3E}">
-        <p14:creationId xmlns:p14="http://schemas.microsoft.com/office/powerpoint/2010/main" val="1979461865"/>
+        <p14:creationId xmlns:p14="http://schemas.microsoft.com/office/powerpoint/2010/main" val="2025557228"/>
       </p:ext>
     </p:extLst>
   </p:cSld>
@@ -7456,113 +9009,167 @@
       </p:sp>
       <p:sp>
         <p:nvSpPr>
-          <p:cNvPr id="4" name="Title 3"/>
-          <p:cNvSpPr>
-            <a:spLocks noGrp="1"/>
-          </p:cNvSpPr>
-          <p:nvPr>
-            <p:ph type="title"/>
+          <p:cNvPr id="2" name="Espaço Reservado para Conteúdo 1"/>
+          <p:cNvSpPr>
+            <a:spLocks noGrp="1"/>
+          </p:cNvSpPr>
+          <p:nvPr>
+            <p:ph idx="1"/>
           </p:nvPr>
         </p:nvSpPr>
         <p:spPr>
           <a:xfrm>
-            <a:off x="457200" y="228600"/>
-            <a:ext cx="8229600" cy="1400200"/>
+            <a:off x="457200" y="1196752"/>
+            <a:ext cx="8229600" cy="4824536"/>
           </a:xfrm>
         </p:spPr>
         <p:txBody>
           <a:bodyPr>
-            <a:normAutofit fontScale="90000"/>
+            <a:noAutofit/>
           </a:bodyPr>
           <a:lstStyle/>
           <a:p>
             <a:r>
-              <a:rPr lang="pt-BR" dirty="0" smtClean="0">
-                <a:solidFill>
-                  <a:srgbClr val="0070C0"/>
-                </a:solidFill>
-                <a:effectLst>
-                  <a:outerShdw blurRad="38100" dist="38100" dir="2700000" algn="tl">
-                    <a:srgbClr val="000000">
-                      <a:alpha val="43137"/>
-                    </a:srgbClr>
-                  </a:outerShdw>
-                </a:effectLst>
+              <a:rPr lang="pt-BR" sz="2800" dirty="0">
+                <a:hlinkClick r:id="rId2"/>
               </a:rPr>
-              <a:t>Apresentação do </a:t>
-            </a:r>
-            <a:r>
-              <a:rPr lang="en-US" dirty="0">
-                <a:solidFill>
-                  <a:srgbClr val="0070C0"/>
-                </a:solidFill>
-                <a:effectLst>
-                  <a:outerShdw blurRad="38100" dist="38100" dir="2700000" algn="tl">
-                    <a:srgbClr val="000000">
-                      <a:alpha val="43137"/>
-                    </a:srgbClr>
-                  </a:outerShdw>
-                </a:effectLst>
+              <a:t>http://blog.so-geht-software.de/2016/02/whats-new-in-junit-5</a:t>
+            </a:r>
+            <a:r>
+              <a:rPr lang="pt-BR" sz="2800" dirty="0" smtClean="0">
+                <a:hlinkClick r:id="rId2"/>
               </a:rPr>
-              <a:t>MATLAB </a:t>
-            </a:r>
-            <a:r>
-              <a:rPr lang="en-US" dirty="0" err="1">
-                <a:solidFill>
-                  <a:srgbClr val="0070C0"/>
-                </a:solidFill>
-                <a:effectLst>
-                  <a:outerShdw blurRad="38100" dist="38100" dir="2700000" algn="tl">
-                    <a:srgbClr val="000000">
-                      <a:alpha val="43137"/>
-                    </a:srgbClr>
-                  </a:outerShdw>
-                </a:effectLst>
+              <a:t>/</a:t>
+            </a:r>
+            <a:endParaRPr lang="pt-BR" sz="2800" dirty="0" smtClean="0"/>
+          </a:p>
+          <a:p>
+            <a:pPr lvl="1"/>
+            <a:r>
+              <a:rPr lang="pt-BR" sz="2400" b="1" dirty="0" err="1" smtClean="0"/>
+              <a:t>Assertions</a:t>
+            </a:r>
+            <a:endParaRPr lang="pt-BR" sz="2400" b="1" dirty="0" smtClean="0"/>
+          </a:p>
+          <a:p>
+            <a:pPr lvl="1"/>
+            <a:r>
+              <a:rPr lang="en-US" sz="2400" b="1" dirty="0"/>
+              <a:t>Assumptions, tags and disabled tests</a:t>
+            </a:r>
+          </a:p>
+          <a:p>
+            <a:pPr lvl="1"/>
+            <a:r>
+              <a:rPr lang="pt-BR" sz="2400" b="1" dirty="0" err="1"/>
+              <a:t>Extension</a:t>
+            </a:r>
+            <a:r>
+              <a:rPr lang="pt-BR" sz="2400" b="1" dirty="0"/>
+              <a:t> </a:t>
+            </a:r>
+            <a:r>
+              <a:rPr lang="pt-BR" sz="2400" b="1" dirty="0" err="1"/>
+              <a:t>model</a:t>
+            </a:r>
+            <a:endParaRPr lang="pt-BR" sz="2400" b="1" dirty="0"/>
+          </a:p>
+          <a:p>
+            <a:pPr lvl="1"/>
+            <a:r>
+              <a:rPr lang="en-US" sz="2400" b="1" dirty="0"/>
+              <a:t>Can I use </a:t>
+            </a:r>
+            <a:r>
+              <a:rPr lang="en-US" sz="2400" b="1" dirty="0" err="1"/>
+              <a:t>Hamcrest</a:t>
+            </a:r>
+            <a:r>
+              <a:rPr lang="en-US" sz="2400" b="1" dirty="0"/>
+              <a:t> Matchers or </a:t>
+            </a:r>
+            <a:r>
+              <a:rPr lang="en-US" sz="2400" b="1" dirty="0" err="1"/>
+              <a:t>AssertJ</a:t>
+            </a:r>
+            <a:r>
+              <a:rPr lang="en-US" sz="2400" b="1" dirty="0"/>
+              <a:t> with </a:t>
+            </a:r>
+            <a:r>
+              <a:rPr lang="en-US" sz="2400" b="1" dirty="0" err="1"/>
+              <a:t>JUnit</a:t>
+            </a:r>
+            <a:r>
+              <a:rPr lang="en-US" sz="2400" b="1" dirty="0"/>
+              <a:t> 5?</a:t>
+            </a:r>
+          </a:p>
+          <a:p>
+            <a:r>
+              <a:rPr lang="en-US" sz="2400" b="1" dirty="0"/>
+              <a:t>What’s next?</a:t>
+            </a:r>
+          </a:p>
+          <a:p>
+            <a:r>
+              <a:rPr lang="en-US" sz="2400" dirty="0"/>
+              <a:t>There is no roadmap on the project’s </a:t>
+            </a:r>
+            <a:r>
+              <a:rPr lang="en-US" sz="2400" dirty="0" err="1">
+                <a:hlinkClick r:id="rId3"/>
               </a:rPr>
-              <a:t>xUnit</a:t>
-            </a:r>
-            <a:r>
-              <a:rPr lang="en-US" dirty="0">
-                <a:solidFill>
-                  <a:srgbClr val="0070C0"/>
-                </a:solidFill>
-                <a:effectLst>
-                  <a:outerShdw blurRad="38100" dist="38100" dir="2700000" algn="tl">
-                    <a:srgbClr val="000000">
-                      <a:alpha val="43137"/>
-                    </a:srgbClr>
-                  </a:outerShdw>
-                </a:effectLst>
+              <a:t>GitHub</a:t>
+            </a:r>
+            <a:r>
+              <a:rPr lang="en-US" sz="2400" dirty="0">
+                <a:hlinkClick r:id="rId3"/>
               </a:rPr>
-              <a:t> Test </a:t>
-            </a:r>
-            <a:r>
-              <a:rPr lang="pt-BR" dirty="0" smtClean="0">
-                <a:solidFill>
-                  <a:srgbClr val="0070C0"/>
-                </a:solidFill>
-                <a:effectLst>
-                  <a:outerShdw blurRad="38100" dist="38100" dir="2700000" algn="tl">
-                    <a:srgbClr val="000000">
-                      <a:alpha val="43137"/>
-                    </a:srgbClr>
-                  </a:outerShdw>
-                </a:effectLst>
-              </a:rPr>
-              <a:t>Framework</a:t>
-            </a:r>
-            <a:endParaRPr lang="pt-BR" dirty="0">
-              <a:solidFill>
-                <a:srgbClr val="0070C0"/>
-              </a:solidFill>
-              <a:effectLst>
-                <a:outerShdw blurRad="38100" dist="38100" dir="2700000" algn="tl">
-                  <a:srgbClr val="000000">
-                    <a:alpha val="43137"/>
-                  </a:srgbClr>
-                </a:outerShdw>
-              </a:effectLst>
-            </a:endParaRPr>
+              <a:t> page</a:t>
+            </a:r>
+            <a:r>
+              <a:rPr lang="en-US" sz="2400" dirty="0"/>
+              <a:t>. </a:t>
+            </a:r>
+            <a:r>
+              <a:rPr lang="en-US" sz="2400" dirty="0" err="1"/>
+              <a:t>JUnit</a:t>
+            </a:r>
+            <a:r>
+              <a:rPr lang="en-US" sz="2400" dirty="0"/>
+              <a:t> 5 is alpha now, feel free to test it and give your feedback. The team has built integration modules for </a:t>
+            </a:r>
+            <a:r>
+              <a:rPr lang="en-US" sz="2400" dirty="0" err="1"/>
+              <a:t>Gradle</a:t>
+            </a:r>
+            <a:r>
+              <a:rPr lang="en-US" sz="2400" dirty="0"/>
+              <a:t> and Maven Surefire. If you would like to run </a:t>
+            </a:r>
+            <a:r>
+              <a:rPr lang="en-US" sz="2400" dirty="0" err="1"/>
+              <a:t>JUnit</a:t>
+            </a:r>
+            <a:r>
+              <a:rPr lang="en-US" sz="2400" dirty="0"/>
+              <a:t> 5 tests in your IDE you can use the </a:t>
+            </a:r>
+            <a:r>
+              <a:rPr lang="en-US" sz="2400" dirty="0" err="1"/>
+              <a:t>JUnit</a:t>
+            </a:r>
+            <a:r>
+              <a:rPr lang="en-US" sz="2400" dirty="0"/>
+              <a:t> 4 Runner.</a:t>
+            </a:r>
+          </a:p>
+          <a:p>
+            <a:endParaRPr lang="pt-BR" b="1" dirty="0"/>
+          </a:p>
+          <a:p>
+            <a:endParaRPr lang="pt-BR" sz="2800" dirty="0" smtClean="0"/>
           </a:p>
         </p:txBody>
       </p:sp>
@@ -7644,18 +9251,78 @@
           </a:p>
         </p:txBody>
       </p:sp>
+      <p:sp>
+        <p:nvSpPr>
+          <p:cNvPr id="9" name="Title 3"/>
+          <p:cNvSpPr>
+            <a:spLocks noGrp="1"/>
+          </p:cNvSpPr>
+          <p:nvPr>
+            <p:ph type="title"/>
+          </p:nvPr>
+        </p:nvSpPr>
+        <p:spPr/>
+        <p:txBody>
+          <a:bodyPr>
+            <a:normAutofit/>
+          </a:bodyPr>
+          <a:lstStyle/>
+          <a:p>
+            <a:r>
+              <a:rPr lang="en-US" dirty="0" err="1" smtClean="0">
+                <a:solidFill>
+                  <a:srgbClr val="0070C0"/>
+                </a:solidFill>
+                <a:effectLst>
+                  <a:outerShdw blurRad="38100" dist="38100" dir="2700000" algn="tl">
+                    <a:srgbClr val="000000">
+                      <a:alpha val="43137"/>
+                    </a:srgbClr>
+                  </a:outerShdw>
+                </a:effectLst>
+              </a:rPr>
+              <a:t>JUnit</a:t>
+            </a:r>
+            <a:r>
+              <a:rPr lang="en-US" dirty="0" smtClean="0">
+                <a:solidFill>
+                  <a:srgbClr val="0070C0"/>
+                </a:solidFill>
+                <a:effectLst>
+                  <a:outerShdw blurRad="38100" dist="38100" dir="2700000" algn="tl">
+                    <a:srgbClr val="000000">
+                      <a:alpha val="43137"/>
+                    </a:srgbClr>
+                  </a:outerShdw>
+                </a:effectLst>
+              </a:rPr>
+              <a:t> 5 Test Framework</a:t>
+            </a:r>
+            <a:endParaRPr lang="en-US" dirty="0">
+              <a:solidFill>
+                <a:srgbClr val="0070C0"/>
+              </a:solidFill>
+              <a:effectLst>
+                <a:outerShdw blurRad="38100" dist="38100" dir="2700000" algn="tl">
+                  <a:srgbClr val="000000">
+                    <a:alpha val="43137"/>
+                  </a:srgbClr>
+                </a:outerShdw>
+              </a:effectLst>
+            </a:endParaRPr>
+          </a:p>
+        </p:txBody>
+      </p:sp>
       <p:pic>
         <p:nvPicPr>
-          <p:cNvPr id="2050" name="Picture 2" descr="https://d1sui4xqepm0ps.cloudfront.net/categories/example"/>
+          <p:cNvPr id="2050" name="Picture 2"/>
           <p:cNvPicPr>
-            <a:picLocks noGrp="1" noChangeAspect="1" noChangeArrowheads="1"/>
+            <a:picLocks noChangeAspect="1" noChangeArrowheads="1"/>
           </p:cNvPicPr>
-          <p:nvPr>
-            <p:ph idx="1"/>
-          </p:nvPr>
+          <p:nvPr/>
         </p:nvPicPr>
         <p:blipFill>
-          <a:blip r:embed="rId2" cstate="print">
+          <a:blip r:embed="rId4">
             <a:extLst>
               <a:ext uri="{28A0092B-C50C-407E-A947-70E740481C1C}">
                 <a14:useLocalDpi xmlns:a14="http://schemas.microsoft.com/office/drawing/2010/main" val="0"/>
@@ -7669,20 +9336,43 @@
         </p:blipFill>
         <p:spPr bwMode="auto">
           <a:xfrm>
-            <a:off x="2540000" y="2612231"/>
-            <a:ext cx="4064000" cy="1968500"/>
+            <a:off x="5652120" y="3573016"/>
+            <a:ext cx="2876104" cy="2770881"/>
           </a:xfrm>
           <a:prstGeom prst="rect">
             <a:avLst/>
           </a:prstGeom>
           <a:noFill/>
+          <a:ln>
+            <a:noFill/>
+          </a:ln>
+          <a:effectLst/>
           <a:extLst>
             <a:ext uri="{909E8E84-426E-40DD-AFC4-6F175D3DCCD1}">
               <a14:hiddenFill xmlns:a14="http://schemas.microsoft.com/office/drawing/2010/main">
                 <a:solidFill>
-                  <a:srgbClr val="FFFFFF"/>
+                  <a:schemeClr val="accent1"/>
                 </a:solidFill>
               </a14:hiddenFill>
+            </a:ext>
+            <a:ext uri="{91240B29-F687-4F45-9708-019B960494DF}">
+              <a14:hiddenLine xmlns:a14="http://schemas.microsoft.com/office/drawing/2010/main" w="9525">
+                <a:solidFill>
+                  <a:schemeClr val="tx1"/>
+                </a:solidFill>
+                <a:miter lim="800000"/>
+                <a:headEnd/>
+                <a:tailEnd/>
+              </a14:hiddenLine>
+            </a:ext>
+            <a:ext uri="{AF507438-7753-43E0-B8FC-AC1667EBCBE1}">
+              <a14:hiddenEffects xmlns:a14="http://schemas.microsoft.com/office/drawing/2010/main">
+                <a:effectLst>
+                  <a:outerShdw dist="35921" dir="2700000" algn="ctr" rotWithShape="0">
+                    <a:schemeClr val="bg2"/>
+                  </a:outerShdw>
+                </a:effectLst>
+              </a14:hiddenEffects>
             </a:ext>
           </a:extLst>
         </p:spPr>
@@ -7690,7 +9380,7 @@
     </p:spTree>
     <p:extLst>
       <p:ext uri="{BB962C8B-B14F-4D97-AF65-F5344CB8AC3E}">
-        <p14:creationId xmlns:p14="http://schemas.microsoft.com/office/powerpoint/2010/main" val="3792145510"/>
+        <p14:creationId xmlns:p14="http://schemas.microsoft.com/office/powerpoint/2010/main" val="27869342"/>
       </p:ext>
     </p:extLst>
   </p:cSld>
@@ -7758,6 +9448,149 @@
       </p:sp>
       <p:sp>
         <p:nvSpPr>
+          <p:cNvPr id="2" name="Espaço Reservado para Conteúdo 1"/>
+          <p:cNvSpPr>
+            <a:spLocks noGrp="1"/>
+          </p:cNvSpPr>
+          <p:nvPr>
+            <p:ph idx="1"/>
+          </p:nvPr>
+        </p:nvSpPr>
+        <p:spPr>
+          <a:xfrm>
+            <a:off x="457200" y="1196752"/>
+            <a:ext cx="8229600" cy="4824536"/>
+          </a:xfrm>
+        </p:spPr>
+        <p:txBody>
+          <a:bodyPr>
+            <a:noAutofit/>
+          </a:bodyPr>
+          <a:lstStyle/>
+          <a:p>
+            <a:r>
+              <a:rPr lang="pt-BR" sz="2800" dirty="0">
+                <a:hlinkClick r:id="rId2"/>
+              </a:rPr>
+              <a:t>https://</a:t>
+            </a:r>
+            <a:r>
+              <a:rPr lang="pt-BR" sz="2800" dirty="0" smtClean="0">
+                <a:hlinkClick r:id="rId2"/>
+              </a:rPr>
+              <a:t>dzone.com/articles/junit-5-basics</a:t>
+            </a:r>
+            <a:endParaRPr lang="pt-BR" sz="2800" dirty="0" smtClean="0"/>
+          </a:p>
+          <a:p>
+            <a:r>
+              <a:rPr lang="pt-BR" b="1" dirty="0"/>
+              <a:t>Test </a:t>
+            </a:r>
+            <a:r>
+              <a:rPr lang="pt-BR" b="1" dirty="0" err="1" smtClean="0"/>
+              <a:t>Lifecycle</a:t>
+            </a:r>
+            <a:endParaRPr lang="pt-BR" b="1" dirty="0" smtClean="0"/>
+          </a:p>
+          <a:p>
+            <a:pPr lvl="1"/>
+            <a:r>
+              <a:rPr lang="pt-BR" b="1" dirty="0"/>
+              <a:t>@Test</a:t>
+            </a:r>
+          </a:p>
+          <a:p>
+            <a:pPr lvl="1"/>
+            <a:r>
+              <a:rPr lang="pt-BR" b="1" dirty="0" err="1"/>
+              <a:t>Before</a:t>
+            </a:r>
+            <a:r>
+              <a:rPr lang="pt-BR" b="1" dirty="0"/>
+              <a:t> </a:t>
+            </a:r>
+            <a:r>
+              <a:rPr lang="pt-BR" b="1" dirty="0" err="1"/>
+              <a:t>and</a:t>
+            </a:r>
+            <a:r>
+              <a:rPr lang="pt-BR" b="1" dirty="0"/>
+              <a:t> </a:t>
+            </a:r>
+            <a:r>
+              <a:rPr lang="pt-BR" b="1" dirty="0" err="1"/>
+              <a:t>After</a:t>
+            </a:r>
+            <a:endParaRPr lang="pt-BR" b="1" dirty="0"/>
+          </a:p>
+          <a:p>
+            <a:pPr lvl="1"/>
+            <a:r>
+              <a:rPr lang="pt-BR" dirty="0"/>
+              <a:t>@</a:t>
+            </a:r>
+            <a:r>
+              <a:rPr lang="pt-BR" dirty="0" err="1" smtClean="0"/>
+              <a:t>Disabled</a:t>
+            </a:r>
+            <a:endParaRPr lang="pt-BR" dirty="0" smtClean="0"/>
+          </a:p>
+          <a:p>
+            <a:pPr lvl="1"/>
+            <a:r>
+              <a:rPr lang="pt-BR" b="1" dirty="0" err="1"/>
+              <a:t>Assertions</a:t>
+            </a:r>
+            <a:endParaRPr lang="pt-BR" b="1" dirty="0"/>
+          </a:p>
+          <a:p>
+            <a:pPr lvl="1"/>
+            <a:r>
+              <a:rPr lang="pt-BR" b="1" dirty="0" err="1"/>
+              <a:t>Extended</a:t>
+            </a:r>
+            <a:endParaRPr lang="pt-BR" b="1" dirty="0"/>
+          </a:p>
+          <a:p>
+            <a:pPr lvl="1"/>
+            <a:r>
+              <a:rPr lang="pt-BR" b="1" dirty="0" err="1"/>
+              <a:t>Assumptions</a:t>
+            </a:r>
+            <a:endParaRPr lang="pt-BR" b="1" dirty="0"/>
+          </a:p>
+          <a:p>
+            <a:pPr lvl="1"/>
+            <a:r>
+              <a:rPr lang="pt-BR" dirty="0"/>
+              <a:t>'@</a:t>
+            </a:r>
+            <a:r>
+              <a:rPr lang="pt-BR" dirty="0" err="1" smtClean="0"/>
+              <a:t>Nested</a:t>
+            </a:r>
+            <a:r>
+              <a:rPr lang="pt-BR" dirty="0" smtClean="0"/>
+              <a:t>‘</a:t>
+            </a:r>
+          </a:p>
+          <a:p>
+            <a:pPr lvl="1"/>
+            <a:r>
+              <a:rPr lang="pt-BR" dirty="0"/>
+              <a:t>@</a:t>
+            </a:r>
+            <a:r>
+              <a:rPr lang="pt-BR" dirty="0" err="1"/>
+              <a:t>DisplayName</a:t>
+            </a:r>
+            <a:endParaRPr lang="pt-BR" b="1" dirty="0"/>
+          </a:p>
+        </p:txBody>
+      </p:sp>
+      <p:sp>
+        <p:nvSpPr>
           <p:cNvPr id="5" name="AutoShape 2" descr="G:\HD-Games\GitRepos\DesignPatterns\CAP392-02-PloP\artigos\03 - Pattern Language\entrega final\family-guy-simpsons2.webp"/>
           <p:cNvSpPr>
             <a:spLocks noChangeAspect="1" noChangeArrowheads="1"/>
@@ -7834,16 +9667,78 @@
           </a:p>
         </p:txBody>
       </p:sp>
+      <p:sp>
+        <p:nvSpPr>
+          <p:cNvPr id="9" name="Title 3"/>
+          <p:cNvSpPr>
+            <a:spLocks noGrp="1"/>
+          </p:cNvSpPr>
+          <p:nvPr>
+            <p:ph type="title"/>
+          </p:nvPr>
+        </p:nvSpPr>
+        <p:spPr/>
+        <p:txBody>
+          <a:bodyPr>
+            <a:normAutofit/>
+          </a:bodyPr>
+          <a:lstStyle/>
+          <a:p>
+            <a:r>
+              <a:rPr lang="en-US" dirty="0" err="1" smtClean="0">
+                <a:solidFill>
+                  <a:srgbClr val="0070C0"/>
+                </a:solidFill>
+                <a:effectLst>
+                  <a:outerShdw blurRad="38100" dist="38100" dir="2700000" algn="tl">
+                    <a:srgbClr val="000000">
+                      <a:alpha val="43137"/>
+                    </a:srgbClr>
+                  </a:outerShdw>
+                </a:effectLst>
+              </a:rPr>
+              <a:t>JUnit</a:t>
+            </a:r>
+            <a:r>
+              <a:rPr lang="en-US" dirty="0" smtClean="0">
+                <a:solidFill>
+                  <a:srgbClr val="0070C0"/>
+                </a:solidFill>
+                <a:effectLst>
+                  <a:outerShdw blurRad="38100" dist="38100" dir="2700000" algn="tl">
+                    <a:srgbClr val="000000">
+                      <a:alpha val="43137"/>
+                    </a:srgbClr>
+                  </a:outerShdw>
+                </a:effectLst>
+              </a:rPr>
+              <a:t> 5 Test Framework</a:t>
+            </a:r>
+            <a:endParaRPr lang="en-US" dirty="0">
+              <a:solidFill>
+                <a:srgbClr val="0070C0"/>
+              </a:solidFill>
+              <a:effectLst>
+                <a:outerShdw blurRad="38100" dist="38100" dir="2700000" algn="tl">
+                  <a:srgbClr val="000000">
+                    <a:alpha val="43137"/>
+                  </a:srgbClr>
+                </a:outerShdw>
+              </a:effectLst>
+            </a:endParaRPr>
+          </a:p>
+        </p:txBody>
+      </p:sp>
       <p:pic>
         <p:nvPicPr>
-          <p:cNvPr id="4099" name="Picture 3"/>
+          <p:cNvPr id="2050" name="Picture 2"/>
           <p:cNvPicPr>
             <a:picLocks noChangeAspect="1" noChangeArrowheads="1"/>
           </p:cNvPicPr>
           <p:nvPr/>
         </p:nvPicPr>
         <p:blipFill>
-          <a:blip r:embed="rId2" cstate="print">
+          <a:blip r:embed="rId3">
             <a:extLst>
               <a:ext uri="{28A0092B-C50C-407E-A947-70E740481C1C}">
                 <a14:useLocalDpi xmlns:a14="http://schemas.microsoft.com/office/drawing/2010/main" val="0"/>
@@ -7857,8 +9752,8 @@
         </p:blipFill>
         <p:spPr bwMode="auto">
           <a:xfrm>
-            <a:off x="457200" y="1268760"/>
-            <a:ext cx="8229600" cy="5238750"/>
+            <a:off x="5652120" y="3573016"/>
+            <a:ext cx="2876104" cy="2770881"/>
           </a:xfrm>
           <a:prstGeom prst="rect">
             <a:avLst/>
@@ -7898,57 +9793,10 @@
           </a:extLst>
         </p:spPr>
       </p:pic>
-      <p:sp>
-        <p:nvSpPr>
-          <p:cNvPr id="13" name="Title 3"/>
-          <p:cNvSpPr>
-            <a:spLocks noGrp="1"/>
-          </p:cNvSpPr>
-          <p:nvPr>
-            <p:ph type="title"/>
-          </p:nvPr>
-        </p:nvSpPr>
-        <p:spPr/>
-        <p:txBody>
-          <a:bodyPr>
-            <a:normAutofit/>
-          </a:bodyPr>
-          <a:lstStyle/>
-          <a:p>
-            <a:r>
-              <a:rPr lang="pt-BR" dirty="0" smtClean="0">
-                <a:solidFill>
-                  <a:srgbClr val="0070C0"/>
-                </a:solidFill>
-                <a:effectLst>
-                  <a:outerShdw blurRad="38100" dist="38100" dir="2700000" algn="tl">
-                    <a:srgbClr val="000000">
-                      <a:alpha val="43137"/>
-                    </a:srgbClr>
-                  </a:outerShdw>
-                </a:effectLst>
-              </a:rPr>
-              <a:t>Exemplo - Função</a:t>
-            </a:r>
-            <a:endParaRPr lang="pt-BR" dirty="0">
-              <a:solidFill>
-                <a:srgbClr val="0070C0"/>
-              </a:solidFill>
-              <a:effectLst>
-                <a:outerShdw blurRad="38100" dist="38100" dir="2700000" algn="tl">
-                  <a:srgbClr val="000000">
-                    <a:alpha val="43137"/>
-                  </a:srgbClr>
-                </a:outerShdw>
-              </a:effectLst>
-            </a:endParaRPr>
-          </a:p>
-        </p:txBody>
-      </p:sp>
     </p:spTree>
     <p:extLst>
       <p:ext uri="{BB962C8B-B14F-4D97-AF65-F5344CB8AC3E}">
-        <p14:creationId xmlns:p14="http://schemas.microsoft.com/office/powerpoint/2010/main" val="3659421261"/>
+        <p14:creationId xmlns:p14="http://schemas.microsoft.com/office/powerpoint/2010/main" val="1559868461"/>
       </p:ext>
     </p:extLst>
   </p:cSld>
@@ -8016,6 +9864,71 @@
       </p:sp>
       <p:sp>
         <p:nvSpPr>
+          <p:cNvPr id="2" name="Espaço Reservado para Conteúdo 1"/>
+          <p:cNvSpPr>
+            <a:spLocks noGrp="1"/>
+          </p:cNvSpPr>
+          <p:nvPr>
+            <p:ph idx="1"/>
+          </p:nvPr>
+        </p:nvSpPr>
+        <p:spPr>
+          <a:xfrm>
+            <a:off x="457200" y="1196752"/>
+            <a:ext cx="8229600" cy="5328592"/>
+          </a:xfrm>
+        </p:spPr>
+        <p:txBody>
+          <a:bodyPr>
+            <a:noAutofit/>
+          </a:bodyPr>
+          <a:lstStyle/>
+          <a:p>
+            <a:r>
+              <a:rPr lang="pt-BR" sz="2800" dirty="0" smtClean="0">
+                <a:hlinkClick r:id="rId2"/>
+              </a:rPr>
+              <a:t>http://radar.oreilly.com/2014/12/unit-testing-java-8-lambda-expressions-and-streams.html</a:t>
+            </a:r>
+            <a:endParaRPr lang="pt-BR" sz="2800" dirty="0" smtClean="0"/>
+          </a:p>
+          <a:p>
+            <a:r>
+              <a:rPr lang="en-US" sz="2800" b="1" dirty="0" smtClean="0"/>
+              <a:t>Unit Testing Java 8 Lambda Expressions and Streams</a:t>
+            </a:r>
+          </a:p>
+          <a:p>
+            <a:r>
+              <a:rPr lang="en-US" sz="2800" b="1" dirty="0" smtClean="0"/>
+              <a:t>Two approaches to testing </a:t>
+            </a:r>
+            <a:r>
+              <a:rPr lang="en-US" sz="2800" b="1" dirty="0" err="1" smtClean="0"/>
+              <a:t>lambdafied</a:t>
+            </a:r>
+            <a:r>
+              <a:rPr lang="en-US" sz="2800" b="1" dirty="0" smtClean="0"/>
+              <a:t> code.</a:t>
+            </a:r>
+          </a:p>
+          <a:p>
+            <a:pPr lvl="1"/>
+            <a:r>
+              <a:rPr lang="en-US" sz="2400" dirty="0" smtClean="0"/>
+              <a:t>Lambda expressions pose a slightly different challenge when unit testing code. Because they don’t have a name, it’s impossible to directly call them in your test code. You could choose to copy the body of the lambda expression into your test and then test that copy, but this approach has the unfortunate side effect of not actually testing the behavior of your implementation. If you change the implementation code, your test will still pass even though the implementation is performing a different task.</a:t>
+            </a:r>
+          </a:p>
+          <a:p>
+            <a:pPr lvl="1">
+              <a:buNone/>
+            </a:pPr>
+            <a:endParaRPr lang="pt-BR" sz="2400" dirty="0"/>
+          </a:p>
+        </p:txBody>
+      </p:sp>
+      <p:sp>
+        <p:nvSpPr>
           <p:cNvPr id="5" name="AutoShape 2" descr="G:\HD-Games\GitRepos\DesignPatterns\CAP392-02-PloP\artigos\03 - Pattern Language\entrega final\family-guy-simpsons2.webp"/>
           <p:cNvSpPr>
             <a:spLocks noChangeAspect="1" noChangeArrowheads="1"/>
@@ -8094,7 +10007,7 @@
       </p:sp>
       <p:sp>
         <p:nvSpPr>
-          <p:cNvPr id="13" name="Title 3"/>
+          <p:cNvPr id="9" name="Title 3"/>
           <p:cNvSpPr>
             <a:spLocks noGrp="1"/>
           </p:cNvSpPr>
@@ -8110,7 +10023,7 @@
           <a:lstStyle/>
           <a:p>
             <a:r>
-              <a:rPr lang="pt-BR" dirty="0" smtClean="0">
+              <a:rPr lang="en-US" dirty="0" err="1" smtClean="0">
                 <a:solidFill>
                   <a:srgbClr val="0070C0"/>
                 </a:solidFill>
@@ -8122,9 +10035,24 @@
                   </a:outerShdw>
                 </a:effectLst>
               </a:rPr>
-              <a:t>Exemplo – Função (Código Teste)</a:t>
-            </a:r>
-            <a:endParaRPr lang="pt-BR" dirty="0">
+              <a:t>JUnit</a:t>
+            </a:r>
+            <a:r>
+              <a:rPr lang="en-US" dirty="0" smtClean="0">
+                <a:solidFill>
+                  <a:srgbClr val="0070C0"/>
+                </a:solidFill>
+                <a:effectLst>
+                  <a:outerShdw blurRad="38100" dist="38100" dir="2700000" algn="tl">
+                    <a:srgbClr val="000000">
+                      <a:alpha val="43137"/>
+                    </a:srgbClr>
+                  </a:outerShdw>
+                </a:effectLst>
+              </a:rPr>
+              <a:t> 5 Test Framework</a:t>
+            </a:r>
+            <a:endParaRPr lang="en-US" dirty="0">
               <a:solidFill>
                 <a:srgbClr val="0070C0"/>
               </a:solidFill>
@@ -8139,138 +10067,10 @@
           </a:p>
         </p:txBody>
       </p:sp>
-      <p:pic>
-        <p:nvPicPr>
-          <p:cNvPr id="5123" name="Picture 3"/>
-          <p:cNvPicPr>
-            <a:picLocks noChangeAspect="1" noChangeArrowheads="1"/>
-          </p:cNvPicPr>
-          <p:nvPr/>
-        </p:nvPicPr>
-        <p:blipFill>
-          <a:blip r:embed="rId2" cstate="print">
-            <a:extLst>
-              <a:ext uri="{28A0092B-C50C-407E-A947-70E740481C1C}">
-                <a14:useLocalDpi xmlns:a14="http://schemas.microsoft.com/office/drawing/2010/main" val="0"/>
-              </a:ext>
-            </a:extLst>
-          </a:blip>
-          <a:srcRect/>
-          <a:stretch>
-            <a:fillRect/>
-          </a:stretch>
-        </p:blipFill>
-        <p:spPr bwMode="auto">
-          <a:xfrm>
-            <a:off x="321645" y="1124744"/>
-            <a:ext cx="8210550" cy="3990975"/>
-          </a:xfrm>
-          <a:prstGeom prst="rect">
-            <a:avLst/>
-          </a:prstGeom>
-          <a:noFill/>
-          <a:ln>
-            <a:noFill/>
-          </a:ln>
-          <a:effectLst/>
-          <a:extLst>
-            <a:ext uri="{909E8E84-426E-40DD-AFC4-6F175D3DCCD1}">
-              <a14:hiddenFill xmlns:a14="http://schemas.microsoft.com/office/drawing/2010/main">
-                <a:solidFill>
-                  <a:schemeClr val="accent1"/>
-                </a:solidFill>
-              </a14:hiddenFill>
-            </a:ext>
-            <a:ext uri="{91240B29-F687-4F45-9708-019B960494DF}">
-              <a14:hiddenLine xmlns:a14="http://schemas.microsoft.com/office/drawing/2010/main" w="9525">
-                <a:solidFill>
-                  <a:schemeClr val="tx1"/>
-                </a:solidFill>
-                <a:miter lim="800000"/>
-                <a:headEnd/>
-                <a:tailEnd/>
-              </a14:hiddenLine>
-            </a:ext>
-            <a:ext uri="{AF507438-7753-43E0-B8FC-AC1667EBCBE1}">
-              <a14:hiddenEffects xmlns:a14="http://schemas.microsoft.com/office/drawing/2010/main">
-                <a:effectLst>
-                  <a:outerShdw dist="35921" dir="2700000" algn="ctr" rotWithShape="0">
-                    <a:schemeClr val="bg2"/>
-                  </a:outerShdw>
-                </a:effectLst>
-              </a14:hiddenEffects>
-            </a:ext>
-          </a:extLst>
-        </p:spPr>
-      </p:pic>
-      <p:pic>
-        <p:nvPicPr>
-          <p:cNvPr id="5124" name="Picture 4"/>
-          <p:cNvPicPr>
-            <a:picLocks noChangeAspect="1" noChangeArrowheads="1"/>
-          </p:cNvPicPr>
-          <p:nvPr/>
-        </p:nvPicPr>
-        <p:blipFill>
-          <a:blip r:embed="rId3" cstate="print">
-            <a:extLst>
-              <a:ext uri="{28A0092B-C50C-407E-A947-70E740481C1C}">
-                <a14:useLocalDpi xmlns:a14="http://schemas.microsoft.com/office/drawing/2010/main" val="0"/>
-              </a:ext>
-            </a:extLst>
-          </a:blip>
-          <a:srcRect/>
-          <a:stretch>
-            <a:fillRect/>
-          </a:stretch>
-        </p:blipFill>
-        <p:spPr bwMode="auto">
-          <a:xfrm>
-            <a:off x="647071" y="2276872"/>
-            <a:ext cx="8210550" cy="4000500"/>
-          </a:xfrm>
-          <a:prstGeom prst="rect">
-            <a:avLst/>
-          </a:prstGeom>
-          <a:noFill/>
-          <a:ln>
-            <a:noFill/>
-          </a:ln>
-          <a:effectLst/>
-          <a:extLst>
-            <a:ext uri="{909E8E84-426E-40DD-AFC4-6F175D3DCCD1}">
-              <a14:hiddenFill xmlns:a14="http://schemas.microsoft.com/office/drawing/2010/main">
-                <a:solidFill>
-                  <a:schemeClr val="accent1"/>
-                </a:solidFill>
-              </a14:hiddenFill>
-            </a:ext>
-            <a:ext uri="{91240B29-F687-4F45-9708-019B960494DF}">
-              <a14:hiddenLine xmlns:a14="http://schemas.microsoft.com/office/drawing/2010/main" w="9525">
-                <a:solidFill>
-                  <a:schemeClr val="tx1"/>
-                </a:solidFill>
-                <a:miter lim="800000"/>
-                <a:headEnd/>
-                <a:tailEnd/>
-              </a14:hiddenLine>
-            </a:ext>
-            <a:ext uri="{AF507438-7753-43E0-B8FC-AC1667EBCBE1}">
-              <a14:hiddenEffects xmlns:a14="http://schemas.microsoft.com/office/drawing/2010/main">
-                <a:effectLst>
-                  <a:outerShdw dist="35921" dir="2700000" algn="ctr" rotWithShape="0">
-                    <a:schemeClr val="bg2"/>
-                  </a:outerShdw>
-                </a:effectLst>
-              </a14:hiddenEffects>
-            </a:ext>
-          </a:extLst>
-        </p:spPr>
-      </p:pic>
     </p:spTree>
     <p:extLst>
       <p:ext uri="{BB962C8B-B14F-4D97-AF65-F5344CB8AC3E}">
-        <p14:creationId xmlns:p14="http://schemas.microsoft.com/office/powerpoint/2010/main" val="3372461043"/>
+        <p14:creationId xmlns:p14="http://schemas.microsoft.com/office/powerpoint/2010/main" val="1979461865"/>
       </p:ext>
     </p:extLst>
   </p:cSld>
@@ -8279,7 +10079,7 @@
   </p:clrMapOvr>
   <mc:AlternateContent xmlns:mc="http://schemas.openxmlformats.org/markup-compatibility/2006" xmlns:p14="http://schemas.microsoft.com/office/powerpoint/2010/main">
     <mc:Choice Requires="p14">
-      <p:transition p14:dur="10"/>
+      <p:transition p14:dur="0"/>
     </mc:Choice>
     <mc:Fallback xmlns="">
       <p:transition/>
@@ -8288,83 +10088,7 @@
   <p:timing>
     <p:tnLst>
       <p:par>
-        <p:cTn id="1" dur="indefinite" restart="never" nodeType="tmRoot">
-          <p:childTnLst>
-            <p:seq concurrent="1" nextAc="seek">
-              <p:cTn id="2" dur="indefinite" nodeType="mainSeq">
-                <p:childTnLst>
-                  <p:par>
-                    <p:cTn id="3" fill="hold">
-                      <p:stCondLst>
-                        <p:cond delay="indefinite"/>
-                      </p:stCondLst>
-                      <p:childTnLst>
-                        <p:par>
-                          <p:cTn id="4" fill="hold">
-                            <p:stCondLst>
-                              <p:cond delay="0"/>
-                            </p:stCondLst>
-                            <p:childTnLst>
-                              <p:par>
-                                <p:cTn id="5" presetID="22" presetClass="entr" presetSubtype="1" fill="hold" nodeType="clickEffect">
-                                  <p:stCondLst>
-                                    <p:cond delay="0"/>
-                                  </p:stCondLst>
-                                  <p:childTnLst>
-                                    <p:set>
-                                      <p:cBhvr>
-                                        <p:cTn id="6" dur="1" fill="hold">
-                                          <p:stCondLst>
-                                            <p:cond delay="0"/>
-                                          </p:stCondLst>
-                                        </p:cTn>
-                                        <p:tgtEl>
-                                          <p:spTgt spid="5124"/>
-                                        </p:tgtEl>
-                                        <p:attrNameLst>
-                                          <p:attrName>style.visibility</p:attrName>
-                                        </p:attrNameLst>
-                                      </p:cBhvr>
-                                      <p:to>
-                                        <p:strVal val="visible"/>
-                                      </p:to>
-                                    </p:set>
-                                    <p:animEffect transition="in" filter="wipe(up)">
-                                      <p:cBhvr>
-                                        <p:cTn id="7" dur="500"/>
-                                        <p:tgtEl>
-                                          <p:spTgt spid="5124"/>
-                                        </p:tgtEl>
-                                      </p:cBhvr>
-                                    </p:animEffect>
-                                  </p:childTnLst>
-                                </p:cTn>
-                              </p:par>
-                            </p:childTnLst>
-                          </p:cTn>
-                        </p:par>
-                      </p:childTnLst>
-                    </p:cTn>
-                  </p:par>
-                </p:childTnLst>
-              </p:cTn>
-              <p:prevCondLst>
-                <p:cond evt="onPrev" delay="0">
-                  <p:tgtEl>
-                    <p:sldTgt/>
-                  </p:tgtEl>
-                </p:cond>
-              </p:prevCondLst>
-              <p:nextCondLst>
-                <p:cond evt="onNext" delay="0">
-                  <p:tgtEl>
-                    <p:sldTgt/>
-                  </p:tgtEl>
-                </p:cond>
-              </p:nextCondLst>
-            </p:seq>
-          </p:childTnLst>
-        </p:cTn>
+        <p:cTn id="1" dur="indefinite" restart="never" nodeType="tmRoot"/>
       </p:par>
     </p:tnLst>
   </p:timing>

</xml_diff>

<commit_message>
Atualização da imagem da arquitetura JUnit5
</commit_message>
<xml_diff>
--- a/CAP385-00-Presentations/02-JUnit 5/02-JUnit 5.pptx
+++ b/CAP385-00-Presentations/02-JUnit 5/02-JUnit 5.pptx
@@ -5,28 +5,29 @@
     <p:sldMasterId id="2147483648" r:id="rId1"/>
   </p:sldMasterIdLst>
   <p:notesMasterIdLst>
-    <p:notesMasterId r:id="rId21"/>
+    <p:notesMasterId r:id="rId22"/>
   </p:notesMasterIdLst>
   <p:sldIdLst>
     <p:sldId id="257" r:id="rId2"/>
     <p:sldId id="271" r:id="rId3"/>
     <p:sldId id="265" r:id="rId4"/>
-    <p:sldId id="272" r:id="rId5"/>
-    <p:sldId id="284" r:id="rId6"/>
-    <p:sldId id="287" r:id="rId7"/>
-    <p:sldId id="285" r:id="rId8"/>
-    <p:sldId id="286" r:id="rId9"/>
-    <p:sldId id="281" r:id="rId10"/>
-    <p:sldId id="280" r:id="rId11"/>
-    <p:sldId id="273" r:id="rId12"/>
-    <p:sldId id="274" r:id="rId13"/>
-    <p:sldId id="275" r:id="rId14"/>
-    <p:sldId id="276" r:id="rId15"/>
-    <p:sldId id="277" r:id="rId16"/>
-    <p:sldId id="278" r:id="rId17"/>
-    <p:sldId id="279" r:id="rId18"/>
-    <p:sldId id="283" r:id="rId19"/>
-    <p:sldId id="282" r:id="rId20"/>
+    <p:sldId id="288" r:id="rId5"/>
+    <p:sldId id="272" r:id="rId6"/>
+    <p:sldId id="284" r:id="rId7"/>
+    <p:sldId id="287" r:id="rId8"/>
+    <p:sldId id="285" r:id="rId9"/>
+    <p:sldId id="286" r:id="rId10"/>
+    <p:sldId id="281" r:id="rId11"/>
+    <p:sldId id="280" r:id="rId12"/>
+    <p:sldId id="273" r:id="rId13"/>
+    <p:sldId id="274" r:id="rId14"/>
+    <p:sldId id="275" r:id="rId15"/>
+    <p:sldId id="276" r:id="rId16"/>
+    <p:sldId id="277" r:id="rId17"/>
+    <p:sldId id="278" r:id="rId18"/>
+    <p:sldId id="279" r:id="rId19"/>
+    <p:sldId id="283" r:id="rId20"/>
+    <p:sldId id="282" r:id="rId21"/>
   </p:sldIdLst>
   <p:sldSz cx="9144000" cy="6858000" type="screen4x3"/>
   <p:notesSz cx="6858000" cy="9144000"/>
@@ -211,7 +212,7 @@
             <a:fld id="{3DB25566-8A38-405D-AF46-A7AC913A6215}" type="datetimeFigureOut">
               <a:rPr lang="pt-BR" smtClean="0"/>
               <a:pPr/>
-              <a:t>15/07/2016</a:t>
+              <a:t>16/07/2016</a:t>
             </a:fld>
             <a:endParaRPr lang="pt-BR"/>
           </a:p>
@@ -744,7 +745,7 @@
             <a:fld id="{97BE082F-75F0-4080-8642-9DC0E9DA7233}" type="datetimeFigureOut">
               <a:rPr lang="pt-BR" smtClean="0"/>
               <a:pPr/>
-              <a:t>15/07/2016</a:t>
+              <a:t>16/07/2016</a:t>
             </a:fld>
             <a:endParaRPr lang="pt-BR"/>
           </a:p>
@@ -916,7 +917,7 @@
             <a:fld id="{97BE082F-75F0-4080-8642-9DC0E9DA7233}" type="datetimeFigureOut">
               <a:rPr lang="pt-BR" smtClean="0"/>
               <a:pPr/>
-              <a:t>15/07/2016</a:t>
+              <a:t>16/07/2016</a:t>
             </a:fld>
             <a:endParaRPr lang="pt-BR"/>
           </a:p>
@@ -1098,7 +1099,7 @@
             <a:fld id="{97BE082F-75F0-4080-8642-9DC0E9DA7233}" type="datetimeFigureOut">
               <a:rPr lang="pt-BR" smtClean="0"/>
               <a:pPr/>
-              <a:t>15/07/2016</a:t>
+              <a:t>16/07/2016</a:t>
             </a:fld>
             <a:endParaRPr lang="pt-BR"/>
           </a:p>
@@ -1452,7 +1453,7 @@
             <a:fld id="{97BE082F-75F0-4080-8642-9DC0E9DA7233}" type="datetimeFigureOut">
               <a:rPr lang="pt-BR" smtClean="0"/>
               <a:pPr/>
-              <a:t>15/07/2016</a:t>
+              <a:t>16/07/2016</a:t>
             </a:fld>
             <a:endParaRPr lang="pt-BR"/>
           </a:p>
@@ -1700,7 +1701,7 @@
             <a:fld id="{97BE082F-75F0-4080-8642-9DC0E9DA7233}" type="datetimeFigureOut">
               <a:rPr lang="pt-BR" smtClean="0"/>
               <a:pPr/>
-              <a:t>15/07/2016</a:t>
+              <a:t>16/07/2016</a:t>
             </a:fld>
             <a:endParaRPr lang="pt-BR"/>
           </a:p>
@@ -1990,7 +1991,7 @@
             <a:fld id="{97BE082F-75F0-4080-8642-9DC0E9DA7233}" type="datetimeFigureOut">
               <a:rPr lang="pt-BR" smtClean="0"/>
               <a:pPr/>
-              <a:t>15/07/2016</a:t>
+              <a:t>16/07/2016</a:t>
             </a:fld>
             <a:endParaRPr lang="pt-BR"/>
           </a:p>
@@ -2414,7 +2415,7 @@
             <a:fld id="{97BE082F-75F0-4080-8642-9DC0E9DA7233}" type="datetimeFigureOut">
               <a:rPr lang="pt-BR" smtClean="0"/>
               <a:pPr/>
-              <a:t>15/07/2016</a:t>
+              <a:t>16/07/2016</a:t>
             </a:fld>
             <a:endParaRPr lang="pt-BR"/>
           </a:p>
@@ -2534,7 +2535,7 @@
             <a:fld id="{97BE082F-75F0-4080-8642-9DC0E9DA7233}" type="datetimeFigureOut">
               <a:rPr lang="pt-BR" smtClean="0"/>
               <a:pPr/>
-              <a:t>15/07/2016</a:t>
+              <a:t>16/07/2016</a:t>
             </a:fld>
             <a:endParaRPr lang="pt-BR"/>
           </a:p>
@@ -2631,7 +2632,7 @@
             <a:fld id="{97BE082F-75F0-4080-8642-9DC0E9DA7233}" type="datetimeFigureOut">
               <a:rPr lang="pt-BR" smtClean="0"/>
               <a:pPr/>
-              <a:t>15/07/2016</a:t>
+              <a:t>16/07/2016</a:t>
             </a:fld>
             <a:endParaRPr lang="pt-BR"/>
           </a:p>
@@ -2910,7 +2911,7 @@
             <a:fld id="{97BE082F-75F0-4080-8642-9DC0E9DA7233}" type="datetimeFigureOut">
               <a:rPr lang="pt-BR" smtClean="0"/>
               <a:pPr/>
-              <a:t>15/07/2016</a:t>
+              <a:t>16/07/2016</a:t>
             </a:fld>
             <a:endParaRPr lang="pt-BR"/>
           </a:p>
@@ -3165,7 +3166,7 @@
             <a:fld id="{97BE082F-75F0-4080-8642-9DC0E9DA7233}" type="datetimeFigureOut">
               <a:rPr lang="pt-BR" smtClean="0"/>
               <a:pPr/>
-              <a:t>15/07/2016</a:t>
+              <a:t>16/07/2016</a:t>
             </a:fld>
             <a:endParaRPr lang="pt-BR"/>
           </a:p>
@@ -3380,7 +3381,7 @@
             <a:fld id="{97BE082F-75F0-4080-8642-9DC0E9DA7233}" type="datetimeFigureOut">
               <a:rPr lang="pt-BR" smtClean="0"/>
               <a:pPr/>
-              <a:t>15/07/2016</a:t>
+              <a:t>16/07/2016</a:t>
             </a:fld>
             <a:endParaRPr lang="pt-BR"/>
           </a:p>
@@ -4161,7 +4162,7 @@
         <p:spPr>
           <a:xfrm>
             <a:off x="457200" y="1196752"/>
-            <a:ext cx="8229600" cy="4824536"/>
+            <a:ext cx="8229600" cy="5328592"/>
           </a:xfrm>
         </p:spPr>
         <p:txBody>
@@ -4174,78 +4175,41 @@
               <a:rPr lang="pt-BR" sz="2800" dirty="0" smtClean="0">
                 <a:hlinkClick r:id="rId2"/>
               </a:rPr>
-              <a:t>http://blog.codeleak.pl/2014/07/junit-testing-exception-with-java-8-and-lambda-expressions.html</a:t>
+              <a:t>http://radar.oreilly.com/2014/12/unit-testing-java-8-lambda-expressions-and-streams.html</a:t>
             </a:r>
             <a:endParaRPr lang="pt-BR" sz="2800" dirty="0" smtClean="0"/>
           </a:p>
           <a:p>
             <a:r>
+              <a:rPr lang="en-US" sz="2800" b="1" dirty="0" smtClean="0"/>
+              <a:t>Unit Testing Java 8 Lambda Expressions and Streams</a:t>
+            </a:r>
+          </a:p>
+          <a:p>
+            <a:r>
+              <a:rPr lang="en-US" sz="2800" b="1" dirty="0" smtClean="0"/>
+              <a:t>Two approaches to testing </a:t>
+            </a:r>
+            <a:r>
               <a:rPr lang="en-US" sz="2800" b="1" dirty="0" err="1" smtClean="0"/>
-              <a:t>JUnit</a:t>
+              <a:t>lambdafied</a:t>
             </a:r>
             <a:r>
               <a:rPr lang="en-US" sz="2800" b="1" dirty="0" smtClean="0"/>
-              <a:t>: testing exception with Java 8 and Lambda Expressions</a:t>
+              <a:t> code.</a:t>
             </a:r>
           </a:p>
           <a:p>
             <a:pPr lvl="1"/>
             <a:r>
               <a:rPr lang="en-US" sz="2400" dirty="0" smtClean="0"/>
-              <a:t>In </a:t>
-            </a:r>
-            <a:r>
-              <a:rPr lang="en-US" sz="2400" dirty="0" err="1" smtClean="0"/>
-              <a:t>JUnit</a:t>
-            </a:r>
-            <a:r>
-              <a:rPr lang="en-US" sz="2400" dirty="0" smtClean="0"/>
-              <a:t> there are many ways of testing exceptions in test code, including </a:t>
-            </a:r>
-            <a:r>
-              <a:rPr lang="en-US" sz="2400" dirty="0" smtClean="0">
-                <a:hlinkClick r:id="rId3"/>
-              </a:rPr>
-              <a:t>try-catch idiom</a:t>
-            </a:r>
-            <a:r>
-              <a:rPr lang="en-US" sz="2400" dirty="0" smtClean="0"/>
-              <a:t>, </a:t>
-            </a:r>
-            <a:r>
-              <a:rPr lang="en-US" sz="2400" dirty="0" err="1" smtClean="0">
-                <a:hlinkClick r:id="rId4"/>
-              </a:rPr>
-              <a:t>JUnit</a:t>
-            </a:r>
-            <a:r>
-              <a:rPr lang="en-US" sz="2400" dirty="0" smtClean="0">
-                <a:hlinkClick r:id="rId4"/>
-              </a:rPr>
-              <a:t> @Rule</a:t>
-            </a:r>
-            <a:r>
-              <a:rPr lang="en-US" sz="2400" dirty="0" smtClean="0"/>
-              <a:t>, with </a:t>
-            </a:r>
-            <a:r>
-              <a:rPr lang="en-US" sz="2400" dirty="0" smtClean="0">
-                <a:hlinkClick r:id="rId5"/>
-              </a:rPr>
-              <a:t>catch-exception</a:t>
-            </a:r>
-            <a:r>
-              <a:rPr lang="en-US" sz="2400" dirty="0" smtClean="0"/>
-              <a:t> library. As of Java 8 we have another way of dealing with exceptions: with lambda expressions. In this short blog post I will demonstrate a simple example how one can utilize the power of Java 8 and lambda expressions to test exceptions in </a:t>
-            </a:r>
-            <a:r>
-              <a:rPr lang="en-US" sz="2400" dirty="0" err="1" smtClean="0"/>
-              <a:t>JUnit</a:t>
-            </a:r>
-            <a:r>
-              <a:rPr lang="en-US" sz="2400" dirty="0" smtClean="0"/>
-              <a:t>. </a:t>
-            </a:r>
+              <a:t>Lambda expressions pose a slightly different challenge when unit testing code. Because they don’t have a name, it’s impossible to directly call them in your test code. You could choose to copy the body of the lambda expression into your test and then test that copy, but this approach has the unfortunate side effect of not actually testing the behavior of your implementation. If you change the implementation code, your test will still pass even though the implementation is performing a different task.</a:t>
+            </a:r>
+          </a:p>
+          <a:p>
+            <a:pPr lvl="1">
+              <a:buNone/>
+            </a:pPr>
             <a:endParaRPr lang="pt-BR" sz="2400" dirty="0"/>
           </a:p>
         </p:txBody>
@@ -4461,113 +4425,103 @@
       </p:sp>
       <p:sp>
         <p:nvSpPr>
-          <p:cNvPr id="4" name="Title 3"/>
-          <p:cNvSpPr>
-            <a:spLocks noGrp="1"/>
-          </p:cNvSpPr>
-          <p:nvPr>
-            <p:ph type="title"/>
+          <p:cNvPr id="2" name="Espaço Reservado para Conteúdo 1"/>
+          <p:cNvSpPr>
+            <a:spLocks noGrp="1"/>
+          </p:cNvSpPr>
+          <p:nvPr>
+            <p:ph idx="1"/>
           </p:nvPr>
         </p:nvSpPr>
         <p:spPr>
           <a:xfrm>
-            <a:off x="457200" y="228600"/>
-            <a:ext cx="8229600" cy="1400200"/>
+            <a:off x="457200" y="1196752"/>
+            <a:ext cx="8229600" cy="4824536"/>
           </a:xfrm>
         </p:spPr>
         <p:txBody>
           <a:bodyPr>
-            <a:normAutofit fontScale="90000"/>
+            <a:noAutofit/>
           </a:bodyPr>
           <a:lstStyle/>
           <a:p>
             <a:r>
-              <a:rPr lang="pt-BR" dirty="0" smtClean="0">
-                <a:solidFill>
-                  <a:srgbClr val="0070C0"/>
-                </a:solidFill>
-                <a:effectLst>
-                  <a:outerShdw blurRad="38100" dist="38100" dir="2700000" algn="tl">
-                    <a:srgbClr val="000000">
-                      <a:alpha val="43137"/>
-                    </a:srgbClr>
-                  </a:outerShdw>
-                </a:effectLst>
+              <a:rPr lang="pt-BR" sz="2800" dirty="0" smtClean="0">
+                <a:hlinkClick r:id="rId2"/>
               </a:rPr>
-              <a:t>Apresentação do </a:t>
-            </a:r>
-            <a:r>
-              <a:rPr lang="en-US" dirty="0">
-                <a:solidFill>
-                  <a:srgbClr val="0070C0"/>
-                </a:solidFill>
-                <a:effectLst>
-                  <a:outerShdw blurRad="38100" dist="38100" dir="2700000" algn="tl">
-                    <a:srgbClr val="000000">
-                      <a:alpha val="43137"/>
-                    </a:srgbClr>
-                  </a:outerShdw>
-                </a:effectLst>
+              <a:t>http://blog.codeleak.pl/2014/07/junit-testing-exception-with-java-8-and-lambda-expressions.html</a:t>
+            </a:r>
+            <a:endParaRPr lang="pt-BR" sz="2800" dirty="0" smtClean="0"/>
+          </a:p>
+          <a:p>
+            <a:r>
+              <a:rPr lang="en-US" sz="2800" b="1" dirty="0" err="1" smtClean="0"/>
+              <a:t>JUnit</a:t>
+            </a:r>
+            <a:r>
+              <a:rPr lang="en-US" sz="2800" b="1" dirty="0" smtClean="0"/>
+              <a:t>: testing exception with Java 8 and Lambda Expressions</a:t>
+            </a:r>
+          </a:p>
+          <a:p>
+            <a:pPr lvl="1"/>
+            <a:r>
+              <a:rPr lang="en-US" sz="2400" dirty="0" smtClean="0"/>
+              <a:t>In </a:t>
+            </a:r>
+            <a:r>
+              <a:rPr lang="en-US" sz="2400" dirty="0" err="1" smtClean="0"/>
+              <a:t>JUnit</a:t>
+            </a:r>
+            <a:r>
+              <a:rPr lang="en-US" sz="2400" dirty="0" smtClean="0"/>
+              <a:t> there are many ways of testing exceptions in test code, including </a:t>
+            </a:r>
+            <a:r>
+              <a:rPr lang="en-US" sz="2400" dirty="0" smtClean="0">
+                <a:hlinkClick r:id="rId3"/>
               </a:rPr>
-              <a:t>MATLAB </a:t>
-            </a:r>
-            <a:r>
-              <a:rPr lang="en-US" dirty="0" err="1">
-                <a:solidFill>
-                  <a:srgbClr val="0070C0"/>
-                </a:solidFill>
-                <a:effectLst>
-                  <a:outerShdw blurRad="38100" dist="38100" dir="2700000" algn="tl">
-                    <a:srgbClr val="000000">
-                      <a:alpha val="43137"/>
-                    </a:srgbClr>
-                  </a:outerShdw>
-                </a:effectLst>
+              <a:t>try-catch idiom</a:t>
+            </a:r>
+            <a:r>
+              <a:rPr lang="en-US" sz="2400" dirty="0" smtClean="0"/>
+              <a:t>, </a:t>
+            </a:r>
+            <a:r>
+              <a:rPr lang="en-US" sz="2400" dirty="0" err="1" smtClean="0">
+                <a:hlinkClick r:id="rId4"/>
               </a:rPr>
-              <a:t>xUnit</a:t>
-            </a:r>
-            <a:r>
-              <a:rPr lang="en-US" dirty="0">
-                <a:solidFill>
-                  <a:srgbClr val="0070C0"/>
-                </a:solidFill>
-                <a:effectLst>
-                  <a:outerShdw blurRad="38100" dist="38100" dir="2700000" algn="tl">
-                    <a:srgbClr val="000000">
-                      <a:alpha val="43137"/>
-                    </a:srgbClr>
-                  </a:outerShdw>
-                </a:effectLst>
+              <a:t>JUnit</a:t>
+            </a:r>
+            <a:r>
+              <a:rPr lang="en-US" sz="2400" dirty="0" smtClean="0">
+                <a:hlinkClick r:id="rId4"/>
               </a:rPr>
-              <a:t> Test </a:t>
-            </a:r>
-            <a:r>
-              <a:rPr lang="pt-BR" dirty="0" smtClean="0">
-                <a:solidFill>
-                  <a:srgbClr val="0070C0"/>
-                </a:solidFill>
-                <a:effectLst>
-                  <a:outerShdw blurRad="38100" dist="38100" dir="2700000" algn="tl">
-                    <a:srgbClr val="000000">
-                      <a:alpha val="43137"/>
-                    </a:srgbClr>
-                  </a:outerShdw>
-                </a:effectLst>
+              <a:t> @Rule</a:t>
+            </a:r>
+            <a:r>
+              <a:rPr lang="en-US" sz="2400" dirty="0" smtClean="0"/>
+              <a:t>, with </a:t>
+            </a:r>
+            <a:r>
+              <a:rPr lang="en-US" sz="2400" dirty="0" smtClean="0">
+                <a:hlinkClick r:id="rId5"/>
               </a:rPr>
-              <a:t>Framework</a:t>
-            </a:r>
-            <a:endParaRPr lang="pt-BR" dirty="0">
-              <a:solidFill>
-                <a:srgbClr val="0070C0"/>
-              </a:solidFill>
-              <a:effectLst>
-                <a:outerShdw blurRad="38100" dist="38100" dir="2700000" algn="tl">
-                  <a:srgbClr val="000000">
-                    <a:alpha val="43137"/>
-                  </a:srgbClr>
-                </a:outerShdw>
-              </a:effectLst>
-            </a:endParaRPr>
+              <a:t>catch-exception</a:t>
+            </a:r>
+            <a:r>
+              <a:rPr lang="en-US" sz="2400" dirty="0" smtClean="0"/>
+              <a:t> library. As of Java 8 we have another way of dealing with exceptions: with lambda expressions. In this short blog post I will demonstrate a simple example how one can utilize the power of Java 8 and lambda expressions to test exceptions in </a:t>
+            </a:r>
+            <a:r>
+              <a:rPr lang="en-US" sz="2400" dirty="0" err="1" smtClean="0"/>
+              <a:t>JUnit</a:t>
+            </a:r>
+            <a:r>
+              <a:rPr lang="en-US" sz="2400" dirty="0" smtClean="0"/>
+              <a:t>. </a:t>
+            </a:r>
+            <a:endParaRPr lang="pt-BR" sz="2400" dirty="0"/>
           </a:p>
         </p:txBody>
       </p:sp>
@@ -4649,53 +4603,72 @@
           </a:p>
         </p:txBody>
       </p:sp>
-      <p:pic>
-        <p:nvPicPr>
-          <p:cNvPr id="2050" name="Picture 2" descr="https://d1sui4xqepm0ps.cloudfront.net/categories/example"/>
-          <p:cNvPicPr>
-            <a:picLocks noGrp="1" noChangeAspect="1" noChangeArrowheads="1"/>
-          </p:cNvPicPr>
-          <p:nvPr>
-            <p:ph idx="1"/>
-          </p:nvPr>
-        </p:nvPicPr>
-        <p:blipFill>
-          <a:blip r:embed="rId2" cstate="print">
-            <a:extLst>
-              <a:ext uri="{28A0092B-C50C-407E-A947-70E740481C1C}">
-                <a14:useLocalDpi xmlns:a14="http://schemas.microsoft.com/office/drawing/2010/main" val="0"/>
-              </a:ext>
-            </a:extLst>
-          </a:blip>
-          <a:srcRect/>
-          <a:stretch>
-            <a:fillRect/>
-          </a:stretch>
-        </p:blipFill>
-        <p:spPr bwMode="auto">
-          <a:xfrm>
-            <a:off x="2540000" y="2612231"/>
-            <a:ext cx="4064000" cy="1968500"/>
-          </a:xfrm>
-          <a:prstGeom prst="rect">
-            <a:avLst/>
-          </a:prstGeom>
-          <a:noFill/>
-          <a:extLst>
-            <a:ext uri="{909E8E84-426E-40DD-AFC4-6F175D3DCCD1}">
-              <a14:hiddenFill xmlns:a14="http://schemas.microsoft.com/office/drawing/2010/main">
-                <a:solidFill>
-                  <a:srgbClr val="FFFFFF"/>
-                </a:solidFill>
-              </a14:hiddenFill>
-            </a:ext>
-          </a:extLst>
-        </p:spPr>
-      </p:pic>
+      <p:sp>
+        <p:nvSpPr>
+          <p:cNvPr id="9" name="Title 3"/>
+          <p:cNvSpPr>
+            <a:spLocks noGrp="1"/>
+          </p:cNvSpPr>
+          <p:nvPr>
+            <p:ph type="title"/>
+          </p:nvPr>
+        </p:nvSpPr>
+        <p:spPr/>
+        <p:txBody>
+          <a:bodyPr>
+            <a:normAutofit/>
+          </a:bodyPr>
+          <a:lstStyle/>
+          <a:p>
+            <a:r>
+              <a:rPr lang="en-US" dirty="0" err="1" smtClean="0">
+                <a:solidFill>
+                  <a:srgbClr val="0070C0"/>
+                </a:solidFill>
+                <a:effectLst>
+                  <a:outerShdw blurRad="38100" dist="38100" dir="2700000" algn="tl">
+                    <a:srgbClr val="000000">
+                      <a:alpha val="43137"/>
+                    </a:srgbClr>
+                  </a:outerShdw>
+                </a:effectLst>
+              </a:rPr>
+              <a:t>JUnit</a:t>
+            </a:r>
+            <a:r>
+              <a:rPr lang="en-US" dirty="0" smtClean="0">
+                <a:solidFill>
+                  <a:srgbClr val="0070C0"/>
+                </a:solidFill>
+                <a:effectLst>
+                  <a:outerShdw blurRad="38100" dist="38100" dir="2700000" algn="tl">
+                    <a:srgbClr val="000000">
+                      <a:alpha val="43137"/>
+                    </a:srgbClr>
+                  </a:outerShdw>
+                </a:effectLst>
+              </a:rPr>
+              <a:t> 5 Test Framework</a:t>
+            </a:r>
+            <a:endParaRPr lang="en-US" dirty="0">
+              <a:solidFill>
+                <a:srgbClr val="0070C0"/>
+              </a:solidFill>
+              <a:effectLst>
+                <a:outerShdw blurRad="38100" dist="38100" dir="2700000" algn="tl">
+                  <a:srgbClr val="000000">
+                    <a:alpha val="43137"/>
+                  </a:srgbClr>
+                </a:outerShdw>
+              </a:effectLst>
+            </a:endParaRPr>
+          </a:p>
+        </p:txBody>
+      </p:sp>
     </p:spTree>
     <p:extLst>
       <p:ext uri="{BB962C8B-B14F-4D97-AF65-F5344CB8AC3E}">
-        <p14:creationId xmlns:p14="http://schemas.microsoft.com/office/powerpoint/2010/main" val="3792145510"/>
+        <p14:creationId xmlns:p14="http://schemas.microsoft.com/office/powerpoint/2010/main" val="1979461865"/>
       </p:ext>
     </p:extLst>
   </p:cSld>
@@ -4763,6 +4736,118 @@
       </p:sp>
       <p:sp>
         <p:nvSpPr>
+          <p:cNvPr id="4" name="Title 3"/>
+          <p:cNvSpPr>
+            <a:spLocks noGrp="1"/>
+          </p:cNvSpPr>
+          <p:nvPr>
+            <p:ph type="title"/>
+          </p:nvPr>
+        </p:nvSpPr>
+        <p:spPr>
+          <a:xfrm>
+            <a:off x="457200" y="228600"/>
+            <a:ext cx="8229600" cy="1400200"/>
+          </a:xfrm>
+        </p:spPr>
+        <p:txBody>
+          <a:bodyPr>
+            <a:normAutofit fontScale="90000"/>
+          </a:bodyPr>
+          <a:lstStyle/>
+          <a:p>
+            <a:r>
+              <a:rPr lang="pt-BR" dirty="0" smtClean="0">
+                <a:solidFill>
+                  <a:srgbClr val="0070C0"/>
+                </a:solidFill>
+                <a:effectLst>
+                  <a:outerShdw blurRad="38100" dist="38100" dir="2700000" algn="tl">
+                    <a:srgbClr val="000000">
+                      <a:alpha val="43137"/>
+                    </a:srgbClr>
+                  </a:outerShdw>
+                </a:effectLst>
+              </a:rPr>
+              <a:t>Apresentação do </a:t>
+            </a:r>
+            <a:r>
+              <a:rPr lang="en-US" dirty="0">
+                <a:solidFill>
+                  <a:srgbClr val="0070C0"/>
+                </a:solidFill>
+                <a:effectLst>
+                  <a:outerShdw blurRad="38100" dist="38100" dir="2700000" algn="tl">
+                    <a:srgbClr val="000000">
+                      <a:alpha val="43137"/>
+                    </a:srgbClr>
+                  </a:outerShdw>
+                </a:effectLst>
+              </a:rPr>
+              <a:t>MATLAB </a:t>
+            </a:r>
+            <a:r>
+              <a:rPr lang="en-US" dirty="0" err="1">
+                <a:solidFill>
+                  <a:srgbClr val="0070C0"/>
+                </a:solidFill>
+                <a:effectLst>
+                  <a:outerShdw blurRad="38100" dist="38100" dir="2700000" algn="tl">
+                    <a:srgbClr val="000000">
+                      <a:alpha val="43137"/>
+                    </a:srgbClr>
+                  </a:outerShdw>
+                </a:effectLst>
+              </a:rPr>
+              <a:t>xUnit</a:t>
+            </a:r>
+            <a:r>
+              <a:rPr lang="en-US" dirty="0">
+                <a:solidFill>
+                  <a:srgbClr val="0070C0"/>
+                </a:solidFill>
+                <a:effectLst>
+                  <a:outerShdw blurRad="38100" dist="38100" dir="2700000" algn="tl">
+                    <a:srgbClr val="000000">
+                      <a:alpha val="43137"/>
+                    </a:srgbClr>
+                  </a:outerShdw>
+                </a:effectLst>
+              </a:rPr>
+              <a:t> Test </a:t>
+            </a:r>
+            <a:r>
+              <a:rPr lang="pt-BR" dirty="0" smtClean="0">
+                <a:solidFill>
+                  <a:srgbClr val="0070C0"/>
+                </a:solidFill>
+                <a:effectLst>
+                  <a:outerShdw blurRad="38100" dist="38100" dir="2700000" algn="tl">
+                    <a:srgbClr val="000000">
+                      <a:alpha val="43137"/>
+                    </a:srgbClr>
+                  </a:outerShdw>
+                </a:effectLst>
+              </a:rPr>
+              <a:t>Framework</a:t>
+            </a:r>
+            <a:endParaRPr lang="pt-BR" dirty="0">
+              <a:solidFill>
+                <a:srgbClr val="0070C0"/>
+              </a:solidFill>
+              <a:effectLst>
+                <a:outerShdw blurRad="38100" dist="38100" dir="2700000" algn="tl">
+                  <a:srgbClr val="000000">
+                    <a:alpha val="43137"/>
+                  </a:srgbClr>
+                </a:outerShdw>
+              </a:effectLst>
+            </a:endParaRPr>
+          </a:p>
+        </p:txBody>
+      </p:sp>
+      <p:sp>
+        <p:nvSpPr>
           <p:cNvPr id="5" name="AutoShape 2" descr="G:\HD-Games\GitRepos\DesignPatterns\CAP392-02-PloP\artigos\03 - Pattern Language\entrega final\family-guy-simpsons2.webp"/>
           <p:cNvSpPr>
             <a:spLocks noChangeAspect="1" noChangeArrowheads="1"/>
@@ -4841,11 +4926,13 @@
       </p:sp>
       <p:pic>
         <p:nvPicPr>
-          <p:cNvPr id="4099" name="Picture 3"/>
+          <p:cNvPr id="2050" name="Picture 2" descr="https://d1sui4xqepm0ps.cloudfront.net/categories/example"/>
           <p:cNvPicPr>
-            <a:picLocks noChangeAspect="1" noChangeArrowheads="1"/>
+            <a:picLocks noGrp="1" noChangeAspect="1" noChangeArrowheads="1"/>
           </p:cNvPicPr>
-          <p:nvPr/>
+          <p:nvPr>
+            <p:ph idx="1"/>
+          </p:nvPr>
         </p:nvPicPr>
         <p:blipFill>
           <a:blip r:embed="rId2" cstate="print">
@@ -4862,98 +4949,28 @@
         </p:blipFill>
         <p:spPr bwMode="auto">
           <a:xfrm>
-            <a:off x="457200" y="1268760"/>
-            <a:ext cx="8229600" cy="5238750"/>
+            <a:off x="2540000" y="2612231"/>
+            <a:ext cx="4064000" cy="1968500"/>
           </a:xfrm>
           <a:prstGeom prst="rect">
             <a:avLst/>
           </a:prstGeom>
           <a:noFill/>
-          <a:ln>
-            <a:noFill/>
-          </a:ln>
-          <a:effectLst/>
           <a:extLst>
             <a:ext uri="{909E8E84-426E-40DD-AFC4-6F175D3DCCD1}">
               <a14:hiddenFill xmlns:a14="http://schemas.microsoft.com/office/drawing/2010/main">
                 <a:solidFill>
-                  <a:schemeClr val="accent1"/>
+                  <a:srgbClr val="FFFFFF"/>
                 </a:solidFill>
               </a14:hiddenFill>
-            </a:ext>
-            <a:ext uri="{91240B29-F687-4F45-9708-019B960494DF}">
-              <a14:hiddenLine xmlns:a14="http://schemas.microsoft.com/office/drawing/2010/main" w="9525">
-                <a:solidFill>
-                  <a:schemeClr val="tx1"/>
-                </a:solidFill>
-                <a:miter lim="800000"/>
-                <a:headEnd/>
-                <a:tailEnd/>
-              </a14:hiddenLine>
-            </a:ext>
-            <a:ext uri="{AF507438-7753-43E0-B8FC-AC1667EBCBE1}">
-              <a14:hiddenEffects xmlns:a14="http://schemas.microsoft.com/office/drawing/2010/main">
-                <a:effectLst>
-                  <a:outerShdw dist="35921" dir="2700000" algn="ctr" rotWithShape="0">
-                    <a:schemeClr val="bg2"/>
-                  </a:outerShdw>
-                </a:effectLst>
-              </a14:hiddenEffects>
             </a:ext>
           </a:extLst>
         </p:spPr>
       </p:pic>
-      <p:sp>
-        <p:nvSpPr>
-          <p:cNvPr id="13" name="Title 3"/>
-          <p:cNvSpPr>
-            <a:spLocks noGrp="1"/>
-          </p:cNvSpPr>
-          <p:nvPr>
-            <p:ph type="title"/>
-          </p:nvPr>
-        </p:nvSpPr>
-        <p:spPr/>
-        <p:txBody>
-          <a:bodyPr>
-            <a:normAutofit/>
-          </a:bodyPr>
-          <a:lstStyle/>
-          <a:p>
-            <a:r>
-              <a:rPr lang="pt-BR" dirty="0" smtClean="0">
-                <a:solidFill>
-                  <a:srgbClr val="0070C0"/>
-                </a:solidFill>
-                <a:effectLst>
-                  <a:outerShdw blurRad="38100" dist="38100" dir="2700000" algn="tl">
-                    <a:srgbClr val="000000">
-                      <a:alpha val="43137"/>
-                    </a:srgbClr>
-                  </a:outerShdw>
-                </a:effectLst>
-              </a:rPr>
-              <a:t>Exemplo - Função</a:t>
-            </a:r>
-            <a:endParaRPr lang="pt-BR" dirty="0">
-              <a:solidFill>
-                <a:srgbClr val="0070C0"/>
-              </a:solidFill>
-              <a:effectLst>
-                <a:outerShdw blurRad="38100" dist="38100" dir="2700000" algn="tl">
-                  <a:srgbClr val="000000">
-                    <a:alpha val="43137"/>
-                  </a:srgbClr>
-                </a:outerShdw>
-              </a:effectLst>
-            </a:endParaRPr>
-          </a:p>
-        </p:txBody>
-      </p:sp>
     </p:spTree>
     <p:extLst>
       <p:ext uri="{BB962C8B-B14F-4D97-AF65-F5344CB8AC3E}">
-        <p14:creationId xmlns:p14="http://schemas.microsoft.com/office/powerpoint/2010/main" val="3659421261"/>
+        <p14:creationId xmlns:p14="http://schemas.microsoft.com/office/powerpoint/2010/main" val="3792145510"/>
       </p:ext>
     </p:extLst>
   </p:cSld>
@@ -5014,6 +5031,264 @@
               <a:rPr lang="en-US" smtClean="0"/>
               <a:pPr/>
               <a:t>13</a:t>
+            </a:fld>
+            <a:endParaRPr lang="en-US" dirty="0"/>
+          </a:p>
+        </p:txBody>
+      </p:sp>
+      <p:sp>
+        <p:nvSpPr>
+          <p:cNvPr id="5" name="AutoShape 2" descr="G:\HD-Games\GitRepos\DesignPatterns\CAP392-02-PloP\artigos\03 - Pattern Language\entrega final\family-guy-simpsons2.webp"/>
+          <p:cNvSpPr>
+            <a:spLocks noChangeAspect="1" noChangeArrowheads="1"/>
+          </p:cNvSpPr>
+          <p:nvPr/>
+        </p:nvSpPr>
+        <p:spPr bwMode="auto">
+          <a:xfrm>
+            <a:off x="155575" y="-144463"/>
+            <a:ext cx="304800" cy="304801"/>
+          </a:xfrm>
+          <a:prstGeom prst="rect">
+            <a:avLst/>
+          </a:prstGeom>
+          <a:noFill/>
+          <a:extLst>
+            <a:ext uri="{909E8E84-426E-40DD-AFC4-6F175D3DCCD1}">
+              <a14:hiddenFill xmlns:a14="http://schemas.microsoft.com/office/drawing/2010/main">
+                <a:solidFill>
+                  <a:srgbClr val="FFFFFF"/>
+                </a:solidFill>
+              </a14:hiddenFill>
+            </a:ext>
+          </a:extLst>
+        </p:spPr>
+        <p:txBody>
+          <a:bodyPr vert="horz" wrap="square" lIns="91440" tIns="45720" rIns="91440" bIns="45720" numCol="1" anchor="t" anchorCtr="0" compatLnSpc="1">
+            <a:prstTxWarp prst="textNoShape">
+              <a:avLst/>
+            </a:prstTxWarp>
+          </a:bodyPr>
+          <a:lstStyle/>
+          <a:p>
+            <a:endParaRPr lang="pt-BR"/>
+          </a:p>
+        </p:txBody>
+      </p:sp>
+      <p:sp>
+        <p:nvSpPr>
+          <p:cNvPr id="7" name="AutoShape 4" descr="G:\HD-Games\GitRepos\DesignPatterns\CAP392-02-PloP\artigos\03 - Pattern Language\entrega final\family-guy-simpsons2.webp"/>
+          <p:cNvSpPr>
+            <a:spLocks noChangeAspect="1" noChangeArrowheads="1"/>
+          </p:cNvSpPr>
+          <p:nvPr/>
+        </p:nvSpPr>
+        <p:spPr bwMode="auto">
+          <a:xfrm>
+            <a:off x="307975" y="7937"/>
+            <a:ext cx="304800" cy="304801"/>
+          </a:xfrm>
+          <a:prstGeom prst="rect">
+            <a:avLst/>
+          </a:prstGeom>
+          <a:noFill/>
+          <a:extLst>
+            <a:ext uri="{909E8E84-426E-40DD-AFC4-6F175D3DCCD1}">
+              <a14:hiddenFill xmlns:a14="http://schemas.microsoft.com/office/drawing/2010/main">
+                <a:solidFill>
+                  <a:srgbClr val="FFFFFF"/>
+                </a:solidFill>
+              </a14:hiddenFill>
+            </a:ext>
+          </a:extLst>
+        </p:spPr>
+        <p:txBody>
+          <a:bodyPr vert="horz" wrap="square" lIns="91440" tIns="45720" rIns="91440" bIns="45720" numCol="1" anchor="t" anchorCtr="0" compatLnSpc="1">
+            <a:prstTxWarp prst="textNoShape">
+              <a:avLst/>
+            </a:prstTxWarp>
+          </a:bodyPr>
+          <a:lstStyle/>
+          <a:p>
+            <a:endParaRPr lang="pt-BR"/>
+          </a:p>
+        </p:txBody>
+      </p:sp>
+      <p:pic>
+        <p:nvPicPr>
+          <p:cNvPr id="4099" name="Picture 3"/>
+          <p:cNvPicPr>
+            <a:picLocks noChangeAspect="1" noChangeArrowheads="1"/>
+          </p:cNvPicPr>
+          <p:nvPr/>
+        </p:nvPicPr>
+        <p:blipFill>
+          <a:blip r:embed="rId2" cstate="print">
+            <a:extLst>
+              <a:ext uri="{28A0092B-C50C-407E-A947-70E740481C1C}">
+                <a14:useLocalDpi xmlns:a14="http://schemas.microsoft.com/office/drawing/2010/main" val="0"/>
+              </a:ext>
+            </a:extLst>
+          </a:blip>
+          <a:srcRect/>
+          <a:stretch>
+            <a:fillRect/>
+          </a:stretch>
+        </p:blipFill>
+        <p:spPr bwMode="auto">
+          <a:xfrm>
+            <a:off x="457200" y="1268760"/>
+            <a:ext cx="8229600" cy="5238750"/>
+          </a:xfrm>
+          <a:prstGeom prst="rect">
+            <a:avLst/>
+          </a:prstGeom>
+          <a:noFill/>
+          <a:ln>
+            <a:noFill/>
+          </a:ln>
+          <a:effectLst/>
+          <a:extLst>
+            <a:ext uri="{909E8E84-426E-40DD-AFC4-6F175D3DCCD1}">
+              <a14:hiddenFill xmlns:a14="http://schemas.microsoft.com/office/drawing/2010/main">
+                <a:solidFill>
+                  <a:schemeClr val="accent1"/>
+                </a:solidFill>
+              </a14:hiddenFill>
+            </a:ext>
+            <a:ext uri="{91240B29-F687-4F45-9708-019B960494DF}">
+              <a14:hiddenLine xmlns:a14="http://schemas.microsoft.com/office/drawing/2010/main" w="9525">
+                <a:solidFill>
+                  <a:schemeClr val="tx1"/>
+                </a:solidFill>
+                <a:miter lim="800000"/>
+                <a:headEnd/>
+                <a:tailEnd/>
+              </a14:hiddenLine>
+            </a:ext>
+            <a:ext uri="{AF507438-7753-43E0-B8FC-AC1667EBCBE1}">
+              <a14:hiddenEffects xmlns:a14="http://schemas.microsoft.com/office/drawing/2010/main">
+                <a:effectLst>
+                  <a:outerShdw dist="35921" dir="2700000" algn="ctr" rotWithShape="0">
+                    <a:schemeClr val="bg2"/>
+                  </a:outerShdw>
+                </a:effectLst>
+              </a14:hiddenEffects>
+            </a:ext>
+          </a:extLst>
+        </p:spPr>
+      </p:pic>
+      <p:sp>
+        <p:nvSpPr>
+          <p:cNvPr id="13" name="Title 3"/>
+          <p:cNvSpPr>
+            <a:spLocks noGrp="1"/>
+          </p:cNvSpPr>
+          <p:nvPr>
+            <p:ph type="title"/>
+          </p:nvPr>
+        </p:nvSpPr>
+        <p:spPr/>
+        <p:txBody>
+          <a:bodyPr>
+            <a:normAutofit/>
+          </a:bodyPr>
+          <a:lstStyle/>
+          <a:p>
+            <a:r>
+              <a:rPr lang="pt-BR" dirty="0" smtClean="0">
+                <a:solidFill>
+                  <a:srgbClr val="0070C0"/>
+                </a:solidFill>
+                <a:effectLst>
+                  <a:outerShdw blurRad="38100" dist="38100" dir="2700000" algn="tl">
+                    <a:srgbClr val="000000">
+                      <a:alpha val="43137"/>
+                    </a:srgbClr>
+                  </a:outerShdw>
+                </a:effectLst>
+              </a:rPr>
+              <a:t>Exemplo - Função</a:t>
+            </a:r>
+            <a:endParaRPr lang="pt-BR" dirty="0">
+              <a:solidFill>
+                <a:srgbClr val="0070C0"/>
+              </a:solidFill>
+              <a:effectLst>
+                <a:outerShdw blurRad="38100" dist="38100" dir="2700000" algn="tl">
+                  <a:srgbClr val="000000">
+                    <a:alpha val="43137"/>
+                  </a:srgbClr>
+                </a:outerShdw>
+              </a:effectLst>
+            </a:endParaRPr>
+          </a:p>
+        </p:txBody>
+      </p:sp>
+    </p:spTree>
+    <p:extLst>
+      <p:ext uri="{BB962C8B-B14F-4D97-AF65-F5344CB8AC3E}">
+        <p14:creationId xmlns:p14="http://schemas.microsoft.com/office/powerpoint/2010/main" val="3659421261"/>
+      </p:ext>
+    </p:extLst>
+  </p:cSld>
+  <p:clrMapOvr>
+    <a:masterClrMapping/>
+  </p:clrMapOvr>
+  <mc:AlternateContent xmlns:mc="http://schemas.openxmlformats.org/markup-compatibility/2006" xmlns:p14="http://schemas.microsoft.com/office/powerpoint/2010/main">
+    <mc:Choice Requires="p14">
+      <p:transition p14:dur="0"/>
+    </mc:Choice>
+    <mc:Fallback xmlns="">
+      <p:transition/>
+    </mc:Fallback>
+  </mc:AlternateContent>
+  <p:timing>
+    <p:tnLst>
+      <p:par>
+        <p:cTn id="1" dur="indefinite" restart="never" nodeType="tmRoot"/>
+      </p:par>
+    </p:tnLst>
+  </p:timing>
+</p:sld>
+</file>
+
+<file path=ppt/slides/slide14.xml><?xml version="1.0" encoding="utf-8"?>
+<p:sld xmlns:a="http://schemas.openxmlformats.org/drawingml/2006/main" xmlns:r="http://schemas.openxmlformats.org/officeDocument/2006/relationships" xmlns:p="http://schemas.openxmlformats.org/presentationml/2006/main">
+  <p:cSld>
+    <p:spTree>
+      <p:nvGrpSpPr>
+        <p:cNvPr id="1" name=""/>
+        <p:cNvGrpSpPr/>
+        <p:nvPr/>
+      </p:nvGrpSpPr>
+      <p:grpSpPr>
+        <a:xfrm>
+          <a:off x="0" y="0"/>
+          <a:ext cx="0" cy="0"/>
+          <a:chOff x="0" y="0"/>
+          <a:chExt cx="0" cy="0"/>
+        </a:xfrm>
+      </p:grpSpPr>
+      <p:sp>
+        <p:nvSpPr>
+          <p:cNvPr id="3" name="Slide Number Placeholder 2"/>
+          <p:cNvSpPr>
+            <a:spLocks noGrp="1"/>
+          </p:cNvSpPr>
+          <p:nvPr>
+            <p:ph type="sldNum" sz="quarter" idx="11"/>
+          </p:nvPr>
+        </p:nvSpPr>
+        <p:spPr/>
+        <p:txBody>
+          <a:bodyPr/>
+          <a:lstStyle/>
+          <a:p>
+            <a:fld id="{338BD863-DCDC-5F43-A029-265BB7DA4A17}" type="slidenum">
+              <a:rPr lang="en-US" smtClean="0"/>
+              <a:pPr/>
+              <a:t>14</a:t>
             </a:fld>
             <a:endParaRPr lang="en-US" dirty="0"/>
           </a:p>
@@ -5376,7 +5651,7 @@
 </p:sld>
 </file>
 
-<file path=ppt/slides/slide14.xml><?xml version="1.0" encoding="utf-8"?>
+<file path=ppt/slides/slide15.xml><?xml version="1.0" encoding="utf-8"?>
 <p:sld xmlns:a="http://schemas.openxmlformats.org/drawingml/2006/main" xmlns:r="http://schemas.openxmlformats.org/officeDocument/2006/relationships" xmlns:p="http://schemas.openxmlformats.org/presentationml/2006/main">
   <p:cSld>
     <p:spTree>
@@ -5411,7 +5686,7 @@
             <a:fld id="{338BD863-DCDC-5F43-A029-265BB7DA4A17}" type="slidenum">
               <a:rPr lang="en-US" smtClean="0"/>
               <a:pPr/>
-              <a:t>14</a:t>
+              <a:t>15</a:t>
             </a:fld>
             <a:endParaRPr lang="en-US" dirty="0"/>
           </a:p>
@@ -5634,7 +5909,7 @@
 </p:sld>
 </file>
 
-<file path=ppt/slides/slide15.xml><?xml version="1.0" encoding="utf-8"?>
+<file path=ppt/slides/slide16.xml><?xml version="1.0" encoding="utf-8"?>
 <p:sld xmlns:a="http://schemas.openxmlformats.org/drawingml/2006/main" xmlns:r="http://schemas.openxmlformats.org/officeDocument/2006/relationships" xmlns:p="http://schemas.openxmlformats.org/presentationml/2006/main">
   <p:cSld>
     <p:spTree>
@@ -5669,7 +5944,7 @@
             <a:fld id="{338BD863-DCDC-5F43-A029-265BB7DA4A17}" type="slidenum">
               <a:rPr lang="en-US" smtClean="0"/>
               <a:pPr/>
-              <a:t>15</a:t>
+              <a:t>16</a:t>
             </a:fld>
             <a:endParaRPr lang="en-US" dirty="0"/>
           </a:p>
@@ -6017,7 +6292,7 @@
 </p:sld>
 </file>
 
-<file path=ppt/slides/slide16.xml><?xml version="1.0" encoding="utf-8"?>
+<file path=ppt/slides/slide17.xml><?xml version="1.0" encoding="utf-8"?>
 <p:sld xmlns:a="http://schemas.openxmlformats.org/drawingml/2006/main" xmlns:r="http://schemas.openxmlformats.org/officeDocument/2006/relationships" xmlns:p="http://schemas.openxmlformats.org/presentationml/2006/main">
   <p:cSld>
     <p:spTree>
@@ -6052,7 +6327,7 @@
             <a:fld id="{338BD863-DCDC-5F43-A029-265BB7DA4A17}" type="slidenum">
               <a:rPr lang="en-US" smtClean="0"/>
               <a:pPr/>
-              <a:t>16</a:t>
+              <a:t>17</a:t>
             </a:fld>
             <a:endParaRPr lang="en-US" dirty="0"/>
           </a:p>
@@ -6275,318 +6550,6 @@
 </p:sld>
 </file>
 
-<file path=ppt/slides/slide17.xml><?xml version="1.0" encoding="utf-8"?>
-<p:sld xmlns:a="http://schemas.openxmlformats.org/drawingml/2006/main" xmlns:r="http://schemas.openxmlformats.org/officeDocument/2006/relationships" xmlns:p="http://schemas.openxmlformats.org/presentationml/2006/main">
-  <p:cSld>
-    <p:spTree>
-      <p:nvGrpSpPr>
-        <p:cNvPr id="1" name=""/>
-        <p:cNvGrpSpPr/>
-        <p:nvPr/>
-      </p:nvGrpSpPr>
-      <p:grpSpPr>
-        <a:xfrm>
-          <a:off x="0" y="0"/>
-          <a:ext cx="0" cy="0"/>
-          <a:chOff x="0" y="0"/>
-          <a:chExt cx="0" cy="0"/>
-        </a:xfrm>
-      </p:grpSpPr>
-      <p:sp>
-        <p:nvSpPr>
-          <p:cNvPr id="3" name="Slide Number Placeholder 2"/>
-          <p:cNvSpPr>
-            <a:spLocks noGrp="1"/>
-          </p:cNvSpPr>
-          <p:nvPr>
-            <p:ph type="sldNum" sz="quarter" idx="11"/>
-          </p:nvPr>
-        </p:nvSpPr>
-        <p:spPr/>
-        <p:txBody>
-          <a:bodyPr/>
-          <a:lstStyle/>
-          <a:p>
-            <a:fld id="{338BD863-DCDC-5F43-A029-265BB7DA4A17}" type="slidenum">
-              <a:rPr lang="en-US" smtClean="0"/>
-              <a:pPr/>
-              <a:t>17</a:t>
-            </a:fld>
-            <a:endParaRPr lang="en-US" dirty="0"/>
-          </a:p>
-        </p:txBody>
-      </p:sp>
-      <p:sp>
-        <p:nvSpPr>
-          <p:cNvPr id="4" name="Title 3"/>
-          <p:cNvSpPr>
-            <a:spLocks noGrp="1"/>
-          </p:cNvSpPr>
-          <p:nvPr>
-            <p:ph type="title"/>
-          </p:nvPr>
-        </p:nvSpPr>
-        <p:spPr/>
-        <p:txBody>
-          <a:bodyPr>
-            <a:normAutofit/>
-          </a:bodyPr>
-          <a:lstStyle/>
-          <a:p>
-            <a:r>
-              <a:rPr lang="pt-BR" dirty="0" smtClean="0">
-                <a:solidFill>
-                  <a:srgbClr val="0070C0"/>
-                </a:solidFill>
-                <a:effectLst>
-                  <a:outerShdw blurRad="38100" dist="38100" dir="2700000" algn="tl">
-                    <a:srgbClr val="000000">
-                      <a:alpha val="43137"/>
-                    </a:srgbClr>
-                  </a:outerShdw>
-                </a:effectLst>
-              </a:rPr>
-              <a:t>Considerações</a:t>
-            </a:r>
-            <a:endParaRPr lang="pt-BR" dirty="0">
-              <a:solidFill>
-                <a:srgbClr val="0070C0"/>
-              </a:solidFill>
-              <a:effectLst>
-                <a:outerShdw blurRad="38100" dist="38100" dir="2700000" algn="tl">
-                  <a:srgbClr val="000000">
-                    <a:alpha val="43137"/>
-                  </a:srgbClr>
-                </a:outerShdw>
-              </a:effectLst>
-            </a:endParaRPr>
-          </a:p>
-        </p:txBody>
-      </p:sp>
-      <p:sp>
-        <p:nvSpPr>
-          <p:cNvPr id="2" name="Espaço Reservado para Conteúdo 1"/>
-          <p:cNvSpPr>
-            <a:spLocks noGrp="1"/>
-          </p:cNvSpPr>
-          <p:nvPr>
-            <p:ph idx="1"/>
-          </p:nvPr>
-        </p:nvSpPr>
-        <p:spPr/>
-        <p:txBody>
-          <a:bodyPr>
-            <a:normAutofit/>
-          </a:bodyPr>
-          <a:lstStyle/>
-          <a:p>
-            <a:r>
-              <a:rPr lang="pt-BR" dirty="0" smtClean="0"/>
-              <a:t>Framework ?</a:t>
-            </a:r>
-          </a:p>
-          <a:p>
-            <a:pPr lvl="1"/>
-            <a:r>
-              <a:rPr lang="pt-BR" dirty="0" err="1" smtClean="0"/>
-              <a:t>runtests</a:t>
-            </a:r>
-            <a:r>
-              <a:rPr lang="pt-BR" dirty="0" smtClean="0"/>
-              <a:t>(‘</a:t>
-            </a:r>
-            <a:r>
-              <a:rPr lang="pt-BR" dirty="0" err="1" smtClean="0"/>
-              <a:t>test_suite</a:t>
-            </a:r>
-            <a:r>
-              <a:rPr lang="pt-BR" dirty="0" smtClean="0"/>
-              <a:t>’)</a:t>
-            </a:r>
-          </a:p>
-          <a:p>
-            <a:pPr lvl="1"/>
-            <a:r>
-              <a:rPr lang="pt-BR" dirty="0" smtClean="0"/>
-              <a:t>Assertivas / Instrumentação</a:t>
-            </a:r>
-          </a:p>
-          <a:p>
-            <a:pPr lvl="1"/>
-            <a:r>
-              <a:rPr lang="pt-BR" dirty="0" smtClean="0"/>
-              <a:t>Resultados tabelados</a:t>
-            </a:r>
-          </a:p>
-          <a:p>
-            <a:pPr lvl="1"/>
-            <a:r>
-              <a:rPr lang="pt-BR" dirty="0" smtClean="0"/>
-              <a:t>Desempenho</a:t>
-            </a:r>
-          </a:p>
-          <a:p>
-            <a:pPr lvl="1"/>
-            <a:r>
-              <a:rPr lang="pt-BR" dirty="0" smtClean="0"/>
-              <a:t>Extensões</a:t>
-            </a:r>
-          </a:p>
-          <a:p>
-            <a:pPr lvl="2"/>
-            <a:r>
-              <a:rPr lang="pt-BR" dirty="0" err="1" smtClean="0"/>
-              <a:t>TestRunner</a:t>
-            </a:r>
-            <a:endParaRPr lang="pt-BR" dirty="0" smtClean="0"/>
-          </a:p>
-          <a:p>
-            <a:pPr lvl="2"/>
-            <a:r>
-              <a:rPr lang="pt-BR" dirty="0" err="1" smtClean="0"/>
-              <a:t>Constraints</a:t>
-            </a:r>
-            <a:endParaRPr lang="pt-BR" dirty="0" smtClean="0"/>
-          </a:p>
-          <a:p>
-            <a:pPr lvl="2"/>
-            <a:r>
-              <a:rPr lang="pt-BR" dirty="0" err="1" smtClean="0"/>
-              <a:t>Tolerance</a:t>
-            </a:r>
-            <a:endParaRPr lang="pt-BR" dirty="0" smtClean="0"/>
-          </a:p>
-          <a:p>
-            <a:pPr lvl="2"/>
-            <a:r>
-              <a:rPr lang="pt-BR" dirty="0" err="1" smtClean="0"/>
-              <a:t>Fixtures</a:t>
-            </a:r>
-            <a:endParaRPr lang="pt-BR" dirty="0" smtClean="0"/>
-          </a:p>
-          <a:p>
-            <a:pPr lvl="1"/>
-            <a:endParaRPr lang="pt-BR" dirty="0" smtClean="0"/>
-          </a:p>
-          <a:p>
-            <a:endParaRPr lang="pt-BR" dirty="0" smtClean="0"/>
-          </a:p>
-          <a:p>
-            <a:pPr lvl="1"/>
-            <a:endParaRPr lang="pt-BR" dirty="0" smtClean="0"/>
-          </a:p>
-          <a:p>
-            <a:pPr lvl="1"/>
-            <a:endParaRPr lang="pt-BR" dirty="0" smtClean="0"/>
-          </a:p>
-        </p:txBody>
-      </p:sp>
-      <p:sp>
-        <p:nvSpPr>
-          <p:cNvPr id="5" name="AutoShape 2" descr="G:\HD-Games\GitRepos\DesignPatterns\CAP392-02-PloP\artigos\03 - Pattern Language\entrega final\family-guy-simpsons2.webp"/>
-          <p:cNvSpPr>
-            <a:spLocks noChangeAspect="1" noChangeArrowheads="1"/>
-          </p:cNvSpPr>
-          <p:nvPr/>
-        </p:nvSpPr>
-        <p:spPr bwMode="auto">
-          <a:xfrm>
-            <a:off x="155575" y="-144463"/>
-            <a:ext cx="304800" cy="304801"/>
-          </a:xfrm>
-          <a:prstGeom prst="rect">
-            <a:avLst/>
-          </a:prstGeom>
-          <a:noFill/>
-          <a:extLst>
-            <a:ext uri="{909E8E84-426E-40DD-AFC4-6F175D3DCCD1}">
-              <a14:hiddenFill xmlns:a14="http://schemas.microsoft.com/office/drawing/2010/main">
-                <a:solidFill>
-                  <a:srgbClr val="FFFFFF"/>
-                </a:solidFill>
-              </a14:hiddenFill>
-            </a:ext>
-          </a:extLst>
-        </p:spPr>
-        <p:txBody>
-          <a:bodyPr vert="horz" wrap="square" lIns="91440" tIns="45720" rIns="91440" bIns="45720" numCol="1" anchor="t" anchorCtr="0" compatLnSpc="1">
-            <a:prstTxWarp prst="textNoShape">
-              <a:avLst/>
-            </a:prstTxWarp>
-          </a:bodyPr>
-          <a:lstStyle/>
-          <a:p>
-            <a:endParaRPr lang="pt-BR"/>
-          </a:p>
-        </p:txBody>
-      </p:sp>
-      <p:sp>
-        <p:nvSpPr>
-          <p:cNvPr id="7" name="AutoShape 4" descr="G:\HD-Games\GitRepos\DesignPatterns\CAP392-02-PloP\artigos\03 - Pattern Language\entrega final\family-guy-simpsons2.webp"/>
-          <p:cNvSpPr>
-            <a:spLocks noChangeAspect="1" noChangeArrowheads="1"/>
-          </p:cNvSpPr>
-          <p:nvPr/>
-        </p:nvSpPr>
-        <p:spPr bwMode="auto">
-          <a:xfrm>
-            <a:off x="307975" y="7937"/>
-            <a:ext cx="304800" cy="304801"/>
-          </a:xfrm>
-          <a:prstGeom prst="rect">
-            <a:avLst/>
-          </a:prstGeom>
-          <a:noFill/>
-          <a:extLst>
-            <a:ext uri="{909E8E84-426E-40DD-AFC4-6F175D3DCCD1}">
-              <a14:hiddenFill xmlns:a14="http://schemas.microsoft.com/office/drawing/2010/main">
-                <a:solidFill>
-                  <a:srgbClr val="FFFFFF"/>
-                </a:solidFill>
-              </a14:hiddenFill>
-            </a:ext>
-          </a:extLst>
-        </p:spPr>
-        <p:txBody>
-          <a:bodyPr vert="horz" wrap="square" lIns="91440" tIns="45720" rIns="91440" bIns="45720" numCol="1" anchor="t" anchorCtr="0" compatLnSpc="1">
-            <a:prstTxWarp prst="textNoShape">
-              <a:avLst/>
-            </a:prstTxWarp>
-          </a:bodyPr>
-          <a:lstStyle/>
-          <a:p>
-            <a:endParaRPr lang="pt-BR"/>
-          </a:p>
-        </p:txBody>
-      </p:sp>
-    </p:spTree>
-    <p:extLst>
-      <p:ext uri="{BB962C8B-B14F-4D97-AF65-F5344CB8AC3E}">
-        <p14:creationId xmlns:p14="http://schemas.microsoft.com/office/powerpoint/2010/main" val="4243044682"/>
-      </p:ext>
-    </p:extLst>
-  </p:cSld>
-  <p:clrMapOvr>
-    <a:masterClrMapping/>
-  </p:clrMapOvr>
-  <mc:AlternateContent xmlns:mc="http://schemas.openxmlformats.org/markup-compatibility/2006" xmlns:p14="http://schemas.microsoft.com/office/powerpoint/2010/main">
-    <mc:Choice Requires="p14">
-      <p:transition p14:dur="0"/>
-    </mc:Choice>
-    <mc:Fallback xmlns="">
-      <p:transition/>
-    </mc:Fallback>
-  </mc:AlternateContent>
-  <p:timing>
-    <p:tnLst>
-      <p:par>
-        <p:cTn id="1" dur="indefinite" restart="never" nodeType="tmRoot"/>
-      </p:par>
-    </p:tnLst>
-  </p:timing>
-</p:sld>
-</file>
-
 <file path=ppt/slides/slide18.xml><?xml version="1.0" encoding="utf-8"?>
 <p:sld xmlns:a="http://schemas.openxmlformats.org/drawingml/2006/main" xmlns:r="http://schemas.openxmlformats.org/officeDocument/2006/relationships" xmlns:p="http://schemas.openxmlformats.org/presentationml/2006/main">
   <p:cSld>
@@ -6630,6 +6593,53 @@
       </p:sp>
       <p:sp>
         <p:nvSpPr>
+          <p:cNvPr id="4" name="Title 3"/>
+          <p:cNvSpPr>
+            <a:spLocks noGrp="1"/>
+          </p:cNvSpPr>
+          <p:nvPr>
+            <p:ph type="title"/>
+          </p:nvPr>
+        </p:nvSpPr>
+        <p:spPr/>
+        <p:txBody>
+          <a:bodyPr>
+            <a:normAutofit/>
+          </a:bodyPr>
+          <a:lstStyle/>
+          <a:p>
+            <a:r>
+              <a:rPr lang="pt-BR" dirty="0" smtClean="0">
+                <a:solidFill>
+                  <a:srgbClr val="0070C0"/>
+                </a:solidFill>
+                <a:effectLst>
+                  <a:outerShdw blurRad="38100" dist="38100" dir="2700000" algn="tl">
+                    <a:srgbClr val="000000">
+                      <a:alpha val="43137"/>
+                    </a:srgbClr>
+                  </a:outerShdw>
+                </a:effectLst>
+              </a:rPr>
+              <a:t>Considerações</a:t>
+            </a:r>
+            <a:endParaRPr lang="pt-BR" dirty="0">
+              <a:solidFill>
+                <a:srgbClr val="0070C0"/>
+              </a:solidFill>
+              <a:effectLst>
+                <a:outerShdw blurRad="38100" dist="38100" dir="2700000" algn="tl">
+                  <a:srgbClr val="000000">
+                    <a:alpha val="43137"/>
+                  </a:srgbClr>
+                </a:outerShdw>
+              </a:effectLst>
+            </a:endParaRPr>
+          </a:p>
+        </p:txBody>
+      </p:sp>
+      <p:sp>
+        <p:nvSpPr>
           <p:cNvPr id="2" name="Espaço Reservado para Conteúdo 1"/>
           <p:cNvSpPr>
             <a:spLocks noGrp="1"/>
@@ -6638,93 +6648,111 @@
             <p:ph idx="1"/>
           </p:nvPr>
         </p:nvSpPr>
-        <p:spPr>
-          <a:xfrm>
-            <a:off x="457200" y="1196752"/>
-            <a:ext cx="8229600" cy="5328592"/>
-          </a:xfrm>
-        </p:spPr>
+        <p:spPr/>
         <p:txBody>
           <a:bodyPr>
-            <a:noAutofit/>
+            <a:normAutofit/>
           </a:bodyPr>
           <a:lstStyle/>
           <a:p>
             <a:r>
-              <a:rPr lang="pt-BR" sz="2800" dirty="0" smtClean="0">
-                <a:hlinkClick r:id="rId2"/>
-              </a:rPr>
-              <a:t>http://blog.caelum.com.br/o-minimo-que-voce-deve-saber-de-java-8/</a:t>
-            </a:r>
-          </a:p>
-          <a:p>
-            <a:r>
-              <a:rPr lang="pt-BR" sz="2800" dirty="0" smtClean="0">
-                <a:hlinkClick r:id="rId2"/>
-              </a:rPr>
-              <a:t>http://pt.stackoverflow.com/questions/269/quais-as-vantagens-das-express%C3%B5es-</a:t>
-            </a:r>
-            <a:r>
-              <a:rPr lang="pt-BR" sz="2800" dirty="0" err="1" smtClean="0">
-                <a:hlinkClick r:id="rId2"/>
-              </a:rPr>
-              <a:t>lambda-presentes-no-java</a:t>
-            </a:r>
-            <a:r>
-              <a:rPr lang="pt-BR" sz="2800" dirty="0" smtClean="0">
-                <a:hlinkClick r:id="rId2"/>
-              </a:rPr>
-              <a:t>-8</a:t>
-            </a:r>
-            <a:endParaRPr lang="pt-BR" sz="2800" dirty="0" smtClean="0"/>
-          </a:p>
-          <a:p>
-            <a:r>
-              <a:rPr lang="pt-BR" sz="2400" dirty="0" smtClean="0">
-                <a:hlinkClick r:id="rId3"/>
-              </a:rPr>
-              <a:t>http://www.devmedia.com.br/como-usar-funcoes-lambda-em-java/32826</a:t>
-            </a:r>
-            <a:endParaRPr lang="pt-BR" sz="2400" dirty="0" smtClean="0"/>
-          </a:p>
-          <a:p>
-            <a:r>
-              <a:rPr lang="pt-BR" sz="2400" dirty="0" smtClean="0">
-                <a:hlinkClick r:id="rId4"/>
-              </a:rPr>
-              <a:t>http://www.devmedia.com.br/novidades-do-java-8-do-lambda-ao-metaspace/29056</a:t>
-            </a:r>
-            <a:endParaRPr lang="pt-BR" sz="2400" dirty="0" smtClean="0"/>
-          </a:p>
-          <a:p>
-            <a:r>
-              <a:rPr lang="pt-BR" sz="2400" dirty="0" smtClean="0">
-                <a:hlinkClick r:id="rId5"/>
-              </a:rPr>
-              <a:t>http://www.teclogica.com.br/blog/java-8-o-que-e-lambda/</a:t>
-            </a:r>
-            <a:endParaRPr lang="pt-BR" sz="2400" dirty="0" smtClean="0"/>
-          </a:p>
-          <a:p>
-            <a:r>
-              <a:rPr lang="pt-BR" sz="2400" dirty="0" smtClean="0">
-                <a:hlinkClick r:id="rId6"/>
-              </a:rPr>
-              <a:t>https://rodrigouchoa.wordpress.com/2014/05/20/novidades-do-java-8-lambda-expressions/</a:t>
-            </a:r>
-            <a:endParaRPr lang="pt-BR" sz="2400" dirty="0" smtClean="0"/>
-          </a:p>
-          <a:p>
-            <a:r>
-              <a:rPr lang="pt-BR" sz="2400" dirty="0" smtClean="0">
-                <a:hlinkClick r:id="rId7"/>
-              </a:rPr>
-              <a:t>http://blog.takipi.com/compilando-expressoes-lambda-scala-vs-java-8/</a:t>
-            </a:r>
-            <a:endParaRPr lang="pt-BR" sz="2400" dirty="0" smtClean="0"/>
-          </a:p>
-          <a:p>
-            <a:endParaRPr lang="pt-BR" sz="2400" dirty="0"/>
+              <a:rPr lang="pt-BR" dirty="0" smtClean="0"/>
+              <a:t>Framework ?</a:t>
+            </a:r>
+          </a:p>
+          <a:p>
+            <a:pPr lvl="1"/>
+            <a:r>
+              <a:rPr lang="pt-BR" dirty="0" err="1" smtClean="0"/>
+              <a:t>runtests</a:t>
+            </a:r>
+            <a:r>
+              <a:rPr lang="pt-BR" dirty="0" smtClean="0"/>
+              <a:t>(‘</a:t>
+            </a:r>
+            <a:r>
+              <a:rPr lang="pt-BR" dirty="0" err="1" smtClean="0"/>
+              <a:t>test_suite</a:t>
+            </a:r>
+            <a:r>
+              <a:rPr lang="pt-BR" dirty="0" smtClean="0"/>
+              <a:t>’)</a:t>
+            </a:r>
+          </a:p>
+          <a:p>
+            <a:pPr lvl="1"/>
+            <a:r>
+              <a:rPr lang="pt-BR" dirty="0" smtClean="0"/>
+              <a:t>Assertivas / Instrumentação</a:t>
+            </a:r>
+          </a:p>
+          <a:p>
+            <a:pPr lvl="1"/>
+            <a:r>
+              <a:rPr lang="pt-BR" dirty="0" smtClean="0"/>
+              <a:t>Resultados tabelados</a:t>
+            </a:r>
+          </a:p>
+          <a:p>
+            <a:pPr lvl="1"/>
+            <a:r>
+              <a:rPr lang="pt-BR" dirty="0" smtClean="0"/>
+              <a:t>Desempenho</a:t>
+            </a:r>
+          </a:p>
+          <a:p>
+            <a:pPr lvl="1"/>
+            <a:r>
+              <a:rPr lang="pt-BR" dirty="0" smtClean="0"/>
+              <a:t>Extensões</a:t>
+            </a:r>
+          </a:p>
+          <a:p>
+            <a:pPr lvl="2"/>
+            <a:r>
+              <a:rPr lang="pt-BR" dirty="0" err="1" smtClean="0"/>
+              <a:t>TestRunner</a:t>
+            </a:r>
+            <a:endParaRPr lang="pt-BR" dirty="0" smtClean="0"/>
+          </a:p>
+          <a:p>
+            <a:pPr lvl="2"/>
+            <a:r>
+              <a:rPr lang="pt-BR" dirty="0" err="1" smtClean="0"/>
+              <a:t>Constraints</a:t>
+            </a:r>
+            <a:endParaRPr lang="pt-BR" dirty="0" smtClean="0"/>
+          </a:p>
+          <a:p>
+            <a:pPr lvl="2"/>
+            <a:r>
+              <a:rPr lang="pt-BR" dirty="0" err="1" smtClean="0"/>
+              <a:t>Tolerance</a:t>
+            </a:r>
+            <a:endParaRPr lang="pt-BR" dirty="0" smtClean="0"/>
+          </a:p>
+          <a:p>
+            <a:pPr lvl="2"/>
+            <a:r>
+              <a:rPr lang="pt-BR" dirty="0" err="1" smtClean="0"/>
+              <a:t>Fixtures</a:t>
+            </a:r>
+            <a:endParaRPr lang="pt-BR" dirty="0" smtClean="0"/>
+          </a:p>
+          <a:p>
+            <a:pPr lvl="1"/>
+            <a:endParaRPr lang="pt-BR" dirty="0" smtClean="0"/>
+          </a:p>
+          <a:p>
+            <a:endParaRPr lang="pt-BR" dirty="0" smtClean="0"/>
+          </a:p>
+          <a:p>
+            <a:pPr lvl="1"/>
+            <a:endParaRPr lang="pt-BR" dirty="0" smtClean="0"/>
+          </a:p>
+          <a:p>
+            <a:pPr lvl="1"/>
+            <a:endParaRPr lang="pt-BR" dirty="0" smtClean="0"/>
           </a:p>
         </p:txBody>
       </p:sp>
@@ -6806,57 +6834,10 @@
           </a:p>
         </p:txBody>
       </p:sp>
-      <p:sp>
-        <p:nvSpPr>
-          <p:cNvPr id="9" name="Title 3"/>
-          <p:cNvSpPr>
-            <a:spLocks noGrp="1"/>
-          </p:cNvSpPr>
-          <p:nvPr>
-            <p:ph type="title"/>
-          </p:nvPr>
-        </p:nvSpPr>
-        <p:spPr/>
-        <p:txBody>
-          <a:bodyPr>
-            <a:normAutofit fontScale="90000"/>
-          </a:bodyPr>
-          <a:lstStyle/>
-          <a:p>
-            <a:r>
-              <a:rPr lang="en-US" dirty="0" smtClean="0">
-                <a:solidFill>
-                  <a:srgbClr val="0070C0"/>
-                </a:solidFill>
-                <a:effectLst>
-                  <a:outerShdw blurRad="38100" dist="38100" dir="2700000" algn="tl">
-                    <a:srgbClr val="000000">
-                      <a:alpha val="43137"/>
-                    </a:srgbClr>
-                  </a:outerShdw>
-                </a:effectLst>
-              </a:rPr>
-              <a:t>Java 8 Lambda Expressions Revision</a:t>
-            </a:r>
-            <a:endParaRPr lang="en-US" dirty="0">
-              <a:solidFill>
-                <a:srgbClr val="0070C0"/>
-              </a:solidFill>
-              <a:effectLst>
-                <a:outerShdw blurRad="38100" dist="38100" dir="2700000" algn="tl">
-                  <a:srgbClr val="000000">
-                    <a:alpha val="43137"/>
-                  </a:srgbClr>
-                </a:outerShdw>
-              </a:effectLst>
-            </a:endParaRPr>
-          </a:p>
-        </p:txBody>
-      </p:sp>
     </p:spTree>
     <p:extLst>
       <p:ext uri="{BB962C8B-B14F-4D97-AF65-F5344CB8AC3E}">
-        <p14:creationId xmlns:p14="http://schemas.microsoft.com/office/powerpoint/2010/main" val="1979461865"/>
+        <p14:creationId xmlns:p14="http://schemas.microsoft.com/office/powerpoint/2010/main" val="4243044682"/>
       </p:ext>
     </p:extLst>
   </p:cSld>
@@ -6935,7 +6916,7 @@
         <p:spPr>
           <a:xfrm>
             <a:off x="457200" y="1196752"/>
-            <a:ext cx="8229600" cy="4824536"/>
+            <a:ext cx="8229600" cy="5328592"/>
           </a:xfrm>
         </p:spPr>
         <p:txBody>
@@ -6945,19 +6926,39 @@
           <a:lstStyle/>
           <a:p>
             <a:r>
-              <a:rPr lang="pt-BR" sz="2400" dirty="0" smtClean="0">
+              <a:rPr lang="pt-BR" sz="2800" dirty="0" smtClean="0">
                 <a:hlinkClick r:id="rId2"/>
               </a:rPr>
-              <a:t>http://stackoverflow.com/questions/28688047/unit-test-code-with-java-8-lambdas</a:t>
-            </a:r>
-            <a:endParaRPr lang="pt-BR" sz="2400" dirty="0" smtClean="0"/>
+              <a:t>http://blog.caelum.com.br/o-minimo-que-voce-deve-saber-de-java-8/</a:t>
+            </a:r>
+          </a:p>
+          <a:p>
+            <a:r>
+              <a:rPr lang="pt-BR" sz="2800" dirty="0" smtClean="0">
+                <a:hlinkClick r:id="rId2"/>
+              </a:rPr>
+              <a:t>http://pt.stackoverflow.com/questions/269/quais-as-vantagens-das-express%C3%B5es-</a:t>
+            </a:r>
+            <a:r>
+              <a:rPr lang="pt-BR" sz="2800" dirty="0" err="1" smtClean="0">
+                <a:hlinkClick r:id="rId2"/>
+              </a:rPr>
+              <a:t>lambda-presentes-no-java</a:t>
+            </a:r>
+            <a:r>
+              <a:rPr lang="pt-BR" sz="2800" dirty="0" smtClean="0">
+                <a:hlinkClick r:id="rId2"/>
+              </a:rPr>
+              <a:t>-8</a:t>
+            </a:r>
+            <a:endParaRPr lang="pt-BR" sz="2800" dirty="0" smtClean="0"/>
           </a:p>
           <a:p>
             <a:r>
               <a:rPr lang="pt-BR" sz="2400" dirty="0" smtClean="0">
                 <a:hlinkClick r:id="rId3"/>
               </a:rPr>
-              <a:t>http://stackoverflow.com/questions/34576710/how-to-test-lambda-functions</a:t>
+              <a:t>http://www.devmedia.com.br/como-usar-funcoes-lambda-em-java/32826</a:t>
             </a:r>
             <a:endParaRPr lang="pt-BR" sz="2400" dirty="0" smtClean="0"/>
           </a:p>
@@ -6966,7 +6967,7 @@
               <a:rPr lang="pt-BR" sz="2400" dirty="0" smtClean="0">
                 <a:hlinkClick r:id="rId4"/>
               </a:rPr>
-              <a:t>https://pythonconquerstheuniverse.wordpress.com/2011/08/29/lambda_tutorial/</a:t>
+              <a:t>http://www.devmedia.com.br/novidades-do-java-8-do-lambda-ao-metaspace/29056</a:t>
             </a:r>
             <a:endParaRPr lang="pt-BR" sz="2400" dirty="0" smtClean="0"/>
           </a:p>
@@ -6975,43 +6976,29 @@
               <a:rPr lang="pt-BR" sz="2400" dirty="0" smtClean="0">
                 <a:hlinkClick r:id="rId5"/>
               </a:rPr>
-              <a:t>http://www.coderanch.com/t/647426/Testing/approach-testing-lambda-expressions</a:t>
+              <a:t>http://www.teclogica.com.br/blog/java-8-o-que-e-lambda/</a:t>
             </a:r>
             <a:endParaRPr lang="pt-BR" sz="2400" dirty="0" smtClean="0"/>
           </a:p>
           <a:p>
-            <a:endParaRPr lang="pt-BR" sz="2400" dirty="0" smtClean="0"/>
-          </a:p>
-          <a:p>
-            <a:r>
-              <a:rPr lang="pt-BR" sz="2400" dirty="0" err="1" smtClean="0"/>
-              <a:t>Node</a:t>
-            </a:r>
-            <a:r>
-              <a:rPr lang="pt-BR" sz="2400" dirty="0" smtClean="0"/>
-              <a:t>.</a:t>
-            </a:r>
-            <a:r>
-              <a:rPr lang="pt-BR" sz="2400" dirty="0" err="1" smtClean="0"/>
-              <a:t>js</a:t>
-            </a:r>
-            <a:r>
-              <a:rPr lang="pt-BR" sz="2400" dirty="0" smtClean="0"/>
-              <a:t> </a:t>
-            </a:r>
             <a:r>
               <a:rPr lang="pt-BR" sz="2400" dirty="0" smtClean="0">
                 <a:hlinkClick r:id="rId6"/>
               </a:rPr>
-              <a:t>https://pub.scotch.io/@richardhyatt/unit-testing-aws-lambda-functions-in-nodejs</a:t>
+              <a:t>https://rodrigouchoa.wordpress.com/2014/05/20/novidades-do-java-8-lambda-expressions/</a:t>
             </a:r>
             <a:endParaRPr lang="pt-BR" sz="2400" dirty="0" smtClean="0"/>
           </a:p>
           <a:p>
             <a:r>
-              <a:rPr lang="pt-BR" sz="2400" dirty="0" err="1" smtClean="0"/>
-              <a:t>Python</a:t>
-            </a:r>
+              <a:rPr lang="pt-BR" sz="2400" dirty="0" smtClean="0">
+                <a:hlinkClick r:id="rId7"/>
+              </a:rPr>
+              <a:t>http://blog.takipi.com/compilando-expressoes-lambda-scala-vs-java-8/</a:t>
+            </a:r>
+            <a:endParaRPr lang="pt-BR" sz="2400" dirty="0" smtClean="0"/>
+          </a:p>
+          <a:p>
             <a:endParaRPr lang="pt-BR" sz="2400" dirty="0"/>
           </a:p>
         </p:txBody>
@@ -7107,12 +7094,12 @@
         <p:spPr/>
         <p:txBody>
           <a:bodyPr>
-            <a:normAutofit/>
+            <a:normAutofit fontScale="90000"/>
           </a:bodyPr>
           <a:lstStyle/>
           <a:p>
             <a:r>
-              <a:rPr lang="en-US" dirty="0" err="1" smtClean="0">
+              <a:rPr lang="en-US" dirty="0" smtClean="0">
                 <a:solidFill>
                   <a:srgbClr val="0070C0"/>
                 </a:solidFill>
@@ -7124,22 +7111,7 @@
                   </a:outerShdw>
                 </a:effectLst>
               </a:rPr>
-              <a:t>JUnit</a:t>
-            </a:r>
-            <a:r>
-              <a:rPr lang="en-US" dirty="0" smtClean="0">
-                <a:solidFill>
-                  <a:srgbClr val="0070C0"/>
-                </a:solidFill>
-                <a:effectLst>
-                  <a:outerShdw blurRad="38100" dist="38100" dir="2700000" algn="tl">
-                    <a:srgbClr val="000000">
-                      <a:alpha val="43137"/>
-                    </a:srgbClr>
-                  </a:outerShdw>
-                </a:effectLst>
-              </a:rPr>
-              <a:t> 5 Test Framework</a:t>
+              <a:t>Java 8 Lambda Expressions Revision</a:t>
             </a:r>
             <a:endParaRPr lang="en-US" dirty="0">
               <a:solidFill>
@@ -7311,6 +7283,13 @@
           </a:p>
           <a:p>
             <a:r>
+              <a:rPr lang="pt-BR" dirty="0" smtClean="0"/>
+              <a:t>Arquitetura do Framework</a:t>
+            </a:r>
+            <a:endParaRPr lang="pt-BR" dirty="0" smtClean="0"/>
+          </a:p>
+          <a:p>
+            <a:r>
               <a:rPr lang="pt-BR" dirty="0" err="1" smtClean="0"/>
               <a:t>Junit</a:t>
             </a:r>
@@ -7431,6 +7410,309 @@
     <p:extLst>
       <p:ext uri="{BB962C8B-B14F-4D97-AF65-F5344CB8AC3E}">
         <p14:creationId xmlns:p14="http://schemas.microsoft.com/office/powerpoint/2010/main" val="1899240751"/>
+      </p:ext>
+    </p:extLst>
+  </p:cSld>
+  <p:clrMapOvr>
+    <a:masterClrMapping/>
+  </p:clrMapOvr>
+  <mc:AlternateContent xmlns:mc="http://schemas.openxmlformats.org/markup-compatibility/2006" xmlns:p14="http://schemas.microsoft.com/office/powerpoint/2010/main">
+    <mc:Choice Requires="p14">
+      <p:transition p14:dur="0"/>
+    </mc:Choice>
+    <mc:Fallback xmlns="">
+      <p:transition/>
+    </mc:Fallback>
+  </mc:AlternateContent>
+  <p:timing>
+    <p:tnLst>
+      <p:par>
+        <p:cTn id="1" dur="indefinite" restart="never" nodeType="tmRoot"/>
+      </p:par>
+    </p:tnLst>
+  </p:timing>
+</p:sld>
+</file>
+
+<file path=ppt/slides/slide20.xml><?xml version="1.0" encoding="utf-8"?>
+<p:sld xmlns:a="http://schemas.openxmlformats.org/drawingml/2006/main" xmlns:r="http://schemas.openxmlformats.org/officeDocument/2006/relationships" xmlns:p="http://schemas.openxmlformats.org/presentationml/2006/main">
+  <p:cSld>
+    <p:spTree>
+      <p:nvGrpSpPr>
+        <p:cNvPr id="1" name=""/>
+        <p:cNvGrpSpPr/>
+        <p:nvPr/>
+      </p:nvGrpSpPr>
+      <p:grpSpPr>
+        <a:xfrm>
+          <a:off x="0" y="0"/>
+          <a:ext cx="0" cy="0"/>
+          <a:chOff x="0" y="0"/>
+          <a:chExt cx="0" cy="0"/>
+        </a:xfrm>
+      </p:grpSpPr>
+      <p:sp>
+        <p:nvSpPr>
+          <p:cNvPr id="3" name="Slide Number Placeholder 2"/>
+          <p:cNvSpPr>
+            <a:spLocks noGrp="1"/>
+          </p:cNvSpPr>
+          <p:nvPr>
+            <p:ph type="sldNum" sz="quarter" idx="11"/>
+          </p:nvPr>
+        </p:nvSpPr>
+        <p:spPr/>
+        <p:txBody>
+          <a:bodyPr/>
+          <a:lstStyle/>
+          <a:p>
+            <a:fld id="{338BD863-DCDC-5F43-A029-265BB7DA4A17}" type="slidenum">
+              <a:rPr lang="en-US" smtClean="0"/>
+              <a:pPr/>
+              <a:t>20</a:t>
+            </a:fld>
+            <a:endParaRPr lang="en-US" dirty="0"/>
+          </a:p>
+        </p:txBody>
+      </p:sp>
+      <p:sp>
+        <p:nvSpPr>
+          <p:cNvPr id="2" name="Espaço Reservado para Conteúdo 1"/>
+          <p:cNvSpPr>
+            <a:spLocks noGrp="1"/>
+          </p:cNvSpPr>
+          <p:nvPr>
+            <p:ph idx="1"/>
+          </p:nvPr>
+        </p:nvSpPr>
+        <p:spPr>
+          <a:xfrm>
+            <a:off x="457200" y="1196752"/>
+            <a:ext cx="8229600" cy="4824536"/>
+          </a:xfrm>
+        </p:spPr>
+        <p:txBody>
+          <a:bodyPr>
+            <a:noAutofit/>
+          </a:bodyPr>
+          <a:lstStyle/>
+          <a:p>
+            <a:r>
+              <a:rPr lang="pt-BR" sz="2400" dirty="0" smtClean="0">
+                <a:hlinkClick r:id="rId2"/>
+              </a:rPr>
+              <a:t>http://stackoverflow.com/questions/28688047/unit-test-code-with-java-8-lambdas</a:t>
+            </a:r>
+            <a:endParaRPr lang="pt-BR" sz="2400" dirty="0" smtClean="0"/>
+          </a:p>
+          <a:p>
+            <a:r>
+              <a:rPr lang="pt-BR" sz="2400" dirty="0" smtClean="0">
+                <a:hlinkClick r:id="rId3"/>
+              </a:rPr>
+              <a:t>http://stackoverflow.com/questions/34576710/how-to-test-lambda-functions</a:t>
+            </a:r>
+            <a:endParaRPr lang="pt-BR" sz="2400" dirty="0" smtClean="0"/>
+          </a:p>
+          <a:p>
+            <a:r>
+              <a:rPr lang="pt-BR" sz="2400" dirty="0" smtClean="0">
+                <a:hlinkClick r:id="rId4"/>
+              </a:rPr>
+              <a:t>https://pythonconquerstheuniverse.wordpress.com/2011/08/29/lambda_tutorial/</a:t>
+            </a:r>
+            <a:endParaRPr lang="pt-BR" sz="2400" dirty="0" smtClean="0"/>
+          </a:p>
+          <a:p>
+            <a:r>
+              <a:rPr lang="pt-BR" sz="2400" dirty="0" smtClean="0">
+                <a:hlinkClick r:id="rId5"/>
+              </a:rPr>
+              <a:t>http://www.coderanch.com/t/647426/Testing/approach-testing-lambda-expressions</a:t>
+            </a:r>
+            <a:endParaRPr lang="pt-BR" sz="2400" dirty="0" smtClean="0"/>
+          </a:p>
+          <a:p>
+            <a:endParaRPr lang="pt-BR" sz="2400" dirty="0" smtClean="0"/>
+          </a:p>
+          <a:p>
+            <a:r>
+              <a:rPr lang="pt-BR" sz="2400" dirty="0" err="1" smtClean="0"/>
+              <a:t>Node</a:t>
+            </a:r>
+            <a:r>
+              <a:rPr lang="pt-BR" sz="2400" dirty="0" smtClean="0"/>
+              <a:t>.</a:t>
+            </a:r>
+            <a:r>
+              <a:rPr lang="pt-BR" sz="2400" dirty="0" err="1" smtClean="0"/>
+              <a:t>js</a:t>
+            </a:r>
+            <a:r>
+              <a:rPr lang="pt-BR" sz="2400" dirty="0" smtClean="0"/>
+              <a:t> </a:t>
+            </a:r>
+            <a:r>
+              <a:rPr lang="pt-BR" sz="2400" dirty="0" smtClean="0">
+                <a:hlinkClick r:id="rId6"/>
+              </a:rPr>
+              <a:t>https://pub.scotch.io/@richardhyatt/unit-testing-aws-lambda-functions-in-nodejs</a:t>
+            </a:r>
+            <a:endParaRPr lang="pt-BR" sz="2400" dirty="0" smtClean="0"/>
+          </a:p>
+          <a:p>
+            <a:r>
+              <a:rPr lang="pt-BR" sz="2400" dirty="0" err="1" smtClean="0"/>
+              <a:t>Python</a:t>
+            </a:r>
+            <a:endParaRPr lang="pt-BR" sz="2400" dirty="0"/>
+          </a:p>
+        </p:txBody>
+      </p:sp>
+      <p:sp>
+        <p:nvSpPr>
+          <p:cNvPr id="5" name="AutoShape 2" descr="G:\HD-Games\GitRepos\DesignPatterns\CAP392-02-PloP\artigos\03 - Pattern Language\entrega final\family-guy-simpsons2.webp"/>
+          <p:cNvSpPr>
+            <a:spLocks noChangeAspect="1" noChangeArrowheads="1"/>
+          </p:cNvSpPr>
+          <p:nvPr/>
+        </p:nvSpPr>
+        <p:spPr bwMode="auto">
+          <a:xfrm>
+            <a:off x="155575" y="-144463"/>
+            <a:ext cx="304800" cy="304801"/>
+          </a:xfrm>
+          <a:prstGeom prst="rect">
+            <a:avLst/>
+          </a:prstGeom>
+          <a:noFill/>
+          <a:extLst>
+            <a:ext uri="{909E8E84-426E-40DD-AFC4-6F175D3DCCD1}">
+              <a14:hiddenFill xmlns:a14="http://schemas.microsoft.com/office/drawing/2010/main">
+                <a:solidFill>
+                  <a:srgbClr val="FFFFFF"/>
+                </a:solidFill>
+              </a14:hiddenFill>
+            </a:ext>
+          </a:extLst>
+        </p:spPr>
+        <p:txBody>
+          <a:bodyPr vert="horz" wrap="square" lIns="91440" tIns="45720" rIns="91440" bIns="45720" numCol="1" anchor="t" anchorCtr="0" compatLnSpc="1">
+            <a:prstTxWarp prst="textNoShape">
+              <a:avLst/>
+            </a:prstTxWarp>
+          </a:bodyPr>
+          <a:lstStyle/>
+          <a:p>
+            <a:endParaRPr lang="pt-BR"/>
+          </a:p>
+        </p:txBody>
+      </p:sp>
+      <p:sp>
+        <p:nvSpPr>
+          <p:cNvPr id="7" name="AutoShape 4" descr="G:\HD-Games\GitRepos\DesignPatterns\CAP392-02-PloP\artigos\03 - Pattern Language\entrega final\family-guy-simpsons2.webp"/>
+          <p:cNvSpPr>
+            <a:spLocks noChangeAspect="1" noChangeArrowheads="1"/>
+          </p:cNvSpPr>
+          <p:nvPr/>
+        </p:nvSpPr>
+        <p:spPr bwMode="auto">
+          <a:xfrm>
+            <a:off x="307975" y="7937"/>
+            <a:ext cx="304800" cy="304801"/>
+          </a:xfrm>
+          <a:prstGeom prst="rect">
+            <a:avLst/>
+          </a:prstGeom>
+          <a:noFill/>
+          <a:extLst>
+            <a:ext uri="{909E8E84-426E-40DD-AFC4-6F175D3DCCD1}">
+              <a14:hiddenFill xmlns:a14="http://schemas.microsoft.com/office/drawing/2010/main">
+                <a:solidFill>
+                  <a:srgbClr val="FFFFFF"/>
+                </a:solidFill>
+              </a14:hiddenFill>
+            </a:ext>
+          </a:extLst>
+        </p:spPr>
+        <p:txBody>
+          <a:bodyPr vert="horz" wrap="square" lIns="91440" tIns="45720" rIns="91440" bIns="45720" numCol="1" anchor="t" anchorCtr="0" compatLnSpc="1">
+            <a:prstTxWarp prst="textNoShape">
+              <a:avLst/>
+            </a:prstTxWarp>
+          </a:bodyPr>
+          <a:lstStyle/>
+          <a:p>
+            <a:endParaRPr lang="pt-BR"/>
+          </a:p>
+        </p:txBody>
+      </p:sp>
+      <p:sp>
+        <p:nvSpPr>
+          <p:cNvPr id="9" name="Title 3"/>
+          <p:cNvSpPr>
+            <a:spLocks noGrp="1"/>
+          </p:cNvSpPr>
+          <p:nvPr>
+            <p:ph type="title"/>
+          </p:nvPr>
+        </p:nvSpPr>
+        <p:spPr/>
+        <p:txBody>
+          <a:bodyPr>
+            <a:normAutofit/>
+          </a:bodyPr>
+          <a:lstStyle/>
+          <a:p>
+            <a:r>
+              <a:rPr lang="en-US" dirty="0" err="1" smtClean="0">
+                <a:solidFill>
+                  <a:srgbClr val="0070C0"/>
+                </a:solidFill>
+                <a:effectLst>
+                  <a:outerShdw blurRad="38100" dist="38100" dir="2700000" algn="tl">
+                    <a:srgbClr val="000000">
+                      <a:alpha val="43137"/>
+                    </a:srgbClr>
+                  </a:outerShdw>
+                </a:effectLst>
+              </a:rPr>
+              <a:t>JUnit</a:t>
+            </a:r>
+            <a:r>
+              <a:rPr lang="en-US" dirty="0" smtClean="0">
+                <a:solidFill>
+                  <a:srgbClr val="0070C0"/>
+                </a:solidFill>
+                <a:effectLst>
+                  <a:outerShdw blurRad="38100" dist="38100" dir="2700000" algn="tl">
+                    <a:srgbClr val="000000">
+                      <a:alpha val="43137"/>
+                    </a:srgbClr>
+                  </a:outerShdw>
+                </a:effectLst>
+              </a:rPr>
+              <a:t> 5 Test Framework</a:t>
+            </a:r>
+            <a:endParaRPr lang="en-US" dirty="0">
+              <a:solidFill>
+                <a:srgbClr val="0070C0"/>
+              </a:solidFill>
+              <a:effectLst>
+                <a:outerShdw blurRad="38100" dist="38100" dir="2700000" algn="tl">
+                  <a:srgbClr val="000000">
+                    <a:alpha val="43137"/>
+                  </a:srgbClr>
+                </a:outerShdw>
+              </a:effectLst>
+            </a:endParaRPr>
+          </a:p>
+        </p:txBody>
+      </p:sp>
+    </p:spTree>
+    <p:extLst>
+      <p:ext uri="{BB962C8B-B14F-4D97-AF65-F5344CB8AC3E}">
+        <p14:creationId xmlns:p14="http://schemas.microsoft.com/office/powerpoint/2010/main" val="1979461865"/>
       </p:ext>
     </p:extLst>
   </p:cSld>
@@ -7561,34 +7843,62 @@
           <a:lstStyle/>
           <a:p>
             <a:r>
-              <a:rPr lang="pt-BR" dirty="0" smtClean="0"/>
-              <a:t>MATLAB (</a:t>
+              <a:rPr lang="en-US" dirty="0" err="1"/>
+              <a:t>JUnit</a:t>
+            </a:r>
+            <a:r>
+              <a:rPr lang="en-US" dirty="0"/>
+              <a:t> 5 is composed of several different modules from three different </a:t>
             </a:r>
             <a:r>
               <a:rPr lang="en-US" dirty="0" smtClean="0"/>
-              <a:t>MATrix LABoratory</a:t>
-            </a:r>
-            <a:r>
-              <a:rPr lang="pt-BR" dirty="0" smtClean="0"/>
-              <a:t>) </a:t>
-            </a:r>
+              <a:t>sub-projects:</a:t>
+            </a:r>
+            <a:endParaRPr lang="en-US" dirty="0"/>
           </a:p>
           <a:p>
             <a:pPr lvl="1"/>
             <a:r>
-              <a:rPr lang="pt-BR" dirty="0" smtClean="0"/>
-              <a:t>Linguagem para computação científica, usando como base o cálculo de matrizes e suas aplicações</a:t>
-            </a:r>
-          </a:p>
-          <a:p>
-            <a:pPr lvl="1"/>
-            <a:r>
-              <a:rPr lang="pt-BR" i="1" dirty="0" smtClean="0">
-                <a:hlinkClick r:id="rId2"/>
-              </a:rPr>
-              <a:t>https://www.youtube.com/watch?v=Ai6M5G90Ml</a:t>
-            </a:r>
-            <a:endParaRPr lang="pt-BR" i="1" dirty="0" smtClean="0"/>
+              <a:rPr lang="en-US" b="1" dirty="0" err="1"/>
+              <a:t>JUnit</a:t>
+            </a:r>
+            <a:r>
+              <a:rPr lang="en-US" b="1" dirty="0"/>
+              <a:t> 5 = </a:t>
+            </a:r>
+            <a:r>
+              <a:rPr lang="en-US" b="1" i="1" dirty="0" err="1"/>
+              <a:t>JUnit</a:t>
+            </a:r>
+            <a:r>
+              <a:rPr lang="en-US" b="1" i="1" dirty="0"/>
+              <a:t> Platform</a:t>
+            </a:r>
+            <a:r>
+              <a:rPr lang="en-US" b="1" dirty="0"/>
+              <a:t> + </a:t>
+            </a:r>
+            <a:r>
+              <a:rPr lang="en-US" b="1" i="1" dirty="0" err="1"/>
+              <a:t>JUnit</a:t>
+            </a:r>
+            <a:r>
+              <a:rPr lang="en-US" b="1" i="1" dirty="0"/>
+              <a:t> Jupiter</a:t>
+            </a:r>
+            <a:r>
+              <a:rPr lang="en-US" b="1" dirty="0"/>
+              <a:t> + </a:t>
+            </a:r>
+            <a:r>
+              <a:rPr lang="en-US" b="1" i="1" dirty="0" err="1"/>
+              <a:t>JUnit</a:t>
+            </a:r>
+            <a:r>
+              <a:rPr lang="en-US" b="1" i="1" dirty="0"/>
+              <a:t> Vintage</a:t>
+            </a:r>
+            <a:endParaRPr lang="en-US" dirty="0"/>
           </a:p>
           <a:p>
             <a:pPr lvl="1"/>
@@ -7687,14 +7997,14 @@
       </p:sp>
       <p:pic>
         <p:nvPicPr>
-          <p:cNvPr id="1028" name="Picture 4" descr="http://www.brainsciencetools.com/sites/brainsciencetools/files/matlab.jpg"/>
+          <p:cNvPr id="1027" name="Picture 3"/>
           <p:cNvPicPr>
             <a:picLocks noChangeAspect="1" noChangeArrowheads="1"/>
           </p:cNvPicPr>
           <p:nvPr/>
         </p:nvPicPr>
         <p:blipFill>
-          <a:blip r:embed="rId3" cstate="print">
+          <a:blip r:embed="rId2">
             <a:extLst>
               <a:ext uri="{28A0092B-C50C-407E-A947-70E740481C1C}">
                 <a14:useLocalDpi xmlns:a14="http://schemas.microsoft.com/office/drawing/2010/main" val="0"/>
@@ -7708,61 +8018,43 @@
         </p:blipFill>
         <p:spPr bwMode="auto">
           <a:xfrm>
-            <a:off x="985268" y="3323371"/>
-            <a:ext cx="2307296" cy="2914885"/>
+            <a:off x="2218279" y="3356992"/>
+            <a:ext cx="4363244" cy="2231488"/>
           </a:xfrm>
           <a:prstGeom prst="rect">
             <a:avLst/>
           </a:prstGeom>
           <a:noFill/>
+          <a:ln>
+            <a:noFill/>
+          </a:ln>
+          <a:effectLst/>
           <a:extLst>
             <a:ext uri="{909E8E84-426E-40DD-AFC4-6F175D3DCCD1}">
               <a14:hiddenFill xmlns:a14="http://schemas.microsoft.com/office/drawing/2010/main">
                 <a:solidFill>
-                  <a:srgbClr val="FFFFFF"/>
+                  <a:schemeClr val="accent1"/>
                 </a:solidFill>
               </a14:hiddenFill>
             </a:ext>
-          </a:extLst>
-        </p:spPr>
-      </p:pic>
-      <p:pic>
-        <p:nvPicPr>
-          <p:cNvPr id="1030" name="Picture 6" descr="http://www.mathworks.com/images/nextgen/supporting/discovery/matlab-vs-r-fit-models-data-with-curve-fitting.jpg"/>
-          <p:cNvPicPr>
-            <a:picLocks noChangeAspect="1" noChangeArrowheads="1"/>
-          </p:cNvPicPr>
-          <p:nvPr/>
-        </p:nvPicPr>
-        <p:blipFill>
-          <a:blip r:embed="rId4" cstate="print">
-            <a:extLst>
-              <a:ext uri="{28A0092B-C50C-407E-A947-70E740481C1C}">
-                <a14:useLocalDpi xmlns:a14="http://schemas.microsoft.com/office/drawing/2010/main" val="0"/>
-              </a:ext>
-            </a:extLst>
-          </a:blip>
-          <a:srcRect/>
-          <a:stretch>
-            <a:fillRect/>
-          </a:stretch>
-        </p:blipFill>
-        <p:spPr bwMode="auto">
-          <a:xfrm>
-            <a:off x="4297636" y="3323685"/>
-            <a:ext cx="3874764" cy="2914571"/>
-          </a:xfrm>
-          <a:prstGeom prst="rect">
-            <a:avLst/>
-          </a:prstGeom>
-          <a:noFill/>
-          <a:extLst>
-            <a:ext uri="{909E8E84-426E-40DD-AFC4-6F175D3DCCD1}">
-              <a14:hiddenFill xmlns:a14="http://schemas.microsoft.com/office/drawing/2010/main">
-                <a:solidFill>
-                  <a:srgbClr val="FFFFFF"/>
-                </a:solidFill>
-              </a14:hiddenFill>
+            <a:ext uri="{91240B29-F687-4F45-9708-019B960494DF}">
+              <a14:hiddenLine xmlns:a14="http://schemas.microsoft.com/office/drawing/2010/main" w="9525">
+                <a:solidFill>
+                  <a:schemeClr val="tx1"/>
+                </a:solidFill>
+                <a:miter lim="800000"/>
+                <a:headEnd/>
+                <a:tailEnd/>
+              </a14:hiddenLine>
+            </a:ext>
+            <a:ext uri="{AF507438-7753-43E0-B8FC-AC1667EBCBE1}">
+              <a14:hiddenEffects xmlns:a14="http://schemas.microsoft.com/office/drawing/2010/main">
+                <a:effectLst>
+                  <a:outerShdw dist="35921" dir="2700000" algn="ctr" rotWithShape="0">
+                    <a:schemeClr val="bg2"/>
+                  </a:outerShdw>
+                </a:effectLst>
+              </a14:hiddenEffects>
             </a:ext>
           </a:extLst>
         </p:spPr>
@@ -7838,6 +8130,68 @@
       </p:sp>
       <p:sp>
         <p:nvSpPr>
+          <p:cNvPr id="4" name="Title 3"/>
+          <p:cNvSpPr>
+            <a:spLocks noGrp="1"/>
+          </p:cNvSpPr>
+          <p:nvPr>
+            <p:ph type="title"/>
+          </p:nvPr>
+        </p:nvSpPr>
+        <p:spPr/>
+        <p:txBody>
+          <a:bodyPr>
+            <a:normAutofit/>
+          </a:bodyPr>
+          <a:lstStyle/>
+          <a:p>
+            <a:r>
+              <a:rPr lang="pt-BR" dirty="0">
+                <a:solidFill>
+                  <a:srgbClr val="0070C0"/>
+                </a:solidFill>
+                <a:effectLst>
+                  <a:outerShdw blurRad="38100" dist="38100" dir="2700000" algn="tl">
+                    <a:srgbClr val="000000">
+                      <a:alpha val="43137"/>
+                    </a:srgbClr>
+                  </a:outerShdw>
+                </a:effectLst>
+              </a:rPr>
+              <a:t>Arquitetura do </a:t>
+            </a:r>
+            <a:r>
+              <a:rPr lang="pt-BR" dirty="0" smtClean="0">
+                <a:solidFill>
+                  <a:srgbClr val="0070C0"/>
+                </a:solidFill>
+                <a:effectLst>
+                  <a:outerShdw blurRad="38100" dist="38100" dir="2700000" algn="tl">
+                    <a:srgbClr val="000000">
+                      <a:alpha val="43137"/>
+                    </a:srgbClr>
+                  </a:outerShdw>
+                </a:effectLst>
+              </a:rPr>
+              <a:t>Framework</a:t>
+            </a:r>
+            <a:endParaRPr lang="pt-BR" dirty="0">
+              <a:solidFill>
+                <a:srgbClr val="0070C0"/>
+              </a:solidFill>
+              <a:effectLst>
+                <a:outerShdw blurRad="38100" dist="38100" dir="2700000" algn="tl">
+                  <a:srgbClr val="000000">
+                    <a:alpha val="43137"/>
+                  </a:srgbClr>
+                </a:outerShdw>
+              </a:effectLst>
+            </a:endParaRPr>
+          </a:p>
+        </p:txBody>
+      </p:sp>
+      <p:sp>
+        <p:nvSpPr>
           <p:cNvPr id="2" name="Espaço Reservado para Conteúdo 1"/>
           <p:cNvSpPr>
             <a:spLocks noGrp="1"/>
@@ -7848,88 +8202,88 @@
         </p:nvSpPr>
         <p:spPr>
           <a:xfrm>
-            <a:off x="457200" y="1196752"/>
-            <a:ext cx="8229600" cy="4824536"/>
+            <a:off x="457200" y="1052736"/>
+            <a:ext cx="8229600" cy="4906963"/>
           </a:xfrm>
         </p:spPr>
         <p:txBody>
           <a:bodyPr>
-            <a:noAutofit/>
+            <a:normAutofit/>
           </a:bodyPr>
           <a:lstStyle/>
           <a:p>
             <a:r>
-              <a:rPr lang="pt-BR" sz="2800" dirty="0" smtClean="0"/>
-              <a:t>Testar a funcionalidade e desempenho do código MATLAB</a:t>
-            </a:r>
-          </a:p>
-          <a:p>
-            <a:r>
-              <a:rPr lang="pt-BR" sz="2800" dirty="0" smtClean="0">
-                <a:hlinkClick r:id="rId2"/>
-              </a:rPr>
-              <a:t>http://www.codeaffine.com/2016/02/18/junit-5-first-look/</a:t>
-            </a:r>
-            <a:endParaRPr lang="pt-BR" sz="2800" dirty="0" smtClean="0"/>
-          </a:p>
-          <a:p>
-            <a:r>
-              <a:rPr lang="en-US" sz="2800" b="1" dirty="0" err="1" smtClean="0"/>
+              <a:rPr lang="en-US" b="1" dirty="0" err="1" smtClean="0"/>
               <a:t>JUnit</a:t>
             </a:r>
             <a:r>
-              <a:rPr lang="en-US" sz="2800" b="1" dirty="0" smtClean="0"/>
-              <a:t> 5 – A First Look at the Next Generation of </a:t>
-            </a:r>
-            <a:r>
-              <a:rPr lang="en-US" sz="2800" b="1" dirty="0" err="1" smtClean="0"/>
-              <a:t>Junit</a:t>
-            </a:r>
-            <a:endParaRPr lang="en-US" sz="2800" b="1" dirty="0" smtClean="0"/>
+              <a:rPr lang="en-US" b="1" dirty="0" smtClean="0"/>
+              <a:t> </a:t>
+            </a:r>
+            <a:r>
+              <a:rPr lang="en-US" b="1" dirty="0"/>
+              <a:t>5 </a:t>
+            </a:r>
+            <a:r>
+              <a:rPr lang="en-US" b="1" dirty="0" smtClean="0"/>
+              <a:t>= </a:t>
+            </a:r>
+            <a:r>
+              <a:rPr lang="en-US" sz="2400" b="1" i="1" dirty="0" err="1" smtClean="0"/>
+              <a:t>JUnit</a:t>
+            </a:r>
+            <a:r>
+              <a:rPr lang="en-US" sz="2400" b="1" i="1" dirty="0" smtClean="0"/>
+              <a:t> </a:t>
+            </a:r>
+            <a:r>
+              <a:rPr lang="en-US" sz="2400" b="1" i="1" dirty="0"/>
+              <a:t>Platform</a:t>
+            </a:r>
+            <a:r>
+              <a:rPr lang="en-US" sz="2400" b="1" dirty="0"/>
+              <a:t> + </a:t>
+            </a:r>
+            <a:r>
+              <a:rPr lang="en-US" sz="2400" b="1" i="1" dirty="0" err="1"/>
+              <a:t>JUnit</a:t>
+            </a:r>
+            <a:r>
+              <a:rPr lang="en-US" sz="2400" b="1" i="1" dirty="0"/>
+              <a:t> Jupiter</a:t>
+            </a:r>
+            <a:r>
+              <a:rPr lang="en-US" sz="2400" b="1" dirty="0"/>
+              <a:t> + </a:t>
+            </a:r>
+            <a:r>
+              <a:rPr lang="en-US" sz="2400" b="1" i="1" dirty="0" err="1"/>
+              <a:t>JUnit</a:t>
+            </a:r>
+            <a:r>
+              <a:rPr lang="en-US" sz="2400" b="1" i="1" dirty="0"/>
+              <a:t> </a:t>
+            </a:r>
+            <a:r>
+              <a:rPr lang="en-US" sz="2400" b="1" i="1" dirty="0" smtClean="0"/>
+              <a:t> Vintage</a:t>
+            </a:r>
+            <a:endParaRPr lang="en-US" sz="3200" dirty="0"/>
           </a:p>
           <a:p>
             <a:pPr lvl="1"/>
-            <a:r>
-              <a:rPr lang="en-US" sz="2400" dirty="0" smtClean="0"/>
-              <a:t>In the beginning of February, the </a:t>
-            </a:r>
-            <a:r>
-              <a:rPr lang="en-US" sz="2400" dirty="0" err="1" smtClean="0">
-                <a:hlinkClick r:id="rId3"/>
-              </a:rPr>
-              <a:t>JUnit</a:t>
-            </a:r>
-            <a:r>
-              <a:rPr lang="en-US" sz="2400" dirty="0" smtClean="0">
-                <a:hlinkClick r:id="rId3"/>
-              </a:rPr>
-              <a:t> 5 (aka </a:t>
-            </a:r>
-            <a:r>
-              <a:rPr lang="en-US" sz="2400" dirty="0" err="1" smtClean="0">
-                <a:hlinkClick r:id="rId3"/>
-              </a:rPr>
-              <a:t>JUnit</a:t>
-            </a:r>
-            <a:r>
-              <a:rPr lang="en-US" sz="2400" dirty="0" smtClean="0">
-                <a:hlinkClick r:id="rId3"/>
-              </a:rPr>
-              <a:t> Lambda) team</a:t>
-            </a:r>
-            <a:r>
-              <a:rPr lang="en-US" sz="2400" dirty="0" smtClean="0"/>
-              <a:t> has published an alpha release. Since </a:t>
-            </a:r>
-            <a:r>
-              <a:rPr lang="en-US" sz="2400" dirty="0" err="1" smtClean="0"/>
-              <a:t>JUnit</a:t>
-            </a:r>
-            <a:r>
-              <a:rPr lang="en-US" sz="2400" dirty="0" smtClean="0"/>
-              <a:t> 4 is among the most used items in my toolbox I thought it might be worth to have a look at the next major release.</a:t>
-            </a:r>
-            <a:endParaRPr lang="pt-BR" sz="2400" dirty="0"/>
+            <a:endParaRPr lang="pt-BR" dirty="0" smtClean="0"/>
+          </a:p>
+          <a:p>
+            <a:endParaRPr lang="pt-BR" dirty="0" smtClean="0"/>
+          </a:p>
+          <a:p>
+            <a:pPr lvl="1"/>
+            <a:endParaRPr lang="pt-BR" dirty="0" smtClean="0"/>
+          </a:p>
+          <a:p>
+            <a:pPr lvl="1"/>
+            <a:endParaRPr lang="pt-BR" dirty="0" smtClean="0"/>
           </a:p>
         </p:txBody>
       </p:sp>
@@ -8011,83 +8365,60 @@
           </a:p>
         </p:txBody>
       </p:sp>
-      <p:sp>
-        <p:nvSpPr>
-          <p:cNvPr id="9" name="Title 3"/>
-          <p:cNvSpPr>
-            <a:spLocks noGrp="1"/>
-          </p:cNvSpPr>
-          <p:nvPr>
-            <p:ph type="title"/>
-          </p:nvPr>
-        </p:nvSpPr>
-        <p:spPr/>
-        <p:txBody>
-          <a:bodyPr>
-            <a:normAutofit/>
-          </a:bodyPr>
-          <a:lstStyle/>
-          <a:p>
-            <a:r>
-              <a:rPr lang="en-US" dirty="0" err="1" smtClean="0">
-                <a:solidFill>
-                  <a:srgbClr val="0070C0"/>
-                </a:solidFill>
-                <a:effectLst>
-                  <a:outerShdw blurRad="38100" dist="38100" dir="2700000" algn="tl">
-                    <a:srgbClr val="000000">
-                      <a:alpha val="43137"/>
-                    </a:srgbClr>
-                  </a:outerShdw>
-                </a:effectLst>
-              </a:rPr>
-              <a:t>JUnit</a:t>
-            </a:r>
-            <a:r>
-              <a:rPr lang="en-US" dirty="0" smtClean="0">
-                <a:solidFill>
-                  <a:srgbClr val="0070C0"/>
-                </a:solidFill>
-                <a:effectLst>
-                  <a:outerShdw blurRad="38100" dist="38100" dir="2700000" algn="tl">
-                    <a:srgbClr val="000000">
-                      <a:alpha val="43137"/>
-                    </a:srgbClr>
-                  </a:outerShdw>
-                </a:effectLst>
-              </a:rPr>
-              <a:t> 5 Test Framework</a:t>
-            </a:r>
-            <a:endParaRPr lang="en-US" dirty="0">
-              <a:solidFill>
-                <a:srgbClr val="0070C0"/>
-              </a:solidFill>
-              <a:effectLst>
-                <a:outerShdw blurRad="38100" dist="38100" dir="2700000" algn="tl">
-                  <a:srgbClr val="000000">
-                    <a:alpha val="43137"/>
-                  </a:srgbClr>
-                </a:outerShdw>
-              </a:effectLst>
-            </a:endParaRPr>
-          </a:p>
-        </p:txBody>
-      </p:sp>
+      <p:pic>
+        <p:nvPicPr>
+          <p:cNvPr id="2050" name="Picture 2" descr="junit-5-architecture"/>
+          <p:cNvPicPr>
+            <a:picLocks noChangeAspect="1" noChangeArrowheads="1"/>
+          </p:cNvPicPr>
+          <p:nvPr/>
+        </p:nvPicPr>
+        <p:blipFill rotWithShape="1">
+          <a:blip r:embed="rId2">
+            <a:extLst>
+              <a:ext uri="{28A0092B-C50C-407E-A947-70E740481C1C}">
+                <a14:useLocalDpi xmlns:a14="http://schemas.microsoft.com/office/drawing/2010/main" val="0"/>
+              </a:ext>
+            </a:extLst>
+          </a:blip>
+          <a:srcRect l="1941" t="2258" r="209" b="2383"/>
+          <a:stretch/>
+        </p:blipFill>
+        <p:spPr bwMode="auto">
+          <a:xfrm>
+            <a:off x="1909923" y="1735418"/>
+            <a:ext cx="5324155" cy="4897144"/>
+          </a:xfrm>
+          <a:prstGeom prst="rect">
+            <a:avLst/>
+          </a:prstGeom>
+          <a:noFill/>
+          <a:extLst>
+            <a:ext uri="{909E8E84-426E-40DD-AFC4-6F175D3DCCD1}">
+              <a14:hiddenFill xmlns:a14="http://schemas.microsoft.com/office/drawing/2010/main">
+                <a:solidFill>
+                  <a:srgbClr val="FFFFFF"/>
+                </a:solidFill>
+              </a14:hiddenFill>
+            </a:ext>
+          </a:extLst>
+        </p:spPr>
+      </p:pic>
     </p:spTree>
     <p:extLst>
       <p:ext uri="{BB962C8B-B14F-4D97-AF65-F5344CB8AC3E}">
-        <p14:creationId xmlns:p14="http://schemas.microsoft.com/office/powerpoint/2010/main" val="1979461865"/>
+        <p14:creationId xmlns:p14="http://schemas.microsoft.com/office/powerpoint/2010/main" val="2511611549"/>
       </p:ext>
     </p:extLst>
   </p:cSld>
   <p:clrMapOvr>
     <a:masterClrMapping/>
   </p:clrMapOvr>
-  <mc:AlternateContent xmlns:mc="http://schemas.openxmlformats.org/markup-compatibility/2006" xmlns:p14="http://schemas.microsoft.com/office/powerpoint/2010/main">
-    <mc:Choice Requires="p14">
-      <p:transition p14:dur="0"/>
+  <mc:AlternateContent xmlns:mc="http://schemas.openxmlformats.org/markup-compatibility/2006">
+    <mc:Choice xmlns:p14="http://schemas.microsoft.com/office/powerpoint/2010/main" Requires="p14">
+      <p:transition p14:dur="10"/>
     </mc:Choice>
-    <mc:Fallback xmlns="">
+    <mc:Fallback>
       <p:transition/>
     </mc:Fallback>
   </mc:AlternateContent>
@@ -8137,6 +8468,312 @@
               <a:rPr lang="en-US" smtClean="0"/>
               <a:pPr/>
               <a:t>5</a:t>
+            </a:fld>
+            <a:endParaRPr lang="en-US" dirty="0"/>
+          </a:p>
+        </p:txBody>
+      </p:sp>
+      <p:sp>
+        <p:nvSpPr>
+          <p:cNvPr id="2" name="Espaço Reservado para Conteúdo 1"/>
+          <p:cNvSpPr>
+            <a:spLocks noGrp="1"/>
+          </p:cNvSpPr>
+          <p:nvPr>
+            <p:ph idx="1"/>
+          </p:nvPr>
+        </p:nvSpPr>
+        <p:spPr>
+          <a:xfrm>
+            <a:off x="457200" y="1196752"/>
+            <a:ext cx="8229600" cy="4824536"/>
+          </a:xfrm>
+        </p:spPr>
+        <p:txBody>
+          <a:bodyPr>
+            <a:noAutofit/>
+          </a:bodyPr>
+          <a:lstStyle/>
+          <a:p>
+            <a:r>
+              <a:rPr lang="pt-BR" sz="2800" dirty="0" smtClean="0"/>
+              <a:t>Testar a funcionalidade e desempenho do código MATLAB</a:t>
+            </a:r>
+          </a:p>
+          <a:p>
+            <a:r>
+              <a:rPr lang="pt-BR" sz="2800" dirty="0" smtClean="0">
+                <a:hlinkClick r:id="rId2"/>
+              </a:rPr>
+              <a:t>http://www.codeaffine.com/2016/02/18/junit-5-first-look/</a:t>
+            </a:r>
+            <a:endParaRPr lang="pt-BR" sz="2800" dirty="0" smtClean="0"/>
+          </a:p>
+          <a:p>
+            <a:r>
+              <a:rPr lang="en-US" sz="2800" b="1" dirty="0" err="1" smtClean="0"/>
+              <a:t>JUnit</a:t>
+            </a:r>
+            <a:r>
+              <a:rPr lang="en-US" sz="2800" b="1" dirty="0" smtClean="0"/>
+              <a:t> 5 – A First Look at the Next Generation of </a:t>
+            </a:r>
+            <a:r>
+              <a:rPr lang="en-US" sz="2800" b="1" dirty="0" err="1" smtClean="0"/>
+              <a:t>Junit</a:t>
+            </a:r>
+            <a:endParaRPr lang="en-US" sz="2800" b="1" dirty="0" smtClean="0"/>
+          </a:p>
+          <a:p>
+            <a:pPr lvl="1"/>
+            <a:r>
+              <a:rPr lang="en-US" sz="2400" dirty="0" smtClean="0"/>
+              <a:t>In the beginning of February, the </a:t>
+            </a:r>
+            <a:r>
+              <a:rPr lang="en-US" sz="2400" dirty="0" err="1" smtClean="0">
+                <a:hlinkClick r:id="rId3"/>
+              </a:rPr>
+              <a:t>JUnit</a:t>
+            </a:r>
+            <a:r>
+              <a:rPr lang="en-US" sz="2400" dirty="0" smtClean="0">
+                <a:hlinkClick r:id="rId3"/>
+              </a:rPr>
+              <a:t> 5 (aka </a:t>
+            </a:r>
+            <a:r>
+              <a:rPr lang="en-US" sz="2400" dirty="0" err="1" smtClean="0">
+                <a:hlinkClick r:id="rId3"/>
+              </a:rPr>
+              <a:t>JUnit</a:t>
+            </a:r>
+            <a:r>
+              <a:rPr lang="en-US" sz="2400" dirty="0" smtClean="0">
+                <a:hlinkClick r:id="rId3"/>
+              </a:rPr>
+              <a:t> Lambda) team</a:t>
+            </a:r>
+            <a:r>
+              <a:rPr lang="en-US" sz="2400" dirty="0" smtClean="0"/>
+              <a:t> has published an alpha release. Since </a:t>
+            </a:r>
+            <a:r>
+              <a:rPr lang="en-US" sz="2400" dirty="0" err="1" smtClean="0"/>
+              <a:t>JUnit</a:t>
+            </a:r>
+            <a:r>
+              <a:rPr lang="en-US" sz="2400" dirty="0" smtClean="0"/>
+              <a:t> 4 is among the most used items in my toolbox I thought it might be worth to have a look at the next major release.</a:t>
+            </a:r>
+            <a:endParaRPr lang="pt-BR" sz="2400" dirty="0"/>
+          </a:p>
+        </p:txBody>
+      </p:sp>
+      <p:sp>
+        <p:nvSpPr>
+          <p:cNvPr id="5" name="AutoShape 2" descr="G:\HD-Games\GitRepos\DesignPatterns\CAP392-02-PloP\artigos\03 - Pattern Language\entrega final\family-guy-simpsons2.webp"/>
+          <p:cNvSpPr>
+            <a:spLocks noChangeAspect="1" noChangeArrowheads="1"/>
+          </p:cNvSpPr>
+          <p:nvPr/>
+        </p:nvSpPr>
+        <p:spPr bwMode="auto">
+          <a:xfrm>
+            <a:off x="155575" y="-144463"/>
+            <a:ext cx="304800" cy="304801"/>
+          </a:xfrm>
+          <a:prstGeom prst="rect">
+            <a:avLst/>
+          </a:prstGeom>
+          <a:noFill/>
+          <a:extLst>
+            <a:ext uri="{909E8E84-426E-40DD-AFC4-6F175D3DCCD1}">
+              <a14:hiddenFill xmlns:a14="http://schemas.microsoft.com/office/drawing/2010/main">
+                <a:solidFill>
+                  <a:srgbClr val="FFFFFF"/>
+                </a:solidFill>
+              </a14:hiddenFill>
+            </a:ext>
+          </a:extLst>
+        </p:spPr>
+        <p:txBody>
+          <a:bodyPr vert="horz" wrap="square" lIns="91440" tIns="45720" rIns="91440" bIns="45720" numCol="1" anchor="t" anchorCtr="0" compatLnSpc="1">
+            <a:prstTxWarp prst="textNoShape">
+              <a:avLst/>
+            </a:prstTxWarp>
+          </a:bodyPr>
+          <a:lstStyle/>
+          <a:p>
+            <a:endParaRPr lang="pt-BR"/>
+          </a:p>
+        </p:txBody>
+      </p:sp>
+      <p:sp>
+        <p:nvSpPr>
+          <p:cNvPr id="7" name="AutoShape 4" descr="G:\HD-Games\GitRepos\DesignPatterns\CAP392-02-PloP\artigos\03 - Pattern Language\entrega final\family-guy-simpsons2.webp"/>
+          <p:cNvSpPr>
+            <a:spLocks noChangeAspect="1" noChangeArrowheads="1"/>
+          </p:cNvSpPr>
+          <p:nvPr/>
+        </p:nvSpPr>
+        <p:spPr bwMode="auto">
+          <a:xfrm>
+            <a:off x="307975" y="7937"/>
+            <a:ext cx="304800" cy="304801"/>
+          </a:xfrm>
+          <a:prstGeom prst="rect">
+            <a:avLst/>
+          </a:prstGeom>
+          <a:noFill/>
+          <a:extLst>
+            <a:ext uri="{909E8E84-426E-40DD-AFC4-6F175D3DCCD1}">
+              <a14:hiddenFill xmlns:a14="http://schemas.microsoft.com/office/drawing/2010/main">
+                <a:solidFill>
+                  <a:srgbClr val="FFFFFF"/>
+                </a:solidFill>
+              </a14:hiddenFill>
+            </a:ext>
+          </a:extLst>
+        </p:spPr>
+        <p:txBody>
+          <a:bodyPr vert="horz" wrap="square" lIns="91440" tIns="45720" rIns="91440" bIns="45720" numCol="1" anchor="t" anchorCtr="0" compatLnSpc="1">
+            <a:prstTxWarp prst="textNoShape">
+              <a:avLst/>
+            </a:prstTxWarp>
+          </a:bodyPr>
+          <a:lstStyle/>
+          <a:p>
+            <a:endParaRPr lang="pt-BR"/>
+          </a:p>
+        </p:txBody>
+      </p:sp>
+      <p:sp>
+        <p:nvSpPr>
+          <p:cNvPr id="9" name="Title 3"/>
+          <p:cNvSpPr>
+            <a:spLocks noGrp="1"/>
+          </p:cNvSpPr>
+          <p:nvPr>
+            <p:ph type="title"/>
+          </p:nvPr>
+        </p:nvSpPr>
+        <p:spPr/>
+        <p:txBody>
+          <a:bodyPr>
+            <a:normAutofit/>
+          </a:bodyPr>
+          <a:lstStyle/>
+          <a:p>
+            <a:r>
+              <a:rPr lang="en-US" dirty="0" err="1" smtClean="0">
+                <a:solidFill>
+                  <a:srgbClr val="0070C0"/>
+                </a:solidFill>
+                <a:effectLst>
+                  <a:outerShdw blurRad="38100" dist="38100" dir="2700000" algn="tl">
+                    <a:srgbClr val="000000">
+                      <a:alpha val="43137"/>
+                    </a:srgbClr>
+                  </a:outerShdw>
+                </a:effectLst>
+              </a:rPr>
+              <a:t>JUnit</a:t>
+            </a:r>
+            <a:r>
+              <a:rPr lang="en-US" dirty="0" smtClean="0">
+                <a:solidFill>
+                  <a:srgbClr val="0070C0"/>
+                </a:solidFill>
+                <a:effectLst>
+                  <a:outerShdw blurRad="38100" dist="38100" dir="2700000" algn="tl">
+                    <a:srgbClr val="000000">
+                      <a:alpha val="43137"/>
+                    </a:srgbClr>
+                  </a:outerShdw>
+                </a:effectLst>
+              </a:rPr>
+              <a:t> 5 Test Framework</a:t>
+            </a:r>
+            <a:endParaRPr lang="en-US" dirty="0">
+              <a:solidFill>
+                <a:srgbClr val="0070C0"/>
+              </a:solidFill>
+              <a:effectLst>
+                <a:outerShdw blurRad="38100" dist="38100" dir="2700000" algn="tl">
+                  <a:srgbClr val="000000">
+                    <a:alpha val="43137"/>
+                  </a:srgbClr>
+                </a:outerShdw>
+              </a:effectLst>
+            </a:endParaRPr>
+          </a:p>
+        </p:txBody>
+      </p:sp>
+    </p:spTree>
+    <p:extLst>
+      <p:ext uri="{BB962C8B-B14F-4D97-AF65-F5344CB8AC3E}">
+        <p14:creationId xmlns:p14="http://schemas.microsoft.com/office/powerpoint/2010/main" val="1979461865"/>
+      </p:ext>
+    </p:extLst>
+  </p:cSld>
+  <p:clrMapOvr>
+    <a:masterClrMapping/>
+  </p:clrMapOvr>
+  <mc:AlternateContent xmlns:mc="http://schemas.openxmlformats.org/markup-compatibility/2006" xmlns:p14="http://schemas.microsoft.com/office/powerpoint/2010/main">
+    <mc:Choice Requires="p14">
+      <p:transition p14:dur="0"/>
+    </mc:Choice>
+    <mc:Fallback xmlns="">
+      <p:transition/>
+    </mc:Fallback>
+  </mc:AlternateContent>
+  <p:timing>
+    <p:tnLst>
+      <p:par>
+        <p:cTn id="1" dur="indefinite" restart="never" nodeType="tmRoot"/>
+      </p:par>
+    </p:tnLst>
+  </p:timing>
+</p:sld>
+</file>
+
+<file path=ppt/slides/slide6.xml><?xml version="1.0" encoding="utf-8"?>
+<p:sld xmlns:a="http://schemas.openxmlformats.org/drawingml/2006/main" xmlns:r="http://schemas.openxmlformats.org/officeDocument/2006/relationships" xmlns:p="http://schemas.openxmlformats.org/presentationml/2006/main">
+  <p:cSld>
+    <p:spTree>
+      <p:nvGrpSpPr>
+        <p:cNvPr id="1" name=""/>
+        <p:cNvGrpSpPr/>
+        <p:nvPr/>
+      </p:nvGrpSpPr>
+      <p:grpSpPr>
+        <a:xfrm>
+          <a:off x="0" y="0"/>
+          <a:ext cx="0" cy="0"/>
+          <a:chOff x="0" y="0"/>
+          <a:chExt cx="0" cy="0"/>
+        </a:xfrm>
+      </p:grpSpPr>
+      <p:sp>
+        <p:nvSpPr>
+          <p:cNvPr id="3" name="Slide Number Placeholder 2"/>
+          <p:cNvSpPr>
+            <a:spLocks noGrp="1"/>
+          </p:cNvSpPr>
+          <p:nvPr>
+            <p:ph type="sldNum" sz="quarter" idx="11"/>
+          </p:nvPr>
+        </p:nvSpPr>
+        <p:spPr/>
+        <p:txBody>
+          <a:bodyPr/>
+          <a:lstStyle/>
+          <a:p>
+            <a:fld id="{338BD863-DCDC-5F43-A029-265BB7DA4A17}" type="slidenum">
+              <a:rPr lang="en-US" smtClean="0"/>
+              <a:pPr/>
+              <a:t>6</a:t>
             </a:fld>
             <a:endParaRPr lang="en-US" dirty="0"/>
           </a:p>
@@ -8546,7 +9183,7 @@
 </p:sld>
 </file>
 
-<file path=ppt/slides/slide6.xml><?xml version="1.0" encoding="utf-8"?>
+<file path=ppt/slides/slide7.xml><?xml version="1.0" encoding="utf-8"?>
 <p:sld xmlns:a="http://schemas.openxmlformats.org/drawingml/2006/main" xmlns:r="http://schemas.openxmlformats.org/officeDocument/2006/relationships" xmlns:p="http://schemas.openxmlformats.org/presentationml/2006/main">
   <p:cSld>
     <p:spTree>
@@ -8581,7 +9218,7 @@
             <a:fld id="{338BD863-DCDC-5F43-A029-265BB7DA4A17}" type="slidenum">
               <a:rPr lang="en-US" smtClean="0"/>
               <a:pPr/>
-              <a:t>6</a:t>
+              <a:t>7</a:t>
             </a:fld>
             <a:endParaRPr lang="en-US" dirty="0"/>
           </a:p>
@@ -8678,13 +9315,7 @@
               <a:rPr lang="pt-BR" sz="2800">
                 <a:hlinkClick r:id="rId3"/>
               </a:rPr>
-              <a:t>http://</a:t>
-            </a:r>
-            <a:r>
-              <a:rPr lang="pt-BR" sz="2800">
-                <a:hlinkClick r:id="rId3"/>
-              </a:rPr>
-              <a:t>blog.codefx.org/design/architecture/junit-5-architecture</a:t>
+              <a:t>http://blog.codefx.org/design/architecture/junit-5-architecture</a:t>
             </a:r>
             <a:r>
               <a:rPr lang="pt-BR" sz="2800" smtClean="0">
@@ -8966,7 +9597,7 @@
 </p:sld>
 </file>
 
-<file path=ppt/slides/slide7.xml><?xml version="1.0" encoding="utf-8"?>
+<file path=ppt/slides/slide8.xml><?xml version="1.0" encoding="utf-8"?>
 <p:sld xmlns:a="http://schemas.openxmlformats.org/drawingml/2006/main" xmlns:r="http://schemas.openxmlformats.org/officeDocument/2006/relationships" xmlns:p="http://schemas.openxmlformats.org/presentationml/2006/main">
   <p:cSld>
     <p:spTree>
@@ -9001,7 +9632,7 @@
             <a:fld id="{338BD863-DCDC-5F43-A029-265BB7DA4A17}" type="slidenum">
               <a:rPr lang="en-US" smtClean="0"/>
               <a:pPr/>
-              <a:t>7</a:t>
+              <a:t>8</a:t>
             </a:fld>
             <a:endParaRPr lang="en-US" dirty="0"/>
           </a:p>
@@ -9405,7 +10036,7 @@
 </p:sld>
 </file>
 
-<file path=ppt/slides/slide8.xml><?xml version="1.0" encoding="utf-8"?>
+<file path=ppt/slides/slide9.xml><?xml version="1.0" encoding="utf-8"?>
 <p:sld xmlns:a="http://schemas.openxmlformats.org/drawingml/2006/main" xmlns:r="http://schemas.openxmlformats.org/officeDocument/2006/relationships" xmlns:p="http://schemas.openxmlformats.org/presentationml/2006/main">
   <p:cSld>
     <p:spTree>
@@ -9440,7 +10071,7 @@
             <a:fld id="{338BD863-DCDC-5F43-A029-265BB7DA4A17}" type="slidenum">
               <a:rPr lang="en-US" smtClean="0"/>
               <a:pPr/>
-              <a:t>8</a:t>
+              <a:t>9</a:t>
             </a:fld>
             <a:endParaRPr lang="en-US" dirty="0"/>
           </a:p>
@@ -9797,280 +10428,6 @@
     <p:extLst>
       <p:ext uri="{BB962C8B-B14F-4D97-AF65-F5344CB8AC3E}">
         <p14:creationId xmlns:p14="http://schemas.microsoft.com/office/powerpoint/2010/main" val="1559868461"/>
-      </p:ext>
-    </p:extLst>
-  </p:cSld>
-  <p:clrMapOvr>
-    <a:masterClrMapping/>
-  </p:clrMapOvr>
-  <mc:AlternateContent xmlns:mc="http://schemas.openxmlformats.org/markup-compatibility/2006" xmlns:p14="http://schemas.microsoft.com/office/powerpoint/2010/main">
-    <mc:Choice Requires="p14">
-      <p:transition p14:dur="0"/>
-    </mc:Choice>
-    <mc:Fallback xmlns="">
-      <p:transition/>
-    </mc:Fallback>
-  </mc:AlternateContent>
-  <p:timing>
-    <p:tnLst>
-      <p:par>
-        <p:cTn id="1" dur="indefinite" restart="never" nodeType="tmRoot"/>
-      </p:par>
-    </p:tnLst>
-  </p:timing>
-</p:sld>
-</file>
-
-<file path=ppt/slides/slide9.xml><?xml version="1.0" encoding="utf-8"?>
-<p:sld xmlns:a="http://schemas.openxmlformats.org/drawingml/2006/main" xmlns:r="http://schemas.openxmlformats.org/officeDocument/2006/relationships" xmlns:p="http://schemas.openxmlformats.org/presentationml/2006/main">
-  <p:cSld>
-    <p:spTree>
-      <p:nvGrpSpPr>
-        <p:cNvPr id="1" name=""/>
-        <p:cNvGrpSpPr/>
-        <p:nvPr/>
-      </p:nvGrpSpPr>
-      <p:grpSpPr>
-        <a:xfrm>
-          <a:off x="0" y="0"/>
-          <a:ext cx="0" cy="0"/>
-          <a:chOff x="0" y="0"/>
-          <a:chExt cx="0" cy="0"/>
-        </a:xfrm>
-      </p:grpSpPr>
-      <p:sp>
-        <p:nvSpPr>
-          <p:cNvPr id="3" name="Slide Number Placeholder 2"/>
-          <p:cNvSpPr>
-            <a:spLocks noGrp="1"/>
-          </p:cNvSpPr>
-          <p:nvPr>
-            <p:ph type="sldNum" sz="quarter" idx="11"/>
-          </p:nvPr>
-        </p:nvSpPr>
-        <p:spPr/>
-        <p:txBody>
-          <a:bodyPr/>
-          <a:lstStyle/>
-          <a:p>
-            <a:fld id="{338BD863-DCDC-5F43-A029-265BB7DA4A17}" type="slidenum">
-              <a:rPr lang="en-US" smtClean="0"/>
-              <a:pPr/>
-              <a:t>9</a:t>
-            </a:fld>
-            <a:endParaRPr lang="en-US" dirty="0"/>
-          </a:p>
-        </p:txBody>
-      </p:sp>
-      <p:sp>
-        <p:nvSpPr>
-          <p:cNvPr id="2" name="Espaço Reservado para Conteúdo 1"/>
-          <p:cNvSpPr>
-            <a:spLocks noGrp="1"/>
-          </p:cNvSpPr>
-          <p:nvPr>
-            <p:ph idx="1"/>
-          </p:nvPr>
-        </p:nvSpPr>
-        <p:spPr>
-          <a:xfrm>
-            <a:off x="457200" y="1196752"/>
-            <a:ext cx="8229600" cy="5328592"/>
-          </a:xfrm>
-        </p:spPr>
-        <p:txBody>
-          <a:bodyPr>
-            <a:noAutofit/>
-          </a:bodyPr>
-          <a:lstStyle/>
-          <a:p>
-            <a:r>
-              <a:rPr lang="pt-BR" sz="2800" dirty="0" smtClean="0">
-                <a:hlinkClick r:id="rId2"/>
-              </a:rPr>
-              <a:t>http://radar.oreilly.com/2014/12/unit-testing-java-8-lambda-expressions-and-streams.html</a:t>
-            </a:r>
-            <a:endParaRPr lang="pt-BR" sz="2800" dirty="0" smtClean="0"/>
-          </a:p>
-          <a:p>
-            <a:r>
-              <a:rPr lang="en-US" sz="2800" b="1" dirty="0" smtClean="0"/>
-              <a:t>Unit Testing Java 8 Lambda Expressions and Streams</a:t>
-            </a:r>
-          </a:p>
-          <a:p>
-            <a:r>
-              <a:rPr lang="en-US" sz="2800" b="1" dirty="0" smtClean="0"/>
-              <a:t>Two approaches to testing </a:t>
-            </a:r>
-            <a:r>
-              <a:rPr lang="en-US" sz="2800" b="1" dirty="0" err="1" smtClean="0"/>
-              <a:t>lambdafied</a:t>
-            </a:r>
-            <a:r>
-              <a:rPr lang="en-US" sz="2800" b="1" dirty="0" smtClean="0"/>
-              <a:t> code.</a:t>
-            </a:r>
-          </a:p>
-          <a:p>
-            <a:pPr lvl="1"/>
-            <a:r>
-              <a:rPr lang="en-US" sz="2400" dirty="0" smtClean="0"/>
-              <a:t>Lambda expressions pose a slightly different challenge when unit testing code. Because they don’t have a name, it’s impossible to directly call them in your test code. You could choose to copy the body of the lambda expression into your test and then test that copy, but this approach has the unfortunate side effect of not actually testing the behavior of your implementation. If you change the implementation code, your test will still pass even though the implementation is performing a different task.</a:t>
-            </a:r>
-          </a:p>
-          <a:p>
-            <a:pPr lvl="1">
-              <a:buNone/>
-            </a:pPr>
-            <a:endParaRPr lang="pt-BR" sz="2400" dirty="0"/>
-          </a:p>
-        </p:txBody>
-      </p:sp>
-      <p:sp>
-        <p:nvSpPr>
-          <p:cNvPr id="5" name="AutoShape 2" descr="G:\HD-Games\GitRepos\DesignPatterns\CAP392-02-PloP\artigos\03 - Pattern Language\entrega final\family-guy-simpsons2.webp"/>
-          <p:cNvSpPr>
-            <a:spLocks noChangeAspect="1" noChangeArrowheads="1"/>
-          </p:cNvSpPr>
-          <p:nvPr/>
-        </p:nvSpPr>
-        <p:spPr bwMode="auto">
-          <a:xfrm>
-            <a:off x="155575" y="-144463"/>
-            <a:ext cx="304800" cy="304801"/>
-          </a:xfrm>
-          <a:prstGeom prst="rect">
-            <a:avLst/>
-          </a:prstGeom>
-          <a:noFill/>
-          <a:extLst>
-            <a:ext uri="{909E8E84-426E-40DD-AFC4-6F175D3DCCD1}">
-              <a14:hiddenFill xmlns:a14="http://schemas.microsoft.com/office/drawing/2010/main">
-                <a:solidFill>
-                  <a:srgbClr val="FFFFFF"/>
-                </a:solidFill>
-              </a14:hiddenFill>
-            </a:ext>
-          </a:extLst>
-        </p:spPr>
-        <p:txBody>
-          <a:bodyPr vert="horz" wrap="square" lIns="91440" tIns="45720" rIns="91440" bIns="45720" numCol="1" anchor="t" anchorCtr="0" compatLnSpc="1">
-            <a:prstTxWarp prst="textNoShape">
-              <a:avLst/>
-            </a:prstTxWarp>
-          </a:bodyPr>
-          <a:lstStyle/>
-          <a:p>
-            <a:endParaRPr lang="pt-BR"/>
-          </a:p>
-        </p:txBody>
-      </p:sp>
-      <p:sp>
-        <p:nvSpPr>
-          <p:cNvPr id="7" name="AutoShape 4" descr="G:\HD-Games\GitRepos\DesignPatterns\CAP392-02-PloP\artigos\03 - Pattern Language\entrega final\family-guy-simpsons2.webp"/>
-          <p:cNvSpPr>
-            <a:spLocks noChangeAspect="1" noChangeArrowheads="1"/>
-          </p:cNvSpPr>
-          <p:nvPr/>
-        </p:nvSpPr>
-        <p:spPr bwMode="auto">
-          <a:xfrm>
-            <a:off x="307975" y="7937"/>
-            <a:ext cx="304800" cy="304801"/>
-          </a:xfrm>
-          <a:prstGeom prst="rect">
-            <a:avLst/>
-          </a:prstGeom>
-          <a:noFill/>
-          <a:extLst>
-            <a:ext uri="{909E8E84-426E-40DD-AFC4-6F175D3DCCD1}">
-              <a14:hiddenFill xmlns:a14="http://schemas.microsoft.com/office/drawing/2010/main">
-                <a:solidFill>
-                  <a:srgbClr val="FFFFFF"/>
-                </a:solidFill>
-              </a14:hiddenFill>
-            </a:ext>
-          </a:extLst>
-        </p:spPr>
-        <p:txBody>
-          <a:bodyPr vert="horz" wrap="square" lIns="91440" tIns="45720" rIns="91440" bIns="45720" numCol="1" anchor="t" anchorCtr="0" compatLnSpc="1">
-            <a:prstTxWarp prst="textNoShape">
-              <a:avLst/>
-            </a:prstTxWarp>
-          </a:bodyPr>
-          <a:lstStyle/>
-          <a:p>
-            <a:endParaRPr lang="pt-BR"/>
-          </a:p>
-        </p:txBody>
-      </p:sp>
-      <p:sp>
-        <p:nvSpPr>
-          <p:cNvPr id="9" name="Title 3"/>
-          <p:cNvSpPr>
-            <a:spLocks noGrp="1"/>
-          </p:cNvSpPr>
-          <p:nvPr>
-            <p:ph type="title"/>
-          </p:nvPr>
-        </p:nvSpPr>
-        <p:spPr/>
-        <p:txBody>
-          <a:bodyPr>
-            <a:normAutofit/>
-          </a:bodyPr>
-          <a:lstStyle/>
-          <a:p>
-            <a:r>
-              <a:rPr lang="en-US" dirty="0" err="1" smtClean="0">
-                <a:solidFill>
-                  <a:srgbClr val="0070C0"/>
-                </a:solidFill>
-                <a:effectLst>
-                  <a:outerShdw blurRad="38100" dist="38100" dir="2700000" algn="tl">
-                    <a:srgbClr val="000000">
-                      <a:alpha val="43137"/>
-                    </a:srgbClr>
-                  </a:outerShdw>
-                </a:effectLst>
-              </a:rPr>
-              <a:t>JUnit</a:t>
-            </a:r>
-            <a:r>
-              <a:rPr lang="en-US" dirty="0" smtClean="0">
-                <a:solidFill>
-                  <a:srgbClr val="0070C0"/>
-                </a:solidFill>
-                <a:effectLst>
-                  <a:outerShdw blurRad="38100" dist="38100" dir="2700000" algn="tl">
-                    <a:srgbClr val="000000">
-                      <a:alpha val="43137"/>
-                    </a:srgbClr>
-                  </a:outerShdw>
-                </a:effectLst>
-              </a:rPr>
-              <a:t> 5 Test Framework</a:t>
-            </a:r>
-            <a:endParaRPr lang="en-US" dirty="0">
-              <a:solidFill>
-                <a:srgbClr val="0070C0"/>
-              </a:solidFill>
-              <a:effectLst>
-                <a:outerShdw blurRad="38100" dist="38100" dir="2700000" algn="tl">
-                  <a:srgbClr val="000000">
-                    <a:alpha val="43137"/>
-                  </a:srgbClr>
-                </a:outerShdw>
-              </a:effectLst>
-            </a:endParaRPr>
-          </a:p>
-        </p:txBody>
-      </p:sp>
-    </p:spTree>
-    <p:extLst>
-      <p:ext uri="{BB962C8B-B14F-4D97-AF65-F5344CB8AC3E}">
-        <p14:creationId xmlns:p14="http://schemas.microsoft.com/office/powerpoint/2010/main" val="1979461865"/>
       </p:ext>
     </p:extLst>
   </p:cSld>

</xml_diff>

<commit_message>
Testes adicionais, Tag Jenkins
</commit_message>
<xml_diff>
--- a/CAP385-00-Presentations/02-JUnit 5/02-JUnit 5.pptx
+++ b/CAP385-00-Presentations/02-JUnit 5/02-JUnit 5.pptx
@@ -9651,6 +9651,9 @@
             </a:r>
           </a:p>
           <a:p>
+            <a:endParaRPr lang="pt-BR" dirty="0" smtClean="0"/>
+          </a:p>
+          <a:p>
             <a:r>
               <a:rPr lang="pt-BR" dirty="0" smtClean="0"/>
               <a:t>Visibilidade default</a:t>
@@ -9677,7 +9680,10 @@
               <a:rPr lang="pt-BR" dirty="0" err="1" smtClean="0"/>
               <a:t>assertAll</a:t>
             </a:r>
-            <a:endParaRPr lang="pt-BR" dirty="0" smtClean="0"/>
+            <a:r>
+              <a:rPr lang="pt-BR" dirty="0" smtClean="0"/>
+              <a:t>;</a:t>
+            </a:r>
           </a:p>
           <a:p>
             <a:r>
@@ -9686,17 +9692,36 @@
             </a:r>
             <a:r>
               <a:rPr lang="pt-BR" dirty="0" err="1" smtClean="0"/>
+              <a:t>Nested</a:t>
+            </a:r>
+            <a:r>
+              <a:rPr lang="pt-BR" dirty="0" smtClean="0"/>
+              <a:t>; </a:t>
+            </a:r>
+            <a:r>
+              <a:rPr lang="pt-BR" dirty="0"/>
+              <a:t>@</a:t>
+            </a:r>
+            <a:r>
+              <a:rPr lang="pt-BR" dirty="0" err="1" smtClean="0"/>
               <a:t>DisplayName</a:t>
             </a:r>
             <a:r>
+              <a:rPr lang="pt-BR" dirty="0"/>
+              <a:t>;</a:t>
+            </a:r>
+            <a:endParaRPr lang="pt-BR" dirty="0" smtClean="0"/>
+          </a:p>
+          <a:p>
+            <a:r>
               <a:rPr lang="pt-BR" dirty="0" smtClean="0"/>
-              <a:t>; @</a:t>
+              <a:t>@</a:t>
             </a:r>
             <a:r>
               <a:rPr lang="pt-BR" dirty="0" err="1" smtClean="0"/>
-              <a:t>Nested</a:t>
-            </a:r>
-            <a:endParaRPr lang="pt-BR" smtClean="0"/>
+              <a:t>Tag</a:t>
+            </a:r>
+            <a:endParaRPr lang="pt-BR" dirty="0" smtClean="0"/>
           </a:p>
           <a:p>
             <a:endParaRPr lang="pt-BR" dirty="0" smtClean="0"/>

</xml_diff>

<commit_message>
Inclusão do teste utilizando API Assertivas Hamcrest e AssertJ.
</commit_message>
<xml_diff>
--- a/CAP385-00-Presentations/02-JUnit 5/02-JUnit 5.pptx
+++ b/CAP385-00-Presentations/02-JUnit 5/02-JUnit 5.pptx
@@ -9575,7 +9575,7 @@
         </p:spPr>
         <p:txBody>
           <a:bodyPr>
-            <a:normAutofit/>
+            <a:normAutofit lnSpcReduction="10000"/>
           </a:bodyPr>
           <a:lstStyle/>
           <a:p>
@@ -9720,6 +9720,33 @@
             <a:r>
               <a:rPr lang="pt-BR" dirty="0" err="1" smtClean="0"/>
               <a:t>Tag</a:t>
+            </a:r>
+            <a:endParaRPr lang="pt-BR" dirty="0" smtClean="0"/>
+          </a:p>
+          <a:p>
+            <a:r>
+              <a:rPr lang="pt-BR" dirty="0" smtClean="0"/>
+              <a:t>API Assertivas - </a:t>
+            </a:r>
+            <a:r>
+              <a:rPr lang="pt-BR" dirty="0" err="1"/>
+              <a:t>Hamcrest</a:t>
+            </a:r>
+            <a:r>
+              <a:rPr lang="pt-BR" dirty="0"/>
+              <a:t> </a:t>
+            </a:r>
+            <a:r>
+              <a:rPr lang="pt-BR" dirty="0" err="1"/>
+              <a:t>and</a:t>
+            </a:r>
+            <a:r>
+              <a:rPr lang="pt-BR" dirty="0"/>
+              <a:t> </a:t>
+            </a:r>
+            <a:r>
+              <a:rPr lang="pt-BR" smtClean="0"/>
+              <a:t>AssertJ</a:t>
             </a:r>
             <a:endParaRPr lang="pt-BR" dirty="0" smtClean="0"/>
           </a:p>

</xml_diff>

<commit_message>
Inclusão de slide de resumo das mudanças JUnitt 4 -> JUnit 5. Início do slide sobre arquitetura e pontos de extensão.
</commit_message>
<xml_diff>
--- a/CAP385-00-Presentations/02-JUnit 5/02-JUnit 5.pptx
+++ b/CAP385-00-Presentations/02-JUnit 5/02-JUnit 5.pptx
@@ -5,7 +5,7 @@
     <p:sldMasterId id="2147483648" r:id="rId1"/>
   </p:sldMasterIdLst>
   <p:notesMasterIdLst>
-    <p:notesMasterId r:id="rId8"/>
+    <p:notesMasterId r:id="rId9"/>
   </p:notesMasterIdLst>
   <p:sldIdLst>
     <p:sldId id="257" r:id="rId2"/>
@@ -13,7 +13,8 @@
     <p:sldId id="265" r:id="rId4"/>
     <p:sldId id="289" r:id="rId5"/>
     <p:sldId id="290" r:id="rId6"/>
-    <p:sldId id="288" r:id="rId7"/>
+    <p:sldId id="291" r:id="rId7"/>
+    <p:sldId id="288" r:id="rId8"/>
   </p:sldIdLst>
   <p:sldSz cx="9144000" cy="6858000" type="screen4x3"/>
   <p:notesSz cx="6858000" cy="9144000"/>
@@ -198,7 +199,7 @@
             <a:fld id="{3DB25566-8A38-405D-AF46-A7AC913A6215}" type="datetimeFigureOut">
               <a:rPr lang="pt-BR" smtClean="0"/>
               <a:pPr/>
-              <a:t>16/07/2016</a:t>
+              <a:t>17/07/2016</a:t>
             </a:fld>
             <a:endParaRPr lang="pt-BR"/>
           </a:p>
@@ -731,7 +732,7 @@
             <a:fld id="{97BE082F-75F0-4080-8642-9DC0E9DA7233}" type="datetimeFigureOut">
               <a:rPr lang="pt-BR" smtClean="0"/>
               <a:pPr/>
-              <a:t>16/07/2016</a:t>
+              <a:t>17/07/2016</a:t>
             </a:fld>
             <a:endParaRPr lang="pt-BR"/>
           </a:p>
@@ -903,7 +904,7 @@
             <a:fld id="{97BE082F-75F0-4080-8642-9DC0E9DA7233}" type="datetimeFigureOut">
               <a:rPr lang="pt-BR" smtClean="0"/>
               <a:pPr/>
-              <a:t>16/07/2016</a:t>
+              <a:t>17/07/2016</a:t>
             </a:fld>
             <a:endParaRPr lang="pt-BR"/>
           </a:p>
@@ -1085,7 +1086,7 @@
             <a:fld id="{97BE082F-75F0-4080-8642-9DC0E9DA7233}" type="datetimeFigureOut">
               <a:rPr lang="pt-BR" smtClean="0"/>
               <a:pPr/>
-              <a:t>16/07/2016</a:t>
+              <a:t>17/07/2016</a:t>
             </a:fld>
             <a:endParaRPr lang="pt-BR"/>
           </a:p>
@@ -1439,7 +1440,7 @@
             <a:fld id="{97BE082F-75F0-4080-8642-9DC0E9DA7233}" type="datetimeFigureOut">
               <a:rPr lang="pt-BR" smtClean="0"/>
               <a:pPr/>
-              <a:t>16/07/2016</a:t>
+              <a:t>17/07/2016</a:t>
             </a:fld>
             <a:endParaRPr lang="pt-BR"/>
           </a:p>
@@ -1687,7 +1688,7 @@
             <a:fld id="{97BE082F-75F0-4080-8642-9DC0E9DA7233}" type="datetimeFigureOut">
               <a:rPr lang="pt-BR" smtClean="0"/>
               <a:pPr/>
-              <a:t>16/07/2016</a:t>
+              <a:t>17/07/2016</a:t>
             </a:fld>
             <a:endParaRPr lang="pt-BR"/>
           </a:p>
@@ -1977,7 +1978,7 @@
             <a:fld id="{97BE082F-75F0-4080-8642-9DC0E9DA7233}" type="datetimeFigureOut">
               <a:rPr lang="pt-BR" smtClean="0"/>
               <a:pPr/>
-              <a:t>16/07/2016</a:t>
+              <a:t>17/07/2016</a:t>
             </a:fld>
             <a:endParaRPr lang="pt-BR"/>
           </a:p>
@@ -2401,7 +2402,7 @@
             <a:fld id="{97BE082F-75F0-4080-8642-9DC0E9DA7233}" type="datetimeFigureOut">
               <a:rPr lang="pt-BR" smtClean="0"/>
               <a:pPr/>
-              <a:t>16/07/2016</a:t>
+              <a:t>17/07/2016</a:t>
             </a:fld>
             <a:endParaRPr lang="pt-BR"/>
           </a:p>
@@ -2521,7 +2522,7 @@
             <a:fld id="{97BE082F-75F0-4080-8642-9DC0E9DA7233}" type="datetimeFigureOut">
               <a:rPr lang="pt-BR" smtClean="0"/>
               <a:pPr/>
-              <a:t>16/07/2016</a:t>
+              <a:t>17/07/2016</a:t>
             </a:fld>
             <a:endParaRPr lang="pt-BR"/>
           </a:p>
@@ -2618,7 +2619,7 @@
             <a:fld id="{97BE082F-75F0-4080-8642-9DC0E9DA7233}" type="datetimeFigureOut">
               <a:rPr lang="pt-BR" smtClean="0"/>
               <a:pPr/>
-              <a:t>16/07/2016</a:t>
+              <a:t>17/07/2016</a:t>
             </a:fld>
             <a:endParaRPr lang="pt-BR"/>
           </a:p>
@@ -2897,7 +2898,7 @@
             <a:fld id="{97BE082F-75F0-4080-8642-9DC0E9DA7233}" type="datetimeFigureOut">
               <a:rPr lang="pt-BR" smtClean="0"/>
               <a:pPr/>
-              <a:t>16/07/2016</a:t>
+              <a:t>17/07/2016</a:t>
             </a:fld>
             <a:endParaRPr lang="pt-BR"/>
           </a:p>
@@ -3152,7 +3153,7 @@
             <a:fld id="{97BE082F-75F0-4080-8642-9DC0E9DA7233}" type="datetimeFigureOut">
               <a:rPr lang="pt-BR" smtClean="0"/>
               <a:pPr/>
-              <a:t>16/07/2016</a:t>
+              <a:t>17/07/2016</a:t>
             </a:fld>
             <a:endParaRPr lang="pt-BR"/>
           </a:p>
@@ -3367,7 +3368,7 @@
             <a:fld id="{97BE082F-75F0-4080-8642-9DC0E9DA7233}" type="datetimeFigureOut">
               <a:rPr lang="pt-BR" smtClean="0"/>
               <a:pPr/>
-              <a:t>16/07/2016</a:t>
+              <a:t>17/07/2016</a:t>
             </a:fld>
             <a:endParaRPr lang="pt-BR"/>
           </a:p>
@@ -4180,22 +4181,7 @@
                   </a:outerShdw>
                 </a:effectLst>
               </a:rPr>
-              <a:t> 5 Test </a:t>
-            </a:r>
-            <a:r>
-              <a:rPr lang="en-US" dirty="0" smtClean="0">
-                <a:solidFill>
-                  <a:srgbClr val="0070C0"/>
-                </a:solidFill>
-                <a:effectLst>
-                  <a:outerShdw blurRad="38100" dist="38100" dir="2700000" algn="tl">
-                    <a:srgbClr val="000000">
-                      <a:alpha val="43137"/>
-                    </a:srgbClr>
-                  </a:outerShdw>
-                </a:effectLst>
-              </a:rPr>
-              <a:t>Framework - </a:t>
+              <a:t> 5 Test Framework - </a:t>
             </a:r>
             <a:r>
               <a:rPr lang="en-US" dirty="0" err="1" smtClean="0">
@@ -4240,7 +4226,7 @@
         <p:spPr/>
         <p:txBody>
           <a:bodyPr>
-            <a:normAutofit fontScale="92500"/>
+            <a:normAutofit fontScale="92500" lnSpcReduction="20000"/>
           </a:bodyPr>
           <a:lstStyle/>
           <a:p>
@@ -4278,6 +4264,33 @@
             </a:r>
           </a:p>
           <a:p>
+            <a:pPr lvl="1"/>
+            <a:r>
+              <a:rPr lang="pt-BR" dirty="0" smtClean="0"/>
+              <a:t>Resumo mudanças </a:t>
+            </a:r>
+            <a:r>
+              <a:rPr lang="pt-BR" dirty="0" err="1" smtClean="0"/>
+              <a:t>JUnit</a:t>
+            </a:r>
+            <a:r>
+              <a:rPr lang="pt-BR" dirty="0" smtClean="0"/>
+              <a:t> 4 p/ </a:t>
+            </a:r>
+            <a:r>
+              <a:rPr lang="pt-BR" dirty="0" err="1" smtClean="0"/>
+              <a:t>JUnit</a:t>
+            </a:r>
+            <a:r>
+              <a:rPr lang="pt-BR" dirty="0" smtClean="0"/>
+              <a:t> 5</a:t>
+            </a:r>
+          </a:p>
+          <a:p>
+            <a:pPr lvl="1"/>
+            <a:endParaRPr lang="pt-BR" dirty="0" smtClean="0"/>
+          </a:p>
+          <a:p>
             <a:r>
               <a:rPr lang="pt-BR" dirty="0"/>
               <a:t>Parte </a:t>
@@ -4286,21 +4299,12 @@
               <a:rPr lang="pt-BR" dirty="0" smtClean="0"/>
               <a:t>2:</a:t>
             </a:r>
-            <a:endParaRPr lang="pt-BR" dirty="0" smtClean="0"/>
           </a:p>
           <a:p>
             <a:pPr lvl="1"/>
             <a:r>
               <a:rPr lang="pt-BR" dirty="0" smtClean="0"/>
-              <a:t>Arquitetura </a:t>
-            </a:r>
-            <a:r>
-              <a:rPr lang="pt-BR" dirty="0" smtClean="0"/>
-              <a:t>do </a:t>
-            </a:r>
-            <a:r>
-              <a:rPr lang="pt-BR" dirty="0" smtClean="0"/>
-              <a:t>Framework</a:t>
+              <a:t>Arquitetura do Framework</a:t>
             </a:r>
           </a:p>
           <a:p>
@@ -4331,7 +4335,6 @@
               <a:rPr lang="pt-BR" dirty="0" smtClean="0"/>
               <a:t>Testes Dinâmicos</a:t>
             </a:r>
-            <a:endParaRPr lang="pt-BR" dirty="0" smtClean="0"/>
           </a:p>
         </p:txBody>
       </p:sp>
@@ -4572,15 +4575,7 @@
             </a:r>
             <a:r>
               <a:rPr lang="pt-BR" dirty="0" smtClean="0"/>
-              <a:t> 2015: Java 8 para</a:t>
-            </a:r>
-            <a:r>
-              <a:rPr lang="pt-BR" dirty="0" smtClean="0"/>
-              <a:t> testar código Java </a:t>
-            </a:r>
-            <a:r>
-              <a:rPr lang="pt-BR" dirty="0" smtClean="0"/>
-              <a:t>8</a:t>
+              <a:t> 2015: Java 8 para testar código Java 8</a:t>
             </a:r>
           </a:p>
           <a:p>
@@ -5681,6 +5676,663 @@
               <a:rPr lang="en-US" smtClean="0"/>
               <a:pPr/>
               <a:t>6</a:t>
+            </a:fld>
+            <a:endParaRPr lang="en-US" dirty="0"/>
+          </a:p>
+        </p:txBody>
+      </p:sp>
+      <p:sp>
+        <p:nvSpPr>
+          <p:cNvPr id="4" name="Title 3"/>
+          <p:cNvSpPr>
+            <a:spLocks noGrp="1"/>
+          </p:cNvSpPr>
+          <p:nvPr>
+            <p:ph type="title"/>
+          </p:nvPr>
+        </p:nvSpPr>
+        <p:spPr/>
+        <p:txBody>
+          <a:bodyPr>
+            <a:normAutofit fontScale="90000"/>
+          </a:bodyPr>
+          <a:lstStyle/>
+          <a:p>
+            <a:r>
+              <a:rPr lang="pt-BR" dirty="0" smtClean="0">
+                <a:solidFill>
+                  <a:srgbClr val="0070C0"/>
+                </a:solidFill>
+                <a:effectLst>
+                  <a:outerShdw blurRad="38100" dist="38100" dir="2700000" algn="tl">
+                    <a:srgbClr val="000000">
+                      <a:alpha val="43137"/>
+                    </a:srgbClr>
+                  </a:outerShdw>
+                </a:effectLst>
+              </a:rPr>
+              <a:t>Resumo Mudanças </a:t>
+            </a:r>
+            <a:r>
+              <a:rPr lang="pt-BR" dirty="0" err="1" smtClean="0">
+                <a:solidFill>
+                  <a:srgbClr val="0070C0"/>
+                </a:solidFill>
+                <a:effectLst>
+                  <a:outerShdw blurRad="38100" dist="38100" dir="2700000" algn="tl">
+                    <a:srgbClr val="000000">
+                      <a:alpha val="43137"/>
+                    </a:srgbClr>
+                  </a:outerShdw>
+                </a:effectLst>
+              </a:rPr>
+              <a:t>JUnit</a:t>
+            </a:r>
+            <a:r>
+              <a:rPr lang="pt-BR" dirty="0" smtClean="0">
+                <a:solidFill>
+                  <a:srgbClr val="0070C0"/>
+                </a:solidFill>
+                <a:effectLst>
+                  <a:outerShdw blurRad="38100" dist="38100" dir="2700000" algn="tl">
+                    <a:srgbClr val="000000">
+                      <a:alpha val="43137"/>
+                    </a:srgbClr>
+                  </a:outerShdw>
+                </a:effectLst>
+              </a:rPr>
+              <a:t> 4 -&gt; </a:t>
+            </a:r>
+            <a:r>
+              <a:rPr lang="pt-BR" dirty="0" err="1" smtClean="0">
+                <a:solidFill>
+                  <a:srgbClr val="0070C0"/>
+                </a:solidFill>
+                <a:effectLst>
+                  <a:outerShdw blurRad="38100" dist="38100" dir="2700000" algn="tl">
+                    <a:srgbClr val="000000">
+                      <a:alpha val="43137"/>
+                    </a:srgbClr>
+                  </a:outerShdw>
+                </a:effectLst>
+              </a:rPr>
+              <a:t>JUnit</a:t>
+            </a:r>
+            <a:r>
+              <a:rPr lang="pt-BR" dirty="0" smtClean="0">
+                <a:solidFill>
+                  <a:srgbClr val="0070C0"/>
+                </a:solidFill>
+                <a:effectLst>
+                  <a:outerShdw blurRad="38100" dist="38100" dir="2700000" algn="tl">
+                    <a:srgbClr val="000000">
+                      <a:alpha val="43137"/>
+                    </a:srgbClr>
+                  </a:outerShdw>
+                </a:effectLst>
+              </a:rPr>
+              <a:t> 5</a:t>
+            </a:r>
+            <a:endParaRPr lang="pt-BR" dirty="0">
+              <a:solidFill>
+                <a:srgbClr val="0070C0"/>
+              </a:solidFill>
+              <a:effectLst>
+                <a:outerShdw blurRad="38100" dist="38100" dir="2700000" algn="tl">
+                  <a:srgbClr val="000000">
+                    <a:alpha val="43137"/>
+                  </a:srgbClr>
+                </a:outerShdw>
+              </a:effectLst>
+            </a:endParaRPr>
+          </a:p>
+        </p:txBody>
+      </p:sp>
+      <p:sp>
+        <p:nvSpPr>
+          <p:cNvPr id="2" name="Espaço Reservado para Conteúdo 1"/>
+          <p:cNvSpPr>
+            <a:spLocks noGrp="1"/>
+          </p:cNvSpPr>
+          <p:nvPr>
+            <p:ph idx="1"/>
+          </p:nvPr>
+        </p:nvSpPr>
+        <p:spPr>
+          <a:xfrm>
+            <a:off x="457200" y="1124744"/>
+            <a:ext cx="8229600" cy="5454352"/>
+          </a:xfrm>
+        </p:spPr>
+        <p:txBody>
+          <a:bodyPr>
+            <a:normAutofit/>
+          </a:bodyPr>
+          <a:lstStyle/>
+          <a:p>
+            <a:r>
+              <a:rPr lang="pt-BR" sz="2800" dirty="0" smtClean="0"/>
+              <a:t>Uso das anotações do pacote </a:t>
+            </a:r>
+            <a:r>
+              <a:rPr lang="en-US" sz="2800" i="1" dirty="0" err="1" smtClean="0"/>
+              <a:t>org.junit.jupiter.api</a:t>
+            </a:r>
+            <a:r>
+              <a:rPr lang="en-US" sz="2800" i="1" dirty="0" smtClean="0"/>
+              <a:t> (</a:t>
+            </a:r>
+            <a:r>
+              <a:rPr lang="en-US" sz="2800" dirty="0" smtClean="0"/>
+              <a:t>Assertions, Assumptions)</a:t>
+            </a:r>
+          </a:p>
+          <a:p>
+            <a:r>
+              <a:rPr lang="pt-BR" sz="2800" dirty="0" smtClean="0"/>
+              <a:t>Migração com</a:t>
+            </a:r>
+            <a:r>
+              <a:rPr lang="en-US" sz="2800" dirty="0" smtClean="0"/>
+              <a:t> </a:t>
+            </a:r>
+            <a:r>
+              <a:rPr lang="pt-BR" sz="2800" b="1" i="1" dirty="0" smtClean="0"/>
+              <a:t>@</a:t>
+            </a:r>
+            <a:r>
+              <a:rPr lang="en-US" sz="2800" b="1" i="1" dirty="0" err="1" smtClean="0"/>
+              <a:t>RunWith</a:t>
+            </a:r>
+            <a:r>
+              <a:rPr lang="en-US" sz="2800" b="1" i="1" dirty="0" smtClean="0"/>
+              <a:t>(</a:t>
+            </a:r>
+            <a:r>
+              <a:rPr lang="en-US" sz="2800" b="1" i="1" dirty="0" err="1" smtClean="0"/>
+              <a:t>JUnitPlatform.class</a:t>
+            </a:r>
+            <a:r>
+              <a:rPr lang="en-US" sz="2800" b="1" i="1" dirty="0" smtClean="0"/>
+              <a:t>)</a:t>
+            </a:r>
+            <a:endParaRPr lang="en-US" sz="2800" dirty="0" smtClean="0"/>
+          </a:p>
+          <a:p>
+            <a:endParaRPr lang="en-US" sz="2800" dirty="0"/>
+          </a:p>
+        </p:txBody>
+      </p:sp>
+      <p:sp>
+        <p:nvSpPr>
+          <p:cNvPr id="5" name="AutoShape 2" descr="G:\HD-Games\GitRepos\DesignPatterns\CAP392-02-PloP\artigos\03 - Pattern Language\entrega final\family-guy-simpsons2.webp"/>
+          <p:cNvSpPr>
+            <a:spLocks noChangeAspect="1" noChangeArrowheads="1"/>
+          </p:cNvSpPr>
+          <p:nvPr/>
+        </p:nvSpPr>
+        <p:spPr bwMode="auto">
+          <a:xfrm>
+            <a:off x="155575" y="-144463"/>
+            <a:ext cx="304800" cy="304801"/>
+          </a:xfrm>
+          <a:prstGeom prst="rect">
+            <a:avLst/>
+          </a:prstGeom>
+          <a:noFill/>
+          <a:extLst>
+            <a:ext uri="{909E8E84-426E-40DD-AFC4-6F175D3DCCD1}">
+              <a14:hiddenFill xmlns:a14="http://schemas.microsoft.com/office/drawing/2010/main">
+                <a:solidFill>
+                  <a:srgbClr val="FFFFFF"/>
+                </a:solidFill>
+              </a14:hiddenFill>
+            </a:ext>
+          </a:extLst>
+        </p:spPr>
+        <p:txBody>
+          <a:bodyPr vert="horz" wrap="square" lIns="91440" tIns="45720" rIns="91440" bIns="45720" numCol="1" anchor="t" anchorCtr="0" compatLnSpc="1">
+            <a:prstTxWarp prst="textNoShape">
+              <a:avLst/>
+            </a:prstTxWarp>
+          </a:bodyPr>
+          <a:lstStyle/>
+          <a:p>
+            <a:endParaRPr lang="pt-BR"/>
+          </a:p>
+        </p:txBody>
+      </p:sp>
+      <p:sp>
+        <p:nvSpPr>
+          <p:cNvPr id="7" name="AutoShape 4" descr="G:\HD-Games\GitRepos\DesignPatterns\CAP392-02-PloP\artigos\03 - Pattern Language\entrega final\family-guy-simpsons2.webp"/>
+          <p:cNvSpPr>
+            <a:spLocks noChangeAspect="1" noChangeArrowheads="1"/>
+          </p:cNvSpPr>
+          <p:nvPr/>
+        </p:nvSpPr>
+        <p:spPr bwMode="auto">
+          <a:xfrm>
+            <a:off x="307975" y="7937"/>
+            <a:ext cx="304800" cy="304801"/>
+          </a:xfrm>
+          <a:prstGeom prst="rect">
+            <a:avLst/>
+          </a:prstGeom>
+          <a:noFill/>
+          <a:extLst>
+            <a:ext uri="{909E8E84-426E-40DD-AFC4-6F175D3DCCD1}">
+              <a14:hiddenFill xmlns:a14="http://schemas.microsoft.com/office/drawing/2010/main">
+                <a:solidFill>
+                  <a:srgbClr val="FFFFFF"/>
+                </a:solidFill>
+              </a14:hiddenFill>
+            </a:ext>
+          </a:extLst>
+        </p:spPr>
+        <p:txBody>
+          <a:bodyPr vert="horz" wrap="square" lIns="91440" tIns="45720" rIns="91440" bIns="45720" numCol="1" anchor="t" anchorCtr="0" compatLnSpc="1">
+            <a:prstTxWarp prst="textNoShape">
+              <a:avLst/>
+            </a:prstTxWarp>
+          </a:bodyPr>
+          <a:lstStyle/>
+          <a:p>
+            <a:endParaRPr lang="pt-BR"/>
+          </a:p>
+        </p:txBody>
+      </p:sp>
+      <p:graphicFrame>
+        <p:nvGraphicFramePr>
+          <p:cNvPr id="6" name="Tabela 5"/>
+          <p:cNvGraphicFramePr>
+            <a:graphicFrameLocks noGrp="1"/>
+          </p:cNvGraphicFramePr>
+          <p:nvPr>
+            <p:extLst>
+              <p:ext uri="{D42A27DB-BD31-4B8C-83A1-F6EECF244321}">
+                <p14:modId xmlns:p14="http://schemas.microsoft.com/office/powerpoint/2010/main" val="3110834847"/>
+              </p:ext>
+            </p:extLst>
+          </p:nvPr>
+        </p:nvGraphicFramePr>
+        <p:xfrm>
+          <a:off x="1716360" y="2780928"/>
+          <a:ext cx="6096000" cy="3708400"/>
+        </p:xfrm>
+        <a:graphic>
+          <a:graphicData uri="http://schemas.openxmlformats.org/drawingml/2006/table">
+            <a:tbl>
+              <a:tblPr firstRow="1" bandRow="1">
+                <a:tableStyleId>{5C22544A-7EE6-4342-B048-85BDC9FD1C3A}</a:tableStyleId>
+              </a:tblPr>
+              <a:tblGrid>
+                <a:gridCol w="3048000"/>
+                <a:gridCol w="3048000"/>
+              </a:tblGrid>
+              <a:tr h="370840">
+                <a:tc>
+                  <a:txBody>
+                    <a:bodyPr/>
+                    <a:lstStyle/>
+                    <a:p>
+                      <a:r>
+                        <a:rPr lang="en-US" noProof="0" smtClean="0"/>
+                        <a:t>JUnit 4</a:t>
+                      </a:r>
+                      <a:endParaRPr lang="en-US" noProof="0"/>
+                    </a:p>
+                  </a:txBody>
+                  <a:tcPr/>
+                </a:tc>
+                <a:tc>
+                  <a:txBody>
+                    <a:bodyPr/>
+                    <a:lstStyle/>
+                    <a:p>
+                      <a:r>
+                        <a:rPr lang="en-US" noProof="0" smtClean="0"/>
+                        <a:t>JUnit 5</a:t>
+                      </a:r>
+                      <a:endParaRPr lang="en-US" noProof="0"/>
+                    </a:p>
+                  </a:txBody>
+                  <a:tcPr/>
+                </a:tc>
+              </a:tr>
+              <a:tr h="370840">
+                <a:tc>
+                  <a:txBody>
+                    <a:bodyPr/>
+                    <a:lstStyle/>
+                    <a:p>
+                      <a:r>
+                        <a:rPr lang="en-US" noProof="0" smtClean="0"/>
+                        <a:t>@BeforeClass</a:t>
+                      </a:r>
+                      <a:endParaRPr lang="en-US" noProof="0"/>
+                    </a:p>
+                  </a:txBody>
+                  <a:tcPr/>
+                </a:tc>
+                <a:tc>
+                  <a:txBody>
+                    <a:bodyPr/>
+                    <a:lstStyle/>
+                    <a:p>
+                      <a:r>
+                        <a:rPr lang="en-US" noProof="0" smtClean="0"/>
+                        <a:t>@BeforeAll</a:t>
+                      </a:r>
+                      <a:endParaRPr lang="en-US" noProof="0"/>
+                    </a:p>
+                  </a:txBody>
+                  <a:tcPr/>
+                </a:tc>
+              </a:tr>
+              <a:tr h="370840">
+                <a:tc>
+                  <a:txBody>
+                    <a:bodyPr/>
+                    <a:lstStyle/>
+                    <a:p>
+                      <a:r>
+                        <a:rPr lang="en-US" noProof="0" smtClean="0"/>
+                        <a:t>@Before</a:t>
+                      </a:r>
+                      <a:endParaRPr lang="en-US" noProof="0"/>
+                    </a:p>
+                  </a:txBody>
+                  <a:tcPr/>
+                </a:tc>
+                <a:tc>
+                  <a:txBody>
+                    <a:bodyPr/>
+                    <a:lstStyle/>
+                    <a:p>
+                      <a:r>
+                        <a:rPr lang="en-US" noProof="0" smtClean="0"/>
+                        <a:t>@BeforeEach</a:t>
+                      </a:r>
+                      <a:endParaRPr lang="en-US" noProof="0"/>
+                    </a:p>
+                  </a:txBody>
+                  <a:tcPr/>
+                </a:tc>
+              </a:tr>
+              <a:tr h="370840">
+                <a:tc>
+                  <a:txBody>
+                    <a:bodyPr/>
+                    <a:lstStyle/>
+                    <a:p>
+                      <a:r>
+                        <a:rPr lang="en-US" noProof="0" smtClean="0"/>
+                        <a:t>@After</a:t>
+                      </a:r>
+                      <a:endParaRPr lang="en-US" noProof="0"/>
+                    </a:p>
+                  </a:txBody>
+                  <a:tcPr/>
+                </a:tc>
+                <a:tc>
+                  <a:txBody>
+                    <a:bodyPr/>
+                    <a:lstStyle/>
+                    <a:p>
+                      <a:r>
+                        <a:rPr lang="en-US" noProof="0" smtClean="0"/>
+                        <a:t>@AfterEach</a:t>
+                      </a:r>
+                      <a:endParaRPr lang="en-US" noProof="0"/>
+                    </a:p>
+                  </a:txBody>
+                  <a:tcPr/>
+                </a:tc>
+              </a:tr>
+              <a:tr h="370840">
+                <a:tc>
+                  <a:txBody>
+                    <a:bodyPr/>
+                    <a:lstStyle/>
+                    <a:p>
+                      <a:r>
+                        <a:rPr lang="en-US" noProof="0" smtClean="0"/>
+                        <a:t>@AfterClass</a:t>
+                      </a:r>
+                      <a:endParaRPr lang="en-US" noProof="0"/>
+                    </a:p>
+                  </a:txBody>
+                  <a:tcPr/>
+                </a:tc>
+                <a:tc>
+                  <a:txBody>
+                    <a:bodyPr/>
+                    <a:lstStyle/>
+                    <a:p>
+                      <a:r>
+                        <a:rPr lang="en-US" noProof="0" smtClean="0"/>
+                        <a:t>@AfterAll</a:t>
+                      </a:r>
+                      <a:endParaRPr lang="en-US" noProof="0"/>
+                    </a:p>
+                  </a:txBody>
+                  <a:tcPr/>
+                </a:tc>
+              </a:tr>
+              <a:tr h="370840">
+                <a:tc>
+                  <a:txBody>
+                    <a:bodyPr/>
+                    <a:lstStyle/>
+                    <a:p>
+                      <a:r>
+                        <a:rPr lang="en-US" noProof="0" smtClean="0"/>
+                        <a:t>@Ignore</a:t>
+                      </a:r>
+                      <a:endParaRPr lang="en-US" noProof="0"/>
+                    </a:p>
+                  </a:txBody>
+                  <a:tcPr/>
+                </a:tc>
+                <a:tc>
+                  <a:txBody>
+                    <a:bodyPr/>
+                    <a:lstStyle/>
+                    <a:p>
+                      <a:r>
+                        <a:rPr lang="en-US" noProof="0" smtClean="0"/>
+                        <a:t>@Disabled</a:t>
+                      </a:r>
+                      <a:endParaRPr lang="en-US" noProof="0"/>
+                    </a:p>
+                  </a:txBody>
+                  <a:tcPr/>
+                </a:tc>
+              </a:tr>
+              <a:tr h="370840">
+                <a:tc>
+                  <a:txBody>
+                    <a:bodyPr/>
+                    <a:lstStyle/>
+                    <a:p>
+                      <a:r>
+                        <a:rPr lang="en-US" noProof="0" smtClean="0"/>
+                        <a:t>@Category</a:t>
+                      </a:r>
+                      <a:endParaRPr lang="en-US" noProof="0"/>
+                    </a:p>
+                  </a:txBody>
+                  <a:tcPr/>
+                </a:tc>
+                <a:tc>
+                  <a:txBody>
+                    <a:bodyPr/>
+                    <a:lstStyle/>
+                    <a:p>
+                      <a:r>
+                        <a:rPr lang="en-US" noProof="0" smtClean="0"/>
+                        <a:t>@Tag</a:t>
+                      </a:r>
+                      <a:endParaRPr lang="en-US" noProof="0"/>
+                    </a:p>
+                  </a:txBody>
+                  <a:tcPr/>
+                </a:tc>
+              </a:tr>
+              <a:tr h="370840">
+                <a:tc>
+                  <a:txBody>
+                    <a:bodyPr/>
+                    <a:lstStyle/>
+                    <a:p>
+                      <a:r>
+                        <a:rPr lang="en-US" noProof="0" smtClean="0"/>
+                        <a:t>@RunWith</a:t>
+                      </a:r>
+                      <a:endParaRPr lang="en-US" noProof="0"/>
+                    </a:p>
+                  </a:txBody>
+                  <a:tcPr/>
+                </a:tc>
+                <a:tc rowSpan="3">
+                  <a:txBody>
+                    <a:bodyPr/>
+                    <a:lstStyle/>
+                    <a:p>
+                      <a:r>
+                        <a:rPr lang="en-US" noProof="0" smtClean="0"/>
+                        <a:t>@ExtendWith</a:t>
+                      </a:r>
+                      <a:endParaRPr lang="en-US" noProof="0"/>
+                    </a:p>
+                  </a:txBody>
+                  <a:tcPr anchor="ctr"/>
+                </a:tc>
+              </a:tr>
+              <a:tr h="370840">
+                <a:tc>
+                  <a:txBody>
+                    <a:bodyPr/>
+                    <a:lstStyle/>
+                    <a:p>
+                      <a:r>
+                        <a:rPr lang="en-US" noProof="0" smtClean="0"/>
+                        <a:t>@Rule</a:t>
+                      </a:r>
+                      <a:endParaRPr lang="en-US" noProof="0"/>
+                    </a:p>
+                  </a:txBody>
+                  <a:tcPr/>
+                </a:tc>
+                <a:tc vMerge="1">
+                  <a:txBody>
+                    <a:bodyPr/>
+                    <a:lstStyle/>
+                    <a:p>
+                      <a:endParaRPr lang="pt-BR" dirty="0"/>
+                    </a:p>
+                  </a:txBody>
+                  <a:tcPr/>
+                </a:tc>
+              </a:tr>
+              <a:tr h="370840">
+                <a:tc>
+                  <a:txBody>
+                    <a:bodyPr/>
+                    <a:lstStyle/>
+                    <a:p>
+                      <a:r>
+                        <a:rPr lang="en-US" noProof="0" dirty="0" smtClean="0"/>
+                        <a:t>@</a:t>
+                      </a:r>
+                      <a:r>
+                        <a:rPr lang="en-US" noProof="0" dirty="0" err="1" smtClean="0"/>
+                        <a:t>ClassRule</a:t>
+                      </a:r>
+                      <a:endParaRPr lang="en-US" noProof="0" dirty="0"/>
+                    </a:p>
+                  </a:txBody>
+                  <a:tcPr/>
+                </a:tc>
+                <a:tc vMerge="1">
+                  <a:txBody>
+                    <a:bodyPr/>
+                    <a:lstStyle/>
+                    <a:p>
+                      <a:endParaRPr lang="pt-BR" dirty="0"/>
+                    </a:p>
+                  </a:txBody>
+                  <a:tcPr/>
+                </a:tc>
+              </a:tr>
+            </a:tbl>
+          </a:graphicData>
+        </a:graphic>
+      </p:graphicFrame>
+    </p:spTree>
+    <p:extLst>
+      <p:ext uri="{BB962C8B-B14F-4D97-AF65-F5344CB8AC3E}">
+        <p14:creationId xmlns:p14="http://schemas.microsoft.com/office/powerpoint/2010/main" val="173753426"/>
+      </p:ext>
+    </p:extLst>
+  </p:cSld>
+  <p:clrMapOvr>
+    <a:masterClrMapping/>
+  </p:clrMapOvr>
+  <mc:AlternateContent xmlns:mc="http://schemas.openxmlformats.org/markup-compatibility/2006" xmlns:p14="http://schemas.microsoft.com/office/powerpoint/2010/main">
+    <mc:Choice Requires="p14">
+      <p:transition p14:dur="0"/>
+    </mc:Choice>
+    <mc:Fallback xmlns="">
+      <p:transition/>
+    </mc:Fallback>
+  </mc:AlternateContent>
+  <p:timing>
+    <p:tnLst>
+      <p:par>
+        <p:cTn id="1" dur="indefinite" restart="never" nodeType="tmRoot"/>
+      </p:par>
+    </p:tnLst>
+  </p:timing>
+</p:sld>
+</file>
+
+<file path=ppt/slides/slide7.xml><?xml version="1.0" encoding="utf-8"?>
+<p:sld xmlns:a="http://schemas.openxmlformats.org/drawingml/2006/main" xmlns:r="http://schemas.openxmlformats.org/officeDocument/2006/relationships" xmlns:p="http://schemas.openxmlformats.org/presentationml/2006/main">
+  <p:cSld>
+    <p:spTree>
+      <p:nvGrpSpPr>
+        <p:cNvPr id="1" name=""/>
+        <p:cNvGrpSpPr/>
+        <p:nvPr/>
+      </p:nvGrpSpPr>
+      <p:grpSpPr>
+        <a:xfrm>
+          <a:off x="0" y="0"/>
+          <a:ext cx="0" cy="0"/>
+          <a:chOff x="0" y="0"/>
+          <a:chExt cx="0" cy="0"/>
+        </a:xfrm>
+      </p:grpSpPr>
+      <p:sp>
+        <p:nvSpPr>
+          <p:cNvPr id="3" name="Slide Number Placeholder 2"/>
+          <p:cNvSpPr>
+            <a:spLocks noGrp="1"/>
+          </p:cNvSpPr>
+          <p:nvPr>
+            <p:ph type="sldNum" sz="quarter" idx="11"/>
+          </p:nvPr>
+        </p:nvSpPr>
+        <p:spPr/>
+        <p:txBody>
+          <a:bodyPr/>
+          <a:lstStyle/>
+          <a:p>
+            <a:fld id="{338BD863-DCDC-5F43-A029-265BB7DA4A17}" type="slidenum">
+              <a:rPr lang="en-US" smtClean="0"/>
+              <a:pPr/>
+              <a:t>7</a:t>
             </a:fld>
             <a:endParaRPr lang="en-US" dirty="0"/>
           </a:p>

</xml_diff>

<commit_message>
Atualizações da apresentação JUnit5 dia 19 e início PPT dia 26
</commit_message>
<xml_diff>
--- a/CAP385-00-Presentations/02-JUnit 5/02-JUnit 5.pptx
+++ b/CAP385-00-Presentations/02-JUnit 5/02-JUnit 5.pptx
@@ -199,7 +199,7 @@
             <a:fld id="{3DB25566-8A38-405D-AF46-A7AC913A6215}" type="datetimeFigureOut">
               <a:rPr lang="pt-BR" smtClean="0"/>
               <a:pPr/>
-              <a:t>17/07/2016</a:t>
+              <a:t>19/07/2016</a:t>
             </a:fld>
             <a:endParaRPr lang="pt-BR"/>
           </a:p>
@@ -732,7 +732,7 @@
             <a:fld id="{97BE082F-75F0-4080-8642-9DC0E9DA7233}" type="datetimeFigureOut">
               <a:rPr lang="pt-BR" smtClean="0"/>
               <a:pPr/>
-              <a:t>17/07/2016</a:t>
+              <a:t>19/07/2016</a:t>
             </a:fld>
             <a:endParaRPr lang="pt-BR"/>
           </a:p>
@@ -904,7 +904,7 @@
             <a:fld id="{97BE082F-75F0-4080-8642-9DC0E9DA7233}" type="datetimeFigureOut">
               <a:rPr lang="pt-BR" smtClean="0"/>
               <a:pPr/>
-              <a:t>17/07/2016</a:t>
+              <a:t>19/07/2016</a:t>
             </a:fld>
             <a:endParaRPr lang="pt-BR"/>
           </a:p>
@@ -1086,7 +1086,7 @@
             <a:fld id="{97BE082F-75F0-4080-8642-9DC0E9DA7233}" type="datetimeFigureOut">
               <a:rPr lang="pt-BR" smtClean="0"/>
               <a:pPr/>
-              <a:t>17/07/2016</a:t>
+              <a:t>19/07/2016</a:t>
             </a:fld>
             <a:endParaRPr lang="pt-BR"/>
           </a:p>
@@ -1440,7 +1440,7 @@
             <a:fld id="{97BE082F-75F0-4080-8642-9DC0E9DA7233}" type="datetimeFigureOut">
               <a:rPr lang="pt-BR" smtClean="0"/>
               <a:pPr/>
-              <a:t>17/07/2016</a:t>
+              <a:t>19/07/2016</a:t>
             </a:fld>
             <a:endParaRPr lang="pt-BR"/>
           </a:p>
@@ -1688,7 +1688,7 @@
             <a:fld id="{97BE082F-75F0-4080-8642-9DC0E9DA7233}" type="datetimeFigureOut">
               <a:rPr lang="pt-BR" smtClean="0"/>
               <a:pPr/>
-              <a:t>17/07/2016</a:t>
+              <a:t>19/07/2016</a:t>
             </a:fld>
             <a:endParaRPr lang="pt-BR"/>
           </a:p>
@@ -1978,7 +1978,7 @@
             <a:fld id="{97BE082F-75F0-4080-8642-9DC0E9DA7233}" type="datetimeFigureOut">
               <a:rPr lang="pt-BR" smtClean="0"/>
               <a:pPr/>
-              <a:t>17/07/2016</a:t>
+              <a:t>19/07/2016</a:t>
             </a:fld>
             <a:endParaRPr lang="pt-BR"/>
           </a:p>
@@ -2402,7 +2402,7 @@
             <a:fld id="{97BE082F-75F0-4080-8642-9DC0E9DA7233}" type="datetimeFigureOut">
               <a:rPr lang="pt-BR" smtClean="0"/>
               <a:pPr/>
-              <a:t>17/07/2016</a:t>
+              <a:t>19/07/2016</a:t>
             </a:fld>
             <a:endParaRPr lang="pt-BR"/>
           </a:p>
@@ -2522,7 +2522,7 @@
             <a:fld id="{97BE082F-75F0-4080-8642-9DC0E9DA7233}" type="datetimeFigureOut">
               <a:rPr lang="pt-BR" smtClean="0"/>
               <a:pPr/>
-              <a:t>17/07/2016</a:t>
+              <a:t>19/07/2016</a:t>
             </a:fld>
             <a:endParaRPr lang="pt-BR"/>
           </a:p>
@@ -2619,7 +2619,7 @@
             <a:fld id="{97BE082F-75F0-4080-8642-9DC0E9DA7233}" type="datetimeFigureOut">
               <a:rPr lang="pt-BR" smtClean="0"/>
               <a:pPr/>
-              <a:t>17/07/2016</a:t>
+              <a:t>19/07/2016</a:t>
             </a:fld>
             <a:endParaRPr lang="pt-BR"/>
           </a:p>
@@ -2898,7 +2898,7 @@
             <a:fld id="{97BE082F-75F0-4080-8642-9DC0E9DA7233}" type="datetimeFigureOut">
               <a:rPr lang="pt-BR" smtClean="0"/>
               <a:pPr/>
-              <a:t>17/07/2016</a:t>
+              <a:t>19/07/2016</a:t>
             </a:fld>
             <a:endParaRPr lang="pt-BR"/>
           </a:p>
@@ -3153,7 +3153,7 @@
             <a:fld id="{97BE082F-75F0-4080-8642-9DC0E9DA7233}" type="datetimeFigureOut">
               <a:rPr lang="pt-BR" smtClean="0"/>
               <a:pPr/>
-              <a:t>17/07/2016</a:t>
+              <a:t>19/07/2016</a:t>
             </a:fld>
             <a:endParaRPr lang="pt-BR"/>
           </a:p>
@@ -3368,7 +3368,7 @@
             <a:fld id="{97BE082F-75F0-4080-8642-9DC0E9DA7233}" type="datetimeFigureOut">
               <a:rPr lang="pt-BR" smtClean="0"/>
               <a:pPr/>
-              <a:t>17/07/2016</a:t>
+              <a:t>19/07/2016</a:t>
             </a:fld>
             <a:endParaRPr lang="pt-BR"/>
           </a:p>
@@ -4566,8 +4566,12 @@
           <a:p>
             <a:pPr lvl="1"/>
             <a:r>
+              <a:rPr lang="pt-BR" dirty="0" err="1" smtClean="0"/>
+              <a:t>Jul</a:t>
+            </a:r>
+            <a:r>
               <a:rPr lang="pt-BR" dirty="0" smtClean="0"/>
-              <a:t>Out/</a:t>
+              <a:t>/</a:t>
             </a:r>
             <a:r>
               <a:rPr lang="pt-BR" dirty="0" err="1" smtClean="0"/>
@@ -4575,7 +4579,11 @@
             </a:r>
             <a:r>
               <a:rPr lang="pt-BR" dirty="0" smtClean="0"/>
-              <a:t> 2015: Java 8 para testar código Java 8</a:t>
+              <a:t> </a:t>
+            </a:r>
+            <a:r>
+              <a:rPr lang="pt-BR" dirty="0" smtClean="0"/>
+              <a:t>2015: Java 8 para testar código Java 8</a:t>
             </a:r>
           </a:p>
           <a:p>

</xml_diff>